<commit_message>
create table for existing solutions
</commit_message>
<xml_diff>
--- a/presentation.pptx
+++ b/presentation.pptx
@@ -1,14 +1,14 @@
 
 <file path=ppt/presentation.xml><?xml version="1.0" encoding="utf-8"?>
-<p:presentation xmlns:a="http://schemas.openxmlformats.org/drawingml/2006/main" xmlns:r="http://schemas.openxmlformats.org/officeDocument/2006/relationships" xmlns:p="http://schemas.openxmlformats.org/presentationml/2006/main" removePersonalInfoOnSave="1" saveSubsetFonts="1" autoCompressPictures="0">
+<p:presentation xmlns:a="http://schemas.openxmlformats.org/drawingml/2006/main" xmlns:r="http://schemas.openxmlformats.org/officeDocument/2006/relationships" xmlns:p="http://schemas.openxmlformats.org/presentationml/2006/main" saveSubsetFonts="1" autoCompressPictures="0">
   <p:sldMasterIdLst>
     <p:sldMasterId id="2147483692" r:id="rId4"/>
   </p:sldMasterIdLst>
   <p:notesMasterIdLst>
-    <p:notesMasterId r:id="rId26"/>
+    <p:notesMasterId r:id="rId27"/>
   </p:notesMasterIdLst>
   <p:handoutMasterIdLst>
-    <p:handoutMasterId r:id="rId27"/>
+    <p:handoutMasterId r:id="rId28"/>
   </p:handoutMasterIdLst>
   <p:sldIdLst>
     <p:sldId id="354" r:id="rId5"/>
@@ -19,19 +19,20 @@
     <p:sldId id="374" r:id="rId10"/>
     <p:sldId id="373" r:id="rId11"/>
     <p:sldId id="387" r:id="rId12"/>
-    <p:sldId id="368" r:id="rId13"/>
-    <p:sldId id="369" r:id="rId14"/>
-    <p:sldId id="370" r:id="rId15"/>
-    <p:sldId id="371" r:id="rId16"/>
-    <p:sldId id="376" r:id="rId17"/>
-    <p:sldId id="377" r:id="rId18"/>
-    <p:sldId id="378" r:id="rId19"/>
-    <p:sldId id="379" r:id="rId20"/>
-    <p:sldId id="380" r:id="rId21"/>
-    <p:sldId id="381" r:id="rId22"/>
-    <p:sldId id="382" r:id="rId23"/>
-    <p:sldId id="383" r:id="rId24"/>
-    <p:sldId id="384" r:id="rId25"/>
+    <p:sldId id="389" r:id="rId13"/>
+    <p:sldId id="368" r:id="rId14"/>
+    <p:sldId id="369" r:id="rId15"/>
+    <p:sldId id="370" r:id="rId16"/>
+    <p:sldId id="371" r:id="rId17"/>
+    <p:sldId id="376" r:id="rId18"/>
+    <p:sldId id="377" r:id="rId19"/>
+    <p:sldId id="378" r:id="rId20"/>
+    <p:sldId id="379" r:id="rId21"/>
+    <p:sldId id="380" r:id="rId22"/>
+    <p:sldId id="381" r:id="rId23"/>
+    <p:sldId id="382" r:id="rId24"/>
+    <p:sldId id="383" r:id="rId25"/>
+    <p:sldId id="384" r:id="rId26"/>
   </p:sldIdLst>
   <p:sldSz cx="12188825" cy="6858000"/>
   <p:notesSz cx="6858000" cy="9144000"/>
@@ -9296,7 +9297,7 @@
           <p:cNvPr id="2" name="Title 1">
             <a:extLst>
               <a:ext uri="{FF2B5EF4-FFF2-40B4-BE49-F238E27FC236}">
-                <a16:creationId xmlns:a16="http://schemas.microsoft.com/office/drawing/2014/main" id="{1DAF76BE-D861-0DEF-4ADF-A5EE483C6394}"/>
+                <a16:creationId xmlns:a16="http://schemas.microsoft.com/office/drawing/2014/main" id="{0A5D6C40-0434-EBEF-14BF-1D813775EF96}"/>
               </a:ext>
             </a:extLst>
           </p:cNvPr>
@@ -9312,7 +9313,10 @@
           <a:bodyPr/>
           <a:lstStyle/>
           <a:p>
-            <a:endParaRPr lang="en-IN" dirty="0"/>
+            <a:r>
+              <a:rPr lang="en-IN" dirty="0"/>
+              <a:t>Definition Phase</a:t>
+            </a:r>
           </a:p>
         </p:txBody>
       </p:sp>
@@ -9321,7 +9325,7 @@
           <p:cNvPr id="3" name="Content Placeholder 2">
             <a:extLst>
               <a:ext uri="{FF2B5EF4-FFF2-40B4-BE49-F238E27FC236}">
-                <a16:creationId xmlns:a16="http://schemas.microsoft.com/office/drawing/2014/main" id="{658554FA-E424-11D3-4CED-608F7A2DAA49}"/>
+                <a16:creationId xmlns:a16="http://schemas.microsoft.com/office/drawing/2014/main" id="{1F8B4EA7-19B5-0955-618D-BC7C3C520C0A}"/>
               </a:ext>
             </a:extLst>
           </p:cNvPr>
@@ -9337,16 +9341,41 @@
           <a:bodyPr/>
           <a:lstStyle/>
           <a:p>
+            <a:endParaRPr lang="en-IN" dirty="0"/>
+          </a:p>
+        </p:txBody>
+      </p:sp>
+      <p:sp>
+        <p:nvSpPr>
+          <p:cNvPr id="4" name="Content Placeholder 3">
+            <a:extLst>
+              <a:ext uri="{FF2B5EF4-FFF2-40B4-BE49-F238E27FC236}">
+                <a16:creationId xmlns:a16="http://schemas.microsoft.com/office/drawing/2014/main" id="{FE2E3821-7773-A700-B250-3A6DD047DD24}"/>
+              </a:ext>
+            </a:extLst>
+          </p:cNvPr>
+          <p:cNvSpPr>
+            <a:spLocks noGrp="1"/>
+          </p:cNvSpPr>
+          <p:nvPr>
+            <p:ph sz="quarter" idx="14"/>
+          </p:nvPr>
+        </p:nvSpPr>
+        <p:spPr/>
+        <p:txBody>
+          <a:bodyPr/>
+          <a:lstStyle/>
+          <a:p>
             <a:endParaRPr lang="en-IN"/>
           </a:p>
         </p:txBody>
       </p:sp>
       <p:sp>
         <p:nvSpPr>
-          <p:cNvPr id="4" name="Slide Number Placeholder 3">
-            <a:extLst>
-              <a:ext uri="{FF2B5EF4-FFF2-40B4-BE49-F238E27FC236}">
-                <a16:creationId xmlns:a16="http://schemas.microsoft.com/office/drawing/2014/main" id="{D3EDF452-2A72-5BC1-C650-2140070FDD4D}"/>
+          <p:cNvPr id="5" name="Slide Number Placeholder 4">
+            <a:extLst>
+              <a:ext uri="{FF2B5EF4-FFF2-40B4-BE49-F238E27FC236}">
+                <a16:creationId xmlns:a16="http://schemas.microsoft.com/office/drawing/2014/main" id="{44E62C45-36B8-E3B6-D4AD-080ECB2464DE}"/>
               </a:ext>
             </a:extLst>
           </p:cNvPr>
@@ -9371,10 +9400,141 @@
           </a:p>
         </p:txBody>
       </p:sp>
+      <p:sp>
+        <p:nvSpPr>
+          <p:cNvPr id="6" name="Slide Number Placeholder 4">
+            <a:extLst>
+              <a:ext uri="{FF2B5EF4-FFF2-40B4-BE49-F238E27FC236}">
+                <a16:creationId xmlns:a16="http://schemas.microsoft.com/office/drawing/2014/main" id="{0752F8F6-0AE8-2345-FE68-F9E52EC6B15A}"/>
+              </a:ext>
+            </a:extLst>
+          </p:cNvPr>
+          <p:cNvSpPr txBox="1">
+            <a:spLocks/>
+          </p:cNvSpPr>
+          <p:nvPr/>
+        </p:nvSpPr>
+        <p:spPr>
+          <a:xfrm>
+            <a:off x="455612" y="6190488"/>
+            <a:ext cx="2677604" cy="210312"/>
+          </a:xfrm>
+          <a:prstGeom prst="rect">
+            <a:avLst/>
+          </a:prstGeom>
+        </p:spPr>
+        <p:txBody>
+          <a:bodyPr vert="horz" lIns="121899" tIns="60949" rIns="121899" bIns="60949" rtlCol="0" anchor="b"/>
+          <a:lstStyle>
+            <a:defPPr>
+              <a:defRPr lang="en-US"/>
+            </a:defPPr>
+            <a:lvl1pPr marL="0" algn="r" defTabSz="1218987" rtl="0" eaLnBrk="1" latinLnBrk="0" hangingPunct="1">
+              <a:defRPr sz="1000" b="1" kern="1200" spc="200" baseline="0">
+                <a:solidFill>
+                  <a:schemeClr val="tx2">
+                    <a:lumMod val="50000"/>
+                  </a:schemeClr>
+                </a:solidFill>
+                <a:latin typeface="+mn-lt"/>
+                <a:ea typeface="+mn-ea"/>
+                <a:cs typeface="+mn-cs"/>
+              </a:defRPr>
+            </a:lvl1pPr>
+            <a:lvl2pPr marL="609493" algn="l" defTabSz="1218987" rtl="0" eaLnBrk="1" latinLnBrk="0" hangingPunct="1">
+              <a:defRPr sz="2400" kern="1200">
+                <a:solidFill>
+                  <a:schemeClr val="tx1"/>
+                </a:solidFill>
+                <a:latin typeface="+mn-lt"/>
+                <a:ea typeface="+mn-ea"/>
+                <a:cs typeface="+mn-cs"/>
+              </a:defRPr>
+            </a:lvl2pPr>
+            <a:lvl3pPr marL="1218987" algn="l" defTabSz="1218987" rtl="0" eaLnBrk="1" latinLnBrk="0" hangingPunct="1">
+              <a:defRPr sz="2400" kern="1200">
+                <a:solidFill>
+                  <a:schemeClr val="tx1"/>
+                </a:solidFill>
+                <a:latin typeface="+mn-lt"/>
+                <a:ea typeface="+mn-ea"/>
+                <a:cs typeface="+mn-cs"/>
+              </a:defRPr>
+            </a:lvl3pPr>
+            <a:lvl4pPr marL="1828480" algn="l" defTabSz="1218987" rtl="0" eaLnBrk="1" latinLnBrk="0" hangingPunct="1">
+              <a:defRPr sz="2400" kern="1200">
+                <a:solidFill>
+                  <a:schemeClr val="tx1"/>
+                </a:solidFill>
+                <a:latin typeface="+mn-lt"/>
+                <a:ea typeface="+mn-ea"/>
+                <a:cs typeface="+mn-cs"/>
+              </a:defRPr>
+            </a:lvl4pPr>
+            <a:lvl5pPr marL="2437973" algn="l" defTabSz="1218987" rtl="0" eaLnBrk="1" latinLnBrk="0" hangingPunct="1">
+              <a:defRPr sz="2400" kern="1200">
+                <a:solidFill>
+                  <a:schemeClr val="tx1"/>
+                </a:solidFill>
+                <a:latin typeface="+mn-lt"/>
+                <a:ea typeface="+mn-ea"/>
+                <a:cs typeface="+mn-cs"/>
+              </a:defRPr>
+            </a:lvl5pPr>
+            <a:lvl6pPr marL="3047467" algn="l" defTabSz="1218987" rtl="0" eaLnBrk="1" latinLnBrk="0" hangingPunct="1">
+              <a:defRPr sz="2400" kern="1200">
+                <a:solidFill>
+                  <a:schemeClr val="tx1"/>
+                </a:solidFill>
+                <a:latin typeface="+mn-lt"/>
+                <a:ea typeface="+mn-ea"/>
+                <a:cs typeface="+mn-cs"/>
+              </a:defRPr>
+            </a:lvl6pPr>
+            <a:lvl7pPr marL="3656960" algn="l" defTabSz="1218987" rtl="0" eaLnBrk="1" latinLnBrk="0" hangingPunct="1">
+              <a:defRPr sz="2400" kern="1200">
+                <a:solidFill>
+                  <a:schemeClr val="tx1"/>
+                </a:solidFill>
+                <a:latin typeface="+mn-lt"/>
+                <a:ea typeface="+mn-ea"/>
+                <a:cs typeface="+mn-cs"/>
+              </a:defRPr>
+            </a:lvl7pPr>
+            <a:lvl8pPr marL="4266453" algn="l" defTabSz="1218987" rtl="0" eaLnBrk="1" latinLnBrk="0" hangingPunct="1">
+              <a:defRPr sz="2400" kern="1200">
+                <a:solidFill>
+                  <a:schemeClr val="tx1"/>
+                </a:solidFill>
+                <a:latin typeface="+mn-lt"/>
+                <a:ea typeface="+mn-ea"/>
+                <a:cs typeface="+mn-cs"/>
+              </a:defRPr>
+            </a:lvl8pPr>
+            <a:lvl9pPr marL="4875947" algn="l" defTabSz="1218987" rtl="0" eaLnBrk="1" latinLnBrk="0" hangingPunct="1">
+              <a:defRPr sz="2400" kern="1200">
+                <a:solidFill>
+                  <a:schemeClr val="tx1"/>
+                </a:solidFill>
+                <a:latin typeface="+mn-lt"/>
+                <a:ea typeface="+mn-ea"/>
+                <a:cs typeface="+mn-cs"/>
+              </a:defRPr>
+            </a:lvl9pPr>
+          </a:lstStyle>
+          <a:p>
+            <a:pPr algn="l"/>
+            <a:r>
+              <a:rPr lang="en-US" dirty="0"/>
+              <a:t>DES211 CAPSTONE PROJECT</a:t>
+            </a:r>
+          </a:p>
+        </p:txBody>
+      </p:sp>
     </p:spTree>
     <p:extLst>
       <p:ext uri="{BB962C8B-B14F-4D97-AF65-F5344CB8AC3E}">
-        <p14:creationId xmlns:p14="http://schemas.microsoft.com/office/powerpoint/2010/main" val="3542959396"/>
+        <p14:creationId xmlns:p14="http://schemas.microsoft.com/office/powerpoint/2010/main" val="3382860869"/>
       </p:ext>
     </p:extLst>
   </p:cSld>
@@ -9418,7 +9578,7 @@
           <p:cNvPr id="2" name="Title 1">
             <a:extLst>
               <a:ext uri="{FF2B5EF4-FFF2-40B4-BE49-F238E27FC236}">
-                <a16:creationId xmlns:a16="http://schemas.microsoft.com/office/drawing/2014/main" id="{81A3617B-0FD5-4494-9CDA-AE370728EAD0}"/>
+                <a16:creationId xmlns:a16="http://schemas.microsoft.com/office/drawing/2014/main" id="{1DAF76BE-D861-0DEF-4ADF-A5EE483C6394}"/>
               </a:ext>
             </a:extLst>
           </p:cNvPr>
@@ -9434,16 +9594,16 @@
           <a:bodyPr/>
           <a:lstStyle/>
           <a:p>
-            <a:endParaRPr lang="en-IN"/>
-          </a:p>
-        </p:txBody>
-      </p:sp>
-      <p:sp>
-        <p:nvSpPr>
-          <p:cNvPr id="3" name="Picture Placeholder 2">
-            <a:extLst>
-              <a:ext uri="{FF2B5EF4-FFF2-40B4-BE49-F238E27FC236}">
-                <a16:creationId xmlns:a16="http://schemas.microsoft.com/office/drawing/2014/main" id="{41F5745F-E770-D068-578F-3CFE5F9010C6}"/>
+            <a:endParaRPr lang="en-IN" dirty="0"/>
+          </a:p>
+        </p:txBody>
+      </p:sp>
+      <p:sp>
+        <p:nvSpPr>
+          <p:cNvPr id="3" name="Content Placeholder 2">
+            <a:extLst>
+              <a:ext uri="{FF2B5EF4-FFF2-40B4-BE49-F238E27FC236}">
+                <a16:creationId xmlns:a16="http://schemas.microsoft.com/office/drawing/2014/main" id="{658554FA-E424-11D3-4CED-608F7A2DAA49}"/>
               </a:ext>
             </a:extLst>
           </p:cNvPr>
@@ -9451,15 +9611,183 @@
             <a:spLocks noGrp="1"/>
           </p:cNvSpPr>
           <p:nvPr>
-            <p:ph type="pic" sz="quarter" idx="10"/>
+            <p:ph sz="quarter" idx="13"/>
           </p:nvPr>
         </p:nvSpPr>
         <p:spPr/>
+        <p:txBody>
+          <a:bodyPr/>
+          <a:lstStyle/>
+          <a:p>
+            <a:endParaRPr lang="en-IN"/>
+          </a:p>
+        </p:txBody>
+      </p:sp>
+      <p:sp>
+        <p:nvSpPr>
+          <p:cNvPr id="4" name="Slide Number Placeholder 3">
+            <a:extLst>
+              <a:ext uri="{FF2B5EF4-FFF2-40B4-BE49-F238E27FC236}">
+                <a16:creationId xmlns:a16="http://schemas.microsoft.com/office/drawing/2014/main" id="{D3EDF452-2A72-5BC1-C650-2140070FDD4D}"/>
+              </a:ext>
+            </a:extLst>
+          </p:cNvPr>
+          <p:cNvSpPr>
+            <a:spLocks noGrp="1"/>
+          </p:cNvSpPr>
+          <p:nvPr>
+            <p:ph type="sldNum" sz="quarter" idx="12"/>
+          </p:nvPr>
+        </p:nvSpPr>
+        <p:spPr/>
+        <p:txBody>
+          <a:bodyPr/>
+          <a:lstStyle/>
+          <a:p>
+            <a:fld id="{EB37DED6-D4C7-42EE-AB49-D2E39E64FDE4}" type="slidenum">
+              <a:rPr lang="en-US" smtClean="0"/>
+              <a:pPr/>
+              <a:t>11</a:t>
+            </a:fld>
+            <a:endParaRPr lang="en-US" dirty="0"/>
+          </a:p>
+        </p:txBody>
+      </p:sp>
+      <p:sp>
+        <p:nvSpPr>
+          <p:cNvPr id="5" name="Slide Number Placeholder 4">
+            <a:extLst>
+              <a:ext uri="{FF2B5EF4-FFF2-40B4-BE49-F238E27FC236}">
+                <a16:creationId xmlns:a16="http://schemas.microsoft.com/office/drawing/2014/main" id="{F7C1BEA9-8B0A-E664-F9E2-D7E738116FAA}"/>
+              </a:ext>
+            </a:extLst>
+          </p:cNvPr>
+          <p:cNvSpPr txBox="1">
+            <a:spLocks/>
+          </p:cNvSpPr>
+          <p:nvPr/>
+        </p:nvSpPr>
+        <p:spPr>
+          <a:xfrm>
+            <a:off x="455612" y="6190488"/>
+            <a:ext cx="2677604" cy="210312"/>
+          </a:xfrm>
+          <a:prstGeom prst="rect">
+            <a:avLst/>
+          </a:prstGeom>
+        </p:spPr>
+        <p:txBody>
+          <a:bodyPr vert="horz" lIns="121899" tIns="60949" rIns="121899" bIns="60949" rtlCol="0" anchor="b"/>
+          <a:lstStyle>
+            <a:defPPr>
+              <a:defRPr lang="en-US"/>
+            </a:defPPr>
+            <a:lvl1pPr marL="0" algn="r" defTabSz="1218987" rtl="0" eaLnBrk="1" latinLnBrk="0" hangingPunct="1">
+              <a:defRPr sz="1000" b="1" kern="1200" spc="200" baseline="0">
+                <a:solidFill>
+                  <a:schemeClr val="tx2">
+                    <a:lumMod val="50000"/>
+                  </a:schemeClr>
+                </a:solidFill>
+                <a:latin typeface="+mn-lt"/>
+                <a:ea typeface="+mn-ea"/>
+                <a:cs typeface="+mn-cs"/>
+              </a:defRPr>
+            </a:lvl1pPr>
+            <a:lvl2pPr marL="609493" algn="l" defTabSz="1218987" rtl="0" eaLnBrk="1" latinLnBrk="0" hangingPunct="1">
+              <a:defRPr sz="2400" kern="1200">
+                <a:solidFill>
+                  <a:schemeClr val="tx1"/>
+                </a:solidFill>
+                <a:latin typeface="+mn-lt"/>
+                <a:ea typeface="+mn-ea"/>
+                <a:cs typeface="+mn-cs"/>
+              </a:defRPr>
+            </a:lvl2pPr>
+            <a:lvl3pPr marL="1218987" algn="l" defTabSz="1218987" rtl="0" eaLnBrk="1" latinLnBrk="0" hangingPunct="1">
+              <a:defRPr sz="2400" kern="1200">
+                <a:solidFill>
+                  <a:schemeClr val="tx1"/>
+                </a:solidFill>
+                <a:latin typeface="+mn-lt"/>
+                <a:ea typeface="+mn-ea"/>
+                <a:cs typeface="+mn-cs"/>
+              </a:defRPr>
+            </a:lvl3pPr>
+            <a:lvl4pPr marL="1828480" algn="l" defTabSz="1218987" rtl="0" eaLnBrk="1" latinLnBrk="0" hangingPunct="1">
+              <a:defRPr sz="2400" kern="1200">
+                <a:solidFill>
+                  <a:schemeClr val="tx1"/>
+                </a:solidFill>
+                <a:latin typeface="+mn-lt"/>
+                <a:ea typeface="+mn-ea"/>
+                <a:cs typeface="+mn-cs"/>
+              </a:defRPr>
+            </a:lvl4pPr>
+            <a:lvl5pPr marL="2437973" algn="l" defTabSz="1218987" rtl="0" eaLnBrk="1" latinLnBrk="0" hangingPunct="1">
+              <a:defRPr sz="2400" kern="1200">
+                <a:solidFill>
+                  <a:schemeClr val="tx1"/>
+                </a:solidFill>
+                <a:latin typeface="+mn-lt"/>
+                <a:ea typeface="+mn-ea"/>
+                <a:cs typeface="+mn-cs"/>
+              </a:defRPr>
+            </a:lvl5pPr>
+            <a:lvl6pPr marL="3047467" algn="l" defTabSz="1218987" rtl="0" eaLnBrk="1" latinLnBrk="0" hangingPunct="1">
+              <a:defRPr sz="2400" kern="1200">
+                <a:solidFill>
+                  <a:schemeClr val="tx1"/>
+                </a:solidFill>
+                <a:latin typeface="+mn-lt"/>
+                <a:ea typeface="+mn-ea"/>
+                <a:cs typeface="+mn-cs"/>
+              </a:defRPr>
+            </a:lvl6pPr>
+            <a:lvl7pPr marL="3656960" algn="l" defTabSz="1218987" rtl="0" eaLnBrk="1" latinLnBrk="0" hangingPunct="1">
+              <a:defRPr sz="2400" kern="1200">
+                <a:solidFill>
+                  <a:schemeClr val="tx1"/>
+                </a:solidFill>
+                <a:latin typeface="+mn-lt"/>
+                <a:ea typeface="+mn-ea"/>
+                <a:cs typeface="+mn-cs"/>
+              </a:defRPr>
+            </a:lvl7pPr>
+            <a:lvl8pPr marL="4266453" algn="l" defTabSz="1218987" rtl="0" eaLnBrk="1" latinLnBrk="0" hangingPunct="1">
+              <a:defRPr sz="2400" kern="1200">
+                <a:solidFill>
+                  <a:schemeClr val="tx1"/>
+                </a:solidFill>
+                <a:latin typeface="+mn-lt"/>
+                <a:ea typeface="+mn-ea"/>
+                <a:cs typeface="+mn-cs"/>
+              </a:defRPr>
+            </a:lvl8pPr>
+            <a:lvl9pPr marL="4875947" algn="l" defTabSz="1218987" rtl="0" eaLnBrk="1" latinLnBrk="0" hangingPunct="1">
+              <a:defRPr sz="2400" kern="1200">
+                <a:solidFill>
+                  <a:schemeClr val="tx1"/>
+                </a:solidFill>
+                <a:latin typeface="+mn-lt"/>
+                <a:ea typeface="+mn-ea"/>
+                <a:cs typeface="+mn-cs"/>
+              </a:defRPr>
+            </a:lvl9pPr>
+          </a:lstStyle>
+          <a:p>
+            <a:pPr algn="l"/>
+            <a:r>
+              <a:rPr lang="en-US" dirty="0"/>
+              <a:t>DES211 CAPSTONE PROJECT</a:t>
+            </a:r>
+          </a:p>
+        </p:txBody>
       </p:sp>
     </p:spTree>
     <p:extLst>
       <p:ext uri="{BB962C8B-B14F-4D97-AF65-F5344CB8AC3E}">
-        <p14:creationId xmlns:p14="http://schemas.microsoft.com/office/powerpoint/2010/main" val="4073682777"/>
+        <p14:creationId xmlns:p14="http://schemas.microsoft.com/office/powerpoint/2010/main" val="3542959396"/>
       </p:ext>
     </p:extLst>
   </p:cSld>
@@ -9503,7 +9831,7 @@
           <p:cNvPr id="2" name="Title 1">
             <a:extLst>
               <a:ext uri="{FF2B5EF4-FFF2-40B4-BE49-F238E27FC236}">
-                <a16:creationId xmlns:a16="http://schemas.microsoft.com/office/drawing/2014/main" id="{8293087C-D9DF-6AEB-3DDD-CE6BA4742958}"/>
+                <a16:creationId xmlns:a16="http://schemas.microsoft.com/office/drawing/2014/main" id="{81A3617B-0FD5-4494-9CDA-AE370728EAD0}"/>
               </a:ext>
             </a:extLst>
           </p:cNvPr>
@@ -9525,10 +9853,10 @@
       </p:sp>
       <p:sp>
         <p:nvSpPr>
-          <p:cNvPr id="3" name="Content Placeholder 2">
-            <a:extLst>
-              <a:ext uri="{FF2B5EF4-FFF2-40B4-BE49-F238E27FC236}">
-                <a16:creationId xmlns:a16="http://schemas.microsoft.com/office/drawing/2014/main" id="{A5EB9FEF-DE24-2B3B-D6C5-2F664A0F932B}"/>
+          <p:cNvPr id="3" name="Picture Placeholder 2">
+            <a:extLst>
+              <a:ext uri="{FF2B5EF4-FFF2-40B4-BE49-F238E27FC236}">
+                <a16:creationId xmlns:a16="http://schemas.microsoft.com/office/drawing/2014/main" id="{41F5745F-E770-D068-578F-3CFE5F9010C6}"/>
               </a:ext>
             </a:extLst>
           </p:cNvPr>
@@ -9536,7 +9864,7 @@
             <a:spLocks noGrp="1"/>
           </p:cNvSpPr>
           <p:nvPr>
-            <p:ph sz="quarter" idx="13"/>
+            <p:ph type="pic" sz="quarter" idx="10"/>
           </p:nvPr>
         </p:nvSpPr>
         <p:spPr/>
@@ -9544,123 +9872,145 @@
           <a:bodyPr/>
           <a:lstStyle/>
           <a:p>
-            <a:endParaRPr lang="en-IN"/>
-          </a:p>
-        </p:txBody>
-      </p:sp>
-      <p:sp>
-        <p:nvSpPr>
-          <p:cNvPr id="4" name="Content Placeholder 3">
-            <a:extLst>
-              <a:ext uri="{FF2B5EF4-FFF2-40B4-BE49-F238E27FC236}">
-                <a16:creationId xmlns:a16="http://schemas.microsoft.com/office/drawing/2014/main" id="{90AD67B7-7DE5-CFC5-8DC4-1A1C44B6049D}"/>
-              </a:ext>
-            </a:extLst>
-          </p:cNvPr>
-          <p:cNvSpPr>
-            <a:spLocks noGrp="1"/>
+            <a:endParaRPr lang="en-US"/>
+          </a:p>
+        </p:txBody>
+      </p:sp>
+      <p:sp>
+        <p:nvSpPr>
+          <p:cNvPr id="4" name="Slide Number Placeholder 4">
+            <a:extLst>
+              <a:ext uri="{FF2B5EF4-FFF2-40B4-BE49-F238E27FC236}">
+                <a16:creationId xmlns:a16="http://schemas.microsoft.com/office/drawing/2014/main" id="{86BBD80D-924B-9698-2026-C1006CEB90DA}"/>
+              </a:ext>
+            </a:extLst>
+          </p:cNvPr>
+          <p:cNvSpPr txBox="1">
+            <a:spLocks/>
           </p:cNvSpPr>
-          <p:nvPr>
-            <p:ph sz="quarter" idx="14"/>
-          </p:nvPr>
-        </p:nvSpPr>
-        <p:spPr/>
-        <p:txBody>
-          <a:bodyPr/>
-          <a:lstStyle/>
-          <a:p>
-            <a:endParaRPr lang="en-IN"/>
-          </a:p>
-        </p:txBody>
-      </p:sp>
-      <p:sp>
-        <p:nvSpPr>
-          <p:cNvPr id="5" name="Picture Placeholder 4">
-            <a:extLst>
-              <a:ext uri="{FF2B5EF4-FFF2-40B4-BE49-F238E27FC236}">
-                <a16:creationId xmlns:a16="http://schemas.microsoft.com/office/drawing/2014/main" id="{84B86DCF-4B97-9947-A1A5-CB1979819433}"/>
-              </a:ext>
-            </a:extLst>
-          </p:cNvPr>
-          <p:cNvSpPr>
-            <a:spLocks noGrp="1"/>
-          </p:cNvSpPr>
-          <p:nvPr>
-            <p:ph type="pic" sz="quarter" idx="15"/>
-          </p:nvPr>
-        </p:nvSpPr>
-        <p:spPr/>
-      </p:sp>
-      <p:sp>
-        <p:nvSpPr>
-          <p:cNvPr id="6" name="Picture Placeholder 5">
-            <a:extLst>
-              <a:ext uri="{FF2B5EF4-FFF2-40B4-BE49-F238E27FC236}">
-                <a16:creationId xmlns:a16="http://schemas.microsoft.com/office/drawing/2014/main" id="{8AB7107F-47DD-9F0D-70A4-3FF297304F55}"/>
-              </a:ext>
-            </a:extLst>
-          </p:cNvPr>
-          <p:cNvSpPr>
-            <a:spLocks noGrp="1"/>
-          </p:cNvSpPr>
-          <p:nvPr>
-            <p:ph type="pic" sz="quarter" idx="17"/>
-          </p:nvPr>
-        </p:nvSpPr>
-        <p:spPr/>
-      </p:sp>
-      <p:sp>
-        <p:nvSpPr>
-          <p:cNvPr id="7" name="Picture Placeholder 6">
-            <a:extLst>
-              <a:ext uri="{FF2B5EF4-FFF2-40B4-BE49-F238E27FC236}">
-                <a16:creationId xmlns:a16="http://schemas.microsoft.com/office/drawing/2014/main" id="{638EFBB7-E515-DA5F-08E3-9C0BE88AB6AA}"/>
-              </a:ext>
-            </a:extLst>
-          </p:cNvPr>
-          <p:cNvSpPr>
-            <a:spLocks noGrp="1"/>
-          </p:cNvSpPr>
-          <p:nvPr>
-            <p:ph type="pic" sz="quarter" idx="16"/>
-          </p:nvPr>
-        </p:nvSpPr>
-        <p:spPr/>
-      </p:sp>
-      <p:sp>
-        <p:nvSpPr>
-          <p:cNvPr id="8" name="Slide Number Placeholder 7">
-            <a:extLst>
-              <a:ext uri="{FF2B5EF4-FFF2-40B4-BE49-F238E27FC236}">
-                <a16:creationId xmlns:a16="http://schemas.microsoft.com/office/drawing/2014/main" id="{73E0A801-B1B2-373A-D748-9D9CBC514047}"/>
-              </a:ext>
-            </a:extLst>
-          </p:cNvPr>
-          <p:cNvSpPr>
-            <a:spLocks noGrp="1"/>
-          </p:cNvSpPr>
-          <p:nvPr>
-            <p:ph type="sldNum" sz="quarter" idx="12"/>
-          </p:nvPr>
-        </p:nvSpPr>
-        <p:spPr/>
-        <p:txBody>
-          <a:bodyPr/>
-          <a:lstStyle/>
-          <a:p>
-            <a:fld id="{EB37DED6-D4C7-42EE-AB49-D2E39E64FDE4}" type="slidenum">
-              <a:rPr lang="en-US" smtClean="0"/>
-              <a:pPr/>
-              <a:t>12</a:t>
-            </a:fld>
-            <a:endParaRPr lang="en-US" dirty="0"/>
+          <p:nvPr/>
+        </p:nvSpPr>
+        <p:spPr>
+          <a:xfrm>
+            <a:off x="-3278188" y="6172200"/>
+            <a:ext cx="2677604" cy="210312"/>
+          </a:xfrm>
+          <a:prstGeom prst="rect">
+            <a:avLst/>
+          </a:prstGeom>
+        </p:spPr>
+        <p:txBody>
+          <a:bodyPr vert="horz" lIns="121899" tIns="60949" rIns="121899" bIns="60949" rtlCol="0" anchor="b"/>
+          <a:lstStyle>
+            <a:defPPr>
+              <a:defRPr lang="en-US"/>
+            </a:defPPr>
+            <a:lvl1pPr marL="0" algn="r" defTabSz="1218987" rtl="0" eaLnBrk="1" latinLnBrk="0" hangingPunct="1">
+              <a:defRPr sz="1000" b="1" kern="1200" spc="200" baseline="0">
+                <a:solidFill>
+                  <a:schemeClr val="tx2">
+                    <a:lumMod val="50000"/>
+                  </a:schemeClr>
+                </a:solidFill>
+                <a:latin typeface="+mn-lt"/>
+                <a:ea typeface="+mn-ea"/>
+                <a:cs typeface="+mn-cs"/>
+              </a:defRPr>
+            </a:lvl1pPr>
+            <a:lvl2pPr marL="609493" algn="l" defTabSz="1218987" rtl="0" eaLnBrk="1" latinLnBrk="0" hangingPunct="1">
+              <a:defRPr sz="2400" kern="1200">
+                <a:solidFill>
+                  <a:schemeClr val="tx1"/>
+                </a:solidFill>
+                <a:latin typeface="+mn-lt"/>
+                <a:ea typeface="+mn-ea"/>
+                <a:cs typeface="+mn-cs"/>
+              </a:defRPr>
+            </a:lvl2pPr>
+            <a:lvl3pPr marL="1218987" algn="l" defTabSz="1218987" rtl="0" eaLnBrk="1" latinLnBrk="0" hangingPunct="1">
+              <a:defRPr sz="2400" kern="1200">
+                <a:solidFill>
+                  <a:schemeClr val="tx1"/>
+                </a:solidFill>
+                <a:latin typeface="+mn-lt"/>
+                <a:ea typeface="+mn-ea"/>
+                <a:cs typeface="+mn-cs"/>
+              </a:defRPr>
+            </a:lvl3pPr>
+            <a:lvl4pPr marL="1828480" algn="l" defTabSz="1218987" rtl="0" eaLnBrk="1" latinLnBrk="0" hangingPunct="1">
+              <a:defRPr sz="2400" kern="1200">
+                <a:solidFill>
+                  <a:schemeClr val="tx1"/>
+                </a:solidFill>
+                <a:latin typeface="+mn-lt"/>
+                <a:ea typeface="+mn-ea"/>
+                <a:cs typeface="+mn-cs"/>
+              </a:defRPr>
+            </a:lvl4pPr>
+            <a:lvl5pPr marL="2437973" algn="l" defTabSz="1218987" rtl="0" eaLnBrk="1" latinLnBrk="0" hangingPunct="1">
+              <a:defRPr sz="2400" kern="1200">
+                <a:solidFill>
+                  <a:schemeClr val="tx1"/>
+                </a:solidFill>
+                <a:latin typeface="+mn-lt"/>
+                <a:ea typeface="+mn-ea"/>
+                <a:cs typeface="+mn-cs"/>
+              </a:defRPr>
+            </a:lvl5pPr>
+            <a:lvl6pPr marL="3047467" algn="l" defTabSz="1218987" rtl="0" eaLnBrk="1" latinLnBrk="0" hangingPunct="1">
+              <a:defRPr sz="2400" kern="1200">
+                <a:solidFill>
+                  <a:schemeClr val="tx1"/>
+                </a:solidFill>
+                <a:latin typeface="+mn-lt"/>
+                <a:ea typeface="+mn-ea"/>
+                <a:cs typeface="+mn-cs"/>
+              </a:defRPr>
+            </a:lvl6pPr>
+            <a:lvl7pPr marL="3656960" algn="l" defTabSz="1218987" rtl="0" eaLnBrk="1" latinLnBrk="0" hangingPunct="1">
+              <a:defRPr sz="2400" kern="1200">
+                <a:solidFill>
+                  <a:schemeClr val="tx1"/>
+                </a:solidFill>
+                <a:latin typeface="+mn-lt"/>
+                <a:ea typeface="+mn-ea"/>
+                <a:cs typeface="+mn-cs"/>
+              </a:defRPr>
+            </a:lvl7pPr>
+            <a:lvl8pPr marL="4266453" algn="l" defTabSz="1218987" rtl="0" eaLnBrk="1" latinLnBrk="0" hangingPunct="1">
+              <a:defRPr sz="2400" kern="1200">
+                <a:solidFill>
+                  <a:schemeClr val="tx1"/>
+                </a:solidFill>
+                <a:latin typeface="+mn-lt"/>
+                <a:ea typeface="+mn-ea"/>
+                <a:cs typeface="+mn-cs"/>
+              </a:defRPr>
+            </a:lvl8pPr>
+            <a:lvl9pPr marL="4875947" algn="l" defTabSz="1218987" rtl="0" eaLnBrk="1" latinLnBrk="0" hangingPunct="1">
+              <a:defRPr sz="2400" kern="1200">
+                <a:solidFill>
+                  <a:schemeClr val="tx1"/>
+                </a:solidFill>
+                <a:latin typeface="+mn-lt"/>
+                <a:ea typeface="+mn-ea"/>
+                <a:cs typeface="+mn-cs"/>
+              </a:defRPr>
+            </a:lvl9pPr>
+          </a:lstStyle>
+          <a:p>
+            <a:pPr algn="l"/>
+            <a:r>
+              <a:rPr lang="en-US" dirty="0"/>
+              <a:t>DES211 CAPSTONE PROJECT</a:t>
+            </a:r>
           </a:p>
         </p:txBody>
       </p:sp>
     </p:spTree>
     <p:extLst>
       <p:ext uri="{BB962C8B-B14F-4D97-AF65-F5344CB8AC3E}">
-        <p14:creationId xmlns:p14="http://schemas.microsoft.com/office/powerpoint/2010/main" val="2656427420"/>
+        <p14:creationId xmlns:p14="http://schemas.microsoft.com/office/powerpoint/2010/main" val="4073682777"/>
       </p:ext>
     </p:extLst>
   </p:cSld>
@@ -9687,13 +10037,7 @@
   <p:cSld>
     <p:spTree>
       <p:nvGrpSpPr>
-        <p:cNvPr id="1" name="">
-          <a:extLst>
-            <a:ext uri="{FF2B5EF4-FFF2-40B4-BE49-F238E27FC236}">
-              <a16:creationId xmlns:a16="http://schemas.microsoft.com/office/drawing/2014/main" id="{FFB85F68-8123-6880-86CF-D39DE164CE9B}"/>
-            </a:ext>
-          </a:extLst>
-        </p:cNvPr>
+        <p:cNvPr id="1" name=""/>
         <p:cNvGrpSpPr/>
         <p:nvPr/>
       </p:nvGrpSpPr>
@@ -9710,7 +10054,7 @@
           <p:cNvPr id="2" name="Title 1">
             <a:extLst>
               <a:ext uri="{FF2B5EF4-FFF2-40B4-BE49-F238E27FC236}">
-                <a16:creationId xmlns:a16="http://schemas.microsoft.com/office/drawing/2014/main" id="{CB2FB0A1-DF3F-2C56-A9BE-2B2150E1E5F2}"/>
+                <a16:creationId xmlns:a16="http://schemas.microsoft.com/office/drawing/2014/main" id="{8293087C-D9DF-6AEB-3DDD-CE6BA4742958}"/>
               </a:ext>
             </a:extLst>
           </p:cNvPr>
@@ -9726,10 +10070,7 @@
           <a:bodyPr/>
           <a:lstStyle/>
           <a:p>
-            <a:r>
-              <a:rPr lang="en-IN" dirty="0"/>
-              <a:t>Prototype Phase</a:t>
-            </a:r>
+            <a:endParaRPr lang="en-IN"/>
           </a:p>
         </p:txBody>
       </p:sp>
@@ -9738,7 +10079,7 @@
           <p:cNvPr id="3" name="Content Placeholder 2">
             <a:extLst>
               <a:ext uri="{FF2B5EF4-FFF2-40B4-BE49-F238E27FC236}">
-                <a16:creationId xmlns:a16="http://schemas.microsoft.com/office/drawing/2014/main" id="{91139623-E418-9918-37FE-C29501924A8E}"/>
+                <a16:creationId xmlns:a16="http://schemas.microsoft.com/office/drawing/2014/main" id="{A5EB9FEF-DE24-2B3B-D6C5-2F664A0F932B}"/>
               </a:ext>
             </a:extLst>
           </p:cNvPr>
@@ -9754,7 +10095,7 @@
           <a:bodyPr/>
           <a:lstStyle/>
           <a:p>
-            <a:endParaRPr lang="en-IN" dirty="0"/>
+            <a:endParaRPr lang="en-IN"/>
           </a:p>
         </p:txBody>
       </p:sp>
@@ -9763,7 +10104,7 @@
           <p:cNvPr id="4" name="Content Placeholder 3">
             <a:extLst>
               <a:ext uri="{FF2B5EF4-FFF2-40B4-BE49-F238E27FC236}">
-                <a16:creationId xmlns:a16="http://schemas.microsoft.com/office/drawing/2014/main" id="{9B787AC9-EBC2-8A16-B408-255CE6BBC6B3}"/>
+                <a16:creationId xmlns:a16="http://schemas.microsoft.com/office/drawing/2014/main" id="{90AD67B7-7DE5-CFC5-8DC4-1A1C44B6049D}"/>
               </a:ext>
             </a:extLst>
           </p:cNvPr>
@@ -9785,10 +10126,85 @@
       </p:sp>
       <p:sp>
         <p:nvSpPr>
-          <p:cNvPr id="5" name="Slide Number Placeholder 4">
-            <a:extLst>
-              <a:ext uri="{FF2B5EF4-FFF2-40B4-BE49-F238E27FC236}">
-                <a16:creationId xmlns:a16="http://schemas.microsoft.com/office/drawing/2014/main" id="{85DF273A-9AB3-B5C3-9ADB-A4CF1A4262CD}"/>
+          <p:cNvPr id="5" name="Picture Placeholder 4">
+            <a:extLst>
+              <a:ext uri="{FF2B5EF4-FFF2-40B4-BE49-F238E27FC236}">
+                <a16:creationId xmlns:a16="http://schemas.microsoft.com/office/drawing/2014/main" id="{84B86DCF-4B97-9947-A1A5-CB1979819433}"/>
+              </a:ext>
+            </a:extLst>
+          </p:cNvPr>
+          <p:cNvSpPr>
+            <a:spLocks noGrp="1"/>
+          </p:cNvSpPr>
+          <p:nvPr>
+            <p:ph type="pic" sz="quarter" idx="15"/>
+          </p:nvPr>
+        </p:nvSpPr>
+        <p:spPr/>
+        <p:txBody>
+          <a:bodyPr/>
+          <a:lstStyle/>
+          <a:p>
+            <a:endParaRPr lang="en-US"/>
+          </a:p>
+        </p:txBody>
+      </p:sp>
+      <p:sp>
+        <p:nvSpPr>
+          <p:cNvPr id="6" name="Picture Placeholder 5">
+            <a:extLst>
+              <a:ext uri="{FF2B5EF4-FFF2-40B4-BE49-F238E27FC236}">
+                <a16:creationId xmlns:a16="http://schemas.microsoft.com/office/drawing/2014/main" id="{8AB7107F-47DD-9F0D-70A4-3FF297304F55}"/>
+              </a:ext>
+            </a:extLst>
+          </p:cNvPr>
+          <p:cNvSpPr>
+            <a:spLocks noGrp="1"/>
+          </p:cNvSpPr>
+          <p:nvPr>
+            <p:ph type="pic" sz="quarter" idx="17"/>
+          </p:nvPr>
+        </p:nvSpPr>
+        <p:spPr/>
+        <p:txBody>
+          <a:bodyPr/>
+          <a:lstStyle/>
+          <a:p>
+            <a:endParaRPr lang="en-US"/>
+          </a:p>
+        </p:txBody>
+      </p:sp>
+      <p:sp>
+        <p:nvSpPr>
+          <p:cNvPr id="7" name="Picture Placeholder 6">
+            <a:extLst>
+              <a:ext uri="{FF2B5EF4-FFF2-40B4-BE49-F238E27FC236}">
+                <a16:creationId xmlns:a16="http://schemas.microsoft.com/office/drawing/2014/main" id="{638EFBB7-E515-DA5F-08E3-9C0BE88AB6AA}"/>
+              </a:ext>
+            </a:extLst>
+          </p:cNvPr>
+          <p:cNvSpPr>
+            <a:spLocks noGrp="1"/>
+          </p:cNvSpPr>
+          <p:nvPr>
+            <p:ph type="pic" sz="quarter" idx="16"/>
+          </p:nvPr>
+        </p:nvSpPr>
+        <p:spPr/>
+        <p:txBody>
+          <a:bodyPr/>
+          <a:lstStyle/>
+          <a:p>
+            <a:endParaRPr lang="en-US"/>
+          </a:p>
+        </p:txBody>
+      </p:sp>
+      <p:sp>
+        <p:nvSpPr>
+          <p:cNvPr id="8" name="Slide Number Placeholder 7">
+            <a:extLst>
+              <a:ext uri="{FF2B5EF4-FFF2-40B4-BE49-F238E27FC236}">
+                <a16:creationId xmlns:a16="http://schemas.microsoft.com/office/drawing/2014/main" id="{73E0A801-B1B2-373A-D748-9D9CBC514047}"/>
               </a:ext>
             </a:extLst>
           </p:cNvPr>
@@ -9813,10 +10229,141 @@
           </a:p>
         </p:txBody>
       </p:sp>
+      <p:sp>
+        <p:nvSpPr>
+          <p:cNvPr id="9" name="Slide Number Placeholder 4">
+            <a:extLst>
+              <a:ext uri="{FF2B5EF4-FFF2-40B4-BE49-F238E27FC236}">
+                <a16:creationId xmlns:a16="http://schemas.microsoft.com/office/drawing/2014/main" id="{B83451FF-8081-707C-0922-6A67FAC34CDB}"/>
+              </a:ext>
+            </a:extLst>
+          </p:cNvPr>
+          <p:cNvSpPr txBox="1">
+            <a:spLocks/>
+          </p:cNvSpPr>
+          <p:nvPr/>
+        </p:nvSpPr>
+        <p:spPr>
+          <a:xfrm>
+            <a:off x="455612" y="6190488"/>
+            <a:ext cx="2677604" cy="210312"/>
+          </a:xfrm>
+          <a:prstGeom prst="rect">
+            <a:avLst/>
+          </a:prstGeom>
+        </p:spPr>
+        <p:txBody>
+          <a:bodyPr vert="horz" lIns="121899" tIns="60949" rIns="121899" bIns="60949" rtlCol="0" anchor="b"/>
+          <a:lstStyle>
+            <a:defPPr>
+              <a:defRPr lang="en-US"/>
+            </a:defPPr>
+            <a:lvl1pPr marL="0" algn="r" defTabSz="1218987" rtl="0" eaLnBrk="1" latinLnBrk="0" hangingPunct="1">
+              <a:defRPr sz="1000" b="1" kern="1200" spc="200" baseline="0">
+                <a:solidFill>
+                  <a:schemeClr val="tx2">
+                    <a:lumMod val="50000"/>
+                  </a:schemeClr>
+                </a:solidFill>
+                <a:latin typeface="+mn-lt"/>
+                <a:ea typeface="+mn-ea"/>
+                <a:cs typeface="+mn-cs"/>
+              </a:defRPr>
+            </a:lvl1pPr>
+            <a:lvl2pPr marL="609493" algn="l" defTabSz="1218987" rtl="0" eaLnBrk="1" latinLnBrk="0" hangingPunct="1">
+              <a:defRPr sz="2400" kern="1200">
+                <a:solidFill>
+                  <a:schemeClr val="tx1"/>
+                </a:solidFill>
+                <a:latin typeface="+mn-lt"/>
+                <a:ea typeface="+mn-ea"/>
+                <a:cs typeface="+mn-cs"/>
+              </a:defRPr>
+            </a:lvl2pPr>
+            <a:lvl3pPr marL="1218987" algn="l" defTabSz="1218987" rtl="0" eaLnBrk="1" latinLnBrk="0" hangingPunct="1">
+              <a:defRPr sz="2400" kern="1200">
+                <a:solidFill>
+                  <a:schemeClr val="tx1"/>
+                </a:solidFill>
+                <a:latin typeface="+mn-lt"/>
+                <a:ea typeface="+mn-ea"/>
+                <a:cs typeface="+mn-cs"/>
+              </a:defRPr>
+            </a:lvl3pPr>
+            <a:lvl4pPr marL="1828480" algn="l" defTabSz="1218987" rtl="0" eaLnBrk="1" latinLnBrk="0" hangingPunct="1">
+              <a:defRPr sz="2400" kern="1200">
+                <a:solidFill>
+                  <a:schemeClr val="tx1"/>
+                </a:solidFill>
+                <a:latin typeface="+mn-lt"/>
+                <a:ea typeface="+mn-ea"/>
+                <a:cs typeface="+mn-cs"/>
+              </a:defRPr>
+            </a:lvl4pPr>
+            <a:lvl5pPr marL="2437973" algn="l" defTabSz="1218987" rtl="0" eaLnBrk="1" latinLnBrk="0" hangingPunct="1">
+              <a:defRPr sz="2400" kern="1200">
+                <a:solidFill>
+                  <a:schemeClr val="tx1"/>
+                </a:solidFill>
+                <a:latin typeface="+mn-lt"/>
+                <a:ea typeface="+mn-ea"/>
+                <a:cs typeface="+mn-cs"/>
+              </a:defRPr>
+            </a:lvl5pPr>
+            <a:lvl6pPr marL="3047467" algn="l" defTabSz="1218987" rtl="0" eaLnBrk="1" latinLnBrk="0" hangingPunct="1">
+              <a:defRPr sz="2400" kern="1200">
+                <a:solidFill>
+                  <a:schemeClr val="tx1"/>
+                </a:solidFill>
+                <a:latin typeface="+mn-lt"/>
+                <a:ea typeface="+mn-ea"/>
+                <a:cs typeface="+mn-cs"/>
+              </a:defRPr>
+            </a:lvl6pPr>
+            <a:lvl7pPr marL="3656960" algn="l" defTabSz="1218987" rtl="0" eaLnBrk="1" latinLnBrk="0" hangingPunct="1">
+              <a:defRPr sz="2400" kern="1200">
+                <a:solidFill>
+                  <a:schemeClr val="tx1"/>
+                </a:solidFill>
+                <a:latin typeface="+mn-lt"/>
+                <a:ea typeface="+mn-ea"/>
+                <a:cs typeface="+mn-cs"/>
+              </a:defRPr>
+            </a:lvl7pPr>
+            <a:lvl8pPr marL="4266453" algn="l" defTabSz="1218987" rtl="0" eaLnBrk="1" latinLnBrk="0" hangingPunct="1">
+              <a:defRPr sz="2400" kern="1200">
+                <a:solidFill>
+                  <a:schemeClr val="tx1"/>
+                </a:solidFill>
+                <a:latin typeface="+mn-lt"/>
+                <a:ea typeface="+mn-ea"/>
+                <a:cs typeface="+mn-cs"/>
+              </a:defRPr>
+            </a:lvl8pPr>
+            <a:lvl9pPr marL="4875947" algn="l" defTabSz="1218987" rtl="0" eaLnBrk="1" latinLnBrk="0" hangingPunct="1">
+              <a:defRPr sz="2400" kern="1200">
+                <a:solidFill>
+                  <a:schemeClr val="tx1"/>
+                </a:solidFill>
+                <a:latin typeface="+mn-lt"/>
+                <a:ea typeface="+mn-ea"/>
+                <a:cs typeface="+mn-cs"/>
+              </a:defRPr>
+            </a:lvl9pPr>
+          </a:lstStyle>
+          <a:p>
+            <a:pPr algn="l"/>
+            <a:r>
+              <a:rPr lang="en-US" dirty="0"/>
+              <a:t>DES211 CAPSTONE PROJECT</a:t>
+            </a:r>
+          </a:p>
+        </p:txBody>
+      </p:sp>
     </p:spTree>
     <p:extLst>
       <p:ext uri="{BB962C8B-B14F-4D97-AF65-F5344CB8AC3E}">
-        <p14:creationId xmlns:p14="http://schemas.microsoft.com/office/powerpoint/2010/main" val="2902727585"/>
+        <p14:creationId xmlns:p14="http://schemas.microsoft.com/office/powerpoint/2010/main" val="2656427420"/>
       </p:ext>
     </p:extLst>
   </p:cSld>
@@ -9843,7 +10390,13 @@
   <p:cSld>
     <p:spTree>
       <p:nvGrpSpPr>
-        <p:cNvPr id="1" name=""/>
+        <p:cNvPr id="1" name="">
+          <a:extLst>
+            <a:ext uri="{FF2B5EF4-FFF2-40B4-BE49-F238E27FC236}">
+              <a16:creationId xmlns:a16="http://schemas.microsoft.com/office/drawing/2014/main" id="{FFB85F68-8123-6880-86CF-D39DE164CE9B}"/>
+            </a:ext>
+          </a:extLst>
+        </p:cNvPr>
         <p:cNvGrpSpPr/>
         <p:nvPr/>
       </p:nvGrpSpPr>
@@ -9860,7 +10413,7 @@
           <p:cNvPr id="2" name="Title 1">
             <a:extLst>
               <a:ext uri="{FF2B5EF4-FFF2-40B4-BE49-F238E27FC236}">
-                <a16:creationId xmlns:a16="http://schemas.microsoft.com/office/drawing/2014/main" id="{AADB5DC0-637B-33EB-9B61-EFB3DE503900}"/>
+                <a16:creationId xmlns:a16="http://schemas.microsoft.com/office/drawing/2014/main" id="{CB2FB0A1-DF3F-2C56-A9BE-2B2150E1E5F2}"/>
               </a:ext>
             </a:extLst>
           </p:cNvPr>
@@ -9876,7 +10429,10 @@
           <a:bodyPr/>
           <a:lstStyle/>
           <a:p>
-            <a:endParaRPr lang="en-IN"/>
+            <a:r>
+              <a:rPr lang="en-IN" dirty="0"/>
+              <a:t>Prototype Phase</a:t>
+            </a:r>
           </a:p>
         </p:txBody>
       </p:sp>
@@ -9885,7 +10441,7 @@
           <p:cNvPr id="3" name="Content Placeholder 2">
             <a:extLst>
               <a:ext uri="{FF2B5EF4-FFF2-40B4-BE49-F238E27FC236}">
-                <a16:creationId xmlns:a16="http://schemas.microsoft.com/office/drawing/2014/main" id="{54DEFFDB-126C-310C-5C89-434FDACA5F31}"/>
+                <a16:creationId xmlns:a16="http://schemas.microsoft.com/office/drawing/2014/main" id="{91139623-E418-9918-37FE-C29501924A8E}"/>
               </a:ext>
             </a:extLst>
           </p:cNvPr>
@@ -9901,16 +10457,16 @@
           <a:bodyPr/>
           <a:lstStyle/>
           <a:p>
-            <a:endParaRPr lang="en-IN"/>
-          </a:p>
-        </p:txBody>
-      </p:sp>
-      <p:sp>
-        <p:nvSpPr>
-          <p:cNvPr id="4" name="Picture Placeholder 3">
-            <a:extLst>
-              <a:ext uri="{FF2B5EF4-FFF2-40B4-BE49-F238E27FC236}">
-                <a16:creationId xmlns:a16="http://schemas.microsoft.com/office/drawing/2014/main" id="{84E988D3-CF35-4838-4D7E-194B8206E5F6}"/>
+            <a:endParaRPr lang="en-IN" dirty="0"/>
+          </a:p>
+        </p:txBody>
+      </p:sp>
+      <p:sp>
+        <p:nvSpPr>
+          <p:cNvPr id="4" name="Content Placeholder 3">
+            <a:extLst>
+              <a:ext uri="{FF2B5EF4-FFF2-40B4-BE49-F238E27FC236}">
+                <a16:creationId xmlns:a16="http://schemas.microsoft.com/office/drawing/2014/main" id="{9B787AC9-EBC2-8A16-B408-255CE6BBC6B3}"/>
               </a:ext>
             </a:extLst>
           </p:cNvPr>
@@ -9918,17 +10474,24 @@
             <a:spLocks noGrp="1"/>
           </p:cNvSpPr>
           <p:nvPr>
-            <p:ph type="pic" sz="quarter" idx="14"/>
+            <p:ph sz="quarter" idx="14"/>
           </p:nvPr>
         </p:nvSpPr>
         <p:spPr/>
+        <p:txBody>
+          <a:bodyPr/>
+          <a:lstStyle/>
+          <a:p>
+            <a:endParaRPr lang="en-IN"/>
+          </a:p>
+        </p:txBody>
       </p:sp>
       <p:sp>
         <p:nvSpPr>
           <p:cNvPr id="5" name="Slide Number Placeholder 4">
             <a:extLst>
               <a:ext uri="{FF2B5EF4-FFF2-40B4-BE49-F238E27FC236}">
-                <a16:creationId xmlns:a16="http://schemas.microsoft.com/office/drawing/2014/main" id="{ECB92C49-500A-83A9-A98E-071CD7B4CF66}"/>
+                <a16:creationId xmlns:a16="http://schemas.microsoft.com/office/drawing/2014/main" id="{85DF273A-9AB3-B5C3-9ADB-A4CF1A4262CD}"/>
               </a:ext>
             </a:extLst>
           </p:cNvPr>
@@ -9953,10 +10516,141 @@
           </a:p>
         </p:txBody>
       </p:sp>
+      <p:sp>
+        <p:nvSpPr>
+          <p:cNvPr id="6" name="Slide Number Placeholder 4">
+            <a:extLst>
+              <a:ext uri="{FF2B5EF4-FFF2-40B4-BE49-F238E27FC236}">
+                <a16:creationId xmlns:a16="http://schemas.microsoft.com/office/drawing/2014/main" id="{2C10F4A0-3974-7A60-C519-09E70A08BDEC}"/>
+              </a:ext>
+            </a:extLst>
+          </p:cNvPr>
+          <p:cNvSpPr txBox="1">
+            <a:spLocks/>
+          </p:cNvSpPr>
+          <p:nvPr/>
+        </p:nvSpPr>
+        <p:spPr>
+          <a:xfrm>
+            <a:off x="455612" y="6190488"/>
+            <a:ext cx="2677604" cy="210312"/>
+          </a:xfrm>
+          <a:prstGeom prst="rect">
+            <a:avLst/>
+          </a:prstGeom>
+        </p:spPr>
+        <p:txBody>
+          <a:bodyPr vert="horz" lIns="121899" tIns="60949" rIns="121899" bIns="60949" rtlCol="0" anchor="b"/>
+          <a:lstStyle>
+            <a:defPPr>
+              <a:defRPr lang="en-US"/>
+            </a:defPPr>
+            <a:lvl1pPr marL="0" algn="r" defTabSz="1218987" rtl="0" eaLnBrk="1" latinLnBrk="0" hangingPunct="1">
+              <a:defRPr sz="1000" b="1" kern="1200" spc="200" baseline="0">
+                <a:solidFill>
+                  <a:schemeClr val="tx2">
+                    <a:lumMod val="50000"/>
+                  </a:schemeClr>
+                </a:solidFill>
+                <a:latin typeface="+mn-lt"/>
+                <a:ea typeface="+mn-ea"/>
+                <a:cs typeface="+mn-cs"/>
+              </a:defRPr>
+            </a:lvl1pPr>
+            <a:lvl2pPr marL="609493" algn="l" defTabSz="1218987" rtl="0" eaLnBrk="1" latinLnBrk="0" hangingPunct="1">
+              <a:defRPr sz="2400" kern="1200">
+                <a:solidFill>
+                  <a:schemeClr val="tx1"/>
+                </a:solidFill>
+                <a:latin typeface="+mn-lt"/>
+                <a:ea typeface="+mn-ea"/>
+                <a:cs typeface="+mn-cs"/>
+              </a:defRPr>
+            </a:lvl2pPr>
+            <a:lvl3pPr marL="1218987" algn="l" defTabSz="1218987" rtl="0" eaLnBrk="1" latinLnBrk="0" hangingPunct="1">
+              <a:defRPr sz="2400" kern="1200">
+                <a:solidFill>
+                  <a:schemeClr val="tx1"/>
+                </a:solidFill>
+                <a:latin typeface="+mn-lt"/>
+                <a:ea typeface="+mn-ea"/>
+                <a:cs typeface="+mn-cs"/>
+              </a:defRPr>
+            </a:lvl3pPr>
+            <a:lvl4pPr marL="1828480" algn="l" defTabSz="1218987" rtl="0" eaLnBrk="1" latinLnBrk="0" hangingPunct="1">
+              <a:defRPr sz="2400" kern="1200">
+                <a:solidFill>
+                  <a:schemeClr val="tx1"/>
+                </a:solidFill>
+                <a:latin typeface="+mn-lt"/>
+                <a:ea typeface="+mn-ea"/>
+                <a:cs typeface="+mn-cs"/>
+              </a:defRPr>
+            </a:lvl4pPr>
+            <a:lvl5pPr marL="2437973" algn="l" defTabSz="1218987" rtl="0" eaLnBrk="1" latinLnBrk="0" hangingPunct="1">
+              <a:defRPr sz="2400" kern="1200">
+                <a:solidFill>
+                  <a:schemeClr val="tx1"/>
+                </a:solidFill>
+                <a:latin typeface="+mn-lt"/>
+                <a:ea typeface="+mn-ea"/>
+                <a:cs typeface="+mn-cs"/>
+              </a:defRPr>
+            </a:lvl5pPr>
+            <a:lvl6pPr marL="3047467" algn="l" defTabSz="1218987" rtl="0" eaLnBrk="1" latinLnBrk="0" hangingPunct="1">
+              <a:defRPr sz="2400" kern="1200">
+                <a:solidFill>
+                  <a:schemeClr val="tx1"/>
+                </a:solidFill>
+                <a:latin typeface="+mn-lt"/>
+                <a:ea typeface="+mn-ea"/>
+                <a:cs typeface="+mn-cs"/>
+              </a:defRPr>
+            </a:lvl6pPr>
+            <a:lvl7pPr marL="3656960" algn="l" defTabSz="1218987" rtl="0" eaLnBrk="1" latinLnBrk="0" hangingPunct="1">
+              <a:defRPr sz="2400" kern="1200">
+                <a:solidFill>
+                  <a:schemeClr val="tx1"/>
+                </a:solidFill>
+                <a:latin typeface="+mn-lt"/>
+                <a:ea typeface="+mn-ea"/>
+                <a:cs typeface="+mn-cs"/>
+              </a:defRPr>
+            </a:lvl7pPr>
+            <a:lvl8pPr marL="4266453" algn="l" defTabSz="1218987" rtl="0" eaLnBrk="1" latinLnBrk="0" hangingPunct="1">
+              <a:defRPr sz="2400" kern="1200">
+                <a:solidFill>
+                  <a:schemeClr val="tx1"/>
+                </a:solidFill>
+                <a:latin typeface="+mn-lt"/>
+                <a:ea typeface="+mn-ea"/>
+                <a:cs typeface="+mn-cs"/>
+              </a:defRPr>
+            </a:lvl8pPr>
+            <a:lvl9pPr marL="4875947" algn="l" defTabSz="1218987" rtl="0" eaLnBrk="1" latinLnBrk="0" hangingPunct="1">
+              <a:defRPr sz="2400" kern="1200">
+                <a:solidFill>
+                  <a:schemeClr val="tx1"/>
+                </a:solidFill>
+                <a:latin typeface="+mn-lt"/>
+                <a:ea typeface="+mn-ea"/>
+                <a:cs typeface="+mn-cs"/>
+              </a:defRPr>
+            </a:lvl9pPr>
+          </a:lstStyle>
+          <a:p>
+            <a:pPr algn="l"/>
+            <a:r>
+              <a:rPr lang="en-US" dirty="0"/>
+              <a:t>DES211 CAPSTONE PROJECT</a:t>
+            </a:r>
+          </a:p>
+        </p:txBody>
+      </p:sp>
     </p:spTree>
     <p:extLst>
       <p:ext uri="{BB962C8B-B14F-4D97-AF65-F5344CB8AC3E}">
-        <p14:creationId xmlns:p14="http://schemas.microsoft.com/office/powerpoint/2010/main" val="1871765083"/>
+        <p14:creationId xmlns:p14="http://schemas.microsoft.com/office/powerpoint/2010/main" val="2902727585"/>
       </p:ext>
     </p:extLst>
   </p:cSld>
@@ -10000,7 +10694,7 @@
           <p:cNvPr id="2" name="Title 1">
             <a:extLst>
               <a:ext uri="{FF2B5EF4-FFF2-40B4-BE49-F238E27FC236}">
-                <a16:creationId xmlns:a16="http://schemas.microsoft.com/office/drawing/2014/main" id="{3691652E-4125-782A-0F3D-C13ED2979900}"/>
+                <a16:creationId xmlns:a16="http://schemas.microsoft.com/office/drawing/2014/main" id="{AADB5DC0-637B-33EB-9B61-EFB3DE503900}"/>
               </a:ext>
             </a:extLst>
           </p:cNvPr>
@@ -10025,7 +10719,7 @@
           <p:cNvPr id="3" name="Content Placeholder 2">
             <a:extLst>
               <a:ext uri="{FF2B5EF4-FFF2-40B4-BE49-F238E27FC236}">
-                <a16:creationId xmlns:a16="http://schemas.microsoft.com/office/drawing/2014/main" id="{C7EE9B6C-C4DB-433D-ADAB-6B49E2BC80AB}"/>
+                <a16:creationId xmlns:a16="http://schemas.microsoft.com/office/drawing/2014/main" id="{54DEFFDB-126C-310C-5C89-434FDACA5F31}"/>
               </a:ext>
             </a:extLst>
           </p:cNvPr>
@@ -10050,7 +10744,7 @@
           <p:cNvPr id="4" name="Picture Placeholder 3">
             <a:extLst>
               <a:ext uri="{FF2B5EF4-FFF2-40B4-BE49-F238E27FC236}">
-                <a16:creationId xmlns:a16="http://schemas.microsoft.com/office/drawing/2014/main" id="{F26B7286-44C7-3395-7091-9C3CF7134780}"/>
+                <a16:creationId xmlns:a16="http://schemas.microsoft.com/office/drawing/2014/main" id="{84E988D3-CF35-4838-4D7E-194B8206E5F6}"/>
               </a:ext>
             </a:extLst>
           </p:cNvPr>
@@ -10062,13 +10756,20 @@
           </p:nvPr>
         </p:nvSpPr>
         <p:spPr/>
+        <p:txBody>
+          <a:bodyPr/>
+          <a:lstStyle/>
+          <a:p>
+            <a:endParaRPr lang="en-US"/>
+          </a:p>
+        </p:txBody>
       </p:sp>
       <p:sp>
         <p:nvSpPr>
           <p:cNvPr id="5" name="Slide Number Placeholder 4">
             <a:extLst>
               <a:ext uri="{FF2B5EF4-FFF2-40B4-BE49-F238E27FC236}">
-                <a16:creationId xmlns:a16="http://schemas.microsoft.com/office/drawing/2014/main" id="{771CACD5-DC8F-E562-D34B-63ACEED10192}"/>
+                <a16:creationId xmlns:a16="http://schemas.microsoft.com/office/drawing/2014/main" id="{ECB92C49-500A-83A9-A98E-071CD7B4CF66}"/>
               </a:ext>
             </a:extLst>
           </p:cNvPr>
@@ -10093,10 +10794,141 @@
           </a:p>
         </p:txBody>
       </p:sp>
+      <p:sp>
+        <p:nvSpPr>
+          <p:cNvPr id="6" name="Slide Number Placeholder 4">
+            <a:extLst>
+              <a:ext uri="{FF2B5EF4-FFF2-40B4-BE49-F238E27FC236}">
+                <a16:creationId xmlns:a16="http://schemas.microsoft.com/office/drawing/2014/main" id="{3F841A1B-DBD5-E8AC-6353-E738060B9317}"/>
+              </a:ext>
+            </a:extLst>
+          </p:cNvPr>
+          <p:cNvSpPr txBox="1">
+            <a:spLocks/>
+          </p:cNvSpPr>
+          <p:nvPr/>
+        </p:nvSpPr>
+        <p:spPr>
+          <a:xfrm>
+            <a:off x="455612" y="6190488"/>
+            <a:ext cx="2677604" cy="210312"/>
+          </a:xfrm>
+          <a:prstGeom prst="rect">
+            <a:avLst/>
+          </a:prstGeom>
+        </p:spPr>
+        <p:txBody>
+          <a:bodyPr vert="horz" lIns="121899" tIns="60949" rIns="121899" bIns="60949" rtlCol="0" anchor="b"/>
+          <a:lstStyle>
+            <a:defPPr>
+              <a:defRPr lang="en-US"/>
+            </a:defPPr>
+            <a:lvl1pPr marL="0" algn="r" defTabSz="1218987" rtl="0" eaLnBrk="1" latinLnBrk="0" hangingPunct="1">
+              <a:defRPr sz="1000" b="1" kern="1200" spc="200" baseline="0">
+                <a:solidFill>
+                  <a:schemeClr val="tx2">
+                    <a:lumMod val="50000"/>
+                  </a:schemeClr>
+                </a:solidFill>
+                <a:latin typeface="+mn-lt"/>
+                <a:ea typeface="+mn-ea"/>
+                <a:cs typeface="+mn-cs"/>
+              </a:defRPr>
+            </a:lvl1pPr>
+            <a:lvl2pPr marL="609493" algn="l" defTabSz="1218987" rtl="0" eaLnBrk="1" latinLnBrk="0" hangingPunct="1">
+              <a:defRPr sz="2400" kern="1200">
+                <a:solidFill>
+                  <a:schemeClr val="tx1"/>
+                </a:solidFill>
+                <a:latin typeface="+mn-lt"/>
+                <a:ea typeface="+mn-ea"/>
+                <a:cs typeface="+mn-cs"/>
+              </a:defRPr>
+            </a:lvl2pPr>
+            <a:lvl3pPr marL="1218987" algn="l" defTabSz="1218987" rtl="0" eaLnBrk="1" latinLnBrk="0" hangingPunct="1">
+              <a:defRPr sz="2400" kern="1200">
+                <a:solidFill>
+                  <a:schemeClr val="tx1"/>
+                </a:solidFill>
+                <a:latin typeface="+mn-lt"/>
+                <a:ea typeface="+mn-ea"/>
+                <a:cs typeface="+mn-cs"/>
+              </a:defRPr>
+            </a:lvl3pPr>
+            <a:lvl4pPr marL="1828480" algn="l" defTabSz="1218987" rtl="0" eaLnBrk="1" latinLnBrk="0" hangingPunct="1">
+              <a:defRPr sz="2400" kern="1200">
+                <a:solidFill>
+                  <a:schemeClr val="tx1"/>
+                </a:solidFill>
+                <a:latin typeface="+mn-lt"/>
+                <a:ea typeface="+mn-ea"/>
+                <a:cs typeface="+mn-cs"/>
+              </a:defRPr>
+            </a:lvl4pPr>
+            <a:lvl5pPr marL="2437973" algn="l" defTabSz="1218987" rtl="0" eaLnBrk="1" latinLnBrk="0" hangingPunct="1">
+              <a:defRPr sz="2400" kern="1200">
+                <a:solidFill>
+                  <a:schemeClr val="tx1"/>
+                </a:solidFill>
+                <a:latin typeface="+mn-lt"/>
+                <a:ea typeface="+mn-ea"/>
+                <a:cs typeface="+mn-cs"/>
+              </a:defRPr>
+            </a:lvl5pPr>
+            <a:lvl6pPr marL="3047467" algn="l" defTabSz="1218987" rtl="0" eaLnBrk="1" latinLnBrk="0" hangingPunct="1">
+              <a:defRPr sz="2400" kern="1200">
+                <a:solidFill>
+                  <a:schemeClr val="tx1"/>
+                </a:solidFill>
+                <a:latin typeface="+mn-lt"/>
+                <a:ea typeface="+mn-ea"/>
+                <a:cs typeface="+mn-cs"/>
+              </a:defRPr>
+            </a:lvl6pPr>
+            <a:lvl7pPr marL="3656960" algn="l" defTabSz="1218987" rtl="0" eaLnBrk="1" latinLnBrk="0" hangingPunct="1">
+              <a:defRPr sz="2400" kern="1200">
+                <a:solidFill>
+                  <a:schemeClr val="tx1"/>
+                </a:solidFill>
+                <a:latin typeface="+mn-lt"/>
+                <a:ea typeface="+mn-ea"/>
+                <a:cs typeface="+mn-cs"/>
+              </a:defRPr>
+            </a:lvl7pPr>
+            <a:lvl8pPr marL="4266453" algn="l" defTabSz="1218987" rtl="0" eaLnBrk="1" latinLnBrk="0" hangingPunct="1">
+              <a:defRPr sz="2400" kern="1200">
+                <a:solidFill>
+                  <a:schemeClr val="tx1"/>
+                </a:solidFill>
+                <a:latin typeface="+mn-lt"/>
+                <a:ea typeface="+mn-ea"/>
+                <a:cs typeface="+mn-cs"/>
+              </a:defRPr>
+            </a:lvl8pPr>
+            <a:lvl9pPr marL="4875947" algn="l" defTabSz="1218987" rtl="0" eaLnBrk="1" latinLnBrk="0" hangingPunct="1">
+              <a:defRPr sz="2400" kern="1200">
+                <a:solidFill>
+                  <a:schemeClr val="tx1"/>
+                </a:solidFill>
+                <a:latin typeface="+mn-lt"/>
+                <a:ea typeface="+mn-ea"/>
+                <a:cs typeface="+mn-cs"/>
+              </a:defRPr>
+            </a:lvl9pPr>
+          </a:lstStyle>
+          <a:p>
+            <a:pPr algn="l"/>
+            <a:r>
+              <a:rPr lang="en-US" dirty="0"/>
+              <a:t>DES211 CAPSTONE PROJECT</a:t>
+            </a:r>
+          </a:p>
+        </p:txBody>
+      </p:sp>
     </p:spTree>
     <p:extLst>
       <p:ext uri="{BB962C8B-B14F-4D97-AF65-F5344CB8AC3E}">
-        <p14:creationId xmlns:p14="http://schemas.microsoft.com/office/powerpoint/2010/main" val="2540403346"/>
+        <p14:creationId xmlns:p14="http://schemas.microsoft.com/office/powerpoint/2010/main" val="1871765083"/>
       </p:ext>
     </p:extLst>
   </p:cSld>
@@ -10140,7 +10972,7 @@
           <p:cNvPr id="2" name="Title 1">
             <a:extLst>
               <a:ext uri="{FF2B5EF4-FFF2-40B4-BE49-F238E27FC236}">
-                <a16:creationId xmlns:a16="http://schemas.microsoft.com/office/drawing/2014/main" id="{E5BB7D67-76BC-2F76-6A7E-93CF1B03CA9B}"/>
+                <a16:creationId xmlns:a16="http://schemas.microsoft.com/office/drawing/2014/main" id="{3691652E-4125-782A-0F3D-C13ED2979900}"/>
               </a:ext>
             </a:extLst>
           </p:cNvPr>
@@ -10165,7 +10997,7 @@
           <p:cNvPr id="3" name="Content Placeholder 2">
             <a:extLst>
               <a:ext uri="{FF2B5EF4-FFF2-40B4-BE49-F238E27FC236}">
-                <a16:creationId xmlns:a16="http://schemas.microsoft.com/office/drawing/2014/main" id="{481F0043-5374-9370-B17A-15CAD56ADF84}"/>
+                <a16:creationId xmlns:a16="http://schemas.microsoft.com/office/drawing/2014/main" id="{C7EE9B6C-C4DB-433D-ADAB-6B49E2BC80AB}"/>
               </a:ext>
             </a:extLst>
           </p:cNvPr>
@@ -10190,7 +11022,7 @@
           <p:cNvPr id="4" name="Picture Placeholder 3">
             <a:extLst>
               <a:ext uri="{FF2B5EF4-FFF2-40B4-BE49-F238E27FC236}">
-                <a16:creationId xmlns:a16="http://schemas.microsoft.com/office/drawing/2014/main" id="{B57F297D-5244-EB01-2D2D-30DC341E469D}"/>
+                <a16:creationId xmlns:a16="http://schemas.microsoft.com/office/drawing/2014/main" id="{F26B7286-44C7-3395-7091-9C3CF7134780}"/>
               </a:ext>
             </a:extLst>
           </p:cNvPr>
@@ -10202,13 +11034,20 @@
           </p:nvPr>
         </p:nvSpPr>
         <p:spPr/>
+        <p:txBody>
+          <a:bodyPr/>
+          <a:lstStyle/>
+          <a:p>
+            <a:endParaRPr lang="en-US"/>
+          </a:p>
+        </p:txBody>
       </p:sp>
       <p:sp>
         <p:nvSpPr>
           <p:cNvPr id="5" name="Slide Number Placeholder 4">
             <a:extLst>
               <a:ext uri="{FF2B5EF4-FFF2-40B4-BE49-F238E27FC236}">
-                <a16:creationId xmlns:a16="http://schemas.microsoft.com/office/drawing/2014/main" id="{C6881C2A-23D8-2323-B89B-98E5EBD584F6}"/>
+                <a16:creationId xmlns:a16="http://schemas.microsoft.com/office/drawing/2014/main" id="{771CACD5-DC8F-E562-D34B-63ACEED10192}"/>
               </a:ext>
             </a:extLst>
           </p:cNvPr>
@@ -10233,10 +11072,141 @@
           </a:p>
         </p:txBody>
       </p:sp>
+      <p:sp>
+        <p:nvSpPr>
+          <p:cNvPr id="6" name="Slide Number Placeholder 4">
+            <a:extLst>
+              <a:ext uri="{FF2B5EF4-FFF2-40B4-BE49-F238E27FC236}">
+                <a16:creationId xmlns:a16="http://schemas.microsoft.com/office/drawing/2014/main" id="{FC397AB4-E7B3-064C-48F7-B4F336380CBA}"/>
+              </a:ext>
+            </a:extLst>
+          </p:cNvPr>
+          <p:cNvSpPr txBox="1">
+            <a:spLocks/>
+          </p:cNvSpPr>
+          <p:nvPr/>
+        </p:nvSpPr>
+        <p:spPr>
+          <a:xfrm>
+            <a:off x="455612" y="6190488"/>
+            <a:ext cx="2677604" cy="210312"/>
+          </a:xfrm>
+          <a:prstGeom prst="rect">
+            <a:avLst/>
+          </a:prstGeom>
+        </p:spPr>
+        <p:txBody>
+          <a:bodyPr vert="horz" lIns="121899" tIns="60949" rIns="121899" bIns="60949" rtlCol="0" anchor="b"/>
+          <a:lstStyle>
+            <a:defPPr>
+              <a:defRPr lang="en-US"/>
+            </a:defPPr>
+            <a:lvl1pPr marL="0" algn="r" defTabSz="1218987" rtl="0" eaLnBrk="1" latinLnBrk="0" hangingPunct="1">
+              <a:defRPr sz="1000" b="1" kern="1200" spc="200" baseline="0">
+                <a:solidFill>
+                  <a:schemeClr val="tx2">
+                    <a:lumMod val="50000"/>
+                  </a:schemeClr>
+                </a:solidFill>
+                <a:latin typeface="+mn-lt"/>
+                <a:ea typeface="+mn-ea"/>
+                <a:cs typeface="+mn-cs"/>
+              </a:defRPr>
+            </a:lvl1pPr>
+            <a:lvl2pPr marL="609493" algn="l" defTabSz="1218987" rtl="0" eaLnBrk="1" latinLnBrk="0" hangingPunct="1">
+              <a:defRPr sz="2400" kern="1200">
+                <a:solidFill>
+                  <a:schemeClr val="tx1"/>
+                </a:solidFill>
+                <a:latin typeface="+mn-lt"/>
+                <a:ea typeface="+mn-ea"/>
+                <a:cs typeface="+mn-cs"/>
+              </a:defRPr>
+            </a:lvl2pPr>
+            <a:lvl3pPr marL="1218987" algn="l" defTabSz="1218987" rtl="0" eaLnBrk="1" latinLnBrk="0" hangingPunct="1">
+              <a:defRPr sz="2400" kern="1200">
+                <a:solidFill>
+                  <a:schemeClr val="tx1"/>
+                </a:solidFill>
+                <a:latin typeface="+mn-lt"/>
+                <a:ea typeface="+mn-ea"/>
+                <a:cs typeface="+mn-cs"/>
+              </a:defRPr>
+            </a:lvl3pPr>
+            <a:lvl4pPr marL="1828480" algn="l" defTabSz="1218987" rtl="0" eaLnBrk="1" latinLnBrk="0" hangingPunct="1">
+              <a:defRPr sz="2400" kern="1200">
+                <a:solidFill>
+                  <a:schemeClr val="tx1"/>
+                </a:solidFill>
+                <a:latin typeface="+mn-lt"/>
+                <a:ea typeface="+mn-ea"/>
+                <a:cs typeface="+mn-cs"/>
+              </a:defRPr>
+            </a:lvl4pPr>
+            <a:lvl5pPr marL="2437973" algn="l" defTabSz="1218987" rtl="0" eaLnBrk="1" latinLnBrk="0" hangingPunct="1">
+              <a:defRPr sz="2400" kern="1200">
+                <a:solidFill>
+                  <a:schemeClr val="tx1"/>
+                </a:solidFill>
+                <a:latin typeface="+mn-lt"/>
+                <a:ea typeface="+mn-ea"/>
+                <a:cs typeface="+mn-cs"/>
+              </a:defRPr>
+            </a:lvl5pPr>
+            <a:lvl6pPr marL="3047467" algn="l" defTabSz="1218987" rtl="0" eaLnBrk="1" latinLnBrk="0" hangingPunct="1">
+              <a:defRPr sz="2400" kern="1200">
+                <a:solidFill>
+                  <a:schemeClr val="tx1"/>
+                </a:solidFill>
+                <a:latin typeface="+mn-lt"/>
+                <a:ea typeface="+mn-ea"/>
+                <a:cs typeface="+mn-cs"/>
+              </a:defRPr>
+            </a:lvl6pPr>
+            <a:lvl7pPr marL="3656960" algn="l" defTabSz="1218987" rtl="0" eaLnBrk="1" latinLnBrk="0" hangingPunct="1">
+              <a:defRPr sz="2400" kern="1200">
+                <a:solidFill>
+                  <a:schemeClr val="tx1"/>
+                </a:solidFill>
+                <a:latin typeface="+mn-lt"/>
+                <a:ea typeface="+mn-ea"/>
+                <a:cs typeface="+mn-cs"/>
+              </a:defRPr>
+            </a:lvl7pPr>
+            <a:lvl8pPr marL="4266453" algn="l" defTabSz="1218987" rtl="0" eaLnBrk="1" latinLnBrk="0" hangingPunct="1">
+              <a:defRPr sz="2400" kern="1200">
+                <a:solidFill>
+                  <a:schemeClr val="tx1"/>
+                </a:solidFill>
+                <a:latin typeface="+mn-lt"/>
+                <a:ea typeface="+mn-ea"/>
+                <a:cs typeface="+mn-cs"/>
+              </a:defRPr>
+            </a:lvl8pPr>
+            <a:lvl9pPr marL="4875947" algn="l" defTabSz="1218987" rtl="0" eaLnBrk="1" latinLnBrk="0" hangingPunct="1">
+              <a:defRPr sz="2400" kern="1200">
+                <a:solidFill>
+                  <a:schemeClr val="tx1"/>
+                </a:solidFill>
+                <a:latin typeface="+mn-lt"/>
+                <a:ea typeface="+mn-ea"/>
+                <a:cs typeface="+mn-cs"/>
+              </a:defRPr>
+            </a:lvl9pPr>
+          </a:lstStyle>
+          <a:p>
+            <a:pPr algn="l"/>
+            <a:r>
+              <a:rPr lang="en-US" dirty="0"/>
+              <a:t>DES211 CAPSTONE PROJECT</a:t>
+            </a:r>
+          </a:p>
+        </p:txBody>
+      </p:sp>
     </p:spTree>
     <p:extLst>
       <p:ext uri="{BB962C8B-B14F-4D97-AF65-F5344CB8AC3E}">
-        <p14:creationId xmlns:p14="http://schemas.microsoft.com/office/powerpoint/2010/main" val="1188192135"/>
+        <p14:creationId xmlns:p14="http://schemas.microsoft.com/office/powerpoint/2010/main" val="2540403346"/>
       </p:ext>
     </p:extLst>
   </p:cSld>
@@ -10280,7 +11250,7 @@
           <p:cNvPr id="2" name="Title 1">
             <a:extLst>
               <a:ext uri="{FF2B5EF4-FFF2-40B4-BE49-F238E27FC236}">
-                <a16:creationId xmlns:a16="http://schemas.microsoft.com/office/drawing/2014/main" id="{2BD7C78A-703A-694E-8FFC-38843E2ED0D5}"/>
+                <a16:creationId xmlns:a16="http://schemas.microsoft.com/office/drawing/2014/main" id="{E5BB7D67-76BC-2F76-6A7E-93CF1B03CA9B}"/>
               </a:ext>
             </a:extLst>
           </p:cNvPr>
@@ -10305,7 +11275,7 @@
           <p:cNvPr id="3" name="Content Placeholder 2">
             <a:extLst>
               <a:ext uri="{FF2B5EF4-FFF2-40B4-BE49-F238E27FC236}">
-                <a16:creationId xmlns:a16="http://schemas.microsoft.com/office/drawing/2014/main" id="{12D21900-DBB9-221C-76E0-EDDD133DAC6B}"/>
+                <a16:creationId xmlns:a16="http://schemas.microsoft.com/office/drawing/2014/main" id="{481F0043-5374-9370-B17A-15CAD56ADF84}"/>
               </a:ext>
             </a:extLst>
           </p:cNvPr>
@@ -10330,7 +11300,7 @@
           <p:cNvPr id="4" name="Picture Placeholder 3">
             <a:extLst>
               <a:ext uri="{FF2B5EF4-FFF2-40B4-BE49-F238E27FC236}">
-                <a16:creationId xmlns:a16="http://schemas.microsoft.com/office/drawing/2014/main" id="{32AEFEA6-A660-5D12-A8F7-5BB4222EFB74}"/>
+                <a16:creationId xmlns:a16="http://schemas.microsoft.com/office/drawing/2014/main" id="{B57F297D-5244-EB01-2D2D-30DC341E469D}"/>
               </a:ext>
             </a:extLst>
           </p:cNvPr>
@@ -10342,13 +11312,20 @@
           </p:nvPr>
         </p:nvSpPr>
         <p:spPr/>
+        <p:txBody>
+          <a:bodyPr/>
+          <a:lstStyle/>
+          <a:p>
+            <a:endParaRPr lang="en-US"/>
+          </a:p>
+        </p:txBody>
       </p:sp>
       <p:sp>
         <p:nvSpPr>
           <p:cNvPr id="5" name="Slide Number Placeholder 4">
             <a:extLst>
               <a:ext uri="{FF2B5EF4-FFF2-40B4-BE49-F238E27FC236}">
-                <a16:creationId xmlns:a16="http://schemas.microsoft.com/office/drawing/2014/main" id="{4DFB636B-8EED-D8C9-B88E-532B23AEFD21}"/>
+                <a16:creationId xmlns:a16="http://schemas.microsoft.com/office/drawing/2014/main" id="{C6881C2A-23D8-2323-B89B-98E5EBD584F6}"/>
               </a:ext>
             </a:extLst>
           </p:cNvPr>
@@ -10373,10 +11350,141 @@
           </a:p>
         </p:txBody>
       </p:sp>
+      <p:sp>
+        <p:nvSpPr>
+          <p:cNvPr id="6" name="Slide Number Placeholder 4">
+            <a:extLst>
+              <a:ext uri="{FF2B5EF4-FFF2-40B4-BE49-F238E27FC236}">
+                <a16:creationId xmlns:a16="http://schemas.microsoft.com/office/drawing/2014/main" id="{1466C1CC-3C62-38E8-78DE-98C589A6C039}"/>
+              </a:ext>
+            </a:extLst>
+          </p:cNvPr>
+          <p:cNvSpPr txBox="1">
+            <a:spLocks/>
+          </p:cNvSpPr>
+          <p:nvPr/>
+        </p:nvSpPr>
+        <p:spPr>
+          <a:xfrm>
+            <a:off x="455612" y="6190488"/>
+            <a:ext cx="2677604" cy="210312"/>
+          </a:xfrm>
+          <a:prstGeom prst="rect">
+            <a:avLst/>
+          </a:prstGeom>
+        </p:spPr>
+        <p:txBody>
+          <a:bodyPr vert="horz" lIns="121899" tIns="60949" rIns="121899" bIns="60949" rtlCol="0" anchor="b"/>
+          <a:lstStyle>
+            <a:defPPr>
+              <a:defRPr lang="en-US"/>
+            </a:defPPr>
+            <a:lvl1pPr marL="0" algn="r" defTabSz="1218987" rtl="0" eaLnBrk="1" latinLnBrk="0" hangingPunct="1">
+              <a:defRPr sz="1000" b="1" kern="1200" spc="200" baseline="0">
+                <a:solidFill>
+                  <a:schemeClr val="tx2">
+                    <a:lumMod val="50000"/>
+                  </a:schemeClr>
+                </a:solidFill>
+                <a:latin typeface="+mn-lt"/>
+                <a:ea typeface="+mn-ea"/>
+                <a:cs typeface="+mn-cs"/>
+              </a:defRPr>
+            </a:lvl1pPr>
+            <a:lvl2pPr marL="609493" algn="l" defTabSz="1218987" rtl="0" eaLnBrk="1" latinLnBrk="0" hangingPunct="1">
+              <a:defRPr sz="2400" kern="1200">
+                <a:solidFill>
+                  <a:schemeClr val="tx1"/>
+                </a:solidFill>
+                <a:latin typeface="+mn-lt"/>
+                <a:ea typeface="+mn-ea"/>
+                <a:cs typeface="+mn-cs"/>
+              </a:defRPr>
+            </a:lvl2pPr>
+            <a:lvl3pPr marL="1218987" algn="l" defTabSz="1218987" rtl="0" eaLnBrk="1" latinLnBrk="0" hangingPunct="1">
+              <a:defRPr sz="2400" kern="1200">
+                <a:solidFill>
+                  <a:schemeClr val="tx1"/>
+                </a:solidFill>
+                <a:latin typeface="+mn-lt"/>
+                <a:ea typeface="+mn-ea"/>
+                <a:cs typeface="+mn-cs"/>
+              </a:defRPr>
+            </a:lvl3pPr>
+            <a:lvl4pPr marL="1828480" algn="l" defTabSz="1218987" rtl="0" eaLnBrk="1" latinLnBrk="0" hangingPunct="1">
+              <a:defRPr sz="2400" kern="1200">
+                <a:solidFill>
+                  <a:schemeClr val="tx1"/>
+                </a:solidFill>
+                <a:latin typeface="+mn-lt"/>
+                <a:ea typeface="+mn-ea"/>
+                <a:cs typeface="+mn-cs"/>
+              </a:defRPr>
+            </a:lvl4pPr>
+            <a:lvl5pPr marL="2437973" algn="l" defTabSz="1218987" rtl="0" eaLnBrk="1" latinLnBrk="0" hangingPunct="1">
+              <a:defRPr sz="2400" kern="1200">
+                <a:solidFill>
+                  <a:schemeClr val="tx1"/>
+                </a:solidFill>
+                <a:latin typeface="+mn-lt"/>
+                <a:ea typeface="+mn-ea"/>
+                <a:cs typeface="+mn-cs"/>
+              </a:defRPr>
+            </a:lvl5pPr>
+            <a:lvl6pPr marL="3047467" algn="l" defTabSz="1218987" rtl="0" eaLnBrk="1" latinLnBrk="0" hangingPunct="1">
+              <a:defRPr sz="2400" kern="1200">
+                <a:solidFill>
+                  <a:schemeClr val="tx1"/>
+                </a:solidFill>
+                <a:latin typeface="+mn-lt"/>
+                <a:ea typeface="+mn-ea"/>
+                <a:cs typeface="+mn-cs"/>
+              </a:defRPr>
+            </a:lvl6pPr>
+            <a:lvl7pPr marL="3656960" algn="l" defTabSz="1218987" rtl="0" eaLnBrk="1" latinLnBrk="0" hangingPunct="1">
+              <a:defRPr sz="2400" kern="1200">
+                <a:solidFill>
+                  <a:schemeClr val="tx1"/>
+                </a:solidFill>
+                <a:latin typeface="+mn-lt"/>
+                <a:ea typeface="+mn-ea"/>
+                <a:cs typeface="+mn-cs"/>
+              </a:defRPr>
+            </a:lvl7pPr>
+            <a:lvl8pPr marL="4266453" algn="l" defTabSz="1218987" rtl="0" eaLnBrk="1" latinLnBrk="0" hangingPunct="1">
+              <a:defRPr sz="2400" kern="1200">
+                <a:solidFill>
+                  <a:schemeClr val="tx1"/>
+                </a:solidFill>
+                <a:latin typeface="+mn-lt"/>
+                <a:ea typeface="+mn-ea"/>
+                <a:cs typeface="+mn-cs"/>
+              </a:defRPr>
+            </a:lvl8pPr>
+            <a:lvl9pPr marL="4875947" algn="l" defTabSz="1218987" rtl="0" eaLnBrk="1" latinLnBrk="0" hangingPunct="1">
+              <a:defRPr sz="2400" kern="1200">
+                <a:solidFill>
+                  <a:schemeClr val="tx1"/>
+                </a:solidFill>
+                <a:latin typeface="+mn-lt"/>
+                <a:ea typeface="+mn-ea"/>
+                <a:cs typeface="+mn-cs"/>
+              </a:defRPr>
+            </a:lvl9pPr>
+          </a:lstStyle>
+          <a:p>
+            <a:pPr algn="l"/>
+            <a:r>
+              <a:rPr lang="en-US" dirty="0"/>
+              <a:t>DES211 CAPSTONE PROJECT</a:t>
+            </a:r>
+          </a:p>
+        </p:txBody>
+      </p:sp>
     </p:spTree>
     <p:extLst>
       <p:ext uri="{BB962C8B-B14F-4D97-AF65-F5344CB8AC3E}">
-        <p14:creationId xmlns:p14="http://schemas.microsoft.com/office/powerpoint/2010/main" val="3262945818"/>
+        <p14:creationId xmlns:p14="http://schemas.microsoft.com/office/powerpoint/2010/main" val="1188192135"/>
       </p:ext>
     </p:extLst>
   </p:cSld>
@@ -10420,7 +11528,7 @@
           <p:cNvPr id="2" name="Title 1">
             <a:extLst>
               <a:ext uri="{FF2B5EF4-FFF2-40B4-BE49-F238E27FC236}">
-                <a16:creationId xmlns:a16="http://schemas.microsoft.com/office/drawing/2014/main" id="{0B4D0D16-67A0-9392-36C4-38AEF1EFD705}"/>
+                <a16:creationId xmlns:a16="http://schemas.microsoft.com/office/drawing/2014/main" id="{2BD7C78A-703A-694E-8FFC-38843E2ED0D5}"/>
               </a:ext>
             </a:extLst>
           </p:cNvPr>
@@ -10445,7 +11553,7 @@
           <p:cNvPr id="3" name="Content Placeholder 2">
             <a:extLst>
               <a:ext uri="{FF2B5EF4-FFF2-40B4-BE49-F238E27FC236}">
-                <a16:creationId xmlns:a16="http://schemas.microsoft.com/office/drawing/2014/main" id="{639F28B0-AE40-DF8E-76CA-380B2FBF75D9}"/>
+                <a16:creationId xmlns:a16="http://schemas.microsoft.com/office/drawing/2014/main" id="{12D21900-DBB9-221C-76E0-EDDD133DAC6B}"/>
               </a:ext>
             </a:extLst>
           </p:cNvPr>
@@ -10467,10 +11575,10 @@
       </p:sp>
       <p:sp>
         <p:nvSpPr>
-          <p:cNvPr id="4" name="Content Placeholder 3">
-            <a:extLst>
-              <a:ext uri="{FF2B5EF4-FFF2-40B4-BE49-F238E27FC236}">
-                <a16:creationId xmlns:a16="http://schemas.microsoft.com/office/drawing/2014/main" id="{E1B2001F-94BD-7F0A-56F1-F7B277AF3CC6}"/>
+          <p:cNvPr id="4" name="Picture Placeholder 3">
+            <a:extLst>
+              <a:ext uri="{FF2B5EF4-FFF2-40B4-BE49-F238E27FC236}">
+                <a16:creationId xmlns:a16="http://schemas.microsoft.com/office/drawing/2014/main" id="{32AEFEA6-A660-5D12-A8F7-5BB4222EFB74}"/>
               </a:ext>
             </a:extLst>
           </p:cNvPr>
@@ -10478,7 +11586,7 @@
             <a:spLocks noGrp="1"/>
           </p:cNvSpPr>
           <p:nvPr>
-            <p:ph sz="quarter" idx="14"/>
+            <p:ph type="pic" sz="quarter" idx="14"/>
           </p:nvPr>
         </p:nvSpPr>
         <p:spPr/>
@@ -10486,7 +11594,7 @@
           <a:bodyPr/>
           <a:lstStyle/>
           <a:p>
-            <a:endParaRPr lang="en-IN"/>
+            <a:endParaRPr lang="en-US"/>
           </a:p>
         </p:txBody>
       </p:sp>
@@ -10495,7 +11603,7 @@
           <p:cNvPr id="5" name="Slide Number Placeholder 4">
             <a:extLst>
               <a:ext uri="{FF2B5EF4-FFF2-40B4-BE49-F238E27FC236}">
-                <a16:creationId xmlns:a16="http://schemas.microsoft.com/office/drawing/2014/main" id="{DE249310-06ED-CE6D-9342-95110ABFA82A}"/>
+                <a16:creationId xmlns:a16="http://schemas.microsoft.com/office/drawing/2014/main" id="{4DFB636B-8EED-D8C9-B88E-532B23AEFD21}"/>
               </a:ext>
             </a:extLst>
           </p:cNvPr>
@@ -10520,10 +11628,141 @@
           </a:p>
         </p:txBody>
       </p:sp>
+      <p:sp>
+        <p:nvSpPr>
+          <p:cNvPr id="6" name="Slide Number Placeholder 4">
+            <a:extLst>
+              <a:ext uri="{FF2B5EF4-FFF2-40B4-BE49-F238E27FC236}">
+                <a16:creationId xmlns:a16="http://schemas.microsoft.com/office/drawing/2014/main" id="{36B8F459-6F30-1450-5D41-1997E9CEE977}"/>
+              </a:ext>
+            </a:extLst>
+          </p:cNvPr>
+          <p:cNvSpPr txBox="1">
+            <a:spLocks/>
+          </p:cNvSpPr>
+          <p:nvPr/>
+        </p:nvSpPr>
+        <p:spPr>
+          <a:xfrm>
+            <a:off x="455612" y="6190488"/>
+            <a:ext cx="2677604" cy="210312"/>
+          </a:xfrm>
+          <a:prstGeom prst="rect">
+            <a:avLst/>
+          </a:prstGeom>
+        </p:spPr>
+        <p:txBody>
+          <a:bodyPr vert="horz" lIns="121899" tIns="60949" rIns="121899" bIns="60949" rtlCol="0" anchor="b"/>
+          <a:lstStyle>
+            <a:defPPr>
+              <a:defRPr lang="en-US"/>
+            </a:defPPr>
+            <a:lvl1pPr marL="0" algn="r" defTabSz="1218987" rtl="0" eaLnBrk="1" latinLnBrk="0" hangingPunct="1">
+              <a:defRPr sz="1000" b="1" kern="1200" spc="200" baseline="0">
+                <a:solidFill>
+                  <a:schemeClr val="tx2">
+                    <a:lumMod val="50000"/>
+                  </a:schemeClr>
+                </a:solidFill>
+                <a:latin typeface="+mn-lt"/>
+                <a:ea typeface="+mn-ea"/>
+                <a:cs typeface="+mn-cs"/>
+              </a:defRPr>
+            </a:lvl1pPr>
+            <a:lvl2pPr marL="609493" algn="l" defTabSz="1218987" rtl="0" eaLnBrk="1" latinLnBrk="0" hangingPunct="1">
+              <a:defRPr sz="2400" kern="1200">
+                <a:solidFill>
+                  <a:schemeClr val="tx1"/>
+                </a:solidFill>
+                <a:latin typeface="+mn-lt"/>
+                <a:ea typeface="+mn-ea"/>
+                <a:cs typeface="+mn-cs"/>
+              </a:defRPr>
+            </a:lvl2pPr>
+            <a:lvl3pPr marL="1218987" algn="l" defTabSz="1218987" rtl="0" eaLnBrk="1" latinLnBrk="0" hangingPunct="1">
+              <a:defRPr sz="2400" kern="1200">
+                <a:solidFill>
+                  <a:schemeClr val="tx1"/>
+                </a:solidFill>
+                <a:latin typeface="+mn-lt"/>
+                <a:ea typeface="+mn-ea"/>
+                <a:cs typeface="+mn-cs"/>
+              </a:defRPr>
+            </a:lvl3pPr>
+            <a:lvl4pPr marL="1828480" algn="l" defTabSz="1218987" rtl="0" eaLnBrk="1" latinLnBrk="0" hangingPunct="1">
+              <a:defRPr sz="2400" kern="1200">
+                <a:solidFill>
+                  <a:schemeClr val="tx1"/>
+                </a:solidFill>
+                <a:latin typeface="+mn-lt"/>
+                <a:ea typeface="+mn-ea"/>
+                <a:cs typeface="+mn-cs"/>
+              </a:defRPr>
+            </a:lvl4pPr>
+            <a:lvl5pPr marL="2437973" algn="l" defTabSz="1218987" rtl="0" eaLnBrk="1" latinLnBrk="0" hangingPunct="1">
+              <a:defRPr sz="2400" kern="1200">
+                <a:solidFill>
+                  <a:schemeClr val="tx1"/>
+                </a:solidFill>
+                <a:latin typeface="+mn-lt"/>
+                <a:ea typeface="+mn-ea"/>
+                <a:cs typeface="+mn-cs"/>
+              </a:defRPr>
+            </a:lvl5pPr>
+            <a:lvl6pPr marL="3047467" algn="l" defTabSz="1218987" rtl="0" eaLnBrk="1" latinLnBrk="0" hangingPunct="1">
+              <a:defRPr sz="2400" kern="1200">
+                <a:solidFill>
+                  <a:schemeClr val="tx1"/>
+                </a:solidFill>
+                <a:latin typeface="+mn-lt"/>
+                <a:ea typeface="+mn-ea"/>
+                <a:cs typeface="+mn-cs"/>
+              </a:defRPr>
+            </a:lvl6pPr>
+            <a:lvl7pPr marL="3656960" algn="l" defTabSz="1218987" rtl="0" eaLnBrk="1" latinLnBrk="0" hangingPunct="1">
+              <a:defRPr sz="2400" kern="1200">
+                <a:solidFill>
+                  <a:schemeClr val="tx1"/>
+                </a:solidFill>
+                <a:latin typeface="+mn-lt"/>
+                <a:ea typeface="+mn-ea"/>
+                <a:cs typeface="+mn-cs"/>
+              </a:defRPr>
+            </a:lvl7pPr>
+            <a:lvl8pPr marL="4266453" algn="l" defTabSz="1218987" rtl="0" eaLnBrk="1" latinLnBrk="0" hangingPunct="1">
+              <a:defRPr sz="2400" kern="1200">
+                <a:solidFill>
+                  <a:schemeClr val="tx1"/>
+                </a:solidFill>
+                <a:latin typeface="+mn-lt"/>
+                <a:ea typeface="+mn-ea"/>
+                <a:cs typeface="+mn-cs"/>
+              </a:defRPr>
+            </a:lvl8pPr>
+            <a:lvl9pPr marL="4875947" algn="l" defTabSz="1218987" rtl="0" eaLnBrk="1" latinLnBrk="0" hangingPunct="1">
+              <a:defRPr sz="2400" kern="1200">
+                <a:solidFill>
+                  <a:schemeClr val="tx1"/>
+                </a:solidFill>
+                <a:latin typeface="+mn-lt"/>
+                <a:ea typeface="+mn-ea"/>
+                <a:cs typeface="+mn-cs"/>
+              </a:defRPr>
+            </a:lvl9pPr>
+          </a:lstStyle>
+          <a:p>
+            <a:pPr algn="l"/>
+            <a:r>
+              <a:rPr lang="en-US" dirty="0"/>
+              <a:t>DES211 CAPSTONE PROJECT</a:t>
+            </a:r>
+          </a:p>
+        </p:txBody>
+      </p:sp>
     </p:spTree>
     <p:extLst>
       <p:ext uri="{BB962C8B-B14F-4D97-AF65-F5344CB8AC3E}">
-        <p14:creationId xmlns:p14="http://schemas.microsoft.com/office/powerpoint/2010/main" val="2633488709"/>
+        <p14:creationId xmlns:p14="http://schemas.microsoft.com/office/powerpoint/2010/main" val="3262945818"/>
       </p:ext>
     </p:extLst>
   </p:cSld>
@@ -10567,7 +11806,7 @@
           <p:cNvPr id="2" name="Title 1">
             <a:extLst>
               <a:ext uri="{FF2B5EF4-FFF2-40B4-BE49-F238E27FC236}">
-                <a16:creationId xmlns:a16="http://schemas.microsoft.com/office/drawing/2014/main" id="{3870CE6E-495D-1808-5A8C-EC4D855C5587}"/>
+                <a16:creationId xmlns:a16="http://schemas.microsoft.com/office/drawing/2014/main" id="{0B4D0D16-67A0-9392-36C4-38AEF1EFD705}"/>
               </a:ext>
             </a:extLst>
           </p:cNvPr>
@@ -10583,10 +11822,7 @@
           <a:bodyPr/>
           <a:lstStyle/>
           <a:p>
-            <a:r>
-              <a:rPr lang="en-IN" dirty="0"/>
-              <a:t>Testing Phase</a:t>
-            </a:r>
+            <a:endParaRPr lang="en-IN"/>
           </a:p>
         </p:txBody>
       </p:sp>
@@ -10595,7 +11831,7 @@
           <p:cNvPr id="3" name="Content Placeholder 2">
             <a:extLst>
               <a:ext uri="{FF2B5EF4-FFF2-40B4-BE49-F238E27FC236}">
-                <a16:creationId xmlns:a16="http://schemas.microsoft.com/office/drawing/2014/main" id="{B0EEF2E2-7250-905A-9F8E-5BB773C92FF2}"/>
+                <a16:creationId xmlns:a16="http://schemas.microsoft.com/office/drawing/2014/main" id="{639F28B0-AE40-DF8E-76CA-380B2FBF75D9}"/>
               </a:ext>
             </a:extLst>
           </p:cNvPr>
@@ -10620,7 +11856,7 @@
           <p:cNvPr id="4" name="Content Placeholder 3">
             <a:extLst>
               <a:ext uri="{FF2B5EF4-FFF2-40B4-BE49-F238E27FC236}">
-                <a16:creationId xmlns:a16="http://schemas.microsoft.com/office/drawing/2014/main" id="{2A8D0320-4D4B-365D-2F4F-3045D1A7C46C}"/>
+                <a16:creationId xmlns:a16="http://schemas.microsoft.com/office/drawing/2014/main" id="{E1B2001F-94BD-7F0A-56F1-F7B277AF3CC6}"/>
               </a:ext>
             </a:extLst>
           </p:cNvPr>
@@ -10645,7 +11881,7 @@
           <p:cNvPr id="5" name="Slide Number Placeholder 4">
             <a:extLst>
               <a:ext uri="{FF2B5EF4-FFF2-40B4-BE49-F238E27FC236}">
-                <a16:creationId xmlns:a16="http://schemas.microsoft.com/office/drawing/2014/main" id="{E7948434-32DA-F1E2-FC11-F2978017F64B}"/>
+                <a16:creationId xmlns:a16="http://schemas.microsoft.com/office/drawing/2014/main" id="{DE249310-06ED-CE6D-9342-95110ABFA82A}"/>
               </a:ext>
             </a:extLst>
           </p:cNvPr>
@@ -10670,10 +11906,141 @@
           </a:p>
         </p:txBody>
       </p:sp>
+      <p:sp>
+        <p:nvSpPr>
+          <p:cNvPr id="6" name="Slide Number Placeholder 4">
+            <a:extLst>
+              <a:ext uri="{FF2B5EF4-FFF2-40B4-BE49-F238E27FC236}">
+                <a16:creationId xmlns:a16="http://schemas.microsoft.com/office/drawing/2014/main" id="{150241C0-6662-9989-D473-E5D8BFD58F6F}"/>
+              </a:ext>
+            </a:extLst>
+          </p:cNvPr>
+          <p:cNvSpPr txBox="1">
+            <a:spLocks/>
+          </p:cNvSpPr>
+          <p:nvPr/>
+        </p:nvSpPr>
+        <p:spPr>
+          <a:xfrm>
+            <a:off x="455612" y="6190488"/>
+            <a:ext cx="2677604" cy="210312"/>
+          </a:xfrm>
+          <a:prstGeom prst="rect">
+            <a:avLst/>
+          </a:prstGeom>
+        </p:spPr>
+        <p:txBody>
+          <a:bodyPr vert="horz" lIns="121899" tIns="60949" rIns="121899" bIns="60949" rtlCol="0" anchor="b"/>
+          <a:lstStyle>
+            <a:defPPr>
+              <a:defRPr lang="en-US"/>
+            </a:defPPr>
+            <a:lvl1pPr marL="0" algn="r" defTabSz="1218987" rtl="0" eaLnBrk="1" latinLnBrk="0" hangingPunct="1">
+              <a:defRPr sz="1000" b="1" kern="1200" spc="200" baseline="0">
+                <a:solidFill>
+                  <a:schemeClr val="tx2">
+                    <a:lumMod val="50000"/>
+                  </a:schemeClr>
+                </a:solidFill>
+                <a:latin typeface="+mn-lt"/>
+                <a:ea typeface="+mn-ea"/>
+                <a:cs typeface="+mn-cs"/>
+              </a:defRPr>
+            </a:lvl1pPr>
+            <a:lvl2pPr marL="609493" algn="l" defTabSz="1218987" rtl="0" eaLnBrk="1" latinLnBrk="0" hangingPunct="1">
+              <a:defRPr sz="2400" kern="1200">
+                <a:solidFill>
+                  <a:schemeClr val="tx1"/>
+                </a:solidFill>
+                <a:latin typeface="+mn-lt"/>
+                <a:ea typeface="+mn-ea"/>
+                <a:cs typeface="+mn-cs"/>
+              </a:defRPr>
+            </a:lvl2pPr>
+            <a:lvl3pPr marL="1218987" algn="l" defTabSz="1218987" rtl="0" eaLnBrk="1" latinLnBrk="0" hangingPunct="1">
+              <a:defRPr sz="2400" kern="1200">
+                <a:solidFill>
+                  <a:schemeClr val="tx1"/>
+                </a:solidFill>
+                <a:latin typeface="+mn-lt"/>
+                <a:ea typeface="+mn-ea"/>
+                <a:cs typeface="+mn-cs"/>
+              </a:defRPr>
+            </a:lvl3pPr>
+            <a:lvl4pPr marL="1828480" algn="l" defTabSz="1218987" rtl="0" eaLnBrk="1" latinLnBrk="0" hangingPunct="1">
+              <a:defRPr sz="2400" kern="1200">
+                <a:solidFill>
+                  <a:schemeClr val="tx1"/>
+                </a:solidFill>
+                <a:latin typeface="+mn-lt"/>
+                <a:ea typeface="+mn-ea"/>
+                <a:cs typeface="+mn-cs"/>
+              </a:defRPr>
+            </a:lvl4pPr>
+            <a:lvl5pPr marL="2437973" algn="l" defTabSz="1218987" rtl="0" eaLnBrk="1" latinLnBrk="0" hangingPunct="1">
+              <a:defRPr sz="2400" kern="1200">
+                <a:solidFill>
+                  <a:schemeClr val="tx1"/>
+                </a:solidFill>
+                <a:latin typeface="+mn-lt"/>
+                <a:ea typeface="+mn-ea"/>
+                <a:cs typeface="+mn-cs"/>
+              </a:defRPr>
+            </a:lvl5pPr>
+            <a:lvl6pPr marL="3047467" algn="l" defTabSz="1218987" rtl="0" eaLnBrk="1" latinLnBrk="0" hangingPunct="1">
+              <a:defRPr sz="2400" kern="1200">
+                <a:solidFill>
+                  <a:schemeClr val="tx1"/>
+                </a:solidFill>
+                <a:latin typeface="+mn-lt"/>
+                <a:ea typeface="+mn-ea"/>
+                <a:cs typeface="+mn-cs"/>
+              </a:defRPr>
+            </a:lvl6pPr>
+            <a:lvl7pPr marL="3656960" algn="l" defTabSz="1218987" rtl="0" eaLnBrk="1" latinLnBrk="0" hangingPunct="1">
+              <a:defRPr sz="2400" kern="1200">
+                <a:solidFill>
+                  <a:schemeClr val="tx1"/>
+                </a:solidFill>
+                <a:latin typeface="+mn-lt"/>
+                <a:ea typeface="+mn-ea"/>
+                <a:cs typeface="+mn-cs"/>
+              </a:defRPr>
+            </a:lvl7pPr>
+            <a:lvl8pPr marL="4266453" algn="l" defTabSz="1218987" rtl="0" eaLnBrk="1" latinLnBrk="0" hangingPunct="1">
+              <a:defRPr sz="2400" kern="1200">
+                <a:solidFill>
+                  <a:schemeClr val="tx1"/>
+                </a:solidFill>
+                <a:latin typeface="+mn-lt"/>
+                <a:ea typeface="+mn-ea"/>
+                <a:cs typeface="+mn-cs"/>
+              </a:defRPr>
+            </a:lvl8pPr>
+            <a:lvl9pPr marL="4875947" algn="l" defTabSz="1218987" rtl="0" eaLnBrk="1" latinLnBrk="0" hangingPunct="1">
+              <a:defRPr sz="2400" kern="1200">
+                <a:solidFill>
+                  <a:schemeClr val="tx1"/>
+                </a:solidFill>
+                <a:latin typeface="+mn-lt"/>
+                <a:ea typeface="+mn-ea"/>
+                <a:cs typeface="+mn-cs"/>
+              </a:defRPr>
+            </a:lvl9pPr>
+          </a:lstStyle>
+          <a:p>
+            <a:pPr algn="l"/>
+            <a:r>
+              <a:rPr lang="en-US" dirty="0"/>
+              <a:t>DES211 CAPSTONE PROJECT</a:t>
+            </a:r>
+          </a:p>
+        </p:txBody>
+      </p:sp>
     </p:spTree>
     <p:extLst>
       <p:ext uri="{BB962C8B-B14F-4D97-AF65-F5344CB8AC3E}">
-        <p14:creationId xmlns:p14="http://schemas.microsoft.com/office/powerpoint/2010/main" val="825357147"/>
+        <p14:creationId xmlns:p14="http://schemas.microsoft.com/office/powerpoint/2010/main" val="2633488709"/>
       </p:ext>
     </p:extLst>
   </p:cSld>
@@ -11092,7 +12459,7 @@
           <p:cNvPr id="2" name="Title 1">
             <a:extLst>
               <a:ext uri="{FF2B5EF4-FFF2-40B4-BE49-F238E27FC236}">
-                <a16:creationId xmlns:a16="http://schemas.microsoft.com/office/drawing/2014/main" id="{64983D13-B3DC-F5A2-EC3C-9AA3827FF06F}"/>
+                <a16:creationId xmlns:a16="http://schemas.microsoft.com/office/drawing/2014/main" id="{3870CE6E-495D-1808-5A8C-EC4D855C5587}"/>
               </a:ext>
             </a:extLst>
           </p:cNvPr>
@@ -11108,16 +12475,19 @@
           <a:bodyPr/>
           <a:lstStyle/>
           <a:p>
-            <a:endParaRPr lang="en-IN"/>
-          </a:p>
-        </p:txBody>
-      </p:sp>
-      <p:sp>
-        <p:nvSpPr>
-          <p:cNvPr id="3" name="Picture Placeholder 2">
-            <a:extLst>
-              <a:ext uri="{FF2B5EF4-FFF2-40B4-BE49-F238E27FC236}">
-                <a16:creationId xmlns:a16="http://schemas.microsoft.com/office/drawing/2014/main" id="{57620467-CA16-1C06-152E-31CFC11FAB8D}"/>
+            <a:r>
+              <a:rPr lang="en-IN" dirty="0"/>
+              <a:t>Testing Phase</a:t>
+            </a:r>
+          </a:p>
+        </p:txBody>
+      </p:sp>
+      <p:sp>
+        <p:nvSpPr>
+          <p:cNvPr id="3" name="Content Placeholder 2">
+            <a:extLst>
+              <a:ext uri="{FF2B5EF4-FFF2-40B4-BE49-F238E27FC236}">
+                <a16:creationId xmlns:a16="http://schemas.microsoft.com/office/drawing/2014/main" id="{B0EEF2E2-7250-905A-9F8E-5BB773C92FF2}"/>
               </a:ext>
             </a:extLst>
           </p:cNvPr>
@@ -11125,15 +12495,208 @@
             <a:spLocks noGrp="1"/>
           </p:cNvSpPr>
           <p:nvPr>
-            <p:ph type="pic" sz="quarter" idx="10"/>
+            <p:ph sz="quarter" idx="13"/>
           </p:nvPr>
         </p:nvSpPr>
         <p:spPr/>
+        <p:txBody>
+          <a:bodyPr/>
+          <a:lstStyle/>
+          <a:p>
+            <a:endParaRPr lang="en-IN"/>
+          </a:p>
+        </p:txBody>
+      </p:sp>
+      <p:sp>
+        <p:nvSpPr>
+          <p:cNvPr id="4" name="Content Placeholder 3">
+            <a:extLst>
+              <a:ext uri="{FF2B5EF4-FFF2-40B4-BE49-F238E27FC236}">
+                <a16:creationId xmlns:a16="http://schemas.microsoft.com/office/drawing/2014/main" id="{2A8D0320-4D4B-365D-2F4F-3045D1A7C46C}"/>
+              </a:ext>
+            </a:extLst>
+          </p:cNvPr>
+          <p:cNvSpPr>
+            <a:spLocks noGrp="1"/>
+          </p:cNvSpPr>
+          <p:nvPr>
+            <p:ph sz="quarter" idx="14"/>
+          </p:nvPr>
+        </p:nvSpPr>
+        <p:spPr/>
+        <p:txBody>
+          <a:bodyPr/>
+          <a:lstStyle/>
+          <a:p>
+            <a:endParaRPr lang="en-IN"/>
+          </a:p>
+        </p:txBody>
+      </p:sp>
+      <p:sp>
+        <p:nvSpPr>
+          <p:cNvPr id="5" name="Slide Number Placeholder 4">
+            <a:extLst>
+              <a:ext uri="{FF2B5EF4-FFF2-40B4-BE49-F238E27FC236}">
+                <a16:creationId xmlns:a16="http://schemas.microsoft.com/office/drawing/2014/main" id="{E7948434-32DA-F1E2-FC11-F2978017F64B}"/>
+              </a:ext>
+            </a:extLst>
+          </p:cNvPr>
+          <p:cNvSpPr>
+            <a:spLocks noGrp="1"/>
+          </p:cNvSpPr>
+          <p:nvPr>
+            <p:ph type="sldNum" sz="quarter" idx="12"/>
+          </p:nvPr>
+        </p:nvSpPr>
+        <p:spPr/>
+        <p:txBody>
+          <a:bodyPr/>
+          <a:lstStyle/>
+          <a:p>
+            <a:fld id="{EB37DED6-D4C7-42EE-AB49-D2E39E64FDE4}" type="slidenum">
+              <a:rPr lang="en-US" smtClean="0"/>
+              <a:pPr/>
+              <a:t>20</a:t>
+            </a:fld>
+            <a:endParaRPr lang="en-US" dirty="0"/>
+          </a:p>
+        </p:txBody>
+      </p:sp>
+      <p:sp>
+        <p:nvSpPr>
+          <p:cNvPr id="6" name="Slide Number Placeholder 4">
+            <a:extLst>
+              <a:ext uri="{FF2B5EF4-FFF2-40B4-BE49-F238E27FC236}">
+                <a16:creationId xmlns:a16="http://schemas.microsoft.com/office/drawing/2014/main" id="{5ECD9DAA-C767-07CC-5C79-8738D4F306A7}"/>
+              </a:ext>
+            </a:extLst>
+          </p:cNvPr>
+          <p:cNvSpPr txBox="1">
+            <a:spLocks/>
+          </p:cNvSpPr>
+          <p:nvPr/>
+        </p:nvSpPr>
+        <p:spPr>
+          <a:xfrm>
+            <a:off x="455612" y="6190488"/>
+            <a:ext cx="2677604" cy="210312"/>
+          </a:xfrm>
+          <a:prstGeom prst="rect">
+            <a:avLst/>
+          </a:prstGeom>
+        </p:spPr>
+        <p:txBody>
+          <a:bodyPr vert="horz" lIns="121899" tIns="60949" rIns="121899" bIns="60949" rtlCol="0" anchor="b"/>
+          <a:lstStyle>
+            <a:defPPr>
+              <a:defRPr lang="en-US"/>
+            </a:defPPr>
+            <a:lvl1pPr marL="0" algn="r" defTabSz="1218987" rtl="0" eaLnBrk="1" latinLnBrk="0" hangingPunct="1">
+              <a:defRPr sz="1000" b="1" kern="1200" spc="200" baseline="0">
+                <a:solidFill>
+                  <a:schemeClr val="tx2">
+                    <a:lumMod val="50000"/>
+                  </a:schemeClr>
+                </a:solidFill>
+                <a:latin typeface="+mn-lt"/>
+                <a:ea typeface="+mn-ea"/>
+                <a:cs typeface="+mn-cs"/>
+              </a:defRPr>
+            </a:lvl1pPr>
+            <a:lvl2pPr marL="609493" algn="l" defTabSz="1218987" rtl="0" eaLnBrk="1" latinLnBrk="0" hangingPunct="1">
+              <a:defRPr sz="2400" kern="1200">
+                <a:solidFill>
+                  <a:schemeClr val="tx1"/>
+                </a:solidFill>
+                <a:latin typeface="+mn-lt"/>
+                <a:ea typeface="+mn-ea"/>
+                <a:cs typeface="+mn-cs"/>
+              </a:defRPr>
+            </a:lvl2pPr>
+            <a:lvl3pPr marL="1218987" algn="l" defTabSz="1218987" rtl="0" eaLnBrk="1" latinLnBrk="0" hangingPunct="1">
+              <a:defRPr sz="2400" kern="1200">
+                <a:solidFill>
+                  <a:schemeClr val="tx1"/>
+                </a:solidFill>
+                <a:latin typeface="+mn-lt"/>
+                <a:ea typeface="+mn-ea"/>
+                <a:cs typeface="+mn-cs"/>
+              </a:defRPr>
+            </a:lvl3pPr>
+            <a:lvl4pPr marL="1828480" algn="l" defTabSz="1218987" rtl="0" eaLnBrk="1" latinLnBrk="0" hangingPunct="1">
+              <a:defRPr sz="2400" kern="1200">
+                <a:solidFill>
+                  <a:schemeClr val="tx1"/>
+                </a:solidFill>
+                <a:latin typeface="+mn-lt"/>
+                <a:ea typeface="+mn-ea"/>
+                <a:cs typeface="+mn-cs"/>
+              </a:defRPr>
+            </a:lvl4pPr>
+            <a:lvl5pPr marL="2437973" algn="l" defTabSz="1218987" rtl="0" eaLnBrk="1" latinLnBrk="0" hangingPunct="1">
+              <a:defRPr sz="2400" kern="1200">
+                <a:solidFill>
+                  <a:schemeClr val="tx1"/>
+                </a:solidFill>
+                <a:latin typeface="+mn-lt"/>
+                <a:ea typeface="+mn-ea"/>
+                <a:cs typeface="+mn-cs"/>
+              </a:defRPr>
+            </a:lvl5pPr>
+            <a:lvl6pPr marL="3047467" algn="l" defTabSz="1218987" rtl="0" eaLnBrk="1" latinLnBrk="0" hangingPunct="1">
+              <a:defRPr sz="2400" kern="1200">
+                <a:solidFill>
+                  <a:schemeClr val="tx1"/>
+                </a:solidFill>
+                <a:latin typeface="+mn-lt"/>
+                <a:ea typeface="+mn-ea"/>
+                <a:cs typeface="+mn-cs"/>
+              </a:defRPr>
+            </a:lvl6pPr>
+            <a:lvl7pPr marL="3656960" algn="l" defTabSz="1218987" rtl="0" eaLnBrk="1" latinLnBrk="0" hangingPunct="1">
+              <a:defRPr sz="2400" kern="1200">
+                <a:solidFill>
+                  <a:schemeClr val="tx1"/>
+                </a:solidFill>
+                <a:latin typeface="+mn-lt"/>
+                <a:ea typeface="+mn-ea"/>
+                <a:cs typeface="+mn-cs"/>
+              </a:defRPr>
+            </a:lvl7pPr>
+            <a:lvl8pPr marL="4266453" algn="l" defTabSz="1218987" rtl="0" eaLnBrk="1" latinLnBrk="0" hangingPunct="1">
+              <a:defRPr sz="2400" kern="1200">
+                <a:solidFill>
+                  <a:schemeClr val="tx1"/>
+                </a:solidFill>
+                <a:latin typeface="+mn-lt"/>
+                <a:ea typeface="+mn-ea"/>
+                <a:cs typeface="+mn-cs"/>
+              </a:defRPr>
+            </a:lvl8pPr>
+            <a:lvl9pPr marL="4875947" algn="l" defTabSz="1218987" rtl="0" eaLnBrk="1" latinLnBrk="0" hangingPunct="1">
+              <a:defRPr sz="2400" kern="1200">
+                <a:solidFill>
+                  <a:schemeClr val="tx1"/>
+                </a:solidFill>
+                <a:latin typeface="+mn-lt"/>
+                <a:ea typeface="+mn-ea"/>
+                <a:cs typeface="+mn-cs"/>
+              </a:defRPr>
+            </a:lvl9pPr>
+          </a:lstStyle>
+          <a:p>
+            <a:pPr algn="l"/>
+            <a:r>
+              <a:rPr lang="en-US" dirty="0"/>
+              <a:t>DES211 CAPSTONE PROJECT</a:t>
+            </a:r>
+          </a:p>
+        </p:txBody>
       </p:sp>
     </p:spTree>
     <p:extLst>
       <p:ext uri="{BB962C8B-B14F-4D97-AF65-F5344CB8AC3E}">
-        <p14:creationId xmlns:p14="http://schemas.microsoft.com/office/powerpoint/2010/main" val="1723280250"/>
+        <p14:creationId xmlns:p14="http://schemas.microsoft.com/office/powerpoint/2010/main" val="825357147"/>
       </p:ext>
     </p:extLst>
   </p:cSld>
@@ -11177,7 +12740,7 @@
           <p:cNvPr id="2" name="Title 1">
             <a:extLst>
               <a:ext uri="{FF2B5EF4-FFF2-40B4-BE49-F238E27FC236}">
-                <a16:creationId xmlns:a16="http://schemas.microsoft.com/office/drawing/2014/main" id="{E9DC9FCC-4F0C-53A9-AE36-C60D0609DD96}"/>
+                <a16:creationId xmlns:a16="http://schemas.microsoft.com/office/drawing/2014/main" id="{64983D13-B3DC-F5A2-EC3C-9AA3827FF06F}"/>
               </a:ext>
             </a:extLst>
           </p:cNvPr>
@@ -11199,6 +12762,229 @@
       </p:sp>
       <p:sp>
         <p:nvSpPr>
+          <p:cNvPr id="3" name="Picture Placeholder 2">
+            <a:extLst>
+              <a:ext uri="{FF2B5EF4-FFF2-40B4-BE49-F238E27FC236}">
+                <a16:creationId xmlns:a16="http://schemas.microsoft.com/office/drawing/2014/main" id="{57620467-CA16-1C06-152E-31CFC11FAB8D}"/>
+              </a:ext>
+            </a:extLst>
+          </p:cNvPr>
+          <p:cNvSpPr>
+            <a:spLocks noGrp="1"/>
+          </p:cNvSpPr>
+          <p:nvPr>
+            <p:ph type="pic" sz="quarter" idx="10"/>
+          </p:nvPr>
+        </p:nvSpPr>
+        <p:spPr/>
+        <p:txBody>
+          <a:bodyPr/>
+          <a:lstStyle/>
+          <a:p>
+            <a:endParaRPr lang="en-US"/>
+          </a:p>
+        </p:txBody>
+      </p:sp>
+      <p:sp>
+        <p:nvSpPr>
+          <p:cNvPr id="5" name="Slide Number Placeholder 4">
+            <a:extLst>
+              <a:ext uri="{FF2B5EF4-FFF2-40B4-BE49-F238E27FC236}">
+                <a16:creationId xmlns:a16="http://schemas.microsoft.com/office/drawing/2014/main" id="{19257D08-7BDC-2EFF-F790-09A4B6BCCC7B}"/>
+              </a:ext>
+            </a:extLst>
+          </p:cNvPr>
+          <p:cNvSpPr txBox="1">
+            <a:spLocks/>
+          </p:cNvSpPr>
+          <p:nvPr/>
+        </p:nvSpPr>
+        <p:spPr>
+          <a:xfrm>
+            <a:off x="455612" y="6190488"/>
+            <a:ext cx="2677604" cy="210312"/>
+          </a:xfrm>
+          <a:prstGeom prst="rect">
+            <a:avLst/>
+          </a:prstGeom>
+        </p:spPr>
+        <p:txBody>
+          <a:bodyPr vert="horz" lIns="121899" tIns="60949" rIns="121899" bIns="60949" rtlCol="0" anchor="b"/>
+          <a:lstStyle>
+            <a:defPPr>
+              <a:defRPr lang="en-US"/>
+            </a:defPPr>
+            <a:lvl1pPr marL="0" algn="r" defTabSz="1218987" rtl="0" eaLnBrk="1" latinLnBrk="0" hangingPunct="1">
+              <a:defRPr sz="1000" b="1" kern="1200" spc="200" baseline="0">
+                <a:solidFill>
+                  <a:schemeClr val="tx2">
+                    <a:lumMod val="50000"/>
+                  </a:schemeClr>
+                </a:solidFill>
+                <a:latin typeface="+mn-lt"/>
+                <a:ea typeface="+mn-ea"/>
+                <a:cs typeface="+mn-cs"/>
+              </a:defRPr>
+            </a:lvl1pPr>
+            <a:lvl2pPr marL="609493" algn="l" defTabSz="1218987" rtl="0" eaLnBrk="1" latinLnBrk="0" hangingPunct="1">
+              <a:defRPr sz="2400" kern="1200">
+                <a:solidFill>
+                  <a:schemeClr val="tx1"/>
+                </a:solidFill>
+                <a:latin typeface="+mn-lt"/>
+                <a:ea typeface="+mn-ea"/>
+                <a:cs typeface="+mn-cs"/>
+              </a:defRPr>
+            </a:lvl2pPr>
+            <a:lvl3pPr marL="1218987" algn="l" defTabSz="1218987" rtl="0" eaLnBrk="1" latinLnBrk="0" hangingPunct="1">
+              <a:defRPr sz="2400" kern="1200">
+                <a:solidFill>
+                  <a:schemeClr val="tx1"/>
+                </a:solidFill>
+                <a:latin typeface="+mn-lt"/>
+                <a:ea typeface="+mn-ea"/>
+                <a:cs typeface="+mn-cs"/>
+              </a:defRPr>
+            </a:lvl3pPr>
+            <a:lvl4pPr marL="1828480" algn="l" defTabSz="1218987" rtl="0" eaLnBrk="1" latinLnBrk="0" hangingPunct="1">
+              <a:defRPr sz="2400" kern="1200">
+                <a:solidFill>
+                  <a:schemeClr val="tx1"/>
+                </a:solidFill>
+                <a:latin typeface="+mn-lt"/>
+                <a:ea typeface="+mn-ea"/>
+                <a:cs typeface="+mn-cs"/>
+              </a:defRPr>
+            </a:lvl4pPr>
+            <a:lvl5pPr marL="2437973" algn="l" defTabSz="1218987" rtl="0" eaLnBrk="1" latinLnBrk="0" hangingPunct="1">
+              <a:defRPr sz="2400" kern="1200">
+                <a:solidFill>
+                  <a:schemeClr val="tx1"/>
+                </a:solidFill>
+                <a:latin typeface="+mn-lt"/>
+                <a:ea typeface="+mn-ea"/>
+                <a:cs typeface="+mn-cs"/>
+              </a:defRPr>
+            </a:lvl5pPr>
+            <a:lvl6pPr marL="3047467" algn="l" defTabSz="1218987" rtl="0" eaLnBrk="1" latinLnBrk="0" hangingPunct="1">
+              <a:defRPr sz="2400" kern="1200">
+                <a:solidFill>
+                  <a:schemeClr val="tx1"/>
+                </a:solidFill>
+                <a:latin typeface="+mn-lt"/>
+                <a:ea typeface="+mn-ea"/>
+                <a:cs typeface="+mn-cs"/>
+              </a:defRPr>
+            </a:lvl6pPr>
+            <a:lvl7pPr marL="3656960" algn="l" defTabSz="1218987" rtl="0" eaLnBrk="1" latinLnBrk="0" hangingPunct="1">
+              <a:defRPr sz="2400" kern="1200">
+                <a:solidFill>
+                  <a:schemeClr val="tx1"/>
+                </a:solidFill>
+                <a:latin typeface="+mn-lt"/>
+                <a:ea typeface="+mn-ea"/>
+                <a:cs typeface="+mn-cs"/>
+              </a:defRPr>
+            </a:lvl7pPr>
+            <a:lvl8pPr marL="4266453" algn="l" defTabSz="1218987" rtl="0" eaLnBrk="1" latinLnBrk="0" hangingPunct="1">
+              <a:defRPr sz="2400" kern="1200">
+                <a:solidFill>
+                  <a:schemeClr val="tx1"/>
+                </a:solidFill>
+                <a:latin typeface="+mn-lt"/>
+                <a:ea typeface="+mn-ea"/>
+                <a:cs typeface="+mn-cs"/>
+              </a:defRPr>
+            </a:lvl8pPr>
+            <a:lvl9pPr marL="4875947" algn="l" defTabSz="1218987" rtl="0" eaLnBrk="1" latinLnBrk="0" hangingPunct="1">
+              <a:defRPr sz="2400" kern="1200">
+                <a:solidFill>
+                  <a:schemeClr val="tx1"/>
+                </a:solidFill>
+                <a:latin typeface="+mn-lt"/>
+                <a:ea typeface="+mn-ea"/>
+                <a:cs typeface="+mn-cs"/>
+              </a:defRPr>
+            </a:lvl9pPr>
+          </a:lstStyle>
+          <a:p>
+            <a:pPr algn="l"/>
+            <a:r>
+              <a:rPr lang="en-US" dirty="0"/>
+              <a:t>DES211 CAPSTONE PROJECT</a:t>
+            </a:r>
+          </a:p>
+        </p:txBody>
+      </p:sp>
+    </p:spTree>
+    <p:extLst>
+      <p:ext uri="{BB962C8B-B14F-4D97-AF65-F5344CB8AC3E}">
+        <p14:creationId xmlns:p14="http://schemas.microsoft.com/office/powerpoint/2010/main" val="1723280250"/>
+      </p:ext>
+    </p:extLst>
+  </p:cSld>
+  <p:clrMapOvr>
+    <a:masterClrMapping/>
+  </p:clrMapOvr>
+  <mc:AlternateContent xmlns:mc="http://schemas.openxmlformats.org/markup-compatibility/2006" xmlns:p14="http://schemas.microsoft.com/office/powerpoint/2010/main">
+    <mc:Choice Requires="p14">
+      <p:transition spd="med" p14:dur="700">
+        <p:fade/>
+      </p:transition>
+    </mc:Choice>
+    <mc:Fallback xmlns="">
+      <p:transition spd="med">
+        <p:fade/>
+      </p:transition>
+    </mc:Fallback>
+  </mc:AlternateContent>
+</p:sld>
+</file>
+
+<file path=ppt/slides/slide22.xml><?xml version="1.0" encoding="utf-8"?>
+<p:sld xmlns:a="http://schemas.openxmlformats.org/drawingml/2006/main" xmlns:r="http://schemas.openxmlformats.org/officeDocument/2006/relationships" xmlns:p="http://schemas.openxmlformats.org/presentationml/2006/main">
+  <p:cSld>
+    <p:spTree>
+      <p:nvGrpSpPr>
+        <p:cNvPr id="1" name=""/>
+        <p:cNvGrpSpPr/>
+        <p:nvPr/>
+      </p:nvGrpSpPr>
+      <p:grpSpPr>
+        <a:xfrm>
+          <a:off x="0" y="0"/>
+          <a:ext cx="0" cy="0"/>
+          <a:chOff x="0" y="0"/>
+          <a:chExt cx="0" cy="0"/>
+        </a:xfrm>
+      </p:grpSpPr>
+      <p:sp>
+        <p:nvSpPr>
+          <p:cNvPr id="2" name="Title 1">
+            <a:extLst>
+              <a:ext uri="{FF2B5EF4-FFF2-40B4-BE49-F238E27FC236}">
+                <a16:creationId xmlns:a16="http://schemas.microsoft.com/office/drawing/2014/main" id="{E9DC9FCC-4F0C-53A9-AE36-C60D0609DD96}"/>
+              </a:ext>
+            </a:extLst>
+          </p:cNvPr>
+          <p:cNvSpPr>
+            <a:spLocks noGrp="1"/>
+          </p:cNvSpPr>
+          <p:nvPr>
+            <p:ph type="title"/>
+          </p:nvPr>
+        </p:nvSpPr>
+        <p:spPr/>
+        <p:txBody>
+          <a:bodyPr/>
+          <a:lstStyle/>
+          <a:p>
+            <a:endParaRPr lang="en-IN"/>
+          </a:p>
+        </p:txBody>
+      </p:sp>
+      <p:sp>
+        <p:nvSpPr>
           <p:cNvPr id="3" name="Content Placeholder 2">
             <a:extLst>
               <a:ext uri="{FF2B5EF4-FFF2-40B4-BE49-F238E27FC236}">
@@ -11246,7 +13032,7 @@
             <a:fld id="{EB37DED6-D4C7-42EE-AB49-D2E39E64FDE4}" type="slidenum">
               <a:rPr lang="en-US" smtClean="0"/>
               <a:pPr/>
-              <a:t>21</a:t>
+              <a:t>22</a:t>
             </a:fld>
             <a:endParaRPr lang="en-US" dirty="0"/>
           </a:p>
@@ -11269,6 +13055,144 @@
           </p:nvPr>
         </p:nvSpPr>
         <p:spPr/>
+        <p:txBody>
+          <a:bodyPr/>
+          <a:lstStyle/>
+          <a:p>
+            <a:endParaRPr lang="en-US"/>
+          </a:p>
+        </p:txBody>
+      </p:sp>
+      <p:sp>
+        <p:nvSpPr>
+          <p:cNvPr id="6" name="Slide Number Placeholder 4">
+            <a:extLst>
+              <a:ext uri="{FF2B5EF4-FFF2-40B4-BE49-F238E27FC236}">
+                <a16:creationId xmlns:a16="http://schemas.microsoft.com/office/drawing/2014/main" id="{4528D0A7-F482-D3DE-3F57-80240745CFC5}"/>
+              </a:ext>
+            </a:extLst>
+          </p:cNvPr>
+          <p:cNvSpPr txBox="1">
+            <a:spLocks/>
+          </p:cNvSpPr>
+          <p:nvPr/>
+        </p:nvSpPr>
+        <p:spPr>
+          <a:xfrm>
+            <a:off x="455612" y="6190488"/>
+            <a:ext cx="2677604" cy="210312"/>
+          </a:xfrm>
+          <a:prstGeom prst="rect">
+            <a:avLst/>
+          </a:prstGeom>
+        </p:spPr>
+        <p:txBody>
+          <a:bodyPr vert="horz" lIns="121899" tIns="60949" rIns="121899" bIns="60949" rtlCol="0" anchor="b"/>
+          <a:lstStyle>
+            <a:defPPr>
+              <a:defRPr lang="en-US"/>
+            </a:defPPr>
+            <a:lvl1pPr marL="0" algn="r" defTabSz="1218987" rtl="0" eaLnBrk="1" latinLnBrk="0" hangingPunct="1">
+              <a:defRPr sz="1000" b="1" kern="1200" spc="200" baseline="0">
+                <a:solidFill>
+                  <a:schemeClr val="tx2">
+                    <a:lumMod val="50000"/>
+                  </a:schemeClr>
+                </a:solidFill>
+                <a:latin typeface="+mn-lt"/>
+                <a:ea typeface="+mn-ea"/>
+                <a:cs typeface="+mn-cs"/>
+              </a:defRPr>
+            </a:lvl1pPr>
+            <a:lvl2pPr marL="609493" algn="l" defTabSz="1218987" rtl="0" eaLnBrk="1" latinLnBrk="0" hangingPunct="1">
+              <a:defRPr sz="2400" kern="1200">
+                <a:solidFill>
+                  <a:schemeClr val="tx1"/>
+                </a:solidFill>
+                <a:latin typeface="+mn-lt"/>
+                <a:ea typeface="+mn-ea"/>
+                <a:cs typeface="+mn-cs"/>
+              </a:defRPr>
+            </a:lvl2pPr>
+            <a:lvl3pPr marL="1218987" algn="l" defTabSz="1218987" rtl="0" eaLnBrk="1" latinLnBrk="0" hangingPunct="1">
+              <a:defRPr sz="2400" kern="1200">
+                <a:solidFill>
+                  <a:schemeClr val="tx1"/>
+                </a:solidFill>
+                <a:latin typeface="+mn-lt"/>
+                <a:ea typeface="+mn-ea"/>
+                <a:cs typeface="+mn-cs"/>
+              </a:defRPr>
+            </a:lvl3pPr>
+            <a:lvl4pPr marL="1828480" algn="l" defTabSz="1218987" rtl="0" eaLnBrk="1" latinLnBrk="0" hangingPunct="1">
+              <a:defRPr sz="2400" kern="1200">
+                <a:solidFill>
+                  <a:schemeClr val="tx1"/>
+                </a:solidFill>
+                <a:latin typeface="+mn-lt"/>
+                <a:ea typeface="+mn-ea"/>
+                <a:cs typeface="+mn-cs"/>
+              </a:defRPr>
+            </a:lvl4pPr>
+            <a:lvl5pPr marL="2437973" algn="l" defTabSz="1218987" rtl="0" eaLnBrk="1" latinLnBrk="0" hangingPunct="1">
+              <a:defRPr sz="2400" kern="1200">
+                <a:solidFill>
+                  <a:schemeClr val="tx1"/>
+                </a:solidFill>
+                <a:latin typeface="+mn-lt"/>
+                <a:ea typeface="+mn-ea"/>
+                <a:cs typeface="+mn-cs"/>
+              </a:defRPr>
+            </a:lvl5pPr>
+            <a:lvl6pPr marL="3047467" algn="l" defTabSz="1218987" rtl="0" eaLnBrk="1" latinLnBrk="0" hangingPunct="1">
+              <a:defRPr sz="2400" kern="1200">
+                <a:solidFill>
+                  <a:schemeClr val="tx1"/>
+                </a:solidFill>
+                <a:latin typeface="+mn-lt"/>
+                <a:ea typeface="+mn-ea"/>
+                <a:cs typeface="+mn-cs"/>
+              </a:defRPr>
+            </a:lvl6pPr>
+            <a:lvl7pPr marL="3656960" algn="l" defTabSz="1218987" rtl="0" eaLnBrk="1" latinLnBrk="0" hangingPunct="1">
+              <a:defRPr sz="2400" kern="1200">
+                <a:solidFill>
+                  <a:schemeClr val="tx1"/>
+                </a:solidFill>
+                <a:latin typeface="+mn-lt"/>
+                <a:ea typeface="+mn-ea"/>
+                <a:cs typeface="+mn-cs"/>
+              </a:defRPr>
+            </a:lvl7pPr>
+            <a:lvl8pPr marL="4266453" algn="l" defTabSz="1218987" rtl="0" eaLnBrk="1" latinLnBrk="0" hangingPunct="1">
+              <a:defRPr sz="2400" kern="1200">
+                <a:solidFill>
+                  <a:schemeClr val="tx1"/>
+                </a:solidFill>
+                <a:latin typeface="+mn-lt"/>
+                <a:ea typeface="+mn-ea"/>
+                <a:cs typeface="+mn-cs"/>
+              </a:defRPr>
+            </a:lvl8pPr>
+            <a:lvl9pPr marL="4875947" algn="l" defTabSz="1218987" rtl="0" eaLnBrk="1" latinLnBrk="0" hangingPunct="1">
+              <a:defRPr sz="2400" kern="1200">
+                <a:solidFill>
+                  <a:schemeClr val="tx1"/>
+                </a:solidFill>
+                <a:latin typeface="+mn-lt"/>
+                <a:ea typeface="+mn-ea"/>
+                <a:cs typeface="+mn-cs"/>
+              </a:defRPr>
+            </a:lvl9pPr>
+          </a:lstStyle>
+          <a:p>
+            <a:pPr algn="l"/>
+            <a:r>
+              <a:rPr lang="en-US" dirty="0"/>
+              <a:t>DES211 CAPSTONE PROJECT</a:t>
+            </a:r>
+          </a:p>
+        </p:txBody>
       </p:sp>
     </p:spTree>
     <p:extLst>
@@ -12518,6 +14442,137 @@
           </a:p>
         </p:txBody>
       </p:sp>
+      <p:sp>
+        <p:nvSpPr>
+          <p:cNvPr id="4" name="Slide Number Placeholder 4">
+            <a:extLst>
+              <a:ext uri="{FF2B5EF4-FFF2-40B4-BE49-F238E27FC236}">
+                <a16:creationId xmlns:a16="http://schemas.microsoft.com/office/drawing/2014/main" id="{C6ABE3FD-DB28-538C-3CD8-8E51B39E9775}"/>
+              </a:ext>
+            </a:extLst>
+          </p:cNvPr>
+          <p:cNvSpPr txBox="1">
+            <a:spLocks/>
+          </p:cNvSpPr>
+          <p:nvPr/>
+        </p:nvSpPr>
+        <p:spPr>
+          <a:xfrm>
+            <a:off x="455612" y="6190488"/>
+            <a:ext cx="2677604" cy="210312"/>
+          </a:xfrm>
+          <a:prstGeom prst="rect">
+            <a:avLst/>
+          </a:prstGeom>
+        </p:spPr>
+        <p:txBody>
+          <a:bodyPr vert="horz" lIns="121899" tIns="60949" rIns="121899" bIns="60949" rtlCol="0" anchor="b"/>
+          <a:lstStyle>
+            <a:defPPr>
+              <a:defRPr lang="en-US"/>
+            </a:defPPr>
+            <a:lvl1pPr marL="0" algn="r" defTabSz="1218987" rtl="0" eaLnBrk="1" latinLnBrk="0" hangingPunct="1">
+              <a:defRPr sz="1000" b="1" kern="1200" spc="200" baseline="0">
+                <a:solidFill>
+                  <a:schemeClr val="tx2">
+                    <a:lumMod val="50000"/>
+                  </a:schemeClr>
+                </a:solidFill>
+                <a:latin typeface="+mn-lt"/>
+                <a:ea typeface="+mn-ea"/>
+                <a:cs typeface="+mn-cs"/>
+              </a:defRPr>
+            </a:lvl1pPr>
+            <a:lvl2pPr marL="609493" algn="l" defTabSz="1218987" rtl="0" eaLnBrk="1" latinLnBrk="0" hangingPunct="1">
+              <a:defRPr sz="2400" kern="1200">
+                <a:solidFill>
+                  <a:schemeClr val="tx1"/>
+                </a:solidFill>
+                <a:latin typeface="+mn-lt"/>
+                <a:ea typeface="+mn-ea"/>
+                <a:cs typeface="+mn-cs"/>
+              </a:defRPr>
+            </a:lvl2pPr>
+            <a:lvl3pPr marL="1218987" algn="l" defTabSz="1218987" rtl="0" eaLnBrk="1" latinLnBrk="0" hangingPunct="1">
+              <a:defRPr sz="2400" kern="1200">
+                <a:solidFill>
+                  <a:schemeClr val="tx1"/>
+                </a:solidFill>
+                <a:latin typeface="+mn-lt"/>
+                <a:ea typeface="+mn-ea"/>
+                <a:cs typeface="+mn-cs"/>
+              </a:defRPr>
+            </a:lvl3pPr>
+            <a:lvl4pPr marL="1828480" algn="l" defTabSz="1218987" rtl="0" eaLnBrk="1" latinLnBrk="0" hangingPunct="1">
+              <a:defRPr sz="2400" kern="1200">
+                <a:solidFill>
+                  <a:schemeClr val="tx1"/>
+                </a:solidFill>
+                <a:latin typeface="+mn-lt"/>
+                <a:ea typeface="+mn-ea"/>
+                <a:cs typeface="+mn-cs"/>
+              </a:defRPr>
+            </a:lvl4pPr>
+            <a:lvl5pPr marL="2437973" algn="l" defTabSz="1218987" rtl="0" eaLnBrk="1" latinLnBrk="0" hangingPunct="1">
+              <a:defRPr sz="2400" kern="1200">
+                <a:solidFill>
+                  <a:schemeClr val="tx1"/>
+                </a:solidFill>
+                <a:latin typeface="+mn-lt"/>
+                <a:ea typeface="+mn-ea"/>
+                <a:cs typeface="+mn-cs"/>
+              </a:defRPr>
+            </a:lvl5pPr>
+            <a:lvl6pPr marL="3047467" algn="l" defTabSz="1218987" rtl="0" eaLnBrk="1" latinLnBrk="0" hangingPunct="1">
+              <a:defRPr sz="2400" kern="1200">
+                <a:solidFill>
+                  <a:schemeClr val="tx1"/>
+                </a:solidFill>
+                <a:latin typeface="+mn-lt"/>
+                <a:ea typeface="+mn-ea"/>
+                <a:cs typeface="+mn-cs"/>
+              </a:defRPr>
+            </a:lvl6pPr>
+            <a:lvl7pPr marL="3656960" algn="l" defTabSz="1218987" rtl="0" eaLnBrk="1" latinLnBrk="0" hangingPunct="1">
+              <a:defRPr sz="2400" kern="1200">
+                <a:solidFill>
+                  <a:schemeClr val="tx1"/>
+                </a:solidFill>
+                <a:latin typeface="+mn-lt"/>
+                <a:ea typeface="+mn-ea"/>
+                <a:cs typeface="+mn-cs"/>
+              </a:defRPr>
+            </a:lvl7pPr>
+            <a:lvl8pPr marL="4266453" algn="l" defTabSz="1218987" rtl="0" eaLnBrk="1" latinLnBrk="0" hangingPunct="1">
+              <a:defRPr sz="2400" kern="1200">
+                <a:solidFill>
+                  <a:schemeClr val="tx1"/>
+                </a:solidFill>
+                <a:latin typeface="+mn-lt"/>
+                <a:ea typeface="+mn-ea"/>
+                <a:cs typeface="+mn-cs"/>
+              </a:defRPr>
+            </a:lvl8pPr>
+            <a:lvl9pPr marL="4875947" algn="l" defTabSz="1218987" rtl="0" eaLnBrk="1" latinLnBrk="0" hangingPunct="1">
+              <a:defRPr sz="2400" kern="1200">
+                <a:solidFill>
+                  <a:schemeClr val="tx1"/>
+                </a:solidFill>
+                <a:latin typeface="+mn-lt"/>
+                <a:ea typeface="+mn-ea"/>
+                <a:cs typeface="+mn-cs"/>
+              </a:defRPr>
+            </a:lvl9pPr>
+          </a:lstStyle>
+          <a:p>
+            <a:pPr algn="l"/>
+            <a:r>
+              <a:rPr lang="en-US" dirty="0"/>
+              <a:t>DES211 CAPSTONE PROJECT</a:t>
+            </a:r>
+          </a:p>
+        </p:txBody>
+      </p:sp>
     </p:spTree>
     <p:extLst>
       <p:ext uri="{BB962C8B-B14F-4D97-AF65-F5344CB8AC3E}">
@@ -12577,6 +14632,13 @@
           </p:nvPr>
         </p:nvSpPr>
         <p:spPr/>
+        <p:txBody>
+          <a:bodyPr/>
+          <a:lstStyle/>
+          <a:p>
+            <a:endParaRPr lang="en-US"/>
+          </a:p>
+        </p:txBody>
       </p:sp>
       <p:sp>
         <p:nvSpPr>
@@ -12762,6 +14824,137 @@
                 <a:latin typeface="Bahnschrift SemiLight" panose="020B0502040204020203" pitchFamily="34" charset="0"/>
               </a:rPr>
               <a:t>Dogs tip bins over, ruining segregation efforts</a:t>
+            </a:r>
+          </a:p>
+        </p:txBody>
+      </p:sp>
+      <p:sp>
+        <p:nvSpPr>
+          <p:cNvPr id="2" name="Slide Number Placeholder 4">
+            <a:extLst>
+              <a:ext uri="{FF2B5EF4-FFF2-40B4-BE49-F238E27FC236}">
+                <a16:creationId xmlns:a16="http://schemas.microsoft.com/office/drawing/2014/main" id="{9F784091-9CC0-0428-47BD-C6327D2BFE12}"/>
+              </a:ext>
+            </a:extLst>
+          </p:cNvPr>
+          <p:cNvSpPr txBox="1">
+            <a:spLocks/>
+          </p:cNvSpPr>
+          <p:nvPr/>
+        </p:nvSpPr>
+        <p:spPr>
+          <a:xfrm>
+            <a:off x="455612" y="6190488"/>
+            <a:ext cx="2677604" cy="210312"/>
+          </a:xfrm>
+          <a:prstGeom prst="rect">
+            <a:avLst/>
+          </a:prstGeom>
+        </p:spPr>
+        <p:txBody>
+          <a:bodyPr vert="horz" lIns="121899" tIns="60949" rIns="121899" bIns="60949" rtlCol="0" anchor="b"/>
+          <a:lstStyle>
+            <a:defPPr>
+              <a:defRPr lang="en-US"/>
+            </a:defPPr>
+            <a:lvl1pPr marL="0" algn="r" defTabSz="1218987" rtl="0" eaLnBrk="1" latinLnBrk="0" hangingPunct="1">
+              <a:defRPr sz="1000" b="1" kern="1200" spc="200" baseline="0">
+                <a:solidFill>
+                  <a:schemeClr val="tx2">
+                    <a:lumMod val="50000"/>
+                  </a:schemeClr>
+                </a:solidFill>
+                <a:latin typeface="+mn-lt"/>
+                <a:ea typeface="+mn-ea"/>
+                <a:cs typeface="+mn-cs"/>
+              </a:defRPr>
+            </a:lvl1pPr>
+            <a:lvl2pPr marL="609493" algn="l" defTabSz="1218987" rtl="0" eaLnBrk="1" latinLnBrk="0" hangingPunct="1">
+              <a:defRPr sz="2400" kern="1200">
+                <a:solidFill>
+                  <a:schemeClr val="tx1"/>
+                </a:solidFill>
+                <a:latin typeface="+mn-lt"/>
+                <a:ea typeface="+mn-ea"/>
+                <a:cs typeface="+mn-cs"/>
+              </a:defRPr>
+            </a:lvl2pPr>
+            <a:lvl3pPr marL="1218987" algn="l" defTabSz="1218987" rtl="0" eaLnBrk="1" latinLnBrk="0" hangingPunct="1">
+              <a:defRPr sz="2400" kern="1200">
+                <a:solidFill>
+                  <a:schemeClr val="tx1"/>
+                </a:solidFill>
+                <a:latin typeface="+mn-lt"/>
+                <a:ea typeface="+mn-ea"/>
+                <a:cs typeface="+mn-cs"/>
+              </a:defRPr>
+            </a:lvl3pPr>
+            <a:lvl4pPr marL="1828480" algn="l" defTabSz="1218987" rtl="0" eaLnBrk="1" latinLnBrk="0" hangingPunct="1">
+              <a:defRPr sz="2400" kern="1200">
+                <a:solidFill>
+                  <a:schemeClr val="tx1"/>
+                </a:solidFill>
+                <a:latin typeface="+mn-lt"/>
+                <a:ea typeface="+mn-ea"/>
+                <a:cs typeface="+mn-cs"/>
+              </a:defRPr>
+            </a:lvl4pPr>
+            <a:lvl5pPr marL="2437973" algn="l" defTabSz="1218987" rtl="0" eaLnBrk="1" latinLnBrk="0" hangingPunct="1">
+              <a:defRPr sz="2400" kern="1200">
+                <a:solidFill>
+                  <a:schemeClr val="tx1"/>
+                </a:solidFill>
+                <a:latin typeface="+mn-lt"/>
+                <a:ea typeface="+mn-ea"/>
+                <a:cs typeface="+mn-cs"/>
+              </a:defRPr>
+            </a:lvl5pPr>
+            <a:lvl6pPr marL="3047467" algn="l" defTabSz="1218987" rtl="0" eaLnBrk="1" latinLnBrk="0" hangingPunct="1">
+              <a:defRPr sz="2400" kern="1200">
+                <a:solidFill>
+                  <a:schemeClr val="tx1"/>
+                </a:solidFill>
+                <a:latin typeface="+mn-lt"/>
+                <a:ea typeface="+mn-ea"/>
+                <a:cs typeface="+mn-cs"/>
+              </a:defRPr>
+            </a:lvl6pPr>
+            <a:lvl7pPr marL="3656960" algn="l" defTabSz="1218987" rtl="0" eaLnBrk="1" latinLnBrk="0" hangingPunct="1">
+              <a:defRPr sz="2400" kern="1200">
+                <a:solidFill>
+                  <a:schemeClr val="tx1"/>
+                </a:solidFill>
+                <a:latin typeface="+mn-lt"/>
+                <a:ea typeface="+mn-ea"/>
+                <a:cs typeface="+mn-cs"/>
+              </a:defRPr>
+            </a:lvl7pPr>
+            <a:lvl8pPr marL="4266453" algn="l" defTabSz="1218987" rtl="0" eaLnBrk="1" latinLnBrk="0" hangingPunct="1">
+              <a:defRPr sz="2400" kern="1200">
+                <a:solidFill>
+                  <a:schemeClr val="tx1"/>
+                </a:solidFill>
+                <a:latin typeface="+mn-lt"/>
+                <a:ea typeface="+mn-ea"/>
+                <a:cs typeface="+mn-cs"/>
+              </a:defRPr>
+            </a:lvl8pPr>
+            <a:lvl9pPr marL="4875947" algn="l" defTabSz="1218987" rtl="0" eaLnBrk="1" latinLnBrk="0" hangingPunct="1">
+              <a:defRPr sz="2400" kern="1200">
+                <a:solidFill>
+                  <a:schemeClr val="tx1"/>
+                </a:solidFill>
+                <a:latin typeface="+mn-lt"/>
+                <a:ea typeface="+mn-ea"/>
+                <a:cs typeface="+mn-cs"/>
+              </a:defRPr>
+            </a:lvl9pPr>
+          </a:lstStyle>
+          <a:p>
+            <a:pPr algn="l"/>
+            <a:r>
+              <a:rPr lang="en-US" dirty="0"/>
+              <a:t>DES211 CAPSTONE PROJECT</a:t>
             </a:r>
           </a:p>
         </p:txBody>
@@ -12955,6 +15148,144 @@
           </p:nvPr>
         </p:nvSpPr>
         <p:spPr/>
+        <p:txBody>
+          <a:bodyPr/>
+          <a:lstStyle/>
+          <a:p>
+            <a:endParaRPr lang="en-US"/>
+          </a:p>
+        </p:txBody>
+      </p:sp>
+      <p:sp>
+        <p:nvSpPr>
+          <p:cNvPr id="7" name="Slide Number Placeholder 4">
+            <a:extLst>
+              <a:ext uri="{FF2B5EF4-FFF2-40B4-BE49-F238E27FC236}">
+                <a16:creationId xmlns:a16="http://schemas.microsoft.com/office/drawing/2014/main" id="{0EAAF75C-A93F-3797-39FD-F3D2C62487D3}"/>
+              </a:ext>
+            </a:extLst>
+          </p:cNvPr>
+          <p:cNvSpPr txBox="1">
+            <a:spLocks/>
+          </p:cNvSpPr>
+          <p:nvPr/>
+        </p:nvSpPr>
+        <p:spPr>
+          <a:xfrm>
+            <a:off x="455612" y="6190488"/>
+            <a:ext cx="2677604" cy="210312"/>
+          </a:xfrm>
+          <a:prstGeom prst="rect">
+            <a:avLst/>
+          </a:prstGeom>
+        </p:spPr>
+        <p:txBody>
+          <a:bodyPr vert="horz" lIns="121899" tIns="60949" rIns="121899" bIns="60949" rtlCol="0" anchor="b"/>
+          <a:lstStyle>
+            <a:defPPr>
+              <a:defRPr lang="en-US"/>
+            </a:defPPr>
+            <a:lvl1pPr marL="0" algn="r" defTabSz="1218987" rtl="0" eaLnBrk="1" latinLnBrk="0" hangingPunct="1">
+              <a:defRPr sz="1000" b="1" kern="1200" spc="200" baseline="0">
+                <a:solidFill>
+                  <a:schemeClr val="tx2">
+                    <a:lumMod val="50000"/>
+                  </a:schemeClr>
+                </a:solidFill>
+                <a:latin typeface="+mn-lt"/>
+                <a:ea typeface="+mn-ea"/>
+                <a:cs typeface="+mn-cs"/>
+              </a:defRPr>
+            </a:lvl1pPr>
+            <a:lvl2pPr marL="609493" algn="l" defTabSz="1218987" rtl="0" eaLnBrk="1" latinLnBrk="0" hangingPunct="1">
+              <a:defRPr sz="2400" kern="1200">
+                <a:solidFill>
+                  <a:schemeClr val="tx1"/>
+                </a:solidFill>
+                <a:latin typeface="+mn-lt"/>
+                <a:ea typeface="+mn-ea"/>
+                <a:cs typeface="+mn-cs"/>
+              </a:defRPr>
+            </a:lvl2pPr>
+            <a:lvl3pPr marL="1218987" algn="l" defTabSz="1218987" rtl="0" eaLnBrk="1" latinLnBrk="0" hangingPunct="1">
+              <a:defRPr sz="2400" kern="1200">
+                <a:solidFill>
+                  <a:schemeClr val="tx1"/>
+                </a:solidFill>
+                <a:latin typeface="+mn-lt"/>
+                <a:ea typeface="+mn-ea"/>
+                <a:cs typeface="+mn-cs"/>
+              </a:defRPr>
+            </a:lvl3pPr>
+            <a:lvl4pPr marL="1828480" algn="l" defTabSz="1218987" rtl="0" eaLnBrk="1" latinLnBrk="0" hangingPunct="1">
+              <a:defRPr sz="2400" kern="1200">
+                <a:solidFill>
+                  <a:schemeClr val="tx1"/>
+                </a:solidFill>
+                <a:latin typeface="+mn-lt"/>
+                <a:ea typeface="+mn-ea"/>
+                <a:cs typeface="+mn-cs"/>
+              </a:defRPr>
+            </a:lvl4pPr>
+            <a:lvl5pPr marL="2437973" algn="l" defTabSz="1218987" rtl="0" eaLnBrk="1" latinLnBrk="0" hangingPunct="1">
+              <a:defRPr sz="2400" kern="1200">
+                <a:solidFill>
+                  <a:schemeClr val="tx1"/>
+                </a:solidFill>
+                <a:latin typeface="+mn-lt"/>
+                <a:ea typeface="+mn-ea"/>
+                <a:cs typeface="+mn-cs"/>
+              </a:defRPr>
+            </a:lvl5pPr>
+            <a:lvl6pPr marL="3047467" algn="l" defTabSz="1218987" rtl="0" eaLnBrk="1" latinLnBrk="0" hangingPunct="1">
+              <a:defRPr sz="2400" kern="1200">
+                <a:solidFill>
+                  <a:schemeClr val="tx1"/>
+                </a:solidFill>
+                <a:latin typeface="+mn-lt"/>
+                <a:ea typeface="+mn-ea"/>
+                <a:cs typeface="+mn-cs"/>
+              </a:defRPr>
+            </a:lvl6pPr>
+            <a:lvl7pPr marL="3656960" algn="l" defTabSz="1218987" rtl="0" eaLnBrk="1" latinLnBrk="0" hangingPunct="1">
+              <a:defRPr sz="2400" kern="1200">
+                <a:solidFill>
+                  <a:schemeClr val="tx1"/>
+                </a:solidFill>
+                <a:latin typeface="+mn-lt"/>
+                <a:ea typeface="+mn-ea"/>
+                <a:cs typeface="+mn-cs"/>
+              </a:defRPr>
+            </a:lvl7pPr>
+            <a:lvl8pPr marL="4266453" algn="l" defTabSz="1218987" rtl="0" eaLnBrk="1" latinLnBrk="0" hangingPunct="1">
+              <a:defRPr sz="2400" kern="1200">
+                <a:solidFill>
+                  <a:schemeClr val="tx1"/>
+                </a:solidFill>
+                <a:latin typeface="+mn-lt"/>
+                <a:ea typeface="+mn-ea"/>
+                <a:cs typeface="+mn-cs"/>
+              </a:defRPr>
+            </a:lvl8pPr>
+            <a:lvl9pPr marL="4875947" algn="l" defTabSz="1218987" rtl="0" eaLnBrk="1" latinLnBrk="0" hangingPunct="1">
+              <a:defRPr sz="2400" kern="1200">
+                <a:solidFill>
+                  <a:schemeClr val="tx1"/>
+                </a:solidFill>
+                <a:latin typeface="+mn-lt"/>
+                <a:ea typeface="+mn-ea"/>
+                <a:cs typeface="+mn-cs"/>
+              </a:defRPr>
+            </a:lvl9pPr>
+          </a:lstStyle>
+          <a:p>
+            <a:pPr algn="l"/>
+            <a:r>
+              <a:rPr lang="en-US" dirty="0"/>
+              <a:t>DES211 CAPSTONE PROJECT</a:t>
+            </a:r>
+          </a:p>
+        </p:txBody>
       </p:sp>
     </p:spTree>
     <p:extLst>
@@ -13040,24 +15371,363 @@
           </a:p>
         </p:txBody>
       </p:sp>
-      <p:sp>
-        <p:nvSpPr>
-          <p:cNvPr id="3" name="Table Placeholder 2">
-            <a:extLst>
-              <a:ext uri="{FF2B5EF4-FFF2-40B4-BE49-F238E27FC236}">
-                <a16:creationId xmlns:a16="http://schemas.microsoft.com/office/drawing/2014/main" id="{3AA1C326-F4B2-4A59-AD1A-E3E64842804D}"/>
-              </a:ext>
-            </a:extLst>
-          </p:cNvPr>
-          <p:cNvSpPr>
-            <a:spLocks noGrp="1"/>
-          </p:cNvSpPr>
+      <p:graphicFrame>
+        <p:nvGraphicFramePr>
+          <p:cNvPr id="6" name="Table Placeholder 5">
+            <a:extLst>
+              <a:ext uri="{FF2B5EF4-FFF2-40B4-BE49-F238E27FC236}">
+                <a16:creationId xmlns:a16="http://schemas.microsoft.com/office/drawing/2014/main" id="{DEE40FCE-70CA-5BBA-ACD8-1A7757443BDE}"/>
+              </a:ext>
+            </a:extLst>
+          </p:cNvPr>
+          <p:cNvGraphicFramePr>
+            <a:graphicFrameLocks noGrp="1"/>
+          </p:cNvGraphicFramePr>
           <p:nvPr>
             <p:ph type="tbl" sz="quarter" idx="13"/>
+            <p:extLst>
+              <p:ext uri="{D42A27DB-BD31-4B8C-83A1-F6EECF244321}">
+                <p14:modId xmlns:p14="http://schemas.microsoft.com/office/powerpoint/2010/main" val="611619493"/>
+              </p:ext>
+            </p:extLst>
           </p:nvPr>
-        </p:nvSpPr>
-        <p:spPr/>
-      </p:sp>
+        </p:nvGraphicFramePr>
+        <p:xfrm>
+          <a:off x="593725" y="1809750"/>
+          <a:ext cx="10771188" cy="3829049"/>
+        </p:xfrm>
+        <a:graphic>
+          <a:graphicData uri="http://schemas.openxmlformats.org/drawingml/2006/table">
+            <a:tbl>
+              <a:tblPr firstRow="1" bandRow="1">
+                <a:tableStyleId>{8A107856-5554-42FB-B03E-39F5DBC370BA}</a:tableStyleId>
+              </a:tblPr>
+              <a:tblGrid>
+                <a:gridCol w="5385594">
+                  <a:extLst>
+                    <a:ext uri="{9D8B030D-6E8A-4147-A177-3AD203B41FA5}">
+                      <a16:colId xmlns:a16="http://schemas.microsoft.com/office/drawing/2014/main" val="3676582090"/>
+                    </a:ext>
+                  </a:extLst>
+                </a:gridCol>
+                <a:gridCol w="5385594">
+                  <a:extLst>
+                    <a:ext uri="{9D8B030D-6E8A-4147-A177-3AD203B41FA5}">
+                      <a16:colId xmlns:a16="http://schemas.microsoft.com/office/drawing/2014/main" val="3458197918"/>
+                    </a:ext>
+                  </a:extLst>
+                </a:gridCol>
+              </a:tblGrid>
+              <a:tr h="533621">
+                <a:tc>
+                  <a:txBody>
+                    <a:bodyPr/>
+                    <a:lstStyle/>
+                    <a:p>
+                      <a:pPr algn="ctr"/>
+                      <a:r>
+                        <a:rPr lang="en-US" i="0" dirty="0">
+                          <a:solidFill>
+                            <a:srgbClr val="435F30"/>
+                          </a:solidFill>
+                          <a:latin typeface="Bahnschrift" panose="020B0502040204020203" pitchFamily="34" charset="0"/>
+                        </a:rPr>
+                        <a:t>Prop Up Rails</a:t>
+                      </a:r>
+                    </a:p>
+                  </a:txBody>
+                  <a:tcPr anchor="ctr"/>
+                </a:tc>
+                <a:tc>
+                  <a:txBody>
+                    <a:bodyPr/>
+                    <a:lstStyle/>
+                    <a:p>
+                      <a:pPr algn="ctr"/>
+                      <a:r>
+                        <a:rPr lang="en-US" dirty="0">
+                          <a:solidFill>
+                            <a:srgbClr val="435F30"/>
+                          </a:solidFill>
+                          <a:latin typeface="Bahnschrift" panose="020B0502040204020203" pitchFamily="34" charset="0"/>
+                        </a:rPr>
+                        <a:t>Color Coded Bins</a:t>
+                      </a:r>
+                    </a:p>
+                  </a:txBody>
+                  <a:tcPr anchor="ctr"/>
+                </a:tc>
+                <a:extLst>
+                  <a:ext uri="{0D108BD9-81ED-4DB2-BD59-A6C34878D82A}">
+                    <a16:rowId xmlns:a16="http://schemas.microsoft.com/office/drawing/2014/main" val="1299871446"/>
+                  </a:ext>
+                </a:extLst>
+              </a:tr>
+              <a:tr h="3295428">
+                <a:tc>
+                  <a:txBody>
+                    <a:bodyPr/>
+                    <a:lstStyle/>
+                    <a:p>
+                      <a:endParaRPr lang="en-US" sz="1600" b="1" dirty="0">
+                        <a:latin typeface="Bahnschrift SemiLight" panose="020B0502040204020203" pitchFamily="34" charset="0"/>
+                      </a:endParaRPr>
+                    </a:p>
+                    <a:p>
+                      <a:r>
+                        <a:rPr lang="en-US" sz="1800" b="0" i="1" dirty="0">
+                          <a:solidFill>
+                            <a:srgbClr val="435F30"/>
+                          </a:solidFill>
+                          <a:latin typeface="Bahnschrift SemiLight" panose="020B0502040204020203" pitchFamily="34" charset="0"/>
+                        </a:rPr>
+                        <a:t>Pros:</a:t>
+                      </a:r>
+                      <a:br>
+                        <a:rPr lang="en-US" sz="1600" dirty="0">
+                          <a:solidFill>
+                            <a:srgbClr val="435F30"/>
+                          </a:solidFill>
+                          <a:latin typeface="Bahnschrift SemiLight" panose="020B0502040204020203" pitchFamily="34" charset="0"/>
+                        </a:rPr>
+                      </a:br>
+                      <a:r>
+                        <a:rPr lang="en-US" sz="1600" dirty="0">
+                          <a:solidFill>
+                            <a:srgbClr val="435F30"/>
+                          </a:solidFill>
+                          <a:latin typeface="Bahnschrift SemiLight" panose="020B0502040204020203" pitchFamily="34" charset="0"/>
+                        </a:rPr>
+                        <a:t>• Adds stability against tipping</a:t>
+                      </a:r>
+                      <a:br>
+                        <a:rPr lang="en-US" sz="1600" dirty="0">
+                          <a:solidFill>
+                            <a:srgbClr val="435F30"/>
+                          </a:solidFill>
+                          <a:latin typeface="Bahnschrift SemiLight" panose="020B0502040204020203" pitchFamily="34" charset="0"/>
+                        </a:rPr>
+                      </a:br>
+                      <a:r>
+                        <a:rPr lang="en-US" sz="1600" dirty="0">
+                          <a:solidFill>
+                            <a:srgbClr val="435F30"/>
+                          </a:solidFill>
+                          <a:latin typeface="Bahnschrift SemiLight" panose="020B0502040204020203" pitchFamily="34" charset="0"/>
+                        </a:rPr>
+                        <a:t>• Durable &amp; low-maintenance (stainless steel)</a:t>
+                      </a:r>
+                    </a:p>
+                    <a:p>
+                      <a:r>
+                        <a:rPr lang="en-US" sz="1600" dirty="0">
+                          <a:solidFill>
+                            <a:srgbClr val="435F30"/>
+                          </a:solidFill>
+                          <a:latin typeface="Bahnschrift SemiLight" panose="020B0502040204020203" pitchFamily="34" charset="0"/>
+                        </a:rPr>
+                        <a:t>• Swinging bins ease trash removal</a:t>
+                      </a:r>
+                    </a:p>
+                    <a:p>
+                      <a:endParaRPr lang="en-US" sz="1600" b="1" dirty="0">
+                        <a:solidFill>
+                          <a:srgbClr val="435F30"/>
+                        </a:solidFill>
+                        <a:latin typeface="Bahnschrift SemiLight" panose="020B0502040204020203" pitchFamily="34" charset="0"/>
+                      </a:endParaRPr>
+                    </a:p>
+                    <a:p>
+                      <a:endParaRPr lang="en-US" sz="1600" b="1" dirty="0">
+                        <a:solidFill>
+                          <a:srgbClr val="435F30"/>
+                        </a:solidFill>
+                        <a:latin typeface="Bahnschrift SemiLight" panose="020B0502040204020203" pitchFamily="34" charset="0"/>
+                      </a:endParaRPr>
+                    </a:p>
+                    <a:p>
+                      <a:r>
+                        <a:rPr lang="en-US" sz="1800" b="0" i="1" dirty="0">
+                          <a:solidFill>
+                            <a:srgbClr val="435F30"/>
+                          </a:solidFill>
+                          <a:latin typeface="Bahnschrift SemiLight" panose="020B0502040204020203" pitchFamily="34" charset="0"/>
+                        </a:rPr>
+                        <a:t>Cons:</a:t>
+                      </a:r>
+                      <a:br>
+                        <a:rPr lang="en-US" sz="1600" dirty="0">
+                          <a:solidFill>
+                            <a:srgbClr val="435F30"/>
+                          </a:solidFill>
+                          <a:latin typeface="Bahnschrift SemiLight" panose="020B0502040204020203" pitchFamily="34" charset="0"/>
+                        </a:rPr>
+                      </a:br>
+                      <a:r>
+                        <a:rPr lang="en-US" sz="1600" dirty="0">
+                          <a:solidFill>
+                            <a:srgbClr val="435F30"/>
+                          </a:solidFill>
+                          <a:latin typeface="Bahnschrift SemiLight" panose="020B0502040204020203" pitchFamily="34" charset="0"/>
+                        </a:rPr>
+                        <a:t>• Bins swing too freely — waste may fall out</a:t>
+                      </a:r>
+                    </a:p>
+                    <a:p>
+                      <a:r>
+                        <a:rPr lang="en-US" sz="1600" dirty="0">
+                          <a:solidFill>
+                            <a:srgbClr val="435F30"/>
+                          </a:solidFill>
+                          <a:latin typeface="Bahnschrift SemiLight" panose="020B0502040204020203" pitchFamily="34" charset="0"/>
+                        </a:rPr>
+                        <a:t>• Heavy, hard to assemble/transport</a:t>
+                      </a:r>
+                    </a:p>
+                    <a:p>
+                      <a:r>
+                        <a:rPr lang="en-US" sz="1600" dirty="0">
+                          <a:solidFill>
+                            <a:srgbClr val="435F30"/>
+                          </a:solidFill>
+                          <a:latin typeface="Bahnschrift SemiLight" panose="020B0502040204020203" pitchFamily="34" charset="0"/>
+                        </a:rPr>
+                        <a:t>• Rarely implemented campus-wide</a:t>
+                      </a:r>
+                    </a:p>
+                  </a:txBody>
+                  <a:tcPr/>
+                </a:tc>
+                <a:tc>
+                  <a:txBody>
+                    <a:bodyPr/>
+                    <a:lstStyle/>
+                    <a:p>
+                      <a:endParaRPr lang="en-US" sz="1800" b="0" i="1" dirty="0">
+                        <a:latin typeface="Bahnschrift SemiLight" panose="020B0502040204020203" pitchFamily="34" charset="0"/>
+                      </a:endParaRPr>
+                    </a:p>
+                    <a:p>
+                      <a:r>
+                        <a:rPr lang="en-US" sz="1800" b="0" i="1" dirty="0">
+                          <a:solidFill>
+                            <a:srgbClr val="435F30"/>
+                          </a:solidFill>
+                          <a:latin typeface="Bahnschrift SemiLight" panose="020B0502040204020203" pitchFamily="34" charset="0"/>
+                        </a:rPr>
+                        <a:t>Pros:</a:t>
+                      </a:r>
+                      <a:br>
+                        <a:rPr lang="en-US" sz="1600" b="0" dirty="0">
+                          <a:solidFill>
+                            <a:srgbClr val="435F30"/>
+                          </a:solidFill>
+                          <a:latin typeface="Bahnschrift SemiLight" panose="020B0502040204020203" pitchFamily="34" charset="0"/>
+                        </a:rPr>
+                      </a:br>
+                      <a:r>
+                        <a:rPr lang="en-US" sz="1600" b="0" dirty="0">
+                          <a:solidFill>
+                            <a:srgbClr val="435F30"/>
+                          </a:solidFill>
+                          <a:latin typeface="Bahnschrift SemiLight" panose="020B0502040204020203" pitchFamily="34" charset="0"/>
+                        </a:rPr>
+                        <a:t>• Clear color distinctions aid sorting</a:t>
+                      </a:r>
+                    </a:p>
+                    <a:p>
+                      <a:endParaRPr lang="en-US" sz="1800" b="0" i="1" dirty="0">
+                        <a:solidFill>
+                          <a:srgbClr val="435F30"/>
+                        </a:solidFill>
+                        <a:latin typeface="Bahnschrift SemiLight" panose="020B0502040204020203" pitchFamily="34" charset="0"/>
+                      </a:endParaRPr>
+                    </a:p>
+                    <a:p>
+                      <a:endParaRPr lang="en-US" sz="1800" b="0" i="1" dirty="0">
+                        <a:solidFill>
+                          <a:srgbClr val="435F30"/>
+                        </a:solidFill>
+                        <a:latin typeface="Bahnschrift SemiLight" panose="020B0502040204020203" pitchFamily="34" charset="0"/>
+                      </a:endParaRPr>
+                    </a:p>
+                    <a:p>
+                      <a:endParaRPr lang="en-US" sz="1800" b="0" i="1" dirty="0">
+                        <a:solidFill>
+                          <a:srgbClr val="435F30"/>
+                        </a:solidFill>
+                        <a:latin typeface="Bahnschrift SemiLight" panose="020B0502040204020203" pitchFamily="34" charset="0"/>
+                      </a:endParaRPr>
+                    </a:p>
+                    <a:p>
+                      <a:endParaRPr lang="en-US" sz="1000" b="0" i="1" dirty="0">
+                        <a:solidFill>
+                          <a:srgbClr val="435F30"/>
+                        </a:solidFill>
+                        <a:latin typeface="Bahnschrift SemiLight" panose="020B0502040204020203" pitchFamily="34" charset="0"/>
+                      </a:endParaRPr>
+                    </a:p>
+                    <a:p>
+                      <a:r>
+                        <a:rPr lang="en-US" sz="1800" b="0" i="1" dirty="0">
+                          <a:solidFill>
+                            <a:srgbClr val="435F30"/>
+                          </a:solidFill>
+                          <a:latin typeface="Bahnschrift SemiLight" panose="020B0502040204020203" pitchFamily="34" charset="0"/>
+                        </a:rPr>
+                        <a:t>Cons:</a:t>
+                      </a:r>
+                      <a:br>
+                        <a:rPr lang="en-US" sz="1600" b="0" dirty="0">
+                          <a:solidFill>
+                            <a:srgbClr val="435F30"/>
+                          </a:solidFill>
+                          <a:latin typeface="Bahnschrift SemiLight" panose="020B0502040204020203" pitchFamily="34" charset="0"/>
+                        </a:rPr>
+                      </a:br>
+                      <a:r>
+                        <a:rPr lang="en-US" sz="1600" b="0" dirty="0">
+                          <a:solidFill>
+                            <a:srgbClr val="435F30"/>
+                          </a:solidFill>
+                          <a:latin typeface="Bahnschrift SemiLight" panose="020B0502040204020203" pitchFamily="34" charset="0"/>
+                        </a:rPr>
+                        <a:t>• Over-reliance on color — bad for colorblind users</a:t>
+                      </a:r>
+                      <a:br>
+                        <a:rPr lang="en-US" sz="1600" b="0" dirty="0">
+                          <a:solidFill>
+                            <a:srgbClr val="435F30"/>
+                          </a:solidFill>
+                          <a:latin typeface="Bahnschrift SemiLight" panose="020B0502040204020203" pitchFamily="34" charset="0"/>
+                        </a:rPr>
+                      </a:br>
+                      <a:r>
+                        <a:rPr lang="en-US" sz="1600" b="0" dirty="0">
+                          <a:solidFill>
+                            <a:srgbClr val="435F30"/>
+                          </a:solidFill>
+                          <a:latin typeface="Bahnschrift SemiLight" panose="020B0502040204020203" pitchFamily="34" charset="0"/>
+                        </a:rPr>
+                        <a:t>• Poor labeling; often placed alone, leading to mixed waste</a:t>
+                      </a:r>
+                    </a:p>
+                    <a:p>
+                      <a:endParaRPr lang="en-US" dirty="0"/>
+                    </a:p>
+                  </a:txBody>
+                  <a:tcPr/>
+                </a:tc>
+                <a:extLst>
+                  <a:ext uri="{0D108BD9-81ED-4DB2-BD59-A6C34878D82A}">
+                    <a16:rowId xmlns:a16="http://schemas.microsoft.com/office/drawing/2014/main" val="3708049680"/>
+                  </a:ext>
+                </a:extLst>
+              </a:tr>
+            </a:tbl>
+          </a:graphicData>
+        </a:graphic>
+      </p:graphicFrame>
       <p:sp>
         <p:nvSpPr>
           <p:cNvPr id="4" name="Slide Number Placeholder 3">
@@ -13085,6 +15755,137 @@
               <a:t>8</a:t>
             </a:fld>
             <a:endParaRPr lang="en-US" dirty="0"/>
+          </a:p>
+        </p:txBody>
+      </p:sp>
+      <p:sp>
+        <p:nvSpPr>
+          <p:cNvPr id="5" name="Slide Number Placeholder 4">
+            <a:extLst>
+              <a:ext uri="{FF2B5EF4-FFF2-40B4-BE49-F238E27FC236}">
+                <a16:creationId xmlns:a16="http://schemas.microsoft.com/office/drawing/2014/main" id="{903DE30F-6AB6-D1D8-9C58-3CA807C00A09}"/>
+              </a:ext>
+            </a:extLst>
+          </p:cNvPr>
+          <p:cNvSpPr txBox="1">
+            <a:spLocks/>
+          </p:cNvSpPr>
+          <p:nvPr/>
+        </p:nvSpPr>
+        <p:spPr>
+          <a:xfrm>
+            <a:off x="455612" y="6190488"/>
+            <a:ext cx="2677604" cy="210312"/>
+          </a:xfrm>
+          <a:prstGeom prst="rect">
+            <a:avLst/>
+          </a:prstGeom>
+        </p:spPr>
+        <p:txBody>
+          <a:bodyPr vert="horz" lIns="121899" tIns="60949" rIns="121899" bIns="60949" rtlCol="0" anchor="b"/>
+          <a:lstStyle>
+            <a:defPPr>
+              <a:defRPr lang="en-US"/>
+            </a:defPPr>
+            <a:lvl1pPr marL="0" algn="r" defTabSz="1218987" rtl="0" eaLnBrk="1" latinLnBrk="0" hangingPunct="1">
+              <a:defRPr sz="1000" b="1" kern="1200" spc="200" baseline="0">
+                <a:solidFill>
+                  <a:schemeClr val="tx2">
+                    <a:lumMod val="50000"/>
+                  </a:schemeClr>
+                </a:solidFill>
+                <a:latin typeface="+mn-lt"/>
+                <a:ea typeface="+mn-ea"/>
+                <a:cs typeface="+mn-cs"/>
+              </a:defRPr>
+            </a:lvl1pPr>
+            <a:lvl2pPr marL="609493" algn="l" defTabSz="1218987" rtl="0" eaLnBrk="1" latinLnBrk="0" hangingPunct="1">
+              <a:defRPr sz="2400" kern="1200">
+                <a:solidFill>
+                  <a:schemeClr val="tx1"/>
+                </a:solidFill>
+                <a:latin typeface="+mn-lt"/>
+                <a:ea typeface="+mn-ea"/>
+                <a:cs typeface="+mn-cs"/>
+              </a:defRPr>
+            </a:lvl2pPr>
+            <a:lvl3pPr marL="1218987" algn="l" defTabSz="1218987" rtl="0" eaLnBrk="1" latinLnBrk="0" hangingPunct="1">
+              <a:defRPr sz="2400" kern="1200">
+                <a:solidFill>
+                  <a:schemeClr val="tx1"/>
+                </a:solidFill>
+                <a:latin typeface="+mn-lt"/>
+                <a:ea typeface="+mn-ea"/>
+                <a:cs typeface="+mn-cs"/>
+              </a:defRPr>
+            </a:lvl3pPr>
+            <a:lvl4pPr marL="1828480" algn="l" defTabSz="1218987" rtl="0" eaLnBrk="1" latinLnBrk="0" hangingPunct="1">
+              <a:defRPr sz="2400" kern="1200">
+                <a:solidFill>
+                  <a:schemeClr val="tx1"/>
+                </a:solidFill>
+                <a:latin typeface="+mn-lt"/>
+                <a:ea typeface="+mn-ea"/>
+                <a:cs typeface="+mn-cs"/>
+              </a:defRPr>
+            </a:lvl4pPr>
+            <a:lvl5pPr marL="2437973" algn="l" defTabSz="1218987" rtl="0" eaLnBrk="1" latinLnBrk="0" hangingPunct="1">
+              <a:defRPr sz="2400" kern="1200">
+                <a:solidFill>
+                  <a:schemeClr val="tx1"/>
+                </a:solidFill>
+                <a:latin typeface="+mn-lt"/>
+                <a:ea typeface="+mn-ea"/>
+                <a:cs typeface="+mn-cs"/>
+              </a:defRPr>
+            </a:lvl5pPr>
+            <a:lvl6pPr marL="3047467" algn="l" defTabSz="1218987" rtl="0" eaLnBrk="1" latinLnBrk="0" hangingPunct="1">
+              <a:defRPr sz="2400" kern="1200">
+                <a:solidFill>
+                  <a:schemeClr val="tx1"/>
+                </a:solidFill>
+                <a:latin typeface="+mn-lt"/>
+                <a:ea typeface="+mn-ea"/>
+                <a:cs typeface="+mn-cs"/>
+              </a:defRPr>
+            </a:lvl6pPr>
+            <a:lvl7pPr marL="3656960" algn="l" defTabSz="1218987" rtl="0" eaLnBrk="1" latinLnBrk="0" hangingPunct="1">
+              <a:defRPr sz="2400" kern="1200">
+                <a:solidFill>
+                  <a:schemeClr val="tx1"/>
+                </a:solidFill>
+                <a:latin typeface="+mn-lt"/>
+                <a:ea typeface="+mn-ea"/>
+                <a:cs typeface="+mn-cs"/>
+              </a:defRPr>
+            </a:lvl7pPr>
+            <a:lvl8pPr marL="4266453" algn="l" defTabSz="1218987" rtl="0" eaLnBrk="1" latinLnBrk="0" hangingPunct="1">
+              <a:defRPr sz="2400" kern="1200">
+                <a:solidFill>
+                  <a:schemeClr val="tx1"/>
+                </a:solidFill>
+                <a:latin typeface="+mn-lt"/>
+                <a:ea typeface="+mn-ea"/>
+                <a:cs typeface="+mn-cs"/>
+              </a:defRPr>
+            </a:lvl8pPr>
+            <a:lvl9pPr marL="4875947" algn="l" defTabSz="1218987" rtl="0" eaLnBrk="1" latinLnBrk="0" hangingPunct="1">
+              <a:defRPr sz="2400" kern="1200">
+                <a:solidFill>
+                  <a:schemeClr val="tx1"/>
+                </a:solidFill>
+                <a:latin typeface="+mn-lt"/>
+                <a:ea typeface="+mn-ea"/>
+                <a:cs typeface="+mn-cs"/>
+              </a:defRPr>
+            </a:lvl9pPr>
+          </a:lstStyle>
+          <a:p>
+            <a:pPr algn="l"/>
+            <a:r>
+              <a:rPr lang="en-US" dirty="0"/>
+              <a:t>DES211 CAPSTONE PROJECT</a:t>
+            </a:r>
           </a:p>
         </p:txBody>
       </p:sp>
@@ -13118,7 +15919,13 @@
   <p:cSld>
     <p:spTree>
       <p:nvGrpSpPr>
-        <p:cNvPr id="1" name=""/>
+        <p:cNvPr id="1" name="">
+          <a:extLst>
+            <a:ext uri="{FF2B5EF4-FFF2-40B4-BE49-F238E27FC236}">
+              <a16:creationId xmlns:a16="http://schemas.microsoft.com/office/drawing/2014/main" id="{D9709A75-0F94-07A0-8439-3E6821F92D82}"/>
+            </a:ext>
+          </a:extLst>
+        </p:cNvPr>
         <p:cNvGrpSpPr/>
         <p:nvPr/>
       </p:nvGrpSpPr>
@@ -13135,7 +15942,7 @@
           <p:cNvPr id="2" name="Title 1">
             <a:extLst>
               <a:ext uri="{FF2B5EF4-FFF2-40B4-BE49-F238E27FC236}">
-                <a16:creationId xmlns:a16="http://schemas.microsoft.com/office/drawing/2014/main" id="{0A5D6C40-0434-EBEF-14BF-1D813775EF96}"/>
+                <a16:creationId xmlns:a16="http://schemas.microsoft.com/office/drawing/2014/main" id="{0469C44E-ED47-1446-F9CD-512BAFCD4186}"/>
               </a:ext>
             </a:extLst>
           </p:cNvPr>
@@ -13151,69 +15958,419 @@
           <a:bodyPr/>
           <a:lstStyle/>
           <a:p>
+            <a:pPr>
+              <a:lnSpc>
+                <a:spcPct val="100000"/>
+              </a:lnSpc>
+            </a:pPr>
             <a:r>
-              <a:rPr lang="en-IN" dirty="0"/>
-              <a:t>Definition Phase</a:t>
+              <a:rPr lang="en-IN" sz="3600" dirty="0">
+                <a:ln w="31750">
+                  <a:solidFill>
+                    <a:schemeClr val="accent2">
+                      <a:lumMod val="50000"/>
+                    </a:schemeClr>
+                  </a:solidFill>
+                </a:ln>
+                <a:noFill/>
+              </a:rPr>
+              <a:t>Existing Solutions</a:t>
             </a:r>
           </a:p>
         </p:txBody>
       </p:sp>
-      <p:sp>
-        <p:nvSpPr>
-          <p:cNvPr id="3" name="Content Placeholder 2">
-            <a:extLst>
-              <a:ext uri="{FF2B5EF4-FFF2-40B4-BE49-F238E27FC236}">
-                <a16:creationId xmlns:a16="http://schemas.microsoft.com/office/drawing/2014/main" id="{1F8B4EA7-19B5-0955-618D-BC7C3C520C0A}"/>
-              </a:ext>
-            </a:extLst>
-          </p:cNvPr>
-          <p:cNvSpPr>
-            <a:spLocks noGrp="1"/>
-          </p:cNvSpPr>
+      <p:graphicFrame>
+        <p:nvGraphicFramePr>
+          <p:cNvPr id="6" name="Table Placeholder 5">
+            <a:extLst>
+              <a:ext uri="{FF2B5EF4-FFF2-40B4-BE49-F238E27FC236}">
+                <a16:creationId xmlns:a16="http://schemas.microsoft.com/office/drawing/2014/main" id="{FD7C14D6-D938-510E-B6A6-7A9C1F47EBDA}"/>
+              </a:ext>
+            </a:extLst>
+          </p:cNvPr>
+          <p:cNvGraphicFramePr>
+            <a:graphicFrameLocks noGrp="1"/>
+          </p:cNvGraphicFramePr>
           <p:nvPr>
-            <p:ph sz="quarter" idx="13"/>
+            <p:ph type="tbl" sz="quarter" idx="13"/>
+            <p:extLst>
+              <p:ext uri="{D42A27DB-BD31-4B8C-83A1-F6EECF244321}">
+                <p14:modId xmlns:p14="http://schemas.microsoft.com/office/powerpoint/2010/main" val="3776900152"/>
+              </p:ext>
+            </p:extLst>
           </p:nvPr>
-        </p:nvSpPr>
-        <p:spPr/>
-        <p:txBody>
-          <a:bodyPr/>
-          <a:lstStyle/>
-          <a:p>
-            <a:endParaRPr lang="en-IN" dirty="0"/>
-          </a:p>
-        </p:txBody>
-      </p:sp>
-      <p:sp>
-        <p:nvSpPr>
-          <p:cNvPr id="4" name="Content Placeholder 3">
-            <a:extLst>
-              <a:ext uri="{FF2B5EF4-FFF2-40B4-BE49-F238E27FC236}">
-                <a16:creationId xmlns:a16="http://schemas.microsoft.com/office/drawing/2014/main" id="{FE2E3821-7773-A700-B250-3A6DD047DD24}"/>
-              </a:ext>
-            </a:extLst>
-          </p:cNvPr>
-          <p:cNvSpPr>
-            <a:spLocks noGrp="1"/>
-          </p:cNvSpPr>
-          <p:nvPr>
-            <p:ph sz="quarter" idx="14"/>
-          </p:nvPr>
-        </p:nvSpPr>
-        <p:spPr/>
-        <p:txBody>
-          <a:bodyPr/>
-          <a:lstStyle/>
-          <a:p>
-            <a:endParaRPr lang="en-IN"/>
-          </a:p>
-        </p:txBody>
-      </p:sp>
-      <p:sp>
-        <p:nvSpPr>
-          <p:cNvPr id="5" name="Slide Number Placeholder 4">
-            <a:extLst>
-              <a:ext uri="{FF2B5EF4-FFF2-40B4-BE49-F238E27FC236}">
-                <a16:creationId xmlns:a16="http://schemas.microsoft.com/office/drawing/2014/main" id="{44E62C45-36B8-E3B6-D4AD-080ECB2464DE}"/>
+        </p:nvGraphicFramePr>
+        <p:xfrm>
+          <a:off x="593725" y="1809750"/>
+          <a:ext cx="10771188" cy="3829049"/>
+        </p:xfrm>
+        <a:graphic>
+          <a:graphicData uri="http://schemas.openxmlformats.org/drawingml/2006/table">
+            <a:tbl>
+              <a:tblPr firstRow="1" bandRow="1">
+                <a:tableStyleId>{8A107856-5554-42FB-B03E-39F5DBC370BA}</a:tableStyleId>
+              </a:tblPr>
+              <a:tblGrid>
+                <a:gridCol w="5385594">
+                  <a:extLst>
+                    <a:ext uri="{9D8B030D-6E8A-4147-A177-3AD203B41FA5}">
+                      <a16:colId xmlns:a16="http://schemas.microsoft.com/office/drawing/2014/main" val="3676582090"/>
+                    </a:ext>
+                  </a:extLst>
+                </a:gridCol>
+                <a:gridCol w="5385594">
+                  <a:extLst>
+                    <a:ext uri="{9D8B030D-6E8A-4147-A177-3AD203B41FA5}">
+                      <a16:colId xmlns:a16="http://schemas.microsoft.com/office/drawing/2014/main" val="3458197918"/>
+                    </a:ext>
+                  </a:extLst>
+                </a:gridCol>
+              </a:tblGrid>
+              <a:tr h="533621">
+                <a:tc>
+                  <a:txBody>
+                    <a:bodyPr/>
+                    <a:lstStyle/>
+                    <a:p>
+                      <a:pPr algn="ctr"/>
+                      <a:r>
+                        <a:rPr lang="en-US" i="0" dirty="0">
+                          <a:solidFill>
+                            <a:srgbClr val="435F30"/>
+                          </a:solidFill>
+                          <a:latin typeface="Bahnschrift" panose="020B0502040204020203" pitchFamily="34" charset="0"/>
+                        </a:rPr>
+                        <a:t>Meme Campaign</a:t>
+                      </a:r>
+                    </a:p>
+                  </a:txBody>
+                  <a:tcPr anchor="ctr"/>
+                </a:tc>
+                <a:tc>
+                  <a:txBody>
+                    <a:bodyPr/>
+                    <a:lstStyle/>
+                    <a:p>
+                      <a:pPr algn="ctr"/>
+                      <a:r>
+                        <a:rPr lang="en-US" dirty="0">
+                          <a:solidFill>
+                            <a:srgbClr val="435F30"/>
+                          </a:solidFill>
+                          <a:latin typeface="Bahnschrift" panose="020B0502040204020203" pitchFamily="34" charset="0"/>
+                        </a:rPr>
+                        <a:t>Trashcan Lids</a:t>
+                      </a:r>
+                    </a:p>
+                  </a:txBody>
+                  <a:tcPr anchor="ctr"/>
+                </a:tc>
+                <a:extLst>
+                  <a:ext uri="{0D108BD9-81ED-4DB2-BD59-A6C34878D82A}">
+                    <a16:rowId xmlns:a16="http://schemas.microsoft.com/office/drawing/2014/main" val="1299871446"/>
+                  </a:ext>
+                </a:extLst>
+              </a:tr>
+              <a:tr h="3295428">
+                <a:tc>
+                  <a:txBody>
+                    <a:bodyPr/>
+                    <a:lstStyle/>
+                    <a:p>
+                      <a:endParaRPr lang="en-US" sz="1600" b="1" dirty="0">
+                        <a:latin typeface="Bahnschrift SemiLight" panose="020B0502040204020203" pitchFamily="34" charset="0"/>
+                      </a:endParaRPr>
+                    </a:p>
+                    <a:p>
+                      <a:r>
+                        <a:rPr lang="en-US" sz="1800" b="0" i="1" dirty="0">
+                          <a:solidFill>
+                            <a:srgbClr val="435F30"/>
+                          </a:solidFill>
+                          <a:latin typeface="Bahnschrift SemiLight" panose="020B0502040204020203" pitchFamily="34" charset="0"/>
+                        </a:rPr>
+                        <a:t>Pros:</a:t>
+                      </a:r>
+                      <a:br>
+                        <a:rPr lang="en-US" sz="1600" dirty="0">
+                          <a:solidFill>
+                            <a:srgbClr val="435F30"/>
+                          </a:solidFill>
+                          <a:latin typeface="Bahnschrift SemiLight" panose="020B0502040204020203" pitchFamily="34" charset="0"/>
+                        </a:rPr>
+                      </a:br>
+                      <a:r>
+                        <a:rPr lang="en-US" sz="1600" dirty="0">
+                          <a:solidFill>
+                            <a:srgbClr val="435F30"/>
+                          </a:solidFill>
+                          <a:latin typeface="Bahnschrift SemiLight" panose="020B0502040204020203" pitchFamily="34" charset="0"/>
+                        </a:rPr>
+                        <a:t>• Creative, non-guilt-based engagement</a:t>
+                      </a:r>
+                      <a:br>
+                        <a:rPr lang="en-US" sz="1600" dirty="0">
+                          <a:solidFill>
+                            <a:srgbClr val="435F30"/>
+                          </a:solidFill>
+                          <a:latin typeface="Bahnschrift SemiLight" panose="020B0502040204020203" pitchFamily="34" charset="0"/>
+                        </a:rPr>
+                      </a:br>
+                      <a:r>
+                        <a:rPr lang="en-US" sz="1600" dirty="0">
+                          <a:solidFill>
+                            <a:srgbClr val="435F30"/>
+                          </a:solidFill>
+                          <a:latin typeface="Bahnschrift SemiLight" panose="020B0502040204020203" pitchFamily="34" charset="0"/>
+                        </a:rPr>
+                        <a:t>• Targeted high-litter zones</a:t>
+                      </a:r>
+                    </a:p>
+                    <a:p>
+                      <a:endParaRPr lang="en-US" sz="1600" b="1" dirty="0">
+                        <a:solidFill>
+                          <a:srgbClr val="435F30"/>
+                        </a:solidFill>
+                        <a:latin typeface="Bahnschrift SemiLight" panose="020B0502040204020203" pitchFamily="34" charset="0"/>
+                      </a:endParaRPr>
+                    </a:p>
+                    <a:p>
+                      <a:endParaRPr lang="en-US" sz="1600" b="1" dirty="0">
+                        <a:solidFill>
+                          <a:srgbClr val="435F30"/>
+                        </a:solidFill>
+                        <a:latin typeface="Bahnschrift SemiLight" panose="020B0502040204020203" pitchFamily="34" charset="0"/>
+                      </a:endParaRPr>
+                    </a:p>
+                    <a:p>
+                      <a:endParaRPr lang="en-US" sz="1600" b="1" dirty="0">
+                        <a:solidFill>
+                          <a:srgbClr val="435F30"/>
+                        </a:solidFill>
+                        <a:latin typeface="Bahnschrift SemiLight" panose="020B0502040204020203" pitchFamily="34" charset="0"/>
+                      </a:endParaRPr>
+                    </a:p>
+                    <a:p>
+                      <a:r>
+                        <a:rPr lang="en-US" sz="1800" b="0" i="1" dirty="0">
+                          <a:solidFill>
+                            <a:srgbClr val="435F30"/>
+                          </a:solidFill>
+                          <a:latin typeface="Bahnschrift SemiLight" panose="020B0502040204020203" pitchFamily="34" charset="0"/>
+                        </a:rPr>
+                        <a:t>Cons:</a:t>
+                      </a:r>
+                      <a:br>
+                        <a:rPr lang="en-US" sz="1600" dirty="0">
+                          <a:solidFill>
+                            <a:srgbClr val="435F30"/>
+                          </a:solidFill>
+                          <a:latin typeface="Bahnschrift SemiLight" panose="020B0502040204020203" pitchFamily="34" charset="0"/>
+                        </a:rPr>
+                      </a:br>
+                      <a:r>
+                        <a:rPr lang="en-US" sz="1600" dirty="0">
+                          <a:solidFill>
+                            <a:srgbClr val="435F30"/>
+                          </a:solidFill>
+                          <a:latin typeface="Bahnschrift SemiLight" panose="020B0502040204020203" pitchFamily="34" charset="0"/>
+                        </a:rPr>
+                        <a:t>• Unfunny memes (had to say it)</a:t>
+                      </a:r>
+                    </a:p>
+                    <a:p>
+                      <a:r>
+                        <a:rPr lang="en-US" sz="1600" dirty="0">
+                          <a:solidFill>
+                            <a:srgbClr val="435F30"/>
+                          </a:solidFill>
+                          <a:latin typeface="Bahnschrift SemiLight" panose="020B0502040204020203" pitchFamily="34" charset="0"/>
+                        </a:rPr>
+                        <a:t>• Memes were too verbose.</a:t>
+                      </a:r>
+                      <a:br>
+                        <a:rPr lang="en-US" sz="1600" dirty="0">
+                          <a:solidFill>
+                            <a:srgbClr val="435F30"/>
+                          </a:solidFill>
+                          <a:latin typeface="Bahnschrift SemiLight" panose="020B0502040204020203" pitchFamily="34" charset="0"/>
+                        </a:rPr>
+                      </a:br>
+                      <a:r>
+                        <a:rPr lang="en-US" sz="1600" dirty="0">
+                          <a:solidFill>
+                            <a:srgbClr val="435F30"/>
+                          </a:solidFill>
+                          <a:latin typeface="Bahnschrift SemiLight" panose="020B0502040204020203" pitchFamily="34" charset="0"/>
+                        </a:rPr>
+                        <a:t>• Poor pasting led to fungal growth (biohazard)</a:t>
+                      </a:r>
+                    </a:p>
+                  </a:txBody>
+                  <a:tcPr/>
+                </a:tc>
+                <a:tc>
+                  <a:txBody>
+                    <a:bodyPr/>
+                    <a:lstStyle/>
+                    <a:p>
+                      <a:endParaRPr lang="en-US" sz="1800" b="0" i="1" dirty="0">
+                        <a:latin typeface="Bahnschrift SemiLight" panose="020B0502040204020203" pitchFamily="34" charset="0"/>
+                      </a:endParaRPr>
+                    </a:p>
+                    <a:p>
+                      <a:r>
+                        <a:rPr lang="en-US" sz="1800" b="0" i="1" dirty="0">
+                          <a:solidFill>
+                            <a:srgbClr val="435F30"/>
+                          </a:solidFill>
+                          <a:latin typeface="Bahnschrift SemiLight" panose="020B0502040204020203" pitchFamily="34" charset="0"/>
+                        </a:rPr>
+                        <a:t>Pros:</a:t>
+                      </a:r>
+                      <a:br>
+                        <a:rPr lang="en-US" sz="1600" b="0" dirty="0">
+                          <a:solidFill>
+                            <a:srgbClr val="435F30"/>
+                          </a:solidFill>
+                          <a:latin typeface="Bahnschrift SemiLight" panose="020B0502040204020203" pitchFamily="34" charset="0"/>
+                        </a:rPr>
+                      </a:br>
+                      <a:r>
+                        <a:rPr lang="en-US" sz="1600" b="0" dirty="0">
+                          <a:solidFill>
+                            <a:srgbClr val="435F30"/>
+                          </a:solidFill>
+                          <a:latin typeface="Bahnschrift SemiLight" panose="020B0502040204020203" pitchFamily="34" charset="0"/>
+                        </a:rPr>
+                        <a:t>• Reduces fly exposure</a:t>
+                      </a:r>
+                      <a:br>
+                        <a:rPr lang="en-US" sz="1600" b="0" dirty="0">
+                          <a:solidFill>
+                            <a:srgbClr val="435F30"/>
+                          </a:solidFill>
+                          <a:latin typeface="Bahnschrift SemiLight" panose="020B0502040204020203" pitchFamily="34" charset="0"/>
+                        </a:rPr>
+                      </a:br>
+                      <a:r>
+                        <a:rPr lang="en-US" sz="1600" b="0" dirty="0">
+                          <a:solidFill>
+                            <a:srgbClr val="435F30"/>
+                          </a:solidFill>
+                          <a:latin typeface="Bahnschrift SemiLight" panose="020B0502040204020203" pitchFamily="34" charset="0"/>
+                        </a:rPr>
+                        <a:t>• Visually conceals waste</a:t>
+                      </a:r>
+                    </a:p>
+                    <a:p>
+                      <a:endParaRPr lang="en-US" sz="1800" b="0" i="1" dirty="0">
+                        <a:solidFill>
+                          <a:srgbClr val="435F30"/>
+                        </a:solidFill>
+                        <a:latin typeface="Bahnschrift SemiLight" panose="020B0502040204020203" pitchFamily="34" charset="0"/>
+                      </a:endParaRPr>
+                    </a:p>
+                    <a:p>
+                      <a:endParaRPr lang="en-US" sz="1800" b="0" i="1" dirty="0">
+                        <a:solidFill>
+                          <a:srgbClr val="435F30"/>
+                        </a:solidFill>
+                        <a:latin typeface="Bahnschrift SemiLight" panose="020B0502040204020203" pitchFamily="34" charset="0"/>
+                      </a:endParaRPr>
+                    </a:p>
+                    <a:p>
+                      <a:endParaRPr lang="en-US" sz="1200" b="0" i="1" dirty="0">
+                        <a:solidFill>
+                          <a:srgbClr val="435F30"/>
+                        </a:solidFill>
+                        <a:latin typeface="Bahnschrift SemiLight" panose="020B0502040204020203" pitchFamily="34" charset="0"/>
+                      </a:endParaRPr>
+                    </a:p>
+                    <a:p>
+                      <a:r>
+                        <a:rPr lang="en-US" sz="1800" b="0" i="1" dirty="0">
+                          <a:solidFill>
+                            <a:srgbClr val="435F30"/>
+                          </a:solidFill>
+                          <a:latin typeface="Bahnschrift SemiLight" panose="020B0502040204020203" pitchFamily="34" charset="0"/>
+                        </a:rPr>
+                        <a:t>Cons:</a:t>
+                      </a:r>
+                      <a:br>
+                        <a:rPr lang="en-US" sz="1600" b="0" dirty="0">
+                          <a:solidFill>
+                            <a:srgbClr val="435F30"/>
+                          </a:solidFill>
+                          <a:latin typeface="Bahnschrift SemiLight" panose="020B0502040204020203" pitchFamily="34" charset="0"/>
+                        </a:rPr>
+                      </a:br>
+                      <a:r>
+                        <a:rPr lang="en-US" sz="1600" b="0" dirty="0">
+                          <a:solidFill>
+                            <a:srgbClr val="435F30"/>
+                          </a:solidFill>
+                          <a:latin typeface="Bahnschrift SemiLight" panose="020B0502040204020203" pitchFamily="34" charset="0"/>
+                        </a:rPr>
+                        <a:t>• Loose-fitting, fall off easily</a:t>
+                      </a:r>
+                      <a:br>
+                        <a:rPr lang="en-US" sz="1600" b="0" dirty="0">
+                          <a:solidFill>
+                            <a:srgbClr val="435F30"/>
+                          </a:solidFill>
+                          <a:latin typeface="Bahnschrift SemiLight" panose="020B0502040204020203" pitchFamily="34" charset="0"/>
+                        </a:rPr>
+                      </a:br>
+                      <a:r>
+                        <a:rPr lang="en-US" sz="1600" b="0" dirty="0">
+                          <a:solidFill>
+                            <a:srgbClr val="435F30"/>
+                          </a:solidFill>
+                          <a:latin typeface="Bahnschrift SemiLight" panose="020B0502040204020203" pitchFamily="34" charset="0"/>
+                        </a:rPr>
+                        <a:t>• Hinders trash removal</a:t>
+                      </a:r>
+                      <a:br>
+                        <a:rPr lang="en-US" sz="1600" b="0" dirty="0">
+                          <a:solidFill>
+                            <a:srgbClr val="435F30"/>
+                          </a:solidFill>
+                          <a:latin typeface="Bahnschrift SemiLight" panose="020B0502040204020203" pitchFamily="34" charset="0"/>
+                        </a:rPr>
+                      </a:br>
+                      <a:r>
+                        <a:rPr lang="en-US" sz="1600" b="0" dirty="0">
+                          <a:solidFill>
+                            <a:srgbClr val="435F30"/>
+                          </a:solidFill>
+                          <a:latin typeface="Bahnschrift SemiLight" panose="020B0502040204020203" pitchFamily="34" charset="0"/>
+                        </a:rPr>
+                        <a:t>• Design causes spills, poor accessibility</a:t>
+                      </a:r>
+                    </a:p>
+                    <a:p>
+                      <a:endParaRPr lang="en-US" dirty="0"/>
+                    </a:p>
+                  </a:txBody>
+                  <a:tcPr/>
+                </a:tc>
+                <a:extLst>
+                  <a:ext uri="{0D108BD9-81ED-4DB2-BD59-A6C34878D82A}">
+                    <a16:rowId xmlns:a16="http://schemas.microsoft.com/office/drawing/2014/main" val="3708049680"/>
+                  </a:ext>
+                </a:extLst>
+              </a:tr>
+            </a:tbl>
+          </a:graphicData>
+        </a:graphic>
+      </p:graphicFrame>
+      <p:sp>
+        <p:nvSpPr>
+          <p:cNvPr id="4" name="Slide Number Placeholder 3">
+            <a:extLst>
+              <a:ext uri="{FF2B5EF4-FFF2-40B4-BE49-F238E27FC236}">
+                <a16:creationId xmlns:a16="http://schemas.microsoft.com/office/drawing/2014/main" id="{77F131AA-C0BD-A3B5-20BE-7D42A1FB739A}"/>
               </a:ext>
             </a:extLst>
           </p:cNvPr>
@@ -13238,23 +16395,154 @@
           </a:p>
         </p:txBody>
       </p:sp>
+      <p:sp>
+        <p:nvSpPr>
+          <p:cNvPr id="5" name="Slide Number Placeholder 4">
+            <a:extLst>
+              <a:ext uri="{FF2B5EF4-FFF2-40B4-BE49-F238E27FC236}">
+                <a16:creationId xmlns:a16="http://schemas.microsoft.com/office/drawing/2014/main" id="{8DDB3B2A-951D-E47A-3485-4670423FC56D}"/>
+              </a:ext>
+            </a:extLst>
+          </p:cNvPr>
+          <p:cNvSpPr txBox="1">
+            <a:spLocks/>
+          </p:cNvSpPr>
+          <p:nvPr/>
+        </p:nvSpPr>
+        <p:spPr>
+          <a:xfrm>
+            <a:off x="455612" y="6190488"/>
+            <a:ext cx="2677604" cy="210312"/>
+          </a:xfrm>
+          <a:prstGeom prst="rect">
+            <a:avLst/>
+          </a:prstGeom>
+        </p:spPr>
+        <p:txBody>
+          <a:bodyPr vert="horz" lIns="121899" tIns="60949" rIns="121899" bIns="60949" rtlCol="0" anchor="b"/>
+          <a:lstStyle>
+            <a:defPPr>
+              <a:defRPr lang="en-US"/>
+            </a:defPPr>
+            <a:lvl1pPr marL="0" algn="r" defTabSz="1218987" rtl="0" eaLnBrk="1" latinLnBrk="0" hangingPunct="1">
+              <a:defRPr sz="1000" b="1" kern="1200" spc="200" baseline="0">
+                <a:solidFill>
+                  <a:schemeClr val="tx2">
+                    <a:lumMod val="50000"/>
+                  </a:schemeClr>
+                </a:solidFill>
+                <a:latin typeface="+mn-lt"/>
+                <a:ea typeface="+mn-ea"/>
+                <a:cs typeface="+mn-cs"/>
+              </a:defRPr>
+            </a:lvl1pPr>
+            <a:lvl2pPr marL="609493" algn="l" defTabSz="1218987" rtl="0" eaLnBrk="1" latinLnBrk="0" hangingPunct="1">
+              <a:defRPr sz="2400" kern="1200">
+                <a:solidFill>
+                  <a:schemeClr val="tx1"/>
+                </a:solidFill>
+                <a:latin typeface="+mn-lt"/>
+                <a:ea typeface="+mn-ea"/>
+                <a:cs typeface="+mn-cs"/>
+              </a:defRPr>
+            </a:lvl2pPr>
+            <a:lvl3pPr marL="1218987" algn="l" defTabSz="1218987" rtl="0" eaLnBrk="1" latinLnBrk="0" hangingPunct="1">
+              <a:defRPr sz="2400" kern="1200">
+                <a:solidFill>
+                  <a:schemeClr val="tx1"/>
+                </a:solidFill>
+                <a:latin typeface="+mn-lt"/>
+                <a:ea typeface="+mn-ea"/>
+                <a:cs typeface="+mn-cs"/>
+              </a:defRPr>
+            </a:lvl3pPr>
+            <a:lvl4pPr marL="1828480" algn="l" defTabSz="1218987" rtl="0" eaLnBrk="1" latinLnBrk="0" hangingPunct="1">
+              <a:defRPr sz="2400" kern="1200">
+                <a:solidFill>
+                  <a:schemeClr val="tx1"/>
+                </a:solidFill>
+                <a:latin typeface="+mn-lt"/>
+                <a:ea typeface="+mn-ea"/>
+                <a:cs typeface="+mn-cs"/>
+              </a:defRPr>
+            </a:lvl4pPr>
+            <a:lvl5pPr marL="2437973" algn="l" defTabSz="1218987" rtl="0" eaLnBrk="1" latinLnBrk="0" hangingPunct="1">
+              <a:defRPr sz="2400" kern="1200">
+                <a:solidFill>
+                  <a:schemeClr val="tx1"/>
+                </a:solidFill>
+                <a:latin typeface="+mn-lt"/>
+                <a:ea typeface="+mn-ea"/>
+                <a:cs typeface="+mn-cs"/>
+              </a:defRPr>
+            </a:lvl5pPr>
+            <a:lvl6pPr marL="3047467" algn="l" defTabSz="1218987" rtl="0" eaLnBrk="1" latinLnBrk="0" hangingPunct="1">
+              <a:defRPr sz="2400" kern="1200">
+                <a:solidFill>
+                  <a:schemeClr val="tx1"/>
+                </a:solidFill>
+                <a:latin typeface="+mn-lt"/>
+                <a:ea typeface="+mn-ea"/>
+                <a:cs typeface="+mn-cs"/>
+              </a:defRPr>
+            </a:lvl6pPr>
+            <a:lvl7pPr marL="3656960" algn="l" defTabSz="1218987" rtl="0" eaLnBrk="1" latinLnBrk="0" hangingPunct="1">
+              <a:defRPr sz="2400" kern="1200">
+                <a:solidFill>
+                  <a:schemeClr val="tx1"/>
+                </a:solidFill>
+                <a:latin typeface="+mn-lt"/>
+                <a:ea typeface="+mn-ea"/>
+                <a:cs typeface="+mn-cs"/>
+              </a:defRPr>
+            </a:lvl7pPr>
+            <a:lvl8pPr marL="4266453" algn="l" defTabSz="1218987" rtl="0" eaLnBrk="1" latinLnBrk="0" hangingPunct="1">
+              <a:defRPr sz="2400" kern="1200">
+                <a:solidFill>
+                  <a:schemeClr val="tx1"/>
+                </a:solidFill>
+                <a:latin typeface="+mn-lt"/>
+                <a:ea typeface="+mn-ea"/>
+                <a:cs typeface="+mn-cs"/>
+              </a:defRPr>
+            </a:lvl8pPr>
+            <a:lvl9pPr marL="4875947" algn="l" defTabSz="1218987" rtl="0" eaLnBrk="1" latinLnBrk="0" hangingPunct="1">
+              <a:defRPr sz="2400" kern="1200">
+                <a:solidFill>
+                  <a:schemeClr val="tx1"/>
+                </a:solidFill>
+                <a:latin typeface="+mn-lt"/>
+                <a:ea typeface="+mn-ea"/>
+                <a:cs typeface="+mn-cs"/>
+              </a:defRPr>
+            </a:lvl9pPr>
+          </a:lstStyle>
+          <a:p>
+            <a:pPr algn="l"/>
+            <a:r>
+              <a:rPr lang="en-US" dirty="0"/>
+              <a:t>DES211 CAPSTONE PROJECT</a:t>
+            </a:r>
+          </a:p>
+        </p:txBody>
+      </p:sp>
     </p:spTree>
     <p:extLst>
       <p:ext uri="{BB962C8B-B14F-4D97-AF65-F5344CB8AC3E}">
-        <p14:creationId xmlns:p14="http://schemas.microsoft.com/office/powerpoint/2010/main" val="3382860869"/>
+        <p14:creationId xmlns:p14="http://schemas.microsoft.com/office/powerpoint/2010/main" val="3826853309"/>
       </p:ext>
     </p:extLst>
   </p:cSld>
   <p:clrMapOvr>
     <a:masterClrMapping/>
   </p:clrMapOvr>
-  <mc:AlternateContent xmlns:mc="http://schemas.openxmlformats.org/markup-compatibility/2006" xmlns:p14="http://schemas.microsoft.com/office/powerpoint/2010/main">
-    <mc:Choice Requires="p14">
+  <mc:AlternateContent xmlns:mc="http://schemas.openxmlformats.org/markup-compatibility/2006">
+    <mc:Choice xmlns:p14="http://schemas.microsoft.com/office/powerpoint/2010/main" Requires="p14">
       <p:transition spd="med" p14:dur="700">
         <p:fade/>
       </p:transition>
     </mc:Choice>
-    <mc:Fallback xmlns="">
+    <mc:Fallback>
       <p:transition spd="med">
         <p:fade/>
       </p:transition>
@@ -14080,15 +17368,6 @@
 </file>
 
 <file path=customXml/item1.xml><?xml version="1.0" encoding="utf-8"?>
-<?mso-contentType ?>
-<FormTemplates xmlns="http://schemas.microsoft.com/sharepoint/v3/contenttype/forms">
-  <Display>DocumentLibraryForm</Display>
-  <Edit>DocumentLibraryForm</Edit>
-  <New>DocumentLibraryForm</New>
-</FormTemplates>
-</file>
-
-<file path=customXml/item2.xml><?xml version="1.0" encoding="utf-8"?>
 <p:properties xmlns:p="http://schemas.microsoft.com/office/2006/metadata/properties" xmlns:xsi="http://www.w3.org/2001/XMLSchema-instance" xmlns:pc="http://schemas.microsoft.com/office/infopath/2007/PartnerControls">
   <documentManagement>
     <_ip_UnifiedCompliancePolicyUIAction xmlns="http://schemas.microsoft.com/sharepoint/v3" xsi:nil="true"/>
@@ -14106,6 +17385,15 @@
     <MediaServiceKeyPoints xmlns="71af3243-3dd4-4a8d-8c0d-dd76da1f02a5" xsi:nil="true"/>
   </documentManagement>
 </p:properties>
+</file>
+
+<file path=customXml/item2.xml><?xml version="1.0" encoding="utf-8"?>
+<?mso-contentType ?>
+<FormTemplates xmlns="http://schemas.microsoft.com/sharepoint/v3/contenttype/forms">
+  <Display>DocumentLibraryForm</Display>
+  <Edit>DocumentLibraryForm</Edit>
+  <New>DocumentLibraryForm</New>
+</FormTemplates>
 </file>
 
 <file path=customXml/item3.xml><?xml version="1.0" encoding="utf-8"?>
@@ -14421,14 +17709,6 @@
 </file>
 
 <file path=customXml/itemProps1.xml><?xml version="1.0" encoding="utf-8"?>
-<ds:datastoreItem xmlns:ds="http://schemas.openxmlformats.org/officeDocument/2006/customXml" ds:itemID="{F49F7C99-DB67-4EF2-86B4-C45C603BA94C}">
-  <ds:schemaRefs>
-    <ds:schemaRef ds:uri="http://schemas.microsoft.com/sharepoint/v3/contenttype/forms"/>
-  </ds:schemaRefs>
-</ds:datastoreItem>
-</file>
-
-<file path=customXml/itemProps2.xml><?xml version="1.0" encoding="utf-8"?>
 <ds:datastoreItem xmlns:ds="http://schemas.openxmlformats.org/officeDocument/2006/customXml" ds:itemID="{527F8595-6F9C-444F-81F9-1BB5383C5D01}">
   <ds:schemaRefs>
     <ds:schemaRef ds:uri="http://schemas.microsoft.com/office/2006/metadata/properties"/>
@@ -14436,6 +17716,14 @@
     <ds:schemaRef ds:uri="http://schemas.microsoft.com/sharepoint/v3"/>
     <ds:schemaRef ds:uri="71af3243-3dd4-4a8d-8c0d-dd76da1f02a5"/>
     <ds:schemaRef ds:uri="230e9df3-be65-4c73-a93b-d1236ebd677e"/>
+  </ds:schemaRefs>
+</ds:datastoreItem>
+</file>
+
+<file path=customXml/itemProps2.xml><?xml version="1.0" encoding="utf-8"?>
+<ds:datastoreItem xmlns:ds="http://schemas.openxmlformats.org/officeDocument/2006/customXml" ds:itemID="{F49F7C99-DB67-4EF2-86B4-C45C603BA94C}">
+  <ds:schemaRefs>
+    <ds:schemaRef ds:uri="http://schemas.microsoft.com/sharepoint/v3/contenttype/forms"/>
   </ds:schemaRefs>
 </ds:datastoreItem>
 </file>

</xml_diff>

<commit_message>
feat: finish define slide deck
</commit_message>
<xml_diff>
--- a/presentation.pptx
+++ b/presentation.pptx
@@ -5,10 +5,10 @@
     <p:sldMasterId id="2147483692" r:id="rId4"/>
   </p:sldMasterIdLst>
   <p:notesMasterIdLst>
-    <p:notesMasterId r:id="rId27"/>
+    <p:notesMasterId r:id="rId28"/>
   </p:notesMasterIdLst>
   <p:handoutMasterIdLst>
-    <p:handoutMasterId r:id="rId28"/>
+    <p:handoutMasterId r:id="rId29"/>
   </p:handoutMasterIdLst>
   <p:sldIdLst>
     <p:sldId id="354" r:id="rId5"/>
@@ -21,18 +21,19 @@
     <p:sldId id="387" r:id="rId12"/>
     <p:sldId id="389" r:id="rId13"/>
     <p:sldId id="368" r:id="rId14"/>
-    <p:sldId id="369" r:id="rId15"/>
-    <p:sldId id="370" r:id="rId16"/>
+    <p:sldId id="391" r:id="rId15"/>
+    <p:sldId id="392" r:id="rId16"/>
     <p:sldId id="371" r:id="rId17"/>
-    <p:sldId id="376" r:id="rId18"/>
-    <p:sldId id="377" r:id="rId19"/>
-    <p:sldId id="378" r:id="rId20"/>
-    <p:sldId id="379" r:id="rId21"/>
-    <p:sldId id="380" r:id="rId22"/>
-    <p:sldId id="381" r:id="rId23"/>
-    <p:sldId id="382" r:id="rId24"/>
-    <p:sldId id="383" r:id="rId25"/>
-    <p:sldId id="384" r:id="rId26"/>
+    <p:sldId id="390" r:id="rId18"/>
+    <p:sldId id="376" r:id="rId19"/>
+    <p:sldId id="377" r:id="rId20"/>
+    <p:sldId id="378" r:id="rId21"/>
+    <p:sldId id="379" r:id="rId22"/>
+    <p:sldId id="380" r:id="rId23"/>
+    <p:sldId id="381" r:id="rId24"/>
+    <p:sldId id="382" r:id="rId25"/>
+    <p:sldId id="383" r:id="rId26"/>
+    <p:sldId id="384" r:id="rId27"/>
   </p:sldIdLst>
   <p:sldSz cx="12188825" cy="6858000"/>
   <p:notesSz cx="6858000" cy="9144000"/>
@@ -9338,10 +9339,42 @@
         </p:nvSpPr>
         <p:spPr/>
         <p:txBody>
-          <a:bodyPr/>
+          <a:bodyPr>
+            <a:normAutofit/>
+          </a:bodyPr>
           <a:lstStyle/>
           <a:p>
-            <a:endParaRPr lang="en-IN" dirty="0"/>
+            <a:pPr marL="0" indent="0">
+              <a:buNone/>
+            </a:pPr>
+            <a:r>
+              <a:rPr lang="en-US" dirty="0">
+                <a:latin typeface="Bahnschrift SemiBold" panose="020B0502040204020203" pitchFamily="34" charset="0"/>
+              </a:rPr>
+              <a:t>The Definition phase is the second step in the Human-Centered Design process. </a:t>
+            </a:r>
+          </a:p>
+          <a:p>
+            <a:pPr marL="0" indent="0">
+              <a:buNone/>
+            </a:pPr>
+            <a:endParaRPr lang="en-US" dirty="0">
+              <a:latin typeface="Bahnschrift SemiBold" panose="020B0502040204020203" pitchFamily="34" charset="0"/>
+            </a:endParaRPr>
+          </a:p>
+          <a:p>
+            <a:pPr marL="0" indent="0">
+              <a:buNone/>
+            </a:pPr>
+            <a:r>
+              <a:rPr lang="en-US" dirty="0">
+                <a:latin typeface="Bahnschrift SemiBold" panose="020B0502040204020203" pitchFamily="34" charset="0"/>
+              </a:rPr>
+              <a:t>Insights from the Empathy phase are used to clearly define the user’s core problem or need.</a:t>
+            </a:r>
+            <a:endParaRPr lang="en-IN" dirty="0">
+              <a:latin typeface="Bahnschrift SemiBold" panose="020B0502040204020203" pitchFamily="34" charset="0"/>
+            </a:endParaRPr>
           </a:p>
         </p:txBody>
       </p:sp>
@@ -9561,7 +9594,13 @@
   <p:cSld>
     <p:spTree>
       <p:nvGrpSpPr>
-        <p:cNvPr id="1" name=""/>
+        <p:cNvPr id="1" name="">
+          <a:extLst>
+            <a:ext uri="{FF2B5EF4-FFF2-40B4-BE49-F238E27FC236}">
+              <a16:creationId xmlns:a16="http://schemas.microsoft.com/office/drawing/2014/main" id="{4BE813CF-51D3-5CBF-3869-EF188CBACA0A}"/>
+            </a:ext>
+          </a:extLst>
+        </p:cNvPr>
         <p:cNvGrpSpPr/>
         <p:nvPr/>
       </p:nvGrpSpPr>
@@ -9575,10 +9614,10 @@
       </p:grpSpPr>
       <p:sp>
         <p:nvSpPr>
-          <p:cNvPr id="2" name="Title 1">
-            <a:extLst>
-              <a:ext uri="{FF2B5EF4-FFF2-40B4-BE49-F238E27FC236}">
-                <a16:creationId xmlns:a16="http://schemas.microsoft.com/office/drawing/2014/main" id="{1DAF76BE-D861-0DEF-4ADF-A5EE483C6394}"/>
+          <p:cNvPr id="3" name="Picture Placeholder 2">
+            <a:extLst>
+              <a:ext uri="{FF2B5EF4-FFF2-40B4-BE49-F238E27FC236}">
+                <a16:creationId xmlns:a16="http://schemas.microsoft.com/office/drawing/2014/main" id="{598213EA-AD07-108F-47C6-99F6983D38E5}"/>
               </a:ext>
             </a:extLst>
           </p:cNvPr>
@@ -9586,7 +9625,7 @@
             <a:spLocks noGrp="1"/>
           </p:cNvSpPr>
           <p:nvPr>
-            <p:ph type="title"/>
+            <p:ph type="pic" sz="quarter" idx="10"/>
           </p:nvPr>
         </p:nvSpPr>
         <p:spPr/>
@@ -9594,71 +9633,16 @@
           <a:bodyPr/>
           <a:lstStyle/>
           <a:p>
-            <a:endParaRPr lang="en-IN" dirty="0"/>
-          </a:p>
-        </p:txBody>
-      </p:sp>
-      <p:sp>
-        <p:nvSpPr>
-          <p:cNvPr id="3" name="Content Placeholder 2">
-            <a:extLst>
-              <a:ext uri="{FF2B5EF4-FFF2-40B4-BE49-F238E27FC236}">
-                <a16:creationId xmlns:a16="http://schemas.microsoft.com/office/drawing/2014/main" id="{658554FA-E424-11D3-4CED-608F7A2DAA49}"/>
-              </a:ext>
-            </a:extLst>
-          </p:cNvPr>
-          <p:cNvSpPr>
-            <a:spLocks noGrp="1"/>
-          </p:cNvSpPr>
-          <p:nvPr>
-            <p:ph sz="quarter" idx="13"/>
-          </p:nvPr>
-        </p:nvSpPr>
-        <p:spPr/>
-        <p:txBody>
-          <a:bodyPr/>
-          <a:lstStyle/>
-          <a:p>
-            <a:endParaRPr lang="en-IN"/>
-          </a:p>
-        </p:txBody>
-      </p:sp>
-      <p:sp>
-        <p:nvSpPr>
-          <p:cNvPr id="4" name="Slide Number Placeholder 3">
-            <a:extLst>
-              <a:ext uri="{FF2B5EF4-FFF2-40B4-BE49-F238E27FC236}">
-                <a16:creationId xmlns:a16="http://schemas.microsoft.com/office/drawing/2014/main" id="{D3EDF452-2A72-5BC1-C650-2140070FDD4D}"/>
-              </a:ext>
-            </a:extLst>
-          </p:cNvPr>
-          <p:cNvSpPr>
-            <a:spLocks noGrp="1"/>
-          </p:cNvSpPr>
-          <p:nvPr>
-            <p:ph type="sldNum" sz="quarter" idx="12"/>
-          </p:nvPr>
-        </p:nvSpPr>
-        <p:spPr/>
-        <p:txBody>
-          <a:bodyPr/>
-          <a:lstStyle/>
-          <a:p>
-            <a:fld id="{EB37DED6-D4C7-42EE-AB49-D2E39E64FDE4}" type="slidenum">
-              <a:rPr lang="en-US" smtClean="0"/>
-              <a:pPr/>
-              <a:t>11</a:t>
-            </a:fld>
-            <a:endParaRPr lang="en-US" dirty="0"/>
-          </a:p>
-        </p:txBody>
-      </p:sp>
-      <p:sp>
-        <p:nvSpPr>
-          <p:cNvPr id="5" name="Slide Number Placeholder 4">
-            <a:extLst>
-              <a:ext uri="{FF2B5EF4-FFF2-40B4-BE49-F238E27FC236}">
-                <a16:creationId xmlns:a16="http://schemas.microsoft.com/office/drawing/2014/main" id="{F7C1BEA9-8B0A-E664-F9E2-D7E738116FAA}"/>
+            <a:endParaRPr lang="en-US"/>
+          </a:p>
+        </p:txBody>
+      </p:sp>
+      <p:sp>
+        <p:nvSpPr>
+          <p:cNvPr id="8" name="Slide Number Placeholder 4">
+            <a:extLst>
+              <a:ext uri="{FF2B5EF4-FFF2-40B4-BE49-F238E27FC236}">
+                <a16:creationId xmlns:a16="http://schemas.microsoft.com/office/drawing/2014/main" id="{2FA00807-A0B6-AD75-9DEB-FAFE9147E660}"/>
               </a:ext>
             </a:extLst>
           </p:cNvPr>
@@ -9784,23 +9768,295 @@
           </a:p>
         </p:txBody>
       </p:sp>
+      <p:sp>
+        <p:nvSpPr>
+          <p:cNvPr id="9" name="TextBox 8">
+            <a:extLst>
+              <a:ext uri="{FF2B5EF4-FFF2-40B4-BE49-F238E27FC236}">
+                <a16:creationId xmlns:a16="http://schemas.microsoft.com/office/drawing/2014/main" id="{241F6D85-A827-4426-2C90-88C0EC207C28}"/>
+              </a:ext>
+            </a:extLst>
+          </p:cNvPr>
+          <p:cNvSpPr txBox="1"/>
+          <p:nvPr/>
+        </p:nvSpPr>
+        <p:spPr>
+          <a:xfrm>
+            <a:off x="531812" y="937728"/>
+            <a:ext cx="4800600" cy="4867999"/>
+          </a:xfrm>
+          <a:prstGeom prst="rect">
+            <a:avLst/>
+          </a:prstGeom>
+          <a:noFill/>
+        </p:spPr>
+        <p:txBody>
+          <a:bodyPr wrap="square" rtlCol="0">
+            <a:spAutoFit/>
+          </a:bodyPr>
+          <a:lstStyle/>
+          <a:p>
+            <a:pPr marL="304747" indent="-304747">
+              <a:lnSpc>
+                <a:spcPct val="95000"/>
+              </a:lnSpc>
+              <a:spcBef>
+                <a:spcPts val="1866"/>
+              </a:spcBef>
+              <a:buClr>
+                <a:schemeClr val="accent6">
+                  <a:lumMod val="50000"/>
+                </a:schemeClr>
+              </a:buClr>
+              <a:buSzPct val="100000"/>
+              <a:buFont typeface="Arial" pitchFamily="34" charset="0"/>
+              <a:buNone/>
+            </a:pPr>
+            <a:r>
+              <a:rPr lang="en-US" sz="1800" i="1" dirty="0">
+                <a:solidFill>
+                  <a:schemeClr val="accent2">
+                    <a:lumMod val="50000"/>
+                  </a:schemeClr>
+                </a:solidFill>
+                <a:latin typeface="Bahnschrift SemiLight" panose="020B0502040204020203" pitchFamily="34" charset="0"/>
+              </a:rPr>
+              <a:t>Specification of Problem Statement</a:t>
+            </a:r>
+          </a:p>
+          <a:p>
+            <a:pPr marL="304747" indent="-304747">
+              <a:lnSpc>
+                <a:spcPct val="95000"/>
+              </a:lnSpc>
+              <a:spcBef>
+                <a:spcPts val="1866"/>
+              </a:spcBef>
+              <a:buClr>
+                <a:schemeClr val="accent6">
+                  <a:lumMod val="50000"/>
+                </a:schemeClr>
+              </a:buClr>
+              <a:buSzPct val="100000"/>
+              <a:buFont typeface="Arial" pitchFamily="34" charset="0"/>
+              <a:buChar char="•"/>
+            </a:pPr>
+            <a:r>
+              <a:rPr lang="en-US" sz="1600" dirty="0">
+                <a:solidFill>
+                  <a:schemeClr val="accent2">
+                    <a:lumMod val="50000"/>
+                  </a:schemeClr>
+                </a:solidFill>
+                <a:latin typeface="Bahnschrift SemiLight" panose="020B0502040204020203" pitchFamily="34" charset="0"/>
+              </a:rPr>
+              <a:t>No clear bin purpose or labeling</a:t>
+            </a:r>
+          </a:p>
+          <a:p>
+            <a:pPr marL="304747" indent="-304747">
+              <a:lnSpc>
+                <a:spcPct val="95000"/>
+              </a:lnSpc>
+              <a:spcBef>
+                <a:spcPts val="1866"/>
+              </a:spcBef>
+              <a:buClr>
+                <a:schemeClr val="accent6">
+                  <a:lumMod val="50000"/>
+                </a:schemeClr>
+              </a:buClr>
+              <a:buSzPct val="100000"/>
+              <a:buFont typeface="Arial" pitchFamily="34" charset="0"/>
+              <a:buChar char="•"/>
+            </a:pPr>
+            <a:r>
+              <a:rPr lang="en-US" sz="1600" dirty="0">
+                <a:solidFill>
+                  <a:schemeClr val="accent2">
+                    <a:lumMod val="50000"/>
+                  </a:schemeClr>
+                </a:solidFill>
+                <a:latin typeface="Bahnschrift SemiLight" panose="020B0502040204020203" pitchFamily="34" charset="0"/>
+              </a:rPr>
+              <a:t>Tipping nullifies waste segregation</a:t>
+            </a:r>
+          </a:p>
+          <a:p>
+            <a:pPr marL="304747" indent="-304747">
+              <a:lnSpc>
+                <a:spcPct val="95000"/>
+              </a:lnSpc>
+              <a:spcBef>
+                <a:spcPts val="1866"/>
+              </a:spcBef>
+              <a:buClr>
+                <a:schemeClr val="accent6">
+                  <a:lumMod val="50000"/>
+                </a:schemeClr>
+              </a:buClr>
+              <a:buSzPct val="100000"/>
+              <a:buFont typeface="Arial" pitchFamily="34" charset="0"/>
+              <a:buChar char="•"/>
+            </a:pPr>
+            <a:r>
+              <a:rPr lang="en-US" sz="1600" dirty="0">
+                <a:solidFill>
+                  <a:schemeClr val="accent2">
+                    <a:lumMod val="50000"/>
+                  </a:schemeClr>
+                </a:solidFill>
+                <a:latin typeface="Bahnschrift SemiLight" panose="020B0502040204020203" pitchFamily="34" charset="0"/>
+              </a:rPr>
+              <a:t>Lone bins lack modularity &amp; expansion</a:t>
+            </a:r>
+          </a:p>
+          <a:p>
+            <a:pPr marL="304747" indent="-304747">
+              <a:lnSpc>
+                <a:spcPct val="95000"/>
+              </a:lnSpc>
+              <a:spcBef>
+                <a:spcPts val="1866"/>
+              </a:spcBef>
+              <a:buClr>
+                <a:schemeClr val="accent6">
+                  <a:lumMod val="50000"/>
+                </a:schemeClr>
+              </a:buClr>
+              <a:buSzPct val="100000"/>
+              <a:buFont typeface="Arial" pitchFamily="34" charset="0"/>
+              <a:buChar char="•"/>
+            </a:pPr>
+            <a:r>
+              <a:rPr lang="en-US" sz="1600" dirty="0">
+                <a:solidFill>
+                  <a:schemeClr val="accent2">
+                    <a:lumMod val="50000"/>
+                  </a:schemeClr>
+                </a:solidFill>
+                <a:latin typeface="Bahnschrift SemiLight" panose="020B0502040204020203" pitchFamily="34" charset="0"/>
+              </a:rPr>
+              <a:t>Must be low-cost, high-capacity, and easy to install</a:t>
+            </a:r>
+          </a:p>
+          <a:p>
+            <a:pPr marL="304747" indent="-304747">
+              <a:lnSpc>
+                <a:spcPct val="95000"/>
+              </a:lnSpc>
+              <a:spcBef>
+                <a:spcPts val="1866"/>
+              </a:spcBef>
+              <a:buClr>
+                <a:schemeClr val="accent6">
+                  <a:lumMod val="50000"/>
+                </a:schemeClr>
+              </a:buClr>
+              <a:buSzPct val="100000"/>
+              <a:buFont typeface="Arial" pitchFamily="34" charset="0"/>
+              <a:buChar char="•"/>
+            </a:pPr>
+            <a:r>
+              <a:rPr lang="en-US" sz="1600" dirty="0">
+                <a:solidFill>
+                  <a:schemeClr val="accent2">
+                    <a:lumMod val="50000"/>
+                  </a:schemeClr>
+                </a:solidFill>
+                <a:latin typeface="Bahnschrift SemiLight" panose="020B0502040204020203" pitchFamily="34" charset="0"/>
+              </a:rPr>
+              <a:t>Floor-wise segregation needed (room-wise unfeasible)</a:t>
+            </a:r>
+          </a:p>
+          <a:p>
+            <a:pPr marL="304747" indent="-304747">
+              <a:lnSpc>
+                <a:spcPct val="95000"/>
+              </a:lnSpc>
+              <a:spcBef>
+                <a:spcPts val="1866"/>
+              </a:spcBef>
+              <a:buClr>
+                <a:schemeClr val="accent6">
+                  <a:lumMod val="50000"/>
+                </a:schemeClr>
+              </a:buClr>
+              <a:buSzPct val="100000"/>
+              <a:buFont typeface="Arial" pitchFamily="34" charset="0"/>
+              <a:buChar char="•"/>
+            </a:pPr>
+            <a:r>
+              <a:rPr lang="en-US" sz="1600" dirty="0">
+                <a:solidFill>
+                  <a:schemeClr val="accent2">
+                    <a:lumMod val="50000"/>
+                  </a:schemeClr>
+                </a:solidFill>
+                <a:latin typeface="Bahnschrift SemiLight" panose="020B0502040204020203" pitchFamily="34" charset="0"/>
+              </a:rPr>
+              <a:t>No incentive system for segregation</a:t>
+            </a:r>
+          </a:p>
+          <a:p>
+            <a:pPr marL="304747" indent="-304747">
+              <a:lnSpc>
+                <a:spcPct val="95000"/>
+              </a:lnSpc>
+              <a:spcBef>
+                <a:spcPts val="1866"/>
+              </a:spcBef>
+              <a:buClr>
+                <a:schemeClr val="accent6">
+                  <a:lumMod val="50000"/>
+                </a:schemeClr>
+              </a:buClr>
+              <a:buSzPct val="100000"/>
+              <a:buFont typeface="Arial" pitchFamily="34" charset="0"/>
+              <a:buChar char="•"/>
+            </a:pPr>
+            <a:r>
+              <a:rPr lang="en-US" sz="1600" dirty="0">
+                <a:solidFill>
+                  <a:srgbClr val="435F30"/>
+                </a:solidFill>
+                <a:latin typeface="Bahnschrift SemiLight" panose="020B0502040204020203" pitchFamily="34" charset="0"/>
+              </a:rPr>
+              <a:t>Bin placement often ignores foot traffic patterns, reducing visibility and usage opportunities.</a:t>
+            </a:r>
+          </a:p>
+          <a:p>
+            <a:pPr>
+              <a:lnSpc>
+                <a:spcPct val="95000"/>
+              </a:lnSpc>
+            </a:pPr>
+            <a:endParaRPr lang="en-US" sz="1600" dirty="0">
+              <a:solidFill>
+                <a:srgbClr val="435F30"/>
+              </a:solidFill>
+              <a:latin typeface="Bahnschrift SemiBold" panose="020B0502040204020203" pitchFamily="34" charset="0"/>
+            </a:endParaRPr>
+          </a:p>
+        </p:txBody>
+      </p:sp>
     </p:spTree>
     <p:extLst>
       <p:ext uri="{BB962C8B-B14F-4D97-AF65-F5344CB8AC3E}">
-        <p14:creationId xmlns:p14="http://schemas.microsoft.com/office/powerpoint/2010/main" val="3542959396"/>
+        <p14:creationId xmlns:p14="http://schemas.microsoft.com/office/powerpoint/2010/main" val="3540321416"/>
       </p:ext>
     </p:extLst>
   </p:cSld>
   <p:clrMapOvr>
     <a:masterClrMapping/>
   </p:clrMapOvr>
-  <mc:AlternateContent xmlns:mc="http://schemas.openxmlformats.org/markup-compatibility/2006" xmlns:p14="http://schemas.microsoft.com/office/powerpoint/2010/main">
-    <mc:Choice Requires="p14">
+  <mc:AlternateContent xmlns:mc="http://schemas.openxmlformats.org/markup-compatibility/2006">
+    <mc:Choice xmlns:p14="http://schemas.microsoft.com/office/powerpoint/2010/main" Requires="p14">
       <p:transition spd="med" p14:dur="700">
         <p:fade/>
       </p:transition>
     </mc:Choice>
-    <mc:Fallback xmlns="">
+    <mc:Fallback>
       <p:transition spd="med">
         <p:fade/>
       </p:transition>
@@ -9814,7 +10070,13 @@
   <p:cSld>
     <p:spTree>
       <p:nvGrpSpPr>
-        <p:cNvPr id="1" name=""/>
+        <p:cNvPr id="1" name="">
+          <a:extLst>
+            <a:ext uri="{FF2B5EF4-FFF2-40B4-BE49-F238E27FC236}">
+              <a16:creationId xmlns:a16="http://schemas.microsoft.com/office/drawing/2014/main" id="{86DEB1F0-7C19-4219-5724-73F454A16438}"/>
+            </a:ext>
+          </a:extLst>
+        </p:cNvPr>
         <p:cNvGrpSpPr/>
         <p:nvPr/>
       </p:nvGrpSpPr>
@@ -9828,35 +10090,10 @@
       </p:grpSpPr>
       <p:sp>
         <p:nvSpPr>
-          <p:cNvPr id="2" name="Title 1">
-            <a:extLst>
-              <a:ext uri="{FF2B5EF4-FFF2-40B4-BE49-F238E27FC236}">
-                <a16:creationId xmlns:a16="http://schemas.microsoft.com/office/drawing/2014/main" id="{81A3617B-0FD5-4494-9CDA-AE370728EAD0}"/>
-              </a:ext>
-            </a:extLst>
-          </p:cNvPr>
-          <p:cNvSpPr>
-            <a:spLocks noGrp="1"/>
-          </p:cNvSpPr>
-          <p:nvPr>
-            <p:ph type="title"/>
-          </p:nvPr>
-        </p:nvSpPr>
-        <p:spPr/>
-        <p:txBody>
-          <a:bodyPr/>
-          <a:lstStyle/>
-          <a:p>
-            <a:endParaRPr lang="en-IN"/>
-          </a:p>
-        </p:txBody>
-      </p:sp>
-      <p:sp>
-        <p:nvSpPr>
           <p:cNvPr id="3" name="Picture Placeholder 2">
             <a:extLst>
               <a:ext uri="{FF2B5EF4-FFF2-40B4-BE49-F238E27FC236}">
-                <a16:creationId xmlns:a16="http://schemas.microsoft.com/office/drawing/2014/main" id="{41F5745F-E770-D068-578F-3CFE5F9010C6}"/>
+                <a16:creationId xmlns:a16="http://schemas.microsoft.com/office/drawing/2014/main" id="{5BB9C49B-DCF1-143A-A6D1-697430514496}"/>
               </a:ext>
             </a:extLst>
           </p:cNvPr>
@@ -9878,10 +10115,10 @@
       </p:sp>
       <p:sp>
         <p:nvSpPr>
-          <p:cNvPr id="4" name="Slide Number Placeholder 4">
-            <a:extLst>
-              <a:ext uri="{FF2B5EF4-FFF2-40B4-BE49-F238E27FC236}">
-                <a16:creationId xmlns:a16="http://schemas.microsoft.com/office/drawing/2014/main" id="{86BBD80D-924B-9698-2026-C1006CEB90DA}"/>
+          <p:cNvPr id="8" name="Slide Number Placeholder 4">
+            <a:extLst>
+              <a:ext uri="{FF2B5EF4-FFF2-40B4-BE49-F238E27FC236}">
+                <a16:creationId xmlns:a16="http://schemas.microsoft.com/office/drawing/2014/main" id="{EDE1152F-175C-20F7-CC6E-942DEEDE492B}"/>
               </a:ext>
             </a:extLst>
           </p:cNvPr>
@@ -9892,7 +10129,7 @@
         </p:nvSpPr>
         <p:spPr>
           <a:xfrm>
-            <a:off x="-3278188" y="6172200"/>
+            <a:off x="455612" y="6190488"/>
             <a:ext cx="2677604" cy="210312"/>
           </a:xfrm>
           <a:prstGeom prst="rect">
@@ -10007,23 +10244,326 @@
           </a:p>
         </p:txBody>
       </p:sp>
+      <p:sp>
+        <p:nvSpPr>
+          <p:cNvPr id="9" name="TextBox 8">
+            <a:extLst>
+              <a:ext uri="{FF2B5EF4-FFF2-40B4-BE49-F238E27FC236}">
+                <a16:creationId xmlns:a16="http://schemas.microsoft.com/office/drawing/2014/main" id="{3FB093B5-258F-7C19-DD44-80C1304BE3A0}"/>
+              </a:ext>
+            </a:extLst>
+          </p:cNvPr>
+          <p:cNvSpPr txBox="1"/>
+          <p:nvPr/>
+        </p:nvSpPr>
+        <p:spPr>
+          <a:xfrm>
+            <a:off x="531812" y="937728"/>
+            <a:ext cx="4800600" cy="5111656"/>
+          </a:xfrm>
+          <a:prstGeom prst="rect">
+            <a:avLst/>
+          </a:prstGeom>
+          <a:noFill/>
+        </p:spPr>
+        <p:txBody>
+          <a:bodyPr wrap="square" rtlCol="0">
+            <a:spAutoFit/>
+          </a:bodyPr>
+          <a:lstStyle/>
+          <a:p>
+            <a:pPr marL="304747" indent="-304747">
+              <a:lnSpc>
+                <a:spcPct val="95000"/>
+              </a:lnSpc>
+              <a:spcBef>
+                <a:spcPts val="1866"/>
+              </a:spcBef>
+              <a:buClr>
+                <a:schemeClr val="accent6">
+                  <a:lumMod val="50000"/>
+                </a:schemeClr>
+              </a:buClr>
+              <a:buSzPct val="100000"/>
+              <a:buFont typeface="Arial" pitchFamily="34" charset="0"/>
+              <a:buNone/>
+            </a:pPr>
+            <a:r>
+              <a:rPr lang="en-US" sz="1800" i="1" dirty="0">
+                <a:solidFill>
+                  <a:schemeClr val="accent2">
+                    <a:lumMod val="50000"/>
+                  </a:schemeClr>
+                </a:solidFill>
+                <a:latin typeface="Bahnschrift SemiLight" panose="020B0502040204020203" pitchFamily="34" charset="0"/>
+              </a:rPr>
+              <a:t>Design Brief</a:t>
+            </a:r>
+          </a:p>
+          <a:p>
+            <a:pPr marL="304747" indent="-304747">
+              <a:lnSpc>
+                <a:spcPct val="95000"/>
+              </a:lnSpc>
+              <a:spcBef>
+                <a:spcPts val="1866"/>
+              </a:spcBef>
+              <a:buClr>
+                <a:schemeClr val="accent6">
+                  <a:lumMod val="50000"/>
+                </a:schemeClr>
+              </a:buClr>
+              <a:buSzPct val="100000"/>
+              <a:buFont typeface="Arial" pitchFamily="34" charset="0"/>
+              <a:buChar char="•"/>
+            </a:pPr>
+            <a:r>
+              <a:rPr lang="en-US" sz="1600" dirty="0">
+                <a:solidFill>
+                  <a:schemeClr val="accent2">
+                    <a:lumMod val="50000"/>
+                  </a:schemeClr>
+                </a:solidFill>
+                <a:latin typeface="Bahnschrift SemiLight" panose="020B0502040204020203" pitchFamily="34" charset="0"/>
+              </a:rPr>
+              <a:t>Compatible with all bin types (single/multi, supported/unsupported)</a:t>
+            </a:r>
+          </a:p>
+          <a:p>
+            <a:pPr marL="304747" indent="-304747">
+              <a:lnSpc>
+                <a:spcPct val="95000"/>
+              </a:lnSpc>
+              <a:spcBef>
+                <a:spcPts val="1866"/>
+              </a:spcBef>
+              <a:buClr>
+                <a:schemeClr val="accent6">
+                  <a:lumMod val="50000"/>
+                </a:schemeClr>
+              </a:buClr>
+              <a:buSzPct val="100000"/>
+              <a:buFont typeface="Arial" pitchFamily="34" charset="0"/>
+              <a:buChar char="•"/>
+            </a:pPr>
+            <a:r>
+              <a:rPr lang="en-US" sz="1600" dirty="0">
+                <a:solidFill>
+                  <a:schemeClr val="accent2">
+                    <a:lumMod val="50000"/>
+                  </a:schemeClr>
+                </a:solidFill>
+                <a:latin typeface="Bahnschrift SemiLight" panose="020B0502040204020203" pitchFamily="34" charset="0"/>
+              </a:rPr>
+              <a:t>Quick lid install/removal for reconfiguration</a:t>
+            </a:r>
+          </a:p>
+          <a:p>
+            <a:pPr marL="304747" indent="-304747">
+              <a:lnSpc>
+                <a:spcPct val="95000"/>
+              </a:lnSpc>
+              <a:spcBef>
+                <a:spcPts val="1866"/>
+              </a:spcBef>
+              <a:buClr>
+                <a:schemeClr val="accent6">
+                  <a:lumMod val="50000"/>
+                </a:schemeClr>
+              </a:buClr>
+              <a:buSzPct val="100000"/>
+              <a:buFont typeface="Arial" pitchFamily="34" charset="0"/>
+              <a:buChar char="•"/>
+            </a:pPr>
+            <a:r>
+              <a:rPr lang="en-US" sz="1600" dirty="0">
+                <a:solidFill>
+                  <a:schemeClr val="accent2">
+                    <a:lumMod val="50000"/>
+                  </a:schemeClr>
+                </a:solidFill>
+                <a:latin typeface="Bahnschrift SemiLight" panose="020B0502040204020203" pitchFamily="34" charset="0"/>
+              </a:rPr>
+              <a:t>Angled (non-vertical) openings to prevent overflow</a:t>
+            </a:r>
+          </a:p>
+          <a:p>
+            <a:pPr marL="304747" indent="-304747">
+              <a:lnSpc>
+                <a:spcPct val="95000"/>
+              </a:lnSpc>
+              <a:spcBef>
+                <a:spcPts val="1866"/>
+              </a:spcBef>
+              <a:buClr>
+                <a:schemeClr val="accent6">
+                  <a:lumMod val="50000"/>
+                </a:schemeClr>
+              </a:buClr>
+              <a:buSzPct val="100000"/>
+              <a:buFont typeface="Arial" pitchFamily="34" charset="0"/>
+              <a:buChar char="•"/>
+            </a:pPr>
+            <a:r>
+              <a:rPr lang="en-US" sz="1600" dirty="0">
+                <a:solidFill>
+                  <a:schemeClr val="accent2">
+                    <a:lumMod val="50000"/>
+                  </a:schemeClr>
+                </a:solidFill>
+                <a:latin typeface="Bahnschrift SemiLight" panose="020B0502040204020203" pitchFamily="34" charset="0"/>
+              </a:rPr>
+              <a:t>Low-contact user interaction</a:t>
+            </a:r>
+          </a:p>
+          <a:p>
+            <a:pPr marL="304747" indent="-304747">
+              <a:lnSpc>
+                <a:spcPct val="95000"/>
+              </a:lnSpc>
+              <a:spcBef>
+                <a:spcPts val="1866"/>
+              </a:spcBef>
+              <a:buClr>
+                <a:schemeClr val="accent6">
+                  <a:lumMod val="50000"/>
+                </a:schemeClr>
+              </a:buClr>
+              <a:buSzPct val="100000"/>
+              <a:buFont typeface="Arial" pitchFamily="34" charset="0"/>
+              <a:buChar char="•"/>
+            </a:pPr>
+            <a:r>
+              <a:rPr lang="en-US" sz="1600" dirty="0">
+                <a:solidFill>
+                  <a:schemeClr val="accent2">
+                    <a:lumMod val="50000"/>
+                  </a:schemeClr>
+                </a:solidFill>
+                <a:latin typeface="Bahnschrift SemiLight" panose="020B0502040204020203" pitchFamily="34" charset="0"/>
+              </a:rPr>
+              <a:t>Clear visual cues: color, text, and design</a:t>
+            </a:r>
+          </a:p>
+          <a:p>
+            <a:pPr marL="304747" indent="-304747">
+              <a:lnSpc>
+                <a:spcPct val="95000"/>
+              </a:lnSpc>
+              <a:spcBef>
+                <a:spcPts val="1866"/>
+              </a:spcBef>
+              <a:buClr>
+                <a:schemeClr val="accent6">
+                  <a:lumMod val="50000"/>
+                </a:schemeClr>
+              </a:buClr>
+              <a:buSzPct val="100000"/>
+              <a:buFont typeface="Arial" pitchFamily="34" charset="0"/>
+              <a:buChar char="•"/>
+            </a:pPr>
+            <a:r>
+              <a:rPr lang="en-US" sz="1600" dirty="0">
+                <a:solidFill>
+                  <a:schemeClr val="accent2">
+                    <a:lumMod val="50000"/>
+                  </a:schemeClr>
+                </a:solidFill>
+                <a:latin typeface="Bahnschrift SemiLight" panose="020B0502040204020203" pitchFamily="34" charset="0"/>
+              </a:rPr>
+              <a:t>Flexible segregation logic based on context/location</a:t>
+            </a:r>
+          </a:p>
+          <a:p>
+            <a:pPr marL="304747" indent="-304747">
+              <a:lnSpc>
+                <a:spcPct val="95000"/>
+              </a:lnSpc>
+              <a:spcBef>
+                <a:spcPts val="1866"/>
+              </a:spcBef>
+              <a:buClr>
+                <a:schemeClr val="accent6">
+                  <a:lumMod val="50000"/>
+                </a:schemeClr>
+              </a:buClr>
+              <a:buSzPct val="100000"/>
+              <a:buFont typeface="Arial" pitchFamily="34" charset="0"/>
+              <a:buChar char="•"/>
+            </a:pPr>
+            <a:r>
+              <a:rPr lang="en-US" sz="1600" dirty="0">
+                <a:solidFill>
+                  <a:schemeClr val="accent2">
+                    <a:lumMod val="50000"/>
+                  </a:schemeClr>
+                </a:solidFill>
+                <a:latin typeface="Bahnschrift SemiLight" panose="020B0502040204020203" pitchFamily="34" charset="0"/>
+              </a:rPr>
+              <a:t>Swappable labels for dynamic use cases</a:t>
+            </a:r>
+          </a:p>
+          <a:p>
+            <a:pPr marL="304747" indent="-304747">
+              <a:lnSpc>
+                <a:spcPct val="95000"/>
+              </a:lnSpc>
+              <a:spcBef>
+                <a:spcPts val="1866"/>
+              </a:spcBef>
+              <a:buClr>
+                <a:schemeClr val="accent6">
+                  <a:lumMod val="50000"/>
+                </a:schemeClr>
+              </a:buClr>
+              <a:buSzPct val="100000"/>
+              <a:buFont typeface="Arial" pitchFamily="34" charset="0"/>
+              <a:buChar char="•"/>
+            </a:pPr>
+            <a:r>
+              <a:rPr lang="en-US" sz="1600" dirty="0">
+                <a:solidFill>
+                  <a:schemeClr val="accent2">
+                    <a:lumMod val="50000"/>
+                  </a:schemeClr>
+                </a:solidFill>
+                <a:latin typeface="Bahnschrift SemiLight" panose="020B0502040204020203" pitchFamily="34" charset="0"/>
+              </a:rPr>
+              <a:t>Multiple color options for intuitive sorting</a:t>
+            </a:r>
+          </a:p>
+          <a:p>
+            <a:pPr>
+              <a:lnSpc>
+                <a:spcPct val="95000"/>
+              </a:lnSpc>
+            </a:pPr>
+            <a:endParaRPr lang="en-US" sz="1600" dirty="0">
+              <a:solidFill>
+                <a:srgbClr val="435F30"/>
+              </a:solidFill>
+              <a:latin typeface="Bahnschrift SemiBold" panose="020B0502040204020203" pitchFamily="34" charset="0"/>
+            </a:endParaRPr>
+          </a:p>
+        </p:txBody>
+      </p:sp>
     </p:spTree>
     <p:extLst>
       <p:ext uri="{BB962C8B-B14F-4D97-AF65-F5344CB8AC3E}">
-        <p14:creationId xmlns:p14="http://schemas.microsoft.com/office/powerpoint/2010/main" val="4073682777"/>
+        <p14:creationId xmlns:p14="http://schemas.microsoft.com/office/powerpoint/2010/main" val="904556556"/>
       </p:ext>
     </p:extLst>
   </p:cSld>
   <p:clrMapOvr>
     <a:masterClrMapping/>
   </p:clrMapOvr>
-  <mc:AlternateContent xmlns:mc="http://schemas.openxmlformats.org/markup-compatibility/2006" xmlns:p14="http://schemas.microsoft.com/office/powerpoint/2010/main">
-    <mc:Choice Requires="p14">
+  <mc:AlternateContent xmlns:mc="http://schemas.openxmlformats.org/markup-compatibility/2006">
+    <mc:Choice xmlns:p14="http://schemas.microsoft.com/office/powerpoint/2010/main" Requires="p14">
       <p:transition spd="med" p14:dur="700">
         <p:fade/>
       </p:transition>
     </mc:Choice>
-    <mc:Fallback xmlns="">
+    <mc:Fallback>
       <p:transition spd="med">
         <p:fade/>
       </p:transition>
@@ -10390,13 +10930,7 @@
   <p:cSld>
     <p:spTree>
       <p:nvGrpSpPr>
-        <p:cNvPr id="1" name="">
-          <a:extLst>
-            <a:ext uri="{FF2B5EF4-FFF2-40B4-BE49-F238E27FC236}">
-              <a16:creationId xmlns:a16="http://schemas.microsoft.com/office/drawing/2014/main" id="{FFB85F68-8123-6880-86CF-D39DE164CE9B}"/>
-            </a:ext>
-          </a:extLst>
-        </p:cNvPr>
+        <p:cNvPr id="1" name=""/>
         <p:cNvGrpSpPr/>
         <p:nvPr/>
       </p:nvGrpSpPr>
@@ -10413,7 +10947,7 @@
           <p:cNvPr id="2" name="Title 1">
             <a:extLst>
               <a:ext uri="{FF2B5EF4-FFF2-40B4-BE49-F238E27FC236}">
-                <a16:creationId xmlns:a16="http://schemas.microsoft.com/office/drawing/2014/main" id="{CB2FB0A1-DF3F-2C56-A9BE-2B2150E1E5F2}"/>
+                <a16:creationId xmlns:a16="http://schemas.microsoft.com/office/drawing/2014/main" id="{8C8292A8-8F69-9053-C83E-CFA06088F1A2}"/>
               </a:ext>
             </a:extLst>
           </p:cNvPr>
@@ -10429,10 +10963,7 @@
           <a:bodyPr/>
           <a:lstStyle/>
           <a:p>
-            <a:r>
-              <a:rPr lang="en-IN" dirty="0"/>
-              <a:t>Prototype Phase</a:t>
-            </a:r>
+            <a:endParaRPr lang="en-US"/>
           </a:p>
         </p:txBody>
       </p:sp>
@@ -10441,7 +10972,7 @@
           <p:cNvPr id="3" name="Content Placeholder 2">
             <a:extLst>
               <a:ext uri="{FF2B5EF4-FFF2-40B4-BE49-F238E27FC236}">
-                <a16:creationId xmlns:a16="http://schemas.microsoft.com/office/drawing/2014/main" id="{91139623-E418-9918-37FE-C29501924A8E}"/>
+                <a16:creationId xmlns:a16="http://schemas.microsoft.com/office/drawing/2014/main" id="{BC96A423-4923-1AF4-7E3F-AF6C5E29581C}"/>
               </a:ext>
             </a:extLst>
           </p:cNvPr>
@@ -10457,7 +10988,7 @@
           <a:bodyPr/>
           <a:lstStyle/>
           <a:p>
-            <a:endParaRPr lang="en-IN" dirty="0"/>
+            <a:endParaRPr lang="en-US"/>
           </a:p>
         </p:txBody>
       </p:sp>
@@ -10466,7 +10997,7 @@
           <p:cNvPr id="4" name="Content Placeholder 3">
             <a:extLst>
               <a:ext uri="{FF2B5EF4-FFF2-40B4-BE49-F238E27FC236}">
-                <a16:creationId xmlns:a16="http://schemas.microsoft.com/office/drawing/2014/main" id="{9B787AC9-EBC2-8A16-B408-255CE6BBC6B3}"/>
+                <a16:creationId xmlns:a16="http://schemas.microsoft.com/office/drawing/2014/main" id="{5333AA6C-63B3-5DB6-2FA1-8405388E36AA}"/>
               </a:ext>
             </a:extLst>
           </p:cNvPr>
@@ -10482,7 +11013,7 @@
           <a:bodyPr/>
           <a:lstStyle/>
           <a:p>
-            <a:endParaRPr lang="en-IN"/>
+            <a:endParaRPr lang="en-US"/>
           </a:p>
         </p:txBody>
       </p:sp>
@@ -10491,7 +11022,7 @@
           <p:cNvPr id="5" name="Slide Number Placeholder 4">
             <a:extLst>
               <a:ext uri="{FF2B5EF4-FFF2-40B4-BE49-F238E27FC236}">
-                <a16:creationId xmlns:a16="http://schemas.microsoft.com/office/drawing/2014/main" id="{85DF273A-9AB3-B5C3-9ADB-A4CF1A4262CD}"/>
+                <a16:creationId xmlns:a16="http://schemas.microsoft.com/office/drawing/2014/main" id="{4029AADF-761F-448B-FC64-9FCE69A1BED1}"/>
               </a:ext>
             </a:extLst>
           </p:cNvPr>
@@ -10516,141 +11047,10 @@
           </a:p>
         </p:txBody>
       </p:sp>
-      <p:sp>
-        <p:nvSpPr>
-          <p:cNvPr id="6" name="Slide Number Placeholder 4">
-            <a:extLst>
-              <a:ext uri="{FF2B5EF4-FFF2-40B4-BE49-F238E27FC236}">
-                <a16:creationId xmlns:a16="http://schemas.microsoft.com/office/drawing/2014/main" id="{2C10F4A0-3974-7A60-C519-09E70A08BDEC}"/>
-              </a:ext>
-            </a:extLst>
-          </p:cNvPr>
-          <p:cNvSpPr txBox="1">
-            <a:spLocks/>
-          </p:cNvSpPr>
-          <p:nvPr/>
-        </p:nvSpPr>
-        <p:spPr>
-          <a:xfrm>
-            <a:off x="455612" y="6190488"/>
-            <a:ext cx="2677604" cy="210312"/>
-          </a:xfrm>
-          <a:prstGeom prst="rect">
-            <a:avLst/>
-          </a:prstGeom>
-        </p:spPr>
-        <p:txBody>
-          <a:bodyPr vert="horz" lIns="121899" tIns="60949" rIns="121899" bIns="60949" rtlCol="0" anchor="b"/>
-          <a:lstStyle>
-            <a:defPPr>
-              <a:defRPr lang="en-US"/>
-            </a:defPPr>
-            <a:lvl1pPr marL="0" algn="r" defTabSz="1218987" rtl="0" eaLnBrk="1" latinLnBrk="0" hangingPunct="1">
-              <a:defRPr sz="1000" b="1" kern="1200" spc="200" baseline="0">
-                <a:solidFill>
-                  <a:schemeClr val="tx2">
-                    <a:lumMod val="50000"/>
-                  </a:schemeClr>
-                </a:solidFill>
-                <a:latin typeface="+mn-lt"/>
-                <a:ea typeface="+mn-ea"/>
-                <a:cs typeface="+mn-cs"/>
-              </a:defRPr>
-            </a:lvl1pPr>
-            <a:lvl2pPr marL="609493" algn="l" defTabSz="1218987" rtl="0" eaLnBrk="1" latinLnBrk="0" hangingPunct="1">
-              <a:defRPr sz="2400" kern="1200">
-                <a:solidFill>
-                  <a:schemeClr val="tx1"/>
-                </a:solidFill>
-                <a:latin typeface="+mn-lt"/>
-                <a:ea typeface="+mn-ea"/>
-                <a:cs typeface="+mn-cs"/>
-              </a:defRPr>
-            </a:lvl2pPr>
-            <a:lvl3pPr marL="1218987" algn="l" defTabSz="1218987" rtl="0" eaLnBrk="1" latinLnBrk="0" hangingPunct="1">
-              <a:defRPr sz="2400" kern="1200">
-                <a:solidFill>
-                  <a:schemeClr val="tx1"/>
-                </a:solidFill>
-                <a:latin typeface="+mn-lt"/>
-                <a:ea typeface="+mn-ea"/>
-                <a:cs typeface="+mn-cs"/>
-              </a:defRPr>
-            </a:lvl3pPr>
-            <a:lvl4pPr marL="1828480" algn="l" defTabSz="1218987" rtl="0" eaLnBrk="1" latinLnBrk="0" hangingPunct="1">
-              <a:defRPr sz="2400" kern="1200">
-                <a:solidFill>
-                  <a:schemeClr val="tx1"/>
-                </a:solidFill>
-                <a:latin typeface="+mn-lt"/>
-                <a:ea typeface="+mn-ea"/>
-                <a:cs typeface="+mn-cs"/>
-              </a:defRPr>
-            </a:lvl4pPr>
-            <a:lvl5pPr marL="2437973" algn="l" defTabSz="1218987" rtl="0" eaLnBrk="1" latinLnBrk="0" hangingPunct="1">
-              <a:defRPr sz="2400" kern="1200">
-                <a:solidFill>
-                  <a:schemeClr val="tx1"/>
-                </a:solidFill>
-                <a:latin typeface="+mn-lt"/>
-                <a:ea typeface="+mn-ea"/>
-                <a:cs typeface="+mn-cs"/>
-              </a:defRPr>
-            </a:lvl5pPr>
-            <a:lvl6pPr marL="3047467" algn="l" defTabSz="1218987" rtl="0" eaLnBrk="1" latinLnBrk="0" hangingPunct="1">
-              <a:defRPr sz="2400" kern="1200">
-                <a:solidFill>
-                  <a:schemeClr val="tx1"/>
-                </a:solidFill>
-                <a:latin typeface="+mn-lt"/>
-                <a:ea typeface="+mn-ea"/>
-                <a:cs typeface="+mn-cs"/>
-              </a:defRPr>
-            </a:lvl6pPr>
-            <a:lvl7pPr marL="3656960" algn="l" defTabSz="1218987" rtl="0" eaLnBrk="1" latinLnBrk="0" hangingPunct="1">
-              <a:defRPr sz="2400" kern="1200">
-                <a:solidFill>
-                  <a:schemeClr val="tx1"/>
-                </a:solidFill>
-                <a:latin typeface="+mn-lt"/>
-                <a:ea typeface="+mn-ea"/>
-                <a:cs typeface="+mn-cs"/>
-              </a:defRPr>
-            </a:lvl7pPr>
-            <a:lvl8pPr marL="4266453" algn="l" defTabSz="1218987" rtl="0" eaLnBrk="1" latinLnBrk="0" hangingPunct="1">
-              <a:defRPr sz="2400" kern="1200">
-                <a:solidFill>
-                  <a:schemeClr val="tx1"/>
-                </a:solidFill>
-                <a:latin typeface="+mn-lt"/>
-                <a:ea typeface="+mn-ea"/>
-                <a:cs typeface="+mn-cs"/>
-              </a:defRPr>
-            </a:lvl8pPr>
-            <a:lvl9pPr marL="4875947" algn="l" defTabSz="1218987" rtl="0" eaLnBrk="1" latinLnBrk="0" hangingPunct="1">
-              <a:defRPr sz="2400" kern="1200">
-                <a:solidFill>
-                  <a:schemeClr val="tx1"/>
-                </a:solidFill>
-                <a:latin typeface="+mn-lt"/>
-                <a:ea typeface="+mn-ea"/>
-                <a:cs typeface="+mn-cs"/>
-              </a:defRPr>
-            </a:lvl9pPr>
-          </a:lstStyle>
-          <a:p>
-            <a:pPr algn="l"/>
-            <a:r>
-              <a:rPr lang="en-US" dirty="0"/>
-              <a:t>DES211 CAPSTONE PROJECT</a:t>
-            </a:r>
-          </a:p>
-        </p:txBody>
-      </p:sp>
     </p:spTree>
     <p:extLst>
       <p:ext uri="{BB962C8B-B14F-4D97-AF65-F5344CB8AC3E}">
-        <p14:creationId xmlns:p14="http://schemas.microsoft.com/office/powerpoint/2010/main" val="2902727585"/>
+        <p14:creationId xmlns:p14="http://schemas.microsoft.com/office/powerpoint/2010/main" val="3132027166"/>
       </p:ext>
     </p:extLst>
   </p:cSld>
@@ -10677,7 +11077,13 @@
   <p:cSld>
     <p:spTree>
       <p:nvGrpSpPr>
-        <p:cNvPr id="1" name=""/>
+        <p:cNvPr id="1" name="">
+          <a:extLst>
+            <a:ext uri="{FF2B5EF4-FFF2-40B4-BE49-F238E27FC236}">
+              <a16:creationId xmlns:a16="http://schemas.microsoft.com/office/drawing/2014/main" id="{FFB85F68-8123-6880-86CF-D39DE164CE9B}"/>
+            </a:ext>
+          </a:extLst>
+        </p:cNvPr>
         <p:cNvGrpSpPr/>
         <p:nvPr/>
       </p:nvGrpSpPr>
@@ -10694,7 +11100,7 @@
           <p:cNvPr id="2" name="Title 1">
             <a:extLst>
               <a:ext uri="{FF2B5EF4-FFF2-40B4-BE49-F238E27FC236}">
-                <a16:creationId xmlns:a16="http://schemas.microsoft.com/office/drawing/2014/main" id="{AADB5DC0-637B-33EB-9B61-EFB3DE503900}"/>
+                <a16:creationId xmlns:a16="http://schemas.microsoft.com/office/drawing/2014/main" id="{CB2FB0A1-DF3F-2C56-A9BE-2B2150E1E5F2}"/>
               </a:ext>
             </a:extLst>
           </p:cNvPr>
@@ -10710,7 +11116,10 @@
           <a:bodyPr/>
           <a:lstStyle/>
           <a:p>
-            <a:endParaRPr lang="en-IN"/>
+            <a:r>
+              <a:rPr lang="en-IN" dirty="0"/>
+              <a:t>Prototype Phase</a:t>
+            </a:r>
           </a:p>
         </p:txBody>
       </p:sp>
@@ -10719,7 +11128,7 @@
           <p:cNvPr id="3" name="Content Placeholder 2">
             <a:extLst>
               <a:ext uri="{FF2B5EF4-FFF2-40B4-BE49-F238E27FC236}">
-                <a16:creationId xmlns:a16="http://schemas.microsoft.com/office/drawing/2014/main" id="{54DEFFDB-126C-310C-5C89-434FDACA5F31}"/>
+                <a16:creationId xmlns:a16="http://schemas.microsoft.com/office/drawing/2014/main" id="{91139623-E418-9918-37FE-C29501924A8E}"/>
               </a:ext>
             </a:extLst>
           </p:cNvPr>
@@ -10735,16 +11144,16 @@
           <a:bodyPr/>
           <a:lstStyle/>
           <a:p>
-            <a:endParaRPr lang="en-IN"/>
-          </a:p>
-        </p:txBody>
-      </p:sp>
-      <p:sp>
-        <p:nvSpPr>
-          <p:cNvPr id="4" name="Picture Placeholder 3">
-            <a:extLst>
-              <a:ext uri="{FF2B5EF4-FFF2-40B4-BE49-F238E27FC236}">
-                <a16:creationId xmlns:a16="http://schemas.microsoft.com/office/drawing/2014/main" id="{84E988D3-CF35-4838-4D7E-194B8206E5F6}"/>
+            <a:endParaRPr lang="en-IN" dirty="0"/>
+          </a:p>
+        </p:txBody>
+      </p:sp>
+      <p:sp>
+        <p:nvSpPr>
+          <p:cNvPr id="4" name="Content Placeholder 3">
+            <a:extLst>
+              <a:ext uri="{FF2B5EF4-FFF2-40B4-BE49-F238E27FC236}">
+                <a16:creationId xmlns:a16="http://schemas.microsoft.com/office/drawing/2014/main" id="{9B787AC9-EBC2-8A16-B408-255CE6BBC6B3}"/>
               </a:ext>
             </a:extLst>
           </p:cNvPr>
@@ -10752,7 +11161,7 @@
             <a:spLocks noGrp="1"/>
           </p:cNvSpPr>
           <p:nvPr>
-            <p:ph type="pic" sz="quarter" idx="14"/>
+            <p:ph sz="quarter" idx="14"/>
           </p:nvPr>
         </p:nvSpPr>
         <p:spPr/>
@@ -10760,7 +11169,7 @@
           <a:bodyPr/>
           <a:lstStyle/>
           <a:p>
-            <a:endParaRPr lang="en-US"/>
+            <a:endParaRPr lang="en-IN"/>
           </a:p>
         </p:txBody>
       </p:sp>
@@ -10769,7 +11178,7 @@
           <p:cNvPr id="5" name="Slide Number Placeholder 4">
             <a:extLst>
               <a:ext uri="{FF2B5EF4-FFF2-40B4-BE49-F238E27FC236}">
-                <a16:creationId xmlns:a16="http://schemas.microsoft.com/office/drawing/2014/main" id="{ECB92C49-500A-83A9-A98E-071CD7B4CF66}"/>
+                <a16:creationId xmlns:a16="http://schemas.microsoft.com/office/drawing/2014/main" id="{85DF273A-9AB3-B5C3-9ADB-A4CF1A4262CD}"/>
               </a:ext>
             </a:extLst>
           </p:cNvPr>
@@ -10799,7 +11208,7 @@
           <p:cNvPr id="6" name="Slide Number Placeholder 4">
             <a:extLst>
               <a:ext uri="{FF2B5EF4-FFF2-40B4-BE49-F238E27FC236}">
-                <a16:creationId xmlns:a16="http://schemas.microsoft.com/office/drawing/2014/main" id="{3F841A1B-DBD5-E8AC-6353-E738060B9317}"/>
+                <a16:creationId xmlns:a16="http://schemas.microsoft.com/office/drawing/2014/main" id="{2C10F4A0-3974-7A60-C519-09E70A08BDEC}"/>
               </a:ext>
             </a:extLst>
           </p:cNvPr>
@@ -10928,7 +11337,7 @@
     </p:spTree>
     <p:extLst>
       <p:ext uri="{BB962C8B-B14F-4D97-AF65-F5344CB8AC3E}">
-        <p14:creationId xmlns:p14="http://schemas.microsoft.com/office/powerpoint/2010/main" val="1871765083"/>
+        <p14:creationId xmlns:p14="http://schemas.microsoft.com/office/powerpoint/2010/main" val="2902727585"/>
       </p:ext>
     </p:extLst>
   </p:cSld>
@@ -10972,7 +11381,7 @@
           <p:cNvPr id="2" name="Title 1">
             <a:extLst>
               <a:ext uri="{FF2B5EF4-FFF2-40B4-BE49-F238E27FC236}">
-                <a16:creationId xmlns:a16="http://schemas.microsoft.com/office/drawing/2014/main" id="{3691652E-4125-782A-0F3D-C13ED2979900}"/>
+                <a16:creationId xmlns:a16="http://schemas.microsoft.com/office/drawing/2014/main" id="{AADB5DC0-637B-33EB-9B61-EFB3DE503900}"/>
               </a:ext>
             </a:extLst>
           </p:cNvPr>
@@ -10997,7 +11406,7 @@
           <p:cNvPr id="3" name="Content Placeholder 2">
             <a:extLst>
               <a:ext uri="{FF2B5EF4-FFF2-40B4-BE49-F238E27FC236}">
-                <a16:creationId xmlns:a16="http://schemas.microsoft.com/office/drawing/2014/main" id="{C7EE9B6C-C4DB-433D-ADAB-6B49E2BC80AB}"/>
+                <a16:creationId xmlns:a16="http://schemas.microsoft.com/office/drawing/2014/main" id="{54DEFFDB-126C-310C-5C89-434FDACA5F31}"/>
               </a:ext>
             </a:extLst>
           </p:cNvPr>
@@ -11022,7 +11431,7 @@
           <p:cNvPr id="4" name="Picture Placeholder 3">
             <a:extLst>
               <a:ext uri="{FF2B5EF4-FFF2-40B4-BE49-F238E27FC236}">
-                <a16:creationId xmlns:a16="http://schemas.microsoft.com/office/drawing/2014/main" id="{F26B7286-44C7-3395-7091-9C3CF7134780}"/>
+                <a16:creationId xmlns:a16="http://schemas.microsoft.com/office/drawing/2014/main" id="{84E988D3-CF35-4838-4D7E-194B8206E5F6}"/>
               </a:ext>
             </a:extLst>
           </p:cNvPr>
@@ -11047,7 +11456,7 @@
           <p:cNvPr id="5" name="Slide Number Placeholder 4">
             <a:extLst>
               <a:ext uri="{FF2B5EF4-FFF2-40B4-BE49-F238E27FC236}">
-                <a16:creationId xmlns:a16="http://schemas.microsoft.com/office/drawing/2014/main" id="{771CACD5-DC8F-E562-D34B-63ACEED10192}"/>
+                <a16:creationId xmlns:a16="http://schemas.microsoft.com/office/drawing/2014/main" id="{ECB92C49-500A-83A9-A98E-071CD7B4CF66}"/>
               </a:ext>
             </a:extLst>
           </p:cNvPr>
@@ -11077,7 +11486,7 @@
           <p:cNvPr id="6" name="Slide Number Placeholder 4">
             <a:extLst>
               <a:ext uri="{FF2B5EF4-FFF2-40B4-BE49-F238E27FC236}">
-                <a16:creationId xmlns:a16="http://schemas.microsoft.com/office/drawing/2014/main" id="{FC397AB4-E7B3-064C-48F7-B4F336380CBA}"/>
+                <a16:creationId xmlns:a16="http://schemas.microsoft.com/office/drawing/2014/main" id="{3F841A1B-DBD5-E8AC-6353-E738060B9317}"/>
               </a:ext>
             </a:extLst>
           </p:cNvPr>
@@ -11206,7 +11615,7 @@
     </p:spTree>
     <p:extLst>
       <p:ext uri="{BB962C8B-B14F-4D97-AF65-F5344CB8AC3E}">
-        <p14:creationId xmlns:p14="http://schemas.microsoft.com/office/powerpoint/2010/main" val="2540403346"/>
+        <p14:creationId xmlns:p14="http://schemas.microsoft.com/office/powerpoint/2010/main" val="1871765083"/>
       </p:ext>
     </p:extLst>
   </p:cSld>
@@ -11250,7 +11659,7 @@
           <p:cNvPr id="2" name="Title 1">
             <a:extLst>
               <a:ext uri="{FF2B5EF4-FFF2-40B4-BE49-F238E27FC236}">
-                <a16:creationId xmlns:a16="http://schemas.microsoft.com/office/drawing/2014/main" id="{E5BB7D67-76BC-2F76-6A7E-93CF1B03CA9B}"/>
+                <a16:creationId xmlns:a16="http://schemas.microsoft.com/office/drawing/2014/main" id="{3691652E-4125-782A-0F3D-C13ED2979900}"/>
               </a:ext>
             </a:extLst>
           </p:cNvPr>
@@ -11275,7 +11684,7 @@
           <p:cNvPr id="3" name="Content Placeholder 2">
             <a:extLst>
               <a:ext uri="{FF2B5EF4-FFF2-40B4-BE49-F238E27FC236}">
-                <a16:creationId xmlns:a16="http://schemas.microsoft.com/office/drawing/2014/main" id="{481F0043-5374-9370-B17A-15CAD56ADF84}"/>
+                <a16:creationId xmlns:a16="http://schemas.microsoft.com/office/drawing/2014/main" id="{C7EE9B6C-C4DB-433D-ADAB-6B49E2BC80AB}"/>
               </a:ext>
             </a:extLst>
           </p:cNvPr>
@@ -11300,7 +11709,7 @@
           <p:cNvPr id="4" name="Picture Placeholder 3">
             <a:extLst>
               <a:ext uri="{FF2B5EF4-FFF2-40B4-BE49-F238E27FC236}">
-                <a16:creationId xmlns:a16="http://schemas.microsoft.com/office/drawing/2014/main" id="{B57F297D-5244-EB01-2D2D-30DC341E469D}"/>
+                <a16:creationId xmlns:a16="http://schemas.microsoft.com/office/drawing/2014/main" id="{F26B7286-44C7-3395-7091-9C3CF7134780}"/>
               </a:ext>
             </a:extLst>
           </p:cNvPr>
@@ -11325,7 +11734,7 @@
           <p:cNvPr id="5" name="Slide Number Placeholder 4">
             <a:extLst>
               <a:ext uri="{FF2B5EF4-FFF2-40B4-BE49-F238E27FC236}">
-                <a16:creationId xmlns:a16="http://schemas.microsoft.com/office/drawing/2014/main" id="{C6881C2A-23D8-2323-B89B-98E5EBD584F6}"/>
+                <a16:creationId xmlns:a16="http://schemas.microsoft.com/office/drawing/2014/main" id="{771CACD5-DC8F-E562-D34B-63ACEED10192}"/>
               </a:ext>
             </a:extLst>
           </p:cNvPr>
@@ -11355,7 +11764,7 @@
           <p:cNvPr id="6" name="Slide Number Placeholder 4">
             <a:extLst>
               <a:ext uri="{FF2B5EF4-FFF2-40B4-BE49-F238E27FC236}">
-                <a16:creationId xmlns:a16="http://schemas.microsoft.com/office/drawing/2014/main" id="{1466C1CC-3C62-38E8-78DE-98C589A6C039}"/>
+                <a16:creationId xmlns:a16="http://schemas.microsoft.com/office/drawing/2014/main" id="{FC397AB4-E7B3-064C-48F7-B4F336380CBA}"/>
               </a:ext>
             </a:extLst>
           </p:cNvPr>
@@ -11484,7 +11893,7 @@
     </p:spTree>
     <p:extLst>
       <p:ext uri="{BB962C8B-B14F-4D97-AF65-F5344CB8AC3E}">
-        <p14:creationId xmlns:p14="http://schemas.microsoft.com/office/powerpoint/2010/main" val="1188192135"/>
+        <p14:creationId xmlns:p14="http://schemas.microsoft.com/office/powerpoint/2010/main" val="2540403346"/>
       </p:ext>
     </p:extLst>
   </p:cSld>
@@ -11528,7 +11937,7 @@
           <p:cNvPr id="2" name="Title 1">
             <a:extLst>
               <a:ext uri="{FF2B5EF4-FFF2-40B4-BE49-F238E27FC236}">
-                <a16:creationId xmlns:a16="http://schemas.microsoft.com/office/drawing/2014/main" id="{2BD7C78A-703A-694E-8FFC-38843E2ED0D5}"/>
+                <a16:creationId xmlns:a16="http://schemas.microsoft.com/office/drawing/2014/main" id="{E5BB7D67-76BC-2F76-6A7E-93CF1B03CA9B}"/>
               </a:ext>
             </a:extLst>
           </p:cNvPr>
@@ -11553,7 +11962,7 @@
           <p:cNvPr id="3" name="Content Placeholder 2">
             <a:extLst>
               <a:ext uri="{FF2B5EF4-FFF2-40B4-BE49-F238E27FC236}">
-                <a16:creationId xmlns:a16="http://schemas.microsoft.com/office/drawing/2014/main" id="{12D21900-DBB9-221C-76E0-EDDD133DAC6B}"/>
+                <a16:creationId xmlns:a16="http://schemas.microsoft.com/office/drawing/2014/main" id="{481F0043-5374-9370-B17A-15CAD56ADF84}"/>
               </a:ext>
             </a:extLst>
           </p:cNvPr>
@@ -11578,7 +11987,7 @@
           <p:cNvPr id="4" name="Picture Placeholder 3">
             <a:extLst>
               <a:ext uri="{FF2B5EF4-FFF2-40B4-BE49-F238E27FC236}">
-                <a16:creationId xmlns:a16="http://schemas.microsoft.com/office/drawing/2014/main" id="{32AEFEA6-A660-5D12-A8F7-5BB4222EFB74}"/>
+                <a16:creationId xmlns:a16="http://schemas.microsoft.com/office/drawing/2014/main" id="{B57F297D-5244-EB01-2D2D-30DC341E469D}"/>
               </a:ext>
             </a:extLst>
           </p:cNvPr>
@@ -11603,7 +12012,7 @@
           <p:cNvPr id="5" name="Slide Number Placeholder 4">
             <a:extLst>
               <a:ext uri="{FF2B5EF4-FFF2-40B4-BE49-F238E27FC236}">
-                <a16:creationId xmlns:a16="http://schemas.microsoft.com/office/drawing/2014/main" id="{4DFB636B-8EED-D8C9-B88E-532B23AEFD21}"/>
+                <a16:creationId xmlns:a16="http://schemas.microsoft.com/office/drawing/2014/main" id="{C6881C2A-23D8-2323-B89B-98E5EBD584F6}"/>
               </a:ext>
             </a:extLst>
           </p:cNvPr>
@@ -11633,7 +12042,7 @@
           <p:cNvPr id="6" name="Slide Number Placeholder 4">
             <a:extLst>
               <a:ext uri="{FF2B5EF4-FFF2-40B4-BE49-F238E27FC236}">
-                <a16:creationId xmlns:a16="http://schemas.microsoft.com/office/drawing/2014/main" id="{36B8F459-6F30-1450-5D41-1997E9CEE977}"/>
+                <a16:creationId xmlns:a16="http://schemas.microsoft.com/office/drawing/2014/main" id="{1466C1CC-3C62-38E8-78DE-98C589A6C039}"/>
               </a:ext>
             </a:extLst>
           </p:cNvPr>
@@ -11762,7 +12171,7 @@
     </p:spTree>
     <p:extLst>
       <p:ext uri="{BB962C8B-B14F-4D97-AF65-F5344CB8AC3E}">
-        <p14:creationId xmlns:p14="http://schemas.microsoft.com/office/powerpoint/2010/main" val="3262945818"/>
+        <p14:creationId xmlns:p14="http://schemas.microsoft.com/office/powerpoint/2010/main" val="1188192135"/>
       </p:ext>
     </p:extLst>
   </p:cSld>
@@ -11806,7 +12215,7 @@
           <p:cNvPr id="2" name="Title 1">
             <a:extLst>
               <a:ext uri="{FF2B5EF4-FFF2-40B4-BE49-F238E27FC236}">
-                <a16:creationId xmlns:a16="http://schemas.microsoft.com/office/drawing/2014/main" id="{0B4D0D16-67A0-9392-36C4-38AEF1EFD705}"/>
+                <a16:creationId xmlns:a16="http://schemas.microsoft.com/office/drawing/2014/main" id="{2BD7C78A-703A-694E-8FFC-38843E2ED0D5}"/>
               </a:ext>
             </a:extLst>
           </p:cNvPr>
@@ -11831,7 +12240,7 @@
           <p:cNvPr id="3" name="Content Placeholder 2">
             <a:extLst>
               <a:ext uri="{FF2B5EF4-FFF2-40B4-BE49-F238E27FC236}">
-                <a16:creationId xmlns:a16="http://schemas.microsoft.com/office/drawing/2014/main" id="{639F28B0-AE40-DF8E-76CA-380B2FBF75D9}"/>
+                <a16:creationId xmlns:a16="http://schemas.microsoft.com/office/drawing/2014/main" id="{12D21900-DBB9-221C-76E0-EDDD133DAC6B}"/>
               </a:ext>
             </a:extLst>
           </p:cNvPr>
@@ -11853,10 +12262,10 @@
       </p:sp>
       <p:sp>
         <p:nvSpPr>
-          <p:cNvPr id="4" name="Content Placeholder 3">
-            <a:extLst>
-              <a:ext uri="{FF2B5EF4-FFF2-40B4-BE49-F238E27FC236}">
-                <a16:creationId xmlns:a16="http://schemas.microsoft.com/office/drawing/2014/main" id="{E1B2001F-94BD-7F0A-56F1-F7B277AF3CC6}"/>
+          <p:cNvPr id="4" name="Picture Placeholder 3">
+            <a:extLst>
+              <a:ext uri="{FF2B5EF4-FFF2-40B4-BE49-F238E27FC236}">
+                <a16:creationId xmlns:a16="http://schemas.microsoft.com/office/drawing/2014/main" id="{32AEFEA6-A660-5D12-A8F7-5BB4222EFB74}"/>
               </a:ext>
             </a:extLst>
           </p:cNvPr>
@@ -11864,7 +12273,7 @@
             <a:spLocks noGrp="1"/>
           </p:cNvSpPr>
           <p:nvPr>
-            <p:ph sz="quarter" idx="14"/>
+            <p:ph type="pic" sz="quarter" idx="14"/>
           </p:nvPr>
         </p:nvSpPr>
         <p:spPr/>
@@ -11872,7 +12281,7 @@
           <a:bodyPr/>
           <a:lstStyle/>
           <a:p>
-            <a:endParaRPr lang="en-IN"/>
+            <a:endParaRPr lang="en-US"/>
           </a:p>
         </p:txBody>
       </p:sp>
@@ -11881,7 +12290,7 @@
           <p:cNvPr id="5" name="Slide Number Placeholder 4">
             <a:extLst>
               <a:ext uri="{FF2B5EF4-FFF2-40B4-BE49-F238E27FC236}">
-                <a16:creationId xmlns:a16="http://schemas.microsoft.com/office/drawing/2014/main" id="{DE249310-06ED-CE6D-9342-95110ABFA82A}"/>
+                <a16:creationId xmlns:a16="http://schemas.microsoft.com/office/drawing/2014/main" id="{4DFB636B-8EED-D8C9-B88E-532B23AEFD21}"/>
               </a:ext>
             </a:extLst>
           </p:cNvPr>
@@ -11911,7 +12320,7 @@
           <p:cNvPr id="6" name="Slide Number Placeholder 4">
             <a:extLst>
               <a:ext uri="{FF2B5EF4-FFF2-40B4-BE49-F238E27FC236}">
-                <a16:creationId xmlns:a16="http://schemas.microsoft.com/office/drawing/2014/main" id="{150241C0-6662-9989-D473-E5D8BFD58F6F}"/>
+                <a16:creationId xmlns:a16="http://schemas.microsoft.com/office/drawing/2014/main" id="{36B8F459-6F30-1450-5D41-1997E9CEE977}"/>
               </a:ext>
             </a:extLst>
           </p:cNvPr>
@@ -12040,7 +12449,7 @@
     </p:spTree>
     <p:extLst>
       <p:ext uri="{BB962C8B-B14F-4D97-AF65-F5344CB8AC3E}">
-        <p14:creationId xmlns:p14="http://schemas.microsoft.com/office/powerpoint/2010/main" val="2633488709"/>
+        <p14:creationId xmlns:p14="http://schemas.microsoft.com/office/powerpoint/2010/main" val="3262945818"/>
       </p:ext>
     </p:extLst>
   </p:cSld>
@@ -12459,7 +12868,7 @@
           <p:cNvPr id="2" name="Title 1">
             <a:extLst>
               <a:ext uri="{FF2B5EF4-FFF2-40B4-BE49-F238E27FC236}">
-                <a16:creationId xmlns:a16="http://schemas.microsoft.com/office/drawing/2014/main" id="{3870CE6E-495D-1808-5A8C-EC4D855C5587}"/>
+                <a16:creationId xmlns:a16="http://schemas.microsoft.com/office/drawing/2014/main" id="{0B4D0D16-67A0-9392-36C4-38AEF1EFD705}"/>
               </a:ext>
             </a:extLst>
           </p:cNvPr>
@@ -12475,10 +12884,7 @@
           <a:bodyPr/>
           <a:lstStyle/>
           <a:p>
-            <a:r>
-              <a:rPr lang="en-IN" dirty="0"/>
-              <a:t>Testing Phase</a:t>
-            </a:r>
+            <a:endParaRPr lang="en-IN"/>
           </a:p>
         </p:txBody>
       </p:sp>
@@ -12487,7 +12893,7 @@
           <p:cNvPr id="3" name="Content Placeholder 2">
             <a:extLst>
               <a:ext uri="{FF2B5EF4-FFF2-40B4-BE49-F238E27FC236}">
-                <a16:creationId xmlns:a16="http://schemas.microsoft.com/office/drawing/2014/main" id="{B0EEF2E2-7250-905A-9F8E-5BB773C92FF2}"/>
+                <a16:creationId xmlns:a16="http://schemas.microsoft.com/office/drawing/2014/main" id="{639F28B0-AE40-DF8E-76CA-380B2FBF75D9}"/>
               </a:ext>
             </a:extLst>
           </p:cNvPr>
@@ -12512,7 +12918,7 @@
           <p:cNvPr id="4" name="Content Placeholder 3">
             <a:extLst>
               <a:ext uri="{FF2B5EF4-FFF2-40B4-BE49-F238E27FC236}">
-                <a16:creationId xmlns:a16="http://schemas.microsoft.com/office/drawing/2014/main" id="{2A8D0320-4D4B-365D-2F4F-3045D1A7C46C}"/>
+                <a16:creationId xmlns:a16="http://schemas.microsoft.com/office/drawing/2014/main" id="{E1B2001F-94BD-7F0A-56F1-F7B277AF3CC6}"/>
               </a:ext>
             </a:extLst>
           </p:cNvPr>
@@ -12537,7 +12943,7 @@
           <p:cNvPr id="5" name="Slide Number Placeholder 4">
             <a:extLst>
               <a:ext uri="{FF2B5EF4-FFF2-40B4-BE49-F238E27FC236}">
-                <a16:creationId xmlns:a16="http://schemas.microsoft.com/office/drawing/2014/main" id="{E7948434-32DA-F1E2-FC11-F2978017F64B}"/>
+                <a16:creationId xmlns:a16="http://schemas.microsoft.com/office/drawing/2014/main" id="{DE249310-06ED-CE6D-9342-95110ABFA82A}"/>
               </a:ext>
             </a:extLst>
           </p:cNvPr>
@@ -12567,7 +12973,7 @@
           <p:cNvPr id="6" name="Slide Number Placeholder 4">
             <a:extLst>
               <a:ext uri="{FF2B5EF4-FFF2-40B4-BE49-F238E27FC236}">
-                <a16:creationId xmlns:a16="http://schemas.microsoft.com/office/drawing/2014/main" id="{5ECD9DAA-C767-07CC-5C79-8738D4F306A7}"/>
+                <a16:creationId xmlns:a16="http://schemas.microsoft.com/office/drawing/2014/main" id="{150241C0-6662-9989-D473-E5D8BFD58F6F}"/>
               </a:ext>
             </a:extLst>
           </p:cNvPr>
@@ -12696,7 +13102,7 @@
     </p:spTree>
     <p:extLst>
       <p:ext uri="{BB962C8B-B14F-4D97-AF65-F5344CB8AC3E}">
-        <p14:creationId xmlns:p14="http://schemas.microsoft.com/office/powerpoint/2010/main" val="825357147"/>
+        <p14:creationId xmlns:p14="http://schemas.microsoft.com/office/powerpoint/2010/main" val="2633488709"/>
       </p:ext>
     </p:extLst>
   </p:cSld>
@@ -12740,7 +13146,7 @@
           <p:cNvPr id="2" name="Title 1">
             <a:extLst>
               <a:ext uri="{FF2B5EF4-FFF2-40B4-BE49-F238E27FC236}">
-                <a16:creationId xmlns:a16="http://schemas.microsoft.com/office/drawing/2014/main" id="{64983D13-B3DC-F5A2-EC3C-9AA3827FF06F}"/>
+                <a16:creationId xmlns:a16="http://schemas.microsoft.com/office/drawing/2014/main" id="{3870CE6E-495D-1808-5A8C-EC4D855C5587}"/>
               </a:ext>
             </a:extLst>
           </p:cNvPr>
@@ -12756,16 +13162,19 @@
           <a:bodyPr/>
           <a:lstStyle/>
           <a:p>
-            <a:endParaRPr lang="en-IN"/>
-          </a:p>
-        </p:txBody>
-      </p:sp>
-      <p:sp>
-        <p:nvSpPr>
-          <p:cNvPr id="3" name="Picture Placeholder 2">
-            <a:extLst>
-              <a:ext uri="{FF2B5EF4-FFF2-40B4-BE49-F238E27FC236}">
-                <a16:creationId xmlns:a16="http://schemas.microsoft.com/office/drawing/2014/main" id="{57620467-CA16-1C06-152E-31CFC11FAB8D}"/>
+            <a:r>
+              <a:rPr lang="en-IN" dirty="0"/>
+              <a:t>Testing Phase</a:t>
+            </a:r>
+          </a:p>
+        </p:txBody>
+      </p:sp>
+      <p:sp>
+        <p:nvSpPr>
+          <p:cNvPr id="3" name="Content Placeholder 2">
+            <a:extLst>
+              <a:ext uri="{FF2B5EF4-FFF2-40B4-BE49-F238E27FC236}">
+                <a16:creationId xmlns:a16="http://schemas.microsoft.com/office/drawing/2014/main" id="{B0EEF2E2-7250-905A-9F8E-5BB773C92FF2}"/>
               </a:ext>
             </a:extLst>
           </p:cNvPr>
@@ -12773,7 +13182,7 @@
             <a:spLocks noGrp="1"/>
           </p:cNvSpPr>
           <p:nvPr>
-            <p:ph type="pic" sz="quarter" idx="10"/>
+            <p:ph sz="quarter" idx="13"/>
           </p:nvPr>
         </p:nvSpPr>
         <p:spPr/>
@@ -12781,7 +13190,32 @@
           <a:bodyPr/>
           <a:lstStyle/>
           <a:p>
-            <a:endParaRPr lang="en-US"/>
+            <a:endParaRPr lang="en-IN"/>
+          </a:p>
+        </p:txBody>
+      </p:sp>
+      <p:sp>
+        <p:nvSpPr>
+          <p:cNvPr id="4" name="Content Placeholder 3">
+            <a:extLst>
+              <a:ext uri="{FF2B5EF4-FFF2-40B4-BE49-F238E27FC236}">
+                <a16:creationId xmlns:a16="http://schemas.microsoft.com/office/drawing/2014/main" id="{2A8D0320-4D4B-365D-2F4F-3045D1A7C46C}"/>
+              </a:ext>
+            </a:extLst>
+          </p:cNvPr>
+          <p:cNvSpPr>
+            <a:spLocks noGrp="1"/>
+          </p:cNvSpPr>
+          <p:nvPr>
+            <p:ph sz="quarter" idx="14"/>
+          </p:nvPr>
+        </p:nvSpPr>
+        <p:spPr/>
+        <p:txBody>
+          <a:bodyPr/>
+          <a:lstStyle/>
+          <a:p>
+            <a:endParaRPr lang="en-IN"/>
           </a:p>
         </p:txBody>
       </p:sp>
@@ -12790,7 +13224,37 @@
           <p:cNvPr id="5" name="Slide Number Placeholder 4">
             <a:extLst>
               <a:ext uri="{FF2B5EF4-FFF2-40B4-BE49-F238E27FC236}">
-                <a16:creationId xmlns:a16="http://schemas.microsoft.com/office/drawing/2014/main" id="{19257D08-7BDC-2EFF-F790-09A4B6BCCC7B}"/>
+                <a16:creationId xmlns:a16="http://schemas.microsoft.com/office/drawing/2014/main" id="{E7948434-32DA-F1E2-FC11-F2978017F64B}"/>
+              </a:ext>
+            </a:extLst>
+          </p:cNvPr>
+          <p:cNvSpPr>
+            <a:spLocks noGrp="1"/>
+          </p:cNvSpPr>
+          <p:nvPr>
+            <p:ph type="sldNum" sz="quarter" idx="12"/>
+          </p:nvPr>
+        </p:nvSpPr>
+        <p:spPr/>
+        <p:txBody>
+          <a:bodyPr/>
+          <a:lstStyle/>
+          <a:p>
+            <a:fld id="{EB37DED6-D4C7-42EE-AB49-D2E39E64FDE4}" type="slidenum">
+              <a:rPr lang="en-US" smtClean="0"/>
+              <a:pPr/>
+              <a:t>21</a:t>
+            </a:fld>
+            <a:endParaRPr lang="en-US" dirty="0"/>
+          </a:p>
+        </p:txBody>
+      </p:sp>
+      <p:sp>
+        <p:nvSpPr>
+          <p:cNvPr id="6" name="Slide Number Placeholder 4">
+            <a:extLst>
+              <a:ext uri="{FF2B5EF4-FFF2-40B4-BE49-F238E27FC236}">
+                <a16:creationId xmlns:a16="http://schemas.microsoft.com/office/drawing/2014/main" id="{5ECD9DAA-C767-07CC-5C79-8738D4F306A7}"/>
               </a:ext>
             </a:extLst>
           </p:cNvPr>
@@ -12919,7 +13383,7 @@
     </p:spTree>
     <p:extLst>
       <p:ext uri="{BB962C8B-B14F-4D97-AF65-F5344CB8AC3E}">
-        <p14:creationId xmlns:p14="http://schemas.microsoft.com/office/powerpoint/2010/main" val="1723280250"/>
+        <p14:creationId xmlns:p14="http://schemas.microsoft.com/office/powerpoint/2010/main" val="825357147"/>
       </p:ext>
     </p:extLst>
   </p:cSld>
@@ -12963,7 +13427,7 @@
           <p:cNvPr id="2" name="Title 1">
             <a:extLst>
               <a:ext uri="{FF2B5EF4-FFF2-40B4-BE49-F238E27FC236}">
-                <a16:creationId xmlns:a16="http://schemas.microsoft.com/office/drawing/2014/main" id="{E9DC9FCC-4F0C-53A9-AE36-C60D0609DD96}"/>
+                <a16:creationId xmlns:a16="http://schemas.microsoft.com/office/drawing/2014/main" id="{64983D13-B3DC-F5A2-EC3C-9AA3827FF06F}"/>
               </a:ext>
             </a:extLst>
           </p:cNvPr>
@@ -12985,6 +13449,229 @@
       </p:sp>
       <p:sp>
         <p:nvSpPr>
+          <p:cNvPr id="3" name="Picture Placeholder 2">
+            <a:extLst>
+              <a:ext uri="{FF2B5EF4-FFF2-40B4-BE49-F238E27FC236}">
+                <a16:creationId xmlns:a16="http://schemas.microsoft.com/office/drawing/2014/main" id="{57620467-CA16-1C06-152E-31CFC11FAB8D}"/>
+              </a:ext>
+            </a:extLst>
+          </p:cNvPr>
+          <p:cNvSpPr>
+            <a:spLocks noGrp="1"/>
+          </p:cNvSpPr>
+          <p:nvPr>
+            <p:ph type="pic" sz="quarter" idx="10"/>
+          </p:nvPr>
+        </p:nvSpPr>
+        <p:spPr/>
+        <p:txBody>
+          <a:bodyPr/>
+          <a:lstStyle/>
+          <a:p>
+            <a:endParaRPr lang="en-US"/>
+          </a:p>
+        </p:txBody>
+      </p:sp>
+      <p:sp>
+        <p:nvSpPr>
+          <p:cNvPr id="5" name="Slide Number Placeholder 4">
+            <a:extLst>
+              <a:ext uri="{FF2B5EF4-FFF2-40B4-BE49-F238E27FC236}">
+                <a16:creationId xmlns:a16="http://schemas.microsoft.com/office/drawing/2014/main" id="{19257D08-7BDC-2EFF-F790-09A4B6BCCC7B}"/>
+              </a:ext>
+            </a:extLst>
+          </p:cNvPr>
+          <p:cNvSpPr txBox="1">
+            <a:spLocks/>
+          </p:cNvSpPr>
+          <p:nvPr/>
+        </p:nvSpPr>
+        <p:spPr>
+          <a:xfrm>
+            <a:off x="455612" y="6190488"/>
+            <a:ext cx="2677604" cy="210312"/>
+          </a:xfrm>
+          <a:prstGeom prst="rect">
+            <a:avLst/>
+          </a:prstGeom>
+        </p:spPr>
+        <p:txBody>
+          <a:bodyPr vert="horz" lIns="121899" tIns="60949" rIns="121899" bIns="60949" rtlCol="0" anchor="b"/>
+          <a:lstStyle>
+            <a:defPPr>
+              <a:defRPr lang="en-US"/>
+            </a:defPPr>
+            <a:lvl1pPr marL="0" algn="r" defTabSz="1218987" rtl="0" eaLnBrk="1" latinLnBrk="0" hangingPunct="1">
+              <a:defRPr sz="1000" b="1" kern="1200" spc="200" baseline="0">
+                <a:solidFill>
+                  <a:schemeClr val="tx2">
+                    <a:lumMod val="50000"/>
+                  </a:schemeClr>
+                </a:solidFill>
+                <a:latin typeface="+mn-lt"/>
+                <a:ea typeface="+mn-ea"/>
+                <a:cs typeface="+mn-cs"/>
+              </a:defRPr>
+            </a:lvl1pPr>
+            <a:lvl2pPr marL="609493" algn="l" defTabSz="1218987" rtl="0" eaLnBrk="1" latinLnBrk="0" hangingPunct="1">
+              <a:defRPr sz="2400" kern="1200">
+                <a:solidFill>
+                  <a:schemeClr val="tx1"/>
+                </a:solidFill>
+                <a:latin typeface="+mn-lt"/>
+                <a:ea typeface="+mn-ea"/>
+                <a:cs typeface="+mn-cs"/>
+              </a:defRPr>
+            </a:lvl2pPr>
+            <a:lvl3pPr marL="1218987" algn="l" defTabSz="1218987" rtl="0" eaLnBrk="1" latinLnBrk="0" hangingPunct="1">
+              <a:defRPr sz="2400" kern="1200">
+                <a:solidFill>
+                  <a:schemeClr val="tx1"/>
+                </a:solidFill>
+                <a:latin typeface="+mn-lt"/>
+                <a:ea typeface="+mn-ea"/>
+                <a:cs typeface="+mn-cs"/>
+              </a:defRPr>
+            </a:lvl3pPr>
+            <a:lvl4pPr marL="1828480" algn="l" defTabSz="1218987" rtl="0" eaLnBrk="1" latinLnBrk="0" hangingPunct="1">
+              <a:defRPr sz="2400" kern="1200">
+                <a:solidFill>
+                  <a:schemeClr val="tx1"/>
+                </a:solidFill>
+                <a:latin typeface="+mn-lt"/>
+                <a:ea typeface="+mn-ea"/>
+                <a:cs typeface="+mn-cs"/>
+              </a:defRPr>
+            </a:lvl4pPr>
+            <a:lvl5pPr marL="2437973" algn="l" defTabSz="1218987" rtl="0" eaLnBrk="1" latinLnBrk="0" hangingPunct="1">
+              <a:defRPr sz="2400" kern="1200">
+                <a:solidFill>
+                  <a:schemeClr val="tx1"/>
+                </a:solidFill>
+                <a:latin typeface="+mn-lt"/>
+                <a:ea typeface="+mn-ea"/>
+                <a:cs typeface="+mn-cs"/>
+              </a:defRPr>
+            </a:lvl5pPr>
+            <a:lvl6pPr marL="3047467" algn="l" defTabSz="1218987" rtl="0" eaLnBrk="1" latinLnBrk="0" hangingPunct="1">
+              <a:defRPr sz="2400" kern="1200">
+                <a:solidFill>
+                  <a:schemeClr val="tx1"/>
+                </a:solidFill>
+                <a:latin typeface="+mn-lt"/>
+                <a:ea typeface="+mn-ea"/>
+                <a:cs typeface="+mn-cs"/>
+              </a:defRPr>
+            </a:lvl6pPr>
+            <a:lvl7pPr marL="3656960" algn="l" defTabSz="1218987" rtl="0" eaLnBrk="1" latinLnBrk="0" hangingPunct="1">
+              <a:defRPr sz="2400" kern="1200">
+                <a:solidFill>
+                  <a:schemeClr val="tx1"/>
+                </a:solidFill>
+                <a:latin typeface="+mn-lt"/>
+                <a:ea typeface="+mn-ea"/>
+                <a:cs typeface="+mn-cs"/>
+              </a:defRPr>
+            </a:lvl7pPr>
+            <a:lvl8pPr marL="4266453" algn="l" defTabSz="1218987" rtl="0" eaLnBrk="1" latinLnBrk="0" hangingPunct="1">
+              <a:defRPr sz="2400" kern="1200">
+                <a:solidFill>
+                  <a:schemeClr val="tx1"/>
+                </a:solidFill>
+                <a:latin typeface="+mn-lt"/>
+                <a:ea typeface="+mn-ea"/>
+                <a:cs typeface="+mn-cs"/>
+              </a:defRPr>
+            </a:lvl8pPr>
+            <a:lvl9pPr marL="4875947" algn="l" defTabSz="1218987" rtl="0" eaLnBrk="1" latinLnBrk="0" hangingPunct="1">
+              <a:defRPr sz="2400" kern="1200">
+                <a:solidFill>
+                  <a:schemeClr val="tx1"/>
+                </a:solidFill>
+                <a:latin typeface="+mn-lt"/>
+                <a:ea typeface="+mn-ea"/>
+                <a:cs typeface="+mn-cs"/>
+              </a:defRPr>
+            </a:lvl9pPr>
+          </a:lstStyle>
+          <a:p>
+            <a:pPr algn="l"/>
+            <a:r>
+              <a:rPr lang="en-US" dirty="0"/>
+              <a:t>DES211 CAPSTONE PROJECT</a:t>
+            </a:r>
+          </a:p>
+        </p:txBody>
+      </p:sp>
+    </p:spTree>
+    <p:extLst>
+      <p:ext uri="{BB962C8B-B14F-4D97-AF65-F5344CB8AC3E}">
+        <p14:creationId xmlns:p14="http://schemas.microsoft.com/office/powerpoint/2010/main" val="1723280250"/>
+      </p:ext>
+    </p:extLst>
+  </p:cSld>
+  <p:clrMapOvr>
+    <a:masterClrMapping/>
+  </p:clrMapOvr>
+  <mc:AlternateContent xmlns:mc="http://schemas.openxmlformats.org/markup-compatibility/2006" xmlns:p14="http://schemas.microsoft.com/office/powerpoint/2010/main">
+    <mc:Choice Requires="p14">
+      <p:transition spd="med" p14:dur="700">
+        <p:fade/>
+      </p:transition>
+    </mc:Choice>
+    <mc:Fallback xmlns="">
+      <p:transition spd="med">
+        <p:fade/>
+      </p:transition>
+    </mc:Fallback>
+  </mc:AlternateContent>
+</p:sld>
+</file>
+
+<file path=ppt/slides/slide23.xml><?xml version="1.0" encoding="utf-8"?>
+<p:sld xmlns:a="http://schemas.openxmlformats.org/drawingml/2006/main" xmlns:r="http://schemas.openxmlformats.org/officeDocument/2006/relationships" xmlns:p="http://schemas.openxmlformats.org/presentationml/2006/main">
+  <p:cSld>
+    <p:spTree>
+      <p:nvGrpSpPr>
+        <p:cNvPr id="1" name=""/>
+        <p:cNvGrpSpPr/>
+        <p:nvPr/>
+      </p:nvGrpSpPr>
+      <p:grpSpPr>
+        <a:xfrm>
+          <a:off x="0" y="0"/>
+          <a:ext cx="0" cy="0"/>
+          <a:chOff x="0" y="0"/>
+          <a:chExt cx="0" cy="0"/>
+        </a:xfrm>
+      </p:grpSpPr>
+      <p:sp>
+        <p:nvSpPr>
+          <p:cNvPr id="2" name="Title 1">
+            <a:extLst>
+              <a:ext uri="{FF2B5EF4-FFF2-40B4-BE49-F238E27FC236}">
+                <a16:creationId xmlns:a16="http://schemas.microsoft.com/office/drawing/2014/main" id="{E9DC9FCC-4F0C-53A9-AE36-C60D0609DD96}"/>
+              </a:ext>
+            </a:extLst>
+          </p:cNvPr>
+          <p:cNvSpPr>
+            <a:spLocks noGrp="1"/>
+          </p:cNvSpPr>
+          <p:nvPr>
+            <p:ph type="title"/>
+          </p:nvPr>
+        </p:nvSpPr>
+        <p:spPr/>
+        <p:txBody>
+          <a:bodyPr/>
+          <a:lstStyle/>
+          <a:p>
+            <a:endParaRPr lang="en-IN"/>
+          </a:p>
+        </p:txBody>
+      </p:sp>
+      <p:sp>
+        <p:nvSpPr>
           <p:cNvPr id="3" name="Content Placeholder 2">
             <a:extLst>
               <a:ext uri="{FF2B5EF4-FFF2-40B4-BE49-F238E27FC236}">
@@ -13032,7 +13719,7 @@
             <a:fld id="{EB37DED6-D4C7-42EE-AB49-D2E39E64FDE4}" type="slidenum">
               <a:rPr lang="en-US" smtClean="0"/>
               <a:pPr/>
-              <a:t>22</a:t>
+              <a:t>23</a:t>
             </a:fld>
             <a:endParaRPr lang="en-US" dirty="0"/>
           </a:p>
@@ -13383,19 +14070,7 @@
               <a:rPr lang="en-US" altLang="en-US" sz="1600" b="0" dirty="0">
                 <a:latin typeface="Bahnschrift SemiLight" panose="020B0502040204020203" pitchFamily="34" charset="0"/>
               </a:rPr>
-              <a:t>Bins are often standalone, </a:t>
-            </a:r>
-            <a:r>
-              <a:rPr lang="en-US" altLang="en-US" sz="1600" b="0" dirty="0" err="1">
-                <a:latin typeface="Bahnschrift SemiLight" panose="020B0502040204020203" pitchFamily="34" charset="0"/>
-              </a:rPr>
-              <a:t>unlabelled</a:t>
-            </a:r>
-            <a:r>
-              <a:rPr lang="en-US" altLang="en-US" sz="1600" b="0" dirty="0">
-                <a:latin typeface="Bahnschrift SemiLight" panose="020B0502040204020203" pitchFamily="34" charset="0"/>
-              </a:rPr>
-              <a:t>, and unnoticeable.</a:t>
+              <a:t>Bins are often standalone, unlabeled, and unnoticeable.</a:t>
             </a:r>
           </a:p>
           <a:p>
@@ -15995,14 +16670,14 @@
             <p:ph type="tbl" sz="quarter" idx="13"/>
             <p:extLst>
               <p:ext uri="{D42A27DB-BD31-4B8C-83A1-F6EECF244321}">
-                <p14:modId xmlns:p14="http://schemas.microsoft.com/office/powerpoint/2010/main" val="3776900152"/>
+                <p14:modId xmlns:p14="http://schemas.microsoft.com/office/powerpoint/2010/main" val="2353462957"/>
               </p:ext>
             </p:extLst>
           </p:nvPr>
         </p:nvGraphicFramePr>
         <p:xfrm>
           <a:off x="593725" y="1809750"/>
-          <a:ext cx="10771188" cy="3829049"/>
+          <a:ext cx="9838849" cy="3829049"/>
         </p:xfrm>
         <a:graphic>
           <a:graphicData uri="http://schemas.openxmlformats.org/drawingml/2006/table">
@@ -16011,7 +16686,7 @@
                 <a:tableStyleId>{8A107856-5554-42FB-B03E-39F5DBC370BA}</a:tableStyleId>
               </a:tblPr>
               <a:tblGrid>
-                <a:gridCol w="5385594">
+                <a:gridCol w="4453255">
                   <a:extLst>
                     <a:ext uri="{9D8B030D-6E8A-4147-A177-3AD203B41FA5}">
                       <a16:colId xmlns:a16="http://schemas.microsoft.com/office/drawing/2014/main" val="3676582090"/>
@@ -16536,13 +17211,13 @@
   <p:clrMapOvr>
     <a:masterClrMapping/>
   </p:clrMapOvr>
-  <mc:AlternateContent xmlns:mc="http://schemas.openxmlformats.org/markup-compatibility/2006">
-    <mc:Choice xmlns:p14="http://schemas.microsoft.com/office/powerpoint/2010/main" Requires="p14">
+  <mc:AlternateContent xmlns:mc="http://schemas.openxmlformats.org/markup-compatibility/2006" xmlns:p14="http://schemas.microsoft.com/office/powerpoint/2010/main">
+    <mc:Choice Requires="p14">
       <p:transition spd="med" p14:dur="700">
         <p:fade/>
       </p:transition>
     </mc:Choice>
-    <mc:Fallback>
+    <mc:Fallback xmlns="">
       <p:transition spd="med">
         <p:fade/>
       </p:transition>
@@ -17368,6 +18043,15 @@
 </file>
 
 <file path=customXml/item1.xml><?xml version="1.0" encoding="utf-8"?>
+<?mso-contentType ?>
+<FormTemplates xmlns="http://schemas.microsoft.com/sharepoint/v3/contenttype/forms">
+  <Display>DocumentLibraryForm</Display>
+  <Edit>DocumentLibraryForm</Edit>
+  <New>DocumentLibraryForm</New>
+</FormTemplates>
+</file>
+
+<file path=customXml/item2.xml><?xml version="1.0" encoding="utf-8"?>
 <p:properties xmlns:p="http://schemas.microsoft.com/office/2006/metadata/properties" xmlns:xsi="http://www.w3.org/2001/XMLSchema-instance" xmlns:pc="http://schemas.microsoft.com/office/infopath/2007/PartnerControls">
   <documentManagement>
     <_ip_UnifiedCompliancePolicyUIAction xmlns="http://schemas.microsoft.com/sharepoint/v3" xsi:nil="true"/>
@@ -17385,15 +18069,6 @@
     <MediaServiceKeyPoints xmlns="71af3243-3dd4-4a8d-8c0d-dd76da1f02a5" xsi:nil="true"/>
   </documentManagement>
 </p:properties>
-</file>
-
-<file path=customXml/item2.xml><?xml version="1.0" encoding="utf-8"?>
-<?mso-contentType ?>
-<FormTemplates xmlns="http://schemas.microsoft.com/sharepoint/v3/contenttype/forms">
-  <Display>DocumentLibraryForm</Display>
-  <Edit>DocumentLibraryForm</Edit>
-  <New>DocumentLibraryForm</New>
-</FormTemplates>
 </file>
 
 <file path=customXml/item3.xml><?xml version="1.0" encoding="utf-8"?>
@@ -17709,6 +18384,14 @@
 </file>
 
 <file path=customXml/itemProps1.xml><?xml version="1.0" encoding="utf-8"?>
+<ds:datastoreItem xmlns:ds="http://schemas.openxmlformats.org/officeDocument/2006/customXml" ds:itemID="{F49F7C99-DB67-4EF2-86B4-C45C603BA94C}">
+  <ds:schemaRefs>
+    <ds:schemaRef ds:uri="http://schemas.microsoft.com/sharepoint/v3/contenttype/forms"/>
+  </ds:schemaRefs>
+</ds:datastoreItem>
+</file>
+
+<file path=customXml/itemProps2.xml><?xml version="1.0" encoding="utf-8"?>
 <ds:datastoreItem xmlns:ds="http://schemas.openxmlformats.org/officeDocument/2006/customXml" ds:itemID="{527F8595-6F9C-444F-81F9-1BB5383C5D01}">
   <ds:schemaRefs>
     <ds:schemaRef ds:uri="http://schemas.microsoft.com/office/2006/metadata/properties"/>
@@ -17716,14 +18399,6 @@
     <ds:schemaRef ds:uri="http://schemas.microsoft.com/sharepoint/v3"/>
     <ds:schemaRef ds:uri="71af3243-3dd4-4a8d-8c0d-dd76da1f02a5"/>
     <ds:schemaRef ds:uri="230e9df3-be65-4c73-a93b-d1236ebd677e"/>
-  </ds:schemaRefs>
-</ds:datastoreItem>
-</file>
-
-<file path=customXml/itemProps2.xml><?xml version="1.0" encoding="utf-8"?>
-<ds:datastoreItem xmlns:ds="http://schemas.openxmlformats.org/officeDocument/2006/customXml" ds:itemID="{F49F7C99-DB67-4EF2-86B4-C45C603BA94C}">
-  <ds:schemaRefs>
-    <ds:schemaRef ds:uri="http://schemas.microsoft.com/sharepoint/v3/contenttype/forms"/>
   </ds:schemaRefs>
 </ds:datastoreItem>
 </file>

</xml_diff>

<commit_message>
start prototyping slide deck
</commit_message>
<xml_diff>
--- a/presentation.pptx
+++ b/presentation.pptx
@@ -5,10 +5,10 @@
     <p:sldMasterId id="2147483692" r:id="rId4"/>
   </p:sldMasterIdLst>
   <p:notesMasterIdLst>
-    <p:notesMasterId r:id="rId27"/>
+    <p:notesMasterId r:id="rId30"/>
   </p:notesMasterIdLst>
   <p:handoutMasterIdLst>
-    <p:handoutMasterId r:id="rId28"/>
+    <p:handoutMasterId r:id="rId31"/>
   </p:handoutMasterIdLst>
   <p:sldIdLst>
     <p:sldId id="354" r:id="rId5"/>
@@ -25,14 +25,17 @@
     <p:sldId id="392" r:id="rId16"/>
     <p:sldId id="393" r:id="rId17"/>
     <p:sldId id="376" r:id="rId18"/>
-    <p:sldId id="377" r:id="rId19"/>
-    <p:sldId id="378" r:id="rId20"/>
-    <p:sldId id="379" r:id="rId21"/>
-    <p:sldId id="380" r:id="rId22"/>
-    <p:sldId id="381" r:id="rId23"/>
-    <p:sldId id="382" r:id="rId24"/>
-    <p:sldId id="383" r:id="rId25"/>
-    <p:sldId id="384" r:id="rId26"/>
+    <p:sldId id="394" r:id="rId19"/>
+    <p:sldId id="395" r:id="rId20"/>
+    <p:sldId id="396" r:id="rId21"/>
+    <p:sldId id="377" r:id="rId22"/>
+    <p:sldId id="378" r:id="rId23"/>
+    <p:sldId id="379" r:id="rId24"/>
+    <p:sldId id="380" r:id="rId25"/>
+    <p:sldId id="381" r:id="rId26"/>
+    <p:sldId id="382" r:id="rId27"/>
+    <p:sldId id="383" r:id="rId28"/>
+    <p:sldId id="384" r:id="rId29"/>
   </p:sldIdLst>
   <p:sldSz cx="12188825" cy="6858000"/>
   <p:notesSz cx="6858000" cy="9144000"/>
@@ -14925,85 +14928,10 @@
       </p:grpSpPr>
       <p:sp>
         <p:nvSpPr>
-          <p:cNvPr id="2" name="Title 1">
+          <p:cNvPr id="4" name="Slide Number Placeholder 3">
             <a:extLst>
               <a:ext uri="{FF2B5EF4-FFF2-40B4-BE49-F238E27FC236}">
-                <a16:creationId xmlns:a16="http://schemas.microsoft.com/office/drawing/2014/main" id="{AADB5DC0-637B-33EB-9B61-EFB3DE503900}"/>
-              </a:ext>
-            </a:extLst>
-          </p:cNvPr>
-          <p:cNvSpPr>
-            <a:spLocks noGrp="1"/>
-          </p:cNvSpPr>
-          <p:nvPr>
-            <p:ph type="title"/>
-          </p:nvPr>
-        </p:nvSpPr>
-        <p:spPr/>
-        <p:txBody>
-          <a:bodyPr/>
-          <a:lstStyle/>
-          <a:p>
-            <a:endParaRPr lang="en-IN"/>
-          </a:p>
-        </p:txBody>
-      </p:sp>
-      <p:sp>
-        <p:nvSpPr>
-          <p:cNvPr id="3" name="Content Placeholder 2">
-            <a:extLst>
-              <a:ext uri="{FF2B5EF4-FFF2-40B4-BE49-F238E27FC236}">
-                <a16:creationId xmlns:a16="http://schemas.microsoft.com/office/drawing/2014/main" id="{54DEFFDB-126C-310C-5C89-434FDACA5F31}"/>
-              </a:ext>
-            </a:extLst>
-          </p:cNvPr>
-          <p:cNvSpPr>
-            <a:spLocks noGrp="1"/>
-          </p:cNvSpPr>
-          <p:nvPr>
-            <p:ph sz="quarter" idx="13"/>
-          </p:nvPr>
-        </p:nvSpPr>
-        <p:spPr/>
-        <p:txBody>
-          <a:bodyPr/>
-          <a:lstStyle/>
-          <a:p>
-            <a:endParaRPr lang="en-IN"/>
-          </a:p>
-        </p:txBody>
-      </p:sp>
-      <p:sp>
-        <p:nvSpPr>
-          <p:cNvPr id="4" name="Picture Placeholder 3">
-            <a:extLst>
-              <a:ext uri="{FF2B5EF4-FFF2-40B4-BE49-F238E27FC236}">
-                <a16:creationId xmlns:a16="http://schemas.microsoft.com/office/drawing/2014/main" id="{84E988D3-CF35-4838-4D7E-194B8206E5F6}"/>
-              </a:ext>
-            </a:extLst>
-          </p:cNvPr>
-          <p:cNvSpPr>
-            <a:spLocks noGrp="1"/>
-          </p:cNvSpPr>
-          <p:nvPr>
-            <p:ph type="pic" sz="quarter" idx="14"/>
-          </p:nvPr>
-        </p:nvSpPr>
-        <p:spPr/>
-        <p:txBody>
-          <a:bodyPr/>
-          <a:lstStyle/>
-          <a:p>
-            <a:endParaRPr lang="en-US"/>
-          </a:p>
-        </p:txBody>
-      </p:sp>
-      <p:sp>
-        <p:nvSpPr>
-          <p:cNvPr id="5" name="Slide Number Placeholder 4">
-            <a:extLst>
-              <a:ext uri="{FF2B5EF4-FFF2-40B4-BE49-F238E27FC236}">
-                <a16:creationId xmlns:a16="http://schemas.microsoft.com/office/drawing/2014/main" id="{ECB92C49-500A-83A9-A98E-071CD7B4CF66}"/>
+                <a16:creationId xmlns:a16="http://schemas.microsoft.com/office/drawing/2014/main" id="{5EDF78A5-329B-AC5C-8934-938E8DDDA728}"/>
               </a:ext>
             </a:extLst>
           </p:cNvPr>
@@ -15028,133 +14956,349 @@
           </a:p>
         </p:txBody>
       </p:sp>
+      <p:pic>
+        <p:nvPicPr>
+          <p:cNvPr id="6" name="Picture 5" descr="A drawing of a rectangular object&#10;&#10;AI-generated content may be incorrect.">
+            <a:extLst>
+              <a:ext uri="{FF2B5EF4-FFF2-40B4-BE49-F238E27FC236}">
+                <a16:creationId xmlns:a16="http://schemas.microsoft.com/office/drawing/2014/main" id="{12FA479C-C4D2-D117-CE90-F13657352BC8}"/>
+              </a:ext>
+            </a:extLst>
+          </p:cNvPr>
+          <p:cNvPicPr>
+            <a:picLocks noChangeAspect="1"/>
+          </p:cNvPicPr>
+          <p:nvPr/>
+        </p:nvPicPr>
+        <p:blipFill>
+          <a:blip r:embed="rId2"/>
+          <a:stretch>
+            <a:fillRect/>
+          </a:stretch>
+        </p:blipFill>
+        <p:spPr>
+          <a:xfrm>
+            <a:off x="531812" y="907030"/>
+            <a:ext cx="2743487" cy="4172387"/>
+          </a:xfrm>
+          <a:prstGeom prst="rect">
+            <a:avLst/>
+          </a:prstGeom>
+          <a:solidFill>
+            <a:srgbClr val="FFFFFF">
+              <a:shade val="85000"/>
+            </a:srgbClr>
+          </a:solidFill>
+          <a:ln w="76200" cap="sq">
+            <a:solidFill>
+              <a:srgbClr val="E5EDDD"/>
+            </a:solidFill>
+            <a:miter lim="800000"/>
+          </a:ln>
+          <a:effectLst>
+            <a:outerShdw blurRad="55000" dist="18000" dir="5400000" algn="tl" rotWithShape="0">
+              <a:srgbClr val="000000">
+                <a:alpha val="40000"/>
+              </a:srgbClr>
+            </a:outerShdw>
+          </a:effectLst>
+          <a:scene3d>
+            <a:camera prst="orthographicFront"/>
+            <a:lightRig rig="twoPt" dir="t">
+              <a:rot lat="0" lon="0" rev="7200000"/>
+            </a:lightRig>
+          </a:scene3d>
+          <a:sp3d>
+            <a:bevelT w="25400" h="19050"/>
+            <a:contourClr>
+              <a:srgbClr val="FFFFFF"/>
+            </a:contourClr>
+          </a:sp3d>
+        </p:spPr>
+      </p:pic>
+      <p:pic>
+        <p:nvPicPr>
+          <p:cNvPr id="8" name="Picture 7" descr="A drawing of a rectangular object&#10;&#10;AI-generated content may be incorrect.">
+            <a:extLst>
+              <a:ext uri="{FF2B5EF4-FFF2-40B4-BE49-F238E27FC236}">
+                <a16:creationId xmlns:a16="http://schemas.microsoft.com/office/drawing/2014/main" id="{152715A6-BC4D-5E51-F62B-A5C0CE854253}"/>
+              </a:ext>
+            </a:extLst>
+          </p:cNvPr>
+          <p:cNvPicPr>
+            <a:picLocks noChangeAspect="1"/>
+          </p:cNvPicPr>
+          <p:nvPr/>
+        </p:nvPicPr>
+        <p:blipFill>
+          <a:blip r:embed="rId3"/>
+          <a:stretch>
+            <a:fillRect/>
+          </a:stretch>
+        </p:blipFill>
+        <p:spPr>
+          <a:xfrm>
+            <a:off x="3889005" y="901775"/>
+            <a:ext cx="2978518" cy="4172387"/>
+          </a:xfrm>
+          <a:prstGeom prst="rect">
+            <a:avLst/>
+          </a:prstGeom>
+          <a:solidFill>
+            <a:srgbClr val="FFFFFF">
+              <a:shade val="85000"/>
+            </a:srgbClr>
+          </a:solidFill>
+          <a:ln w="76200" cap="sq">
+            <a:solidFill>
+              <a:srgbClr val="E5EDDD"/>
+            </a:solidFill>
+            <a:miter lim="800000"/>
+          </a:ln>
+          <a:effectLst>
+            <a:outerShdw blurRad="55000" dist="18000" dir="5400000" algn="tl" rotWithShape="0">
+              <a:srgbClr val="000000">
+                <a:alpha val="40000"/>
+              </a:srgbClr>
+            </a:outerShdw>
+          </a:effectLst>
+          <a:scene3d>
+            <a:camera prst="orthographicFront"/>
+            <a:lightRig rig="twoPt" dir="t">
+              <a:rot lat="0" lon="0" rev="7200000"/>
+            </a:lightRig>
+          </a:scene3d>
+          <a:sp3d>
+            <a:bevelT w="25400" h="19050"/>
+            <a:contourClr>
+              <a:srgbClr val="FFFFFF"/>
+            </a:contourClr>
+          </a:sp3d>
+        </p:spPr>
+      </p:pic>
+      <p:pic>
+        <p:nvPicPr>
+          <p:cNvPr id="10" name="Picture 9" descr="A drawing of a square box&#10;&#10;AI-generated content may be incorrect.">
+            <a:extLst>
+              <a:ext uri="{FF2B5EF4-FFF2-40B4-BE49-F238E27FC236}">
+                <a16:creationId xmlns:a16="http://schemas.microsoft.com/office/drawing/2014/main" id="{5736D709-F9DE-3F85-B558-3D6F4F237C72}"/>
+              </a:ext>
+            </a:extLst>
+          </p:cNvPr>
+          <p:cNvPicPr>
+            <a:picLocks noChangeAspect="1"/>
+          </p:cNvPicPr>
+          <p:nvPr/>
+        </p:nvPicPr>
+        <p:blipFill>
+          <a:blip r:embed="rId4"/>
+          <a:stretch>
+            <a:fillRect/>
+          </a:stretch>
+        </p:blipFill>
+        <p:spPr>
+          <a:xfrm>
+            <a:off x="7389812" y="901775"/>
+            <a:ext cx="4382919" cy="4172386"/>
+          </a:xfrm>
+          <a:prstGeom prst="rect">
+            <a:avLst/>
+          </a:prstGeom>
+          <a:solidFill>
+            <a:srgbClr val="FFFFFF">
+              <a:shade val="85000"/>
+            </a:srgbClr>
+          </a:solidFill>
+          <a:ln w="76200" cap="sq">
+            <a:solidFill>
+              <a:srgbClr val="E5EDDD"/>
+            </a:solidFill>
+            <a:miter lim="800000"/>
+          </a:ln>
+          <a:effectLst>
+            <a:outerShdw blurRad="55000" dist="18000" dir="5400000" algn="tl" rotWithShape="0">
+              <a:srgbClr val="000000">
+                <a:alpha val="40000"/>
+              </a:srgbClr>
+            </a:outerShdw>
+          </a:effectLst>
+          <a:scene3d>
+            <a:camera prst="orthographicFront"/>
+            <a:lightRig rig="twoPt" dir="t">
+              <a:rot lat="0" lon="0" rev="7200000"/>
+            </a:lightRig>
+          </a:scene3d>
+          <a:sp3d>
+            <a:bevelT w="25400" h="19050"/>
+            <a:contourClr>
+              <a:srgbClr val="FFFFFF"/>
+            </a:contourClr>
+          </a:sp3d>
+        </p:spPr>
+      </p:pic>
       <p:sp>
         <p:nvSpPr>
-          <p:cNvPr id="6" name="Slide Number Placeholder 4">
+          <p:cNvPr id="11" name="TextBox 10">
             <a:extLst>
               <a:ext uri="{FF2B5EF4-FFF2-40B4-BE49-F238E27FC236}">
-                <a16:creationId xmlns:a16="http://schemas.microsoft.com/office/drawing/2014/main" id="{3F841A1B-DBD5-E8AC-6353-E738060B9317}"/>
+                <a16:creationId xmlns:a16="http://schemas.microsoft.com/office/drawing/2014/main" id="{3C29075D-A878-95B9-8E26-25CC989CD1CF}"/>
               </a:ext>
             </a:extLst>
           </p:cNvPr>
-          <p:cNvSpPr txBox="1">
-            <a:spLocks/>
-          </p:cNvSpPr>
+          <p:cNvSpPr txBox="1"/>
           <p:nvPr/>
         </p:nvSpPr>
         <p:spPr>
           <a:xfrm>
-            <a:off x="455612" y="6190488"/>
-            <a:ext cx="2677604" cy="210312"/>
+            <a:off x="681105" y="5181600"/>
+            <a:ext cx="2444900" cy="297004"/>
           </a:xfrm>
           <a:prstGeom prst="rect">
             <a:avLst/>
           </a:prstGeom>
+          <a:noFill/>
         </p:spPr>
         <p:txBody>
-          <a:bodyPr vert="horz" lIns="121899" tIns="60949" rIns="121899" bIns="60949" rtlCol="0" anchor="b"/>
-          <a:lstStyle>
-            <a:defPPr>
-              <a:defRPr lang="en-US"/>
-            </a:defPPr>
-            <a:lvl1pPr marL="0" algn="r" defTabSz="1218987" rtl="0" eaLnBrk="1" latinLnBrk="0" hangingPunct="1">
-              <a:defRPr sz="1000" b="1" kern="1200" spc="200" baseline="0">
-                <a:solidFill>
-                  <a:schemeClr val="tx2">
-                    <a:lumMod val="50000"/>
-                  </a:schemeClr>
-                </a:solidFill>
-                <a:latin typeface="+mn-lt"/>
-                <a:ea typeface="+mn-ea"/>
-                <a:cs typeface="+mn-cs"/>
-              </a:defRPr>
-            </a:lvl1pPr>
-            <a:lvl2pPr marL="609493" algn="l" defTabSz="1218987" rtl="0" eaLnBrk="1" latinLnBrk="0" hangingPunct="1">
-              <a:defRPr sz="2400" kern="1200">
-                <a:solidFill>
-                  <a:schemeClr val="tx1"/>
-                </a:solidFill>
-                <a:latin typeface="+mn-lt"/>
-                <a:ea typeface="+mn-ea"/>
-                <a:cs typeface="+mn-cs"/>
-              </a:defRPr>
-            </a:lvl2pPr>
-            <a:lvl3pPr marL="1218987" algn="l" defTabSz="1218987" rtl="0" eaLnBrk="1" latinLnBrk="0" hangingPunct="1">
-              <a:defRPr sz="2400" kern="1200">
-                <a:solidFill>
-                  <a:schemeClr val="tx1"/>
-                </a:solidFill>
-                <a:latin typeface="+mn-lt"/>
-                <a:ea typeface="+mn-ea"/>
-                <a:cs typeface="+mn-cs"/>
-              </a:defRPr>
-            </a:lvl3pPr>
-            <a:lvl4pPr marL="1828480" algn="l" defTabSz="1218987" rtl="0" eaLnBrk="1" latinLnBrk="0" hangingPunct="1">
-              <a:defRPr sz="2400" kern="1200">
-                <a:solidFill>
-                  <a:schemeClr val="tx1"/>
-                </a:solidFill>
-                <a:latin typeface="+mn-lt"/>
-                <a:ea typeface="+mn-ea"/>
-                <a:cs typeface="+mn-cs"/>
-              </a:defRPr>
-            </a:lvl4pPr>
-            <a:lvl5pPr marL="2437973" algn="l" defTabSz="1218987" rtl="0" eaLnBrk="1" latinLnBrk="0" hangingPunct="1">
-              <a:defRPr sz="2400" kern="1200">
-                <a:solidFill>
-                  <a:schemeClr val="tx1"/>
-                </a:solidFill>
-                <a:latin typeface="+mn-lt"/>
-                <a:ea typeface="+mn-ea"/>
-                <a:cs typeface="+mn-cs"/>
-              </a:defRPr>
-            </a:lvl5pPr>
-            <a:lvl6pPr marL="3047467" algn="l" defTabSz="1218987" rtl="0" eaLnBrk="1" latinLnBrk="0" hangingPunct="1">
-              <a:defRPr sz="2400" kern="1200">
-                <a:solidFill>
-                  <a:schemeClr val="tx1"/>
-                </a:solidFill>
-                <a:latin typeface="+mn-lt"/>
-                <a:ea typeface="+mn-ea"/>
-                <a:cs typeface="+mn-cs"/>
-              </a:defRPr>
-            </a:lvl6pPr>
-            <a:lvl7pPr marL="3656960" algn="l" defTabSz="1218987" rtl="0" eaLnBrk="1" latinLnBrk="0" hangingPunct="1">
-              <a:defRPr sz="2400" kern="1200">
-                <a:solidFill>
-                  <a:schemeClr val="tx1"/>
-                </a:solidFill>
-                <a:latin typeface="+mn-lt"/>
-                <a:ea typeface="+mn-ea"/>
-                <a:cs typeface="+mn-cs"/>
-              </a:defRPr>
-            </a:lvl7pPr>
-            <a:lvl8pPr marL="4266453" algn="l" defTabSz="1218987" rtl="0" eaLnBrk="1" latinLnBrk="0" hangingPunct="1">
-              <a:defRPr sz="2400" kern="1200">
-                <a:solidFill>
-                  <a:schemeClr val="tx1"/>
-                </a:solidFill>
-                <a:latin typeface="+mn-lt"/>
-                <a:ea typeface="+mn-ea"/>
-                <a:cs typeface="+mn-cs"/>
-              </a:defRPr>
-            </a:lvl8pPr>
-            <a:lvl9pPr marL="4875947" algn="l" defTabSz="1218987" rtl="0" eaLnBrk="1" latinLnBrk="0" hangingPunct="1">
-              <a:defRPr sz="2400" kern="1200">
-                <a:solidFill>
-                  <a:schemeClr val="tx1"/>
-                </a:solidFill>
-                <a:latin typeface="+mn-lt"/>
-                <a:ea typeface="+mn-ea"/>
-                <a:cs typeface="+mn-cs"/>
-              </a:defRPr>
-            </a:lvl9pPr>
-          </a:lstStyle>
-          <a:p>
-            <a:pPr algn="l"/>
+          <a:bodyPr wrap="none" rtlCol="0">
+            <a:spAutoFit/>
+          </a:bodyPr>
+          <a:lstStyle/>
+          <a:p>
+            <a:pPr>
+              <a:lnSpc>
+                <a:spcPct val="95000"/>
+              </a:lnSpc>
+            </a:pPr>
             <a:r>
-              <a:rPr lang="en-US" dirty="0"/>
-              <a:t>DES211 CAPSTONE PROJECT</a:t>
+              <a:rPr lang="en-US" sz="1400" dirty="0">
+                <a:solidFill>
+                  <a:srgbClr val="435F30"/>
+                </a:solidFill>
+                <a:latin typeface="Bahnschrift SemiLight" panose="020B0502040204020203" pitchFamily="34" charset="0"/>
+              </a:rPr>
+              <a:t>Grooves for infinite chaining</a:t>
+            </a:r>
+          </a:p>
+        </p:txBody>
+      </p:sp>
+      <p:sp>
+        <p:nvSpPr>
+          <p:cNvPr id="12" name="TextBox 11">
+            <a:extLst>
+              <a:ext uri="{FF2B5EF4-FFF2-40B4-BE49-F238E27FC236}">
+                <a16:creationId xmlns:a16="http://schemas.microsoft.com/office/drawing/2014/main" id="{5F96C536-F7F9-317A-746C-0BD00AE31430}"/>
+              </a:ext>
+            </a:extLst>
+          </p:cNvPr>
+          <p:cNvSpPr txBox="1"/>
+          <p:nvPr/>
+        </p:nvSpPr>
+        <p:spPr>
+          <a:xfrm>
+            <a:off x="4256001" y="5175380"/>
+            <a:ext cx="2244525" cy="501676"/>
+          </a:xfrm>
+          <a:prstGeom prst="rect">
+            <a:avLst/>
+          </a:prstGeom>
+          <a:noFill/>
+        </p:spPr>
+        <p:txBody>
+          <a:bodyPr wrap="none" rtlCol="0">
+            <a:spAutoFit/>
+          </a:bodyPr>
+          <a:lstStyle/>
+          <a:p>
+            <a:pPr algn="ctr">
+              <a:lnSpc>
+                <a:spcPct val="95000"/>
+              </a:lnSpc>
+            </a:pPr>
+            <a:r>
+              <a:rPr lang="en-US" sz="1400" dirty="0">
+                <a:solidFill>
+                  <a:srgbClr val="435F30"/>
+                </a:solidFill>
+                <a:latin typeface="Bahnschrift SemiLight" panose="020B0502040204020203" pitchFamily="34" charset="0"/>
+              </a:rPr>
+              <a:t>Reduced groove depth for</a:t>
+            </a:r>
+          </a:p>
+          <a:p>
+            <a:pPr algn="ctr">
+              <a:lnSpc>
+                <a:spcPct val="95000"/>
+              </a:lnSpc>
+            </a:pPr>
+            <a:r>
+              <a:rPr lang="en-US" sz="1400" dirty="0">
+                <a:solidFill>
+                  <a:srgbClr val="435F30"/>
+                </a:solidFill>
+                <a:latin typeface="Bahnschrift SemiLight" panose="020B0502040204020203" pitchFamily="34" charset="0"/>
+              </a:rPr>
+              <a:t>better user experience</a:t>
+            </a:r>
+          </a:p>
+        </p:txBody>
+      </p:sp>
+      <p:sp>
+        <p:nvSpPr>
+          <p:cNvPr id="13" name="TextBox 12">
+            <a:extLst>
+              <a:ext uri="{FF2B5EF4-FFF2-40B4-BE49-F238E27FC236}">
+                <a16:creationId xmlns:a16="http://schemas.microsoft.com/office/drawing/2014/main" id="{27C6FA01-BF33-9FA2-65B8-5AE45B94CC11}"/>
+              </a:ext>
+            </a:extLst>
+          </p:cNvPr>
+          <p:cNvSpPr txBox="1"/>
+          <p:nvPr/>
+        </p:nvSpPr>
+        <p:spPr>
+          <a:xfrm>
+            <a:off x="8171279" y="5177702"/>
+            <a:ext cx="2820003" cy="501676"/>
+          </a:xfrm>
+          <a:prstGeom prst="rect">
+            <a:avLst/>
+          </a:prstGeom>
+          <a:noFill/>
+        </p:spPr>
+        <p:txBody>
+          <a:bodyPr wrap="none" rtlCol="0">
+            <a:spAutoFit/>
+          </a:bodyPr>
+          <a:lstStyle/>
+          <a:p>
+            <a:pPr algn="ctr">
+              <a:lnSpc>
+                <a:spcPct val="95000"/>
+              </a:lnSpc>
+            </a:pPr>
+            <a:r>
+              <a:rPr lang="en-US" sz="1400" dirty="0">
+                <a:solidFill>
+                  <a:srgbClr val="435F30"/>
+                </a:solidFill>
+                <a:latin typeface="Bahnschrift SemiLight" panose="020B0502040204020203" pitchFamily="34" charset="0"/>
+              </a:rPr>
+              <a:t>Bag clips to ensure garbage bins</a:t>
+            </a:r>
+          </a:p>
+          <a:p>
+            <a:pPr algn="ctr">
+              <a:lnSpc>
+                <a:spcPct val="95000"/>
+              </a:lnSpc>
+            </a:pPr>
+            <a:r>
+              <a:rPr lang="en-US" sz="1400" dirty="0">
+                <a:solidFill>
+                  <a:srgbClr val="435F30"/>
+                </a:solidFill>
+                <a:latin typeface="Bahnschrift SemiLight" panose="020B0502040204020203" pitchFamily="34" charset="0"/>
+              </a:rPr>
+              <a:t>are always open</a:t>
             </a:r>
           </a:p>
         </p:txBody>
@@ -15162,7 +15306,7 @@
     </p:spTree>
     <p:extLst>
       <p:ext uri="{BB962C8B-B14F-4D97-AF65-F5344CB8AC3E}">
-        <p14:creationId xmlns:p14="http://schemas.microsoft.com/office/powerpoint/2010/main" val="1871765083"/>
+        <p14:creationId xmlns:p14="http://schemas.microsoft.com/office/powerpoint/2010/main" val="2798589290"/>
       </p:ext>
     </p:extLst>
   </p:cSld>
@@ -15189,7 +15333,13 @@
   <p:cSld>
     <p:spTree>
       <p:nvGrpSpPr>
-        <p:cNvPr id="1" name=""/>
+        <p:cNvPr id="1" name="">
+          <a:extLst>
+            <a:ext uri="{FF2B5EF4-FFF2-40B4-BE49-F238E27FC236}">
+              <a16:creationId xmlns:a16="http://schemas.microsoft.com/office/drawing/2014/main" id="{ED481F99-0E95-287F-111C-F463553BEC0C}"/>
+            </a:ext>
+          </a:extLst>
+        </p:cNvPr>
         <p:cNvGrpSpPr/>
         <p:nvPr/>
       </p:nvGrpSpPr>
@@ -15203,85 +15353,10 @@
       </p:grpSpPr>
       <p:sp>
         <p:nvSpPr>
-          <p:cNvPr id="2" name="Title 1">
+          <p:cNvPr id="4" name="Slide Number Placeholder 3">
             <a:extLst>
               <a:ext uri="{FF2B5EF4-FFF2-40B4-BE49-F238E27FC236}">
-                <a16:creationId xmlns:a16="http://schemas.microsoft.com/office/drawing/2014/main" id="{3691652E-4125-782A-0F3D-C13ED2979900}"/>
-              </a:ext>
-            </a:extLst>
-          </p:cNvPr>
-          <p:cNvSpPr>
-            <a:spLocks noGrp="1"/>
-          </p:cNvSpPr>
-          <p:nvPr>
-            <p:ph type="title"/>
-          </p:nvPr>
-        </p:nvSpPr>
-        <p:spPr/>
-        <p:txBody>
-          <a:bodyPr/>
-          <a:lstStyle/>
-          <a:p>
-            <a:endParaRPr lang="en-IN"/>
-          </a:p>
-        </p:txBody>
-      </p:sp>
-      <p:sp>
-        <p:nvSpPr>
-          <p:cNvPr id="3" name="Content Placeholder 2">
-            <a:extLst>
-              <a:ext uri="{FF2B5EF4-FFF2-40B4-BE49-F238E27FC236}">
-                <a16:creationId xmlns:a16="http://schemas.microsoft.com/office/drawing/2014/main" id="{C7EE9B6C-C4DB-433D-ADAB-6B49E2BC80AB}"/>
-              </a:ext>
-            </a:extLst>
-          </p:cNvPr>
-          <p:cNvSpPr>
-            <a:spLocks noGrp="1"/>
-          </p:cNvSpPr>
-          <p:nvPr>
-            <p:ph sz="quarter" idx="13"/>
-          </p:nvPr>
-        </p:nvSpPr>
-        <p:spPr/>
-        <p:txBody>
-          <a:bodyPr/>
-          <a:lstStyle/>
-          <a:p>
-            <a:endParaRPr lang="en-IN"/>
-          </a:p>
-        </p:txBody>
-      </p:sp>
-      <p:sp>
-        <p:nvSpPr>
-          <p:cNvPr id="4" name="Picture Placeholder 3">
-            <a:extLst>
-              <a:ext uri="{FF2B5EF4-FFF2-40B4-BE49-F238E27FC236}">
-                <a16:creationId xmlns:a16="http://schemas.microsoft.com/office/drawing/2014/main" id="{F26B7286-44C7-3395-7091-9C3CF7134780}"/>
-              </a:ext>
-            </a:extLst>
-          </p:cNvPr>
-          <p:cNvSpPr>
-            <a:spLocks noGrp="1"/>
-          </p:cNvSpPr>
-          <p:nvPr>
-            <p:ph type="pic" sz="quarter" idx="14"/>
-          </p:nvPr>
-        </p:nvSpPr>
-        <p:spPr/>
-        <p:txBody>
-          <a:bodyPr/>
-          <a:lstStyle/>
-          <a:p>
-            <a:endParaRPr lang="en-US"/>
-          </a:p>
-        </p:txBody>
-      </p:sp>
-      <p:sp>
-        <p:nvSpPr>
-          <p:cNvPr id="5" name="Slide Number Placeholder 4">
-            <a:extLst>
-              <a:ext uri="{FF2B5EF4-FFF2-40B4-BE49-F238E27FC236}">
-                <a16:creationId xmlns:a16="http://schemas.microsoft.com/office/drawing/2014/main" id="{771CACD5-DC8F-E562-D34B-63ACEED10192}"/>
+                <a16:creationId xmlns:a16="http://schemas.microsoft.com/office/drawing/2014/main" id="{F1EE8F3D-BF6A-EA6F-09BF-B9F78A0B9537}"/>
               </a:ext>
             </a:extLst>
           </p:cNvPr>
@@ -15308,152 +15383,231 @@
       </p:sp>
       <p:sp>
         <p:nvSpPr>
-          <p:cNvPr id="6" name="Slide Number Placeholder 4">
+          <p:cNvPr id="11" name="TextBox 10">
             <a:extLst>
               <a:ext uri="{FF2B5EF4-FFF2-40B4-BE49-F238E27FC236}">
-                <a16:creationId xmlns:a16="http://schemas.microsoft.com/office/drawing/2014/main" id="{FC397AB4-E7B3-064C-48F7-B4F336380CBA}"/>
+                <a16:creationId xmlns:a16="http://schemas.microsoft.com/office/drawing/2014/main" id="{5BD38CD5-4046-F541-0101-D13F77694A71}"/>
               </a:ext>
             </a:extLst>
           </p:cNvPr>
-          <p:cNvSpPr txBox="1">
-            <a:spLocks/>
-          </p:cNvSpPr>
+          <p:cNvSpPr txBox="1"/>
           <p:nvPr/>
         </p:nvSpPr>
         <p:spPr>
           <a:xfrm>
-            <a:off x="455612" y="6190488"/>
-            <a:ext cx="2677604" cy="210312"/>
+            <a:off x="1221290" y="5181600"/>
+            <a:ext cx="3802644" cy="297004"/>
           </a:xfrm>
           <a:prstGeom prst="rect">
             <a:avLst/>
           </a:prstGeom>
+          <a:noFill/>
         </p:spPr>
         <p:txBody>
-          <a:bodyPr vert="horz" lIns="121899" tIns="60949" rIns="121899" bIns="60949" rtlCol="0" anchor="b"/>
-          <a:lstStyle>
-            <a:defPPr>
-              <a:defRPr lang="en-US"/>
-            </a:defPPr>
-            <a:lvl1pPr marL="0" algn="r" defTabSz="1218987" rtl="0" eaLnBrk="1" latinLnBrk="0" hangingPunct="1">
-              <a:defRPr sz="1000" b="1" kern="1200" spc="200" baseline="0">
-                <a:solidFill>
-                  <a:schemeClr val="tx2">
-                    <a:lumMod val="50000"/>
-                  </a:schemeClr>
-                </a:solidFill>
-                <a:latin typeface="+mn-lt"/>
-                <a:ea typeface="+mn-ea"/>
-                <a:cs typeface="+mn-cs"/>
-              </a:defRPr>
-            </a:lvl1pPr>
-            <a:lvl2pPr marL="609493" algn="l" defTabSz="1218987" rtl="0" eaLnBrk="1" latinLnBrk="0" hangingPunct="1">
-              <a:defRPr sz="2400" kern="1200">
-                <a:solidFill>
-                  <a:schemeClr val="tx1"/>
-                </a:solidFill>
-                <a:latin typeface="+mn-lt"/>
-                <a:ea typeface="+mn-ea"/>
-                <a:cs typeface="+mn-cs"/>
-              </a:defRPr>
-            </a:lvl2pPr>
-            <a:lvl3pPr marL="1218987" algn="l" defTabSz="1218987" rtl="0" eaLnBrk="1" latinLnBrk="0" hangingPunct="1">
-              <a:defRPr sz="2400" kern="1200">
-                <a:solidFill>
-                  <a:schemeClr val="tx1"/>
-                </a:solidFill>
-                <a:latin typeface="+mn-lt"/>
-                <a:ea typeface="+mn-ea"/>
-                <a:cs typeface="+mn-cs"/>
-              </a:defRPr>
-            </a:lvl3pPr>
-            <a:lvl4pPr marL="1828480" algn="l" defTabSz="1218987" rtl="0" eaLnBrk="1" latinLnBrk="0" hangingPunct="1">
-              <a:defRPr sz="2400" kern="1200">
-                <a:solidFill>
-                  <a:schemeClr val="tx1"/>
-                </a:solidFill>
-                <a:latin typeface="+mn-lt"/>
-                <a:ea typeface="+mn-ea"/>
-                <a:cs typeface="+mn-cs"/>
-              </a:defRPr>
-            </a:lvl4pPr>
-            <a:lvl5pPr marL="2437973" algn="l" defTabSz="1218987" rtl="0" eaLnBrk="1" latinLnBrk="0" hangingPunct="1">
-              <a:defRPr sz="2400" kern="1200">
-                <a:solidFill>
-                  <a:schemeClr val="tx1"/>
-                </a:solidFill>
-                <a:latin typeface="+mn-lt"/>
-                <a:ea typeface="+mn-ea"/>
-                <a:cs typeface="+mn-cs"/>
-              </a:defRPr>
-            </a:lvl5pPr>
-            <a:lvl6pPr marL="3047467" algn="l" defTabSz="1218987" rtl="0" eaLnBrk="1" latinLnBrk="0" hangingPunct="1">
-              <a:defRPr sz="2400" kern="1200">
-                <a:solidFill>
-                  <a:schemeClr val="tx1"/>
-                </a:solidFill>
-                <a:latin typeface="+mn-lt"/>
-                <a:ea typeface="+mn-ea"/>
-                <a:cs typeface="+mn-cs"/>
-              </a:defRPr>
-            </a:lvl6pPr>
-            <a:lvl7pPr marL="3656960" algn="l" defTabSz="1218987" rtl="0" eaLnBrk="1" latinLnBrk="0" hangingPunct="1">
-              <a:defRPr sz="2400" kern="1200">
-                <a:solidFill>
-                  <a:schemeClr val="tx1"/>
-                </a:solidFill>
-                <a:latin typeface="+mn-lt"/>
-                <a:ea typeface="+mn-ea"/>
-                <a:cs typeface="+mn-cs"/>
-              </a:defRPr>
-            </a:lvl7pPr>
-            <a:lvl8pPr marL="4266453" algn="l" defTabSz="1218987" rtl="0" eaLnBrk="1" latinLnBrk="0" hangingPunct="1">
-              <a:defRPr sz="2400" kern="1200">
-                <a:solidFill>
-                  <a:schemeClr val="tx1"/>
-                </a:solidFill>
-                <a:latin typeface="+mn-lt"/>
-                <a:ea typeface="+mn-ea"/>
-                <a:cs typeface="+mn-cs"/>
-              </a:defRPr>
-            </a:lvl8pPr>
-            <a:lvl9pPr marL="4875947" algn="l" defTabSz="1218987" rtl="0" eaLnBrk="1" latinLnBrk="0" hangingPunct="1">
-              <a:defRPr sz="2400" kern="1200">
-                <a:solidFill>
-                  <a:schemeClr val="tx1"/>
-                </a:solidFill>
-                <a:latin typeface="+mn-lt"/>
-                <a:ea typeface="+mn-ea"/>
-                <a:cs typeface="+mn-cs"/>
-              </a:defRPr>
-            </a:lvl9pPr>
-          </a:lstStyle>
-          <a:p>
-            <a:pPr algn="l"/>
+          <a:bodyPr wrap="none" rtlCol="0">
+            <a:spAutoFit/>
+          </a:bodyPr>
+          <a:lstStyle/>
+          <a:p>
+            <a:pPr>
+              <a:lnSpc>
+                <a:spcPct val="95000"/>
+              </a:lnSpc>
+            </a:pPr>
             <a:r>
-              <a:rPr lang="en-US" dirty="0"/>
-              <a:t>DES211 CAPSTONE PROJECT</a:t>
+              <a:rPr lang="en-US" sz="1400" dirty="0">
+                <a:solidFill>
+                  <a:srgbClr val="435F30"/>
+                </a:solidFill>
+                <a:latin typeface="Bahnschrift SemiLight" panose="020B0502040204020203" pitchFamily="34" charset="0"/>
+              </a:rPr>
+              <a:t>Optional rotating lid to minimize user contact</a:t>
             </a:r>
           </a:p>
         </p:txBody>
       </p:sp>
+      <p:sp>
+        <p:nvSpPr>
+          <p:cNvPr id="13" name="TextBox 12">
+            <a:extLst>
+              <a:ext uri="{FF2B5EF4-FFF2-40B4-BE49-F238E27FC236}">
+                <a16:creationId xmlns:a16="http://schemas.microsoft.com/office/drawing/2014/main" id="{DF35BBE4-F3EA-DFE1-949C-75C55B5A65B7}"/>
+              </a:ext>
+            </a:extLst>
+          </p:cNvPr>
+          <p:cNvSpPr txBox="1"/>
+          <p:nvPr/>
+        </p:nvSpPr>
+        <p:spPr>
+          <a:xfrm>
+            <a:off x="8070154" y="5227766"/>
+            <a:ext cx="1810112" cy="297004"/>
+          </a:xfrm>
+          <a:prstGeom prst="rect">
+            <a:avLst/>
+          </a:prstGeom>
+          <a:noFill/>
+        </p:spPr>
+        <p:txBody>
+          <a:bodyPr wrap="none" rtlCol="0">
+            <a:spAutoFit/>
+          </a:bodyPr>
+          <a:lstStyle/>
+          <a:p>
+            <a:pPr algn="ctr">
+              <a:lnSpc>
+                <a:spcPct val="95000"/>
+              </a:lnSpc>
+            </a:pPr>
+            <a:r>
+              <a:rPr lang="en-US" sz="1400" dirty="0">
+                <a:solidFill>
+                  <a:srgbClr val="435F30"/>
+                </a:solidFill>
+                <a:latin typeface="Bahnschrift SemiLight" panose="020B0502040204020203" pitchFamily="34" charset="0"/>
+              </a:rPr>
+              <a:t>Bin and Lid together</a:t>
+            </a:r>
+          </a:p>
+        </p:txBody>
+      </p:sp>
+      <p:pic>
+        <p:nvPicPr>
+          <p:cNvPr id="3" name="Picture 2">
+            <a:extLst>
+              <a:ext uri="{FF2B5EF4-FFF2-40B4-BE49-F238E27FC236}">
+                <a16:creationId xmlns:a16="http://schemas.microsoft.com/office/drawing/2014/main" id="{2B97FBB4-2A82-39B8-486D-F95EB8032787}"/>
+              </a:ext>
+            </a:extLst>
+          </p:cNvPr>
+          <p:cNvPicPr>
+            <a:picLocks noChangeAspect="1"/>
+          </p:cNvPicPr>
+          <p:nvPr/>
+        </p:nvPicPr>
+        <p:blipFill>
+          <a:blip r:embed="rId2"/>
+          <a:stretch>
+            <a:fillRect/>
+          </a:stretch>
+        </p:blipFill>
+        <p:spPr>
+          <a:xfrm>
+            <a:off x="531812" y="1008991"/>
+            <a:ext cx="5181600" cy="4081473"/>
+          </a:xfrm>
+          <a:prstGeom prst="rect">
+            <a:avLst/>
+          </a:prstGeom>
+          <a:solidFill>
+            <a:srgbClr val="FFFFFF">
+              <a:shade val="85000"/>
+            </a:srgbClr>
+          </a:solidFill>
+          <a:ln w="57150" cap="sq">
+            <a:solidFill>
+              <a:srgbClr val="E5EDDD"/>
+            </a:solidFill>
+            <a:miter lim="800000"/>
+          </a:ln>
+          <a:effectLst>
+            <a:outerShdw blurRad="55000" dist="18000" dir="5400000" algn="tl" rotWithShape="0">
+              <a:srgbClr val="000000">
+                <a:alpha val="40000"/>
+              </a:srgbClr>
+            </a:outerShdw>
+          </a:effectLst>
+          <a:scene3d>
+            <a:camera prst="orthographicFront"/>
+            <a:lightRig rig="twoPt" dir="t">
+              <a:rot lat="0" lon="0" rev="7200000"/>
+            </a:lightRig>
+          </a:scene3d>
+          <a:sp3d>
+            <a:bevelT w="25400" h="19050"/>
+            <a:contourClr>
+              <a:srgbClr val="FFFFFF"/>
+            </a:contourClr>
+          </a:sp3d>
+        </p:spPr>
+      </p:pic>
+      <p:pic>
+        <p:nvPicPr>
+          <p:cNvPr id="7" name="Picture 6">
+            <a:extLst>
+              <a:ext uri="{FF2B5EF4-FFF2-40B4-BE49-F238E27FC236}">
+                <a16:creationId xmlns:a16="http://schemas.microsoft.com/office/drawing/2014/main" id="{373F1096-504D-7307-86D6-365BCA94919E}"/>
+              </a:ext>
+            </a:extLst>
+          </p:cNvPr>
+          <p:cNvPicPr>
+            <a:picLocks noChangeAspect="1"/>
+          </p:cNvPicPr>
+          <p:nvPr/>
+        </p:nvPicPr>
+        <p:blipFill>
+          <a:blip r:embed="rId3"/>
+          <a:stretch>
+            <a:fillRect/>
+          </a:stretch>
+        </p:blipFill>
+        <p:spPr>
+          <a:xfrm>
+            <a:off x="6627812" y="1008991"/>
+            <a:ext cx="4694791" cy="4136339"/>
+          </a:xfrm>
+          <a:prstGeom prst="rect">
+            <a:avLst/>
+          </a:prstGeom>
+          <a:solidFill>
+            <a:srgbClr val="FFFFFF">
+              <a:shade val="85000"/>
+            </a:srgbClr>
+          </a:solidFill>
+          <a:ln w="57150" cap="sq">
+            <a:solidFill>
+              <a:srgbClr val="E5EDDD"/>
+            </a:solidFill>
+            <a:miter lim="800000"/>
+          </a:ln>
+          <a:effectLst>
+            <a:outerShdw blurRad="55000" dist="18000" dir="5400000" algn="tl" rotWithShape="0">
+              <a:srgbClr val="000000">
+                <a:alpha val="40000"/>
+              </a:srgbClr>
+            </a:outerShdw>
+          </a:effectLst>
+          <a:scene3d>
+            <a:camera prst="orthographicFront"/>
+            <a:lightRig rig="twoPt" dir="t">
+              <a:rot lat="0" lon="0" rev="7200000"/>
+            </a:lightRig>
+          </a:scene3d>
+          <a:sp3d>
+            <a:bevelT w="25400" h="19050"/>
+            <a:contourClr>
+              <a:srgbClr val="FFFFFF"/>
+            </a:contourClr>
+          </a:sp3d>
+        </p:spPr>
+      </p:pic>
     </p:spTree>
     <p:extLst>
       <p:ext uri="{BB962C8B-B14F-4D97-AF65-F5344CB8AC3E}">
-        <p14:creationId xmlns:p14="http://schemas.microsoft.com/office/powerpoint/2010/main" val="2540403346"/>
+        <p14:creationId xmlns:p14="http://schemas.microsoft.com/office/powerpoint/2010/main" val="3331049099"/>
       </p:ext>
     </p:extLst>
   </p:cSld>
   <p:clrMapOvr>
     <a:masterClrMapping/>
   </p:clrMapOvr>
-  <mc:AlternateContent xmlns:mc="http://schemas.openxmlformats.org/markup-compatibility/2006" xmlns:p14="http://schemas.microsoft.com/office/powerpoint/2010/main">
-    <mc:Choice Requires="p14">
+  <mc:AlternateContent xmlns:mc="http://schemas.openxmlformats.org/markup-compatibility/2006">
+    <mc:Choice xmlns:p14="http://schemas.microsoft.com/office/powerpoint/2010/main" Requires="p14">
       <p:transition spd="med" p14:dur="700">
         <p:fade/>
       </p:transition>
     </mc:Choice>
-    <mc:Fallback xmlns="">
+    <mc:Fallback>
       <p:transition spd="med">
         <p:fade/>
       </p:transition>
@@ -15467,7 +15621,13 @@
   <p:cSld>
     <p:spTree>
       <p:nvGrpSpPr>
-        <p:cNvPr id="1" name=""/>
+        <p:cNvPr id="1" name="">
+          <a:extLst>
+            <a:ext uri="{FF2B5EF4-FFF2-40B4-BE49-F238E27FC236}">
+              <a16:creationId xmlns:a16="http://schemas.microsoft.com/office/drawing/2014/main" id="{4BBF7A5A-F01E-A46E-7FC8-80A808491AF3}"/>
+            </a:ext>
+          </a:extLst>
+        </p:cNvPr>
         <p:cNvGrpSpPr/>
         <p:nvPr/>
       </p:nvGrpSpPr>
@@ -15481,85 +15641,10 @@
       </p:grpSpPr>
       <p:sp>
         <p:nvSpPr>
-          <p:cNvPr id="2" name="Title 1">
+          <p:cNvPr id="4" name="Slide Number Placeholder 3">
             <a:extLst>
               <a:ext uri="{FF2B5EF4-FFF2-40B4-BE49-F238E27FC236}">
-                <a16:creationId xmlns:a16="http://schemas.microsoft.com/office/drawing/2014/main" id="{E5BB7D67-76BC-2F76-6A7E-93CF1B03CA9B}"/>
-              </a:ext>
-            </a:extLst>
-          </p:cNvPr>
-          <p:cNvSpPr>
-            <a:spLocks noGrp="1"/>
-          </p:cNvSpPr>
-          <p:nvPr>
-            <p:ph type="title"/>
-          </p:nvPr>
-        </p:nvSpPr>
-        <p:spPr/>
-        <p:txBody>
-          <a:bodyPr/>
-          <a:lstStyle/>
-          <a:p>
-            <a:endParaRPr lang="en-IN"/>
-          </a:p>
-        </p:txBody>
-      </p:sp>
-      <p:sp>
-        <p:nvSpPr>
-          <p:cNvPr id="3" name="Content Placeholder 2">
-            <a:extLst>
-              <a:ext uri="{FF2B5EF4-FFF2-40B4-BE49-F238E27FC236}">
-                <a16:creationId xmlns:a16="http://schemas.microsoft.com/office/drawing/2014/main" id="{481F0043-5374-9370-B17A-15CAD56ADF84}"/>
-              </a:ext>
-            </a:extLst>
-          </p:cNvPr>
-          <p:cNvSpPr>
-            <a:spLocks noGrp="1"/>
-          </p:cNvSpPr>
-          <p:nvPr>
-            <p:ph sz="quarter" idx="13"/>
-          </p:nvPr>
-        </p:nvSpPr>
-        <p:spPr/>
-        <p:txBody>
-          <a:bodyPr/>
-          <a:lstStyle/>
-          <a:p>
-            <a:endParaRPr lang="en-IN"/>
-          </a:p>
-        </p:txBody>
-      </p:sp>
-      <p:sp>
-        <p:nvSpPr>
-          <p:cNvPr id="4" name="Picture Placeholder 3">
-            <a:extLst>
-              <a:ext uri="{FF2B5EF4-FFF2-40B4-BE49-F238E27FC236}">
-                <a16:creationId xmlns:a16="http://schemas.microsoft.com/office/drawing/2014/main" id="{B57F297D-5244-EB01-2D2D-30DC341E469D}"/>
-              </a:ext>
-            </a:extLst>
-          </p:cNvPr>
-          <p:cNvSpPr>
-            <a:spLocks noGrp="1"/>
-          </p:cNvSpPr>
-          <p:nvPr>
-            <p:ph type="pic" sz="quarter" idx="14"/>
-          </p:nvPr>
-        </p:nvSpPr>
-        <p:spPr/>
-        <p:txBody>
-          <a:bodyPr/>
-          <a:lstStyle/>
-          <a:p>
-            <a:endParaRPr lang="en-US"/>
-          </a:p>
-        </p:txBody>
-      </p:sp>
-      <p:sp>
-        <p:nvSpPr>
-          <p:cNvPr id="5" name="Slide Number Placeholder 4">
-            <a:extLst>
-              <a:ext uri="{FF2B5EF4-FFF2-40B4-BE49-F238E27FC236}">
-                <a16:creationId xmlns:a16="http://schemas.microsoft.com/office/drawing/2014/main" id="{C6881C2A-23D8-2323-B89B-98E5EBD584F6}"/>
+                <a16:creationId xmlns:a16="http://schemas.microsoft.com/office/drawing/2014/main" id="{9452E637-11C2-0066-F082-1A69742B78A9}"/>
               </a:ext>
             </a:extLst>
           </p:cNvPr>
@@ -15586,152 +15671,263 @@
       </p:sp>
       <p:sp>
         <p:nvSpPr>
-          <p:cNvPr id="6" name="Slide Number Placeholder 4">
+          <p:cNvPr id="11" name="TextBox 10">
             <a:extLst>
               <a:ext uri="{FF2B5EF4-FFF2-40B4-BE49-F238E27FC236}">
-                <a16:creationId xmlns:a16="http://schemas.microsoft.com/office/drawing/2014/main" id="{1466C1CC-3C62-38E8-78DE-98C589A6C039}"/>
+                <a16:creationId xmlns:a16="http://schemas.microsoft.com/office/drawing/2014/main" id="{B1044AF6-141B-2724-5A48-5801385D696E}"/>
               </a:ext>
             </a:extLst>
           </p:cNvPr>
-          <p:cNvSpPr txBox="1">
-            <a:spLocks/>
-          </p:cNvSpPr>
+          <p:cNvSpPr txBox="1"/>
           <p:nvPr/>
         </p:nvSpPr>
         <p:spPr>
           <a:xfrm>
-            <a:off x="455612" y="6190488"/>
-            <a:ext cx="2677604" cy="210312"/>
+            <a:off x="1699108" y="5181600"/>
+            <a:ext cx="2539478" cy="501676"/>
           </a:xfrm>
           <a:prstGeom prst="rect">
             <a:avLst/>
           </a:prstGeom>
+          <a:noFill/>
         </p:spPr>
         <p:txBody>
-          <a:bodyPr vert="horz" lIns="121899" tIns="60949" rIns="121899" bIns="60949" rtlCol="0" anchor="b"/>
-          <a:lstStyle>
-            <a:defPPr>
-              <a:defRPr lang="en-US"/>
-            </a:defPPr>
-            <a:lvl1pPr marL="0" algn="r" defTabSz="1218987" rtl="0" eaLnBrk="1" latinLnBrk="0" hangingPunct="1">
-              <a:defRPr sz="1000" b="1" kern="1200" spc="200" baseline="0">
-                <a:solidFill>
-                  <a:schemeClr val="tx2">
-                    <a:lumMod val="50000"/>
-                  </a:schemeClr>
-                </a:solidFill>
-                <a:latin typeface="+mn-lt"/>
-                <a:ea typeface="+mn-ea"/>
-                <a:cs typeface="+mn-cs"/>
-              </a:defRPr>
-            </a:lvl1pPr>
-            <a:lvl2pPr marL="609493" algn="l" defTabSz="1218987" rtl="0" eaLnBrk="1" latinLnBrk="0" hangingPunct="1">
-              <a:defRPr sz="2400" kern="1200">
-                <a:solidFill>
-                  <a:schemeClr val="tx1"/>
-                </a:solidFill>
-                <a:latin typeface="+mn-lt"/>
-                <a:ea typeface="+mn-ea"/>
-                <a:cs typeface="+mn-cs"/>
-              </a:defRPr>
-            </a:lvl2pPr>
-            <a:lvl3pPr marL="1218987" algn="l" defTabSz="1218987" rtl="0" eaLnBrk="1" latinLnBrk="0" hangingPunct="1">
-              <a:defRPr sz="2400" kern="1200">
-                <a:solidFill>
-                  <a:schemeClr val="tx1"/>
-                </a:solidFill>
-                <a:latin typeface="+mn-lt"/>
-                <a:ea typeface="+mn-ea"/>
-                <a:cs typeface="+mn-cs"/>
-              </a:defRPr>
-            </a:lvl3pPr>
-            <a:lvl4pPr marL="1828480" algn="l" defTabSz="1218987" rtl="0" eaLnBrk="1" latinLnBrk="0" hangingPunct="1">
-              <a:defRPr sz="2400" kern="1200">
-                <a:solidFill>
-                  <a:schemeClr val="tx1"/>
-                </a:solidFill>
-                <a:latin typeface="+mn-lt"/>
-                <a:ea typeface="+mn-ea"/>
-                <a:cs typeface="+mn-cs"/>
-              </a:defRPr>
-            </a:lvl4pPr>
-            <a:lvl5pPr marL="2437973" algn="l" defTabSz="1218987" rtl="0" eaLnBrk="1" latinLnBrk="0" hangingPunct="1">
-              <a:defRPr sz="2400" kern="1200">
-                <a:solidFill>
-                  <a:schemeClr val="tx1"/>
-                </a:solidFill>
-                <a:latin typeface="+mn-lt"/>
-                <a:ea typeface="+mn-ea"/>
-                <a:cs typeface="+mn-cs"/>
-              </a:defRPr>
-            </a:lvl5pPr>
-            <a:lvl6pPr marL="3047467" algn="l" defTabSz="1218987" rtl="0" eaLnBrk="1" latinLnBrk="0" hangingPunct="1">
-              <a:defRPr sz="2400" kern="1200">
-                <a:solidFill>
-                  <a:schemeClr val="tx1"/>
-                </a:solidFill>
-                <a:latin typeface="+mn-lt"/>
-                <a:ea typeface="+mn-ea"/>
-                <a:cs typeface="+mn-cs"/>
-              </a:defRPr>
-            </a:lvl6pPr>
-            <a:lvl7pPr marL="3656960" algn="l" defTabSz="1218987" rtl="0" eaLnBrk="1" latinLnBrk="0" hangingPunct="1">
-              <a:defRPr sz="2400" kern="1200">
-                <a:solidFill>
-                  <a:schemeClr val="tx1"/>
-                </a:solidFill>
-                <a:latin typeface="+mn-lt"/>
-                <a:ea typeface="+mn-ea"/>
-                <a:cs typeface="+mn-cs"/>
-              </a:defRPr>
-            </a:lvl7pPr>
-            <a:lvl8pPr marL="4266453" algn="l" defTabSz="1218987" rtl="0" eaLnBrk="1" latinLnBrk="0" hangingPunct="1">
-              <a:defRPr sz="2400" kern="1200">
-                <a:solidFill>
-                  <a:schemeClr val="tx1"/>
-                </a:solidFill>
-                <a:latin typeface="+mn-lt"/>
-                <a:ea typeface="+mn-ea"/>
-                <a:cs typeface="+mn-cs"/>
-              </a:defRPr>
-            </a:lvl8pPr>
-            <a:lvl9pPr marL="4875947" algn="l" defTabSz="1218987" rtl="0" eaLnBrk="1" latinLnBrk="0" hangingPunct="1">
-              <a:defRPr sz="2400" kern="1200">
-                <a:solidFill>
-                  <a:schemeClr val="tx1"/>
-                </a:solidFill>
-                <a:latin typeface="+mn-lt"/>
-                <a:ea typeface="+mn-ea"/>
-                <a:cs typeface="+mn-cs"/>
-              </a:defRPr>
-            </a:lvl9pPr>
-          </a:lstStyle>
-          <a:p>
-            <a:pPr algn="l"/>
+          <a:bodyPr wrap="none" rtlCol="0">
+            <a:spAutoFit/>
+          </a:bodyPr>
+          <a:lstStyle/>
+          <a:p>
+            <a:pPr algn="ctr">
+              <a:lnSpc>
+                <a:spcPct val="95000"/>
+              </a:lnSpc>
+            </a:pPr>
             <a:r>
-              <a:rPr lang="en-US" dirty="0"/>
-              <a:t>DES211 CAPSTONE PROJECT</a:t>
+              <a:rPr lang="en-US" sz="1400" dirty="0">
+                <a:solidFill>
+                  <a:srgbClr val="435F30"/>
+                </a:solidFill>
+                <a:latin typeface="Bahnschrift SemiLight" panose="020B0502040204020203" pitchFamily="34" charset="0"/>
+              </a:rPr>
+              <a:t>Detachable suction bottom to</a:t>
+            </a:r>
+          </a:p>
+          <a:p>
+            <a:pPr algn="ctr">
+              <a:lnSpc>
+                <a:spcPct val="95000"/>
+              </a:lnSpc>
+            </a:pPr>
+            <a:r>
+              <a:rPr lang="en-US" sz="1400" dirty="0">
+                <a:solidFill>
+                  <a:srgbClr val="435F30"/>
+                </a:solidFill>
+                <a:latin typeface="Bahnschrift SemiLight" panose="020B0502040204020203" pitchFamily="34" charset="0"/>
+              </a:rPr>
+              <a:t>ensure bin doesn’t tip over</a:t>
             </a:r>
           </a:p>
         </p:txBody>
       </p:sp>
+      <p:sp>
+        <p:nvSpPr>
+          <p:cNvPr id="13" name="TextBox 12">
+            <a:extLst>
+              <a:ext uri="{FF2B5EF4-FFF2-40B4-BE49-F238E27FC236}">
+                <a16:creationId xmlns:a16="http://schemas.microsoft.com/office/drawing/2014/main" id="{3D334BA0-43CE-5150-D340-6C241435A868}"/>
+              </a:ext>
+            </a:extLst>
+          </p:cNvPr>
+          <p:cNvSpPr txBox="1"/>
+          <p:nvPr/>
+        </p:nvSpPr>
+        <p:spPr>
+          <a:xfrm>
+            <a:off x="7628005" y="5181600"/>
+            <a:ext cx="1843773" cy="501676"/>
+          </a:xfrm>
+          <a:prstGeom prst="rect">
+            <a:avLst/>
+          </a:prstGeom>
+          <a:noFill/>
+        </p:spPr>
+        <p:txBody>
+          <a:bodyPr wrap="none" rtlCol="0">
+            <a:spAutoFit/>
+          </a:bodyPr>
+          <a:lstStyle/>
+          <a:p>
+            <a:pPr algn="ctr">
+              <a:lnSpc>
+                <a:spcPct val="95000"/>
+              </a:lnSpc>
+            </a:pPr>
+            <a:r>
+              <a:rPr lang="en-US" sz="1400" dirty="0">
+                <a:solidFill>
+                  <a:srgbClr val="435F30"/>
+                </a:solidFill>
+                <a:latin typeface="Bahnschrift SemiLight" panose="020B0502040204020203" pitchFamily="34" charset="0"/>
+              </a:rPr>
+              <a:t>Attachment point for</a:t>
+            </a:r>
+          </a:p>
+          <a:p>
+            <a:pPr algn="ctr">
+              <a:lnSpc>
+                <a:spcPct val="95000"/>
+              </a:lnSpc>
+            </a:pPr>
+            <a:r>
+              <a:rPr lang="en-US" sz="1400" dirty="0">
+                <a:solidFill>
+                  <a:srgbClr val="435F30"/>
+                </a:solidFill>
+                <a:latin typeface="Bahnschrift SemiLight" panose="020B0502040204020203" pitchFamily="34" charset="0"/>
+              </a:rPr>
+              <a:t>Suction bottom</a:t>
+            </a:r>
+          </a:p>
+        </p:txBody>
+      </p:sp>
+      <p:pic>
+        <p:nvPicPr>
+          <p:cNvPr id="5" name="Picture 4">
+            <a:extLst>
+              <a:ext uri="{FF2B5EF4-FFF2-40B4-BE49-F238E27FC236}">
+                <a16:creationId xmlns:a16="http://schemas.microsoft.com/office/drawing/2014/main" id="{766CA910-373E-32A9-5EF7-2619B7EF5D3B}"/>
+              </a:ext>
+            </a:extLst>
+          </p:cNvPr>
+          <p:cNvPicPr>
+            <a:picLocks noChangeAspect="1"/>
+          </p:cNvPicPr>
+          <p:nvPr/>
+        </p:nvPicPr>
+        <p:blipFill>
+          <a:blip r:embed="rId2"/>
+          <a:stretch>
+            <a:fillRect/>
+          </a:stretch>
+        </p:blipFill>
+        <p:spPr>
+          <a:xfrm>
+            <a:off x="608012" y="1008991"/>
+            <a:ext cx="4721670" cy="4136339"/>
+          </a:xfrm>
+          <a:prstGeom prst="rect">
+            <a:avLst/>
+          </a:prstGeom>
+          <a:solidFill>
+            <a:srgbClr val="FFFFFF">
+              <a:shade val="85000"/>
+            </a:srgbClr>
+          </a:solidFill>
+          <a:ln w="57150" cap="sq">
+            <a:solidFill>
+              <a:srgbClr val="E5EDDD"/>
+            </a:solidFill>
+            <a:miter lim="800000"/>
+          </a:ln>
+          <a:effectLst>
+            <a:outerShdw blurRad="55000" dist="18000" dir="5400000" algn="tl" rotWithShape="0">
+              <a:srgbClr val="000000">
+                <a:alpha val="40000"/>
+              </a:srgbClr>
+            </a:outerShdw>
+          </a:effectLst>
+          <a:scene3d>
+            <a:camera prst="orthographicFront"/>
+            <a:lightRig rig="twoPt" dir="t">
+              <a:rot lat="0" lon="0" rev="7200000"/>
+            </a:lightRig>
+          </a:scene3d>
+          <a:sp3d>
+            <a:bevelT w="25400" h="19050"/>
+            <a:contourClr>
+              <a:srgbClr val="FFFFFF"/>
+            </a:contourClr>
+          </a:sp3d>
+        </p:spPr>
+      </p:pic>
+      <p:pic>
+        <p:nvPicPr>
+          <p:cNvPr id="8" name="Picture 7">
+            <a:extLst>
+              <a:ext uri="{FF2B5EF4-FFF2-40B4-BE49-F238E27FC236}">
+                <a16:creationId xmlns:a16="http://schemas.microsoft.com/office/drawing/2014/main" id="{824CA23A-13ED-F613-0148-AAC435952F01}"/>
+              </a:ext>
+            </a:extLst>
+          </p:cNvPr>
+          <p:cNvPicPr>
+            <a:picLocks noChangeAspect="1"/>
+          </p:cNvPicPr>
+          <p:nvPr/>
+        </p:nvPicPr>
+        <p:blipFill>
+          <a:blip r:embed="rId3"/>
+          <a:stretch>
+            <a:fillRect/>
+          </a:stretch>
+        </p:blipFill>
+        <p:spPr>
+          <a:xfrm>
+            <a:off x="5942012" y="1008991"/>
+            <a:ext cx="5215760" cy="4172609"/>
+          </a:xfrm>
+          <a:prstGeom prst="rect">
+            <a:avLst/>
+          </a:prstGeom>
+          <a:solidFill>
+            <a:srgbClr val="FFFFFF">
+              <a:shade val="85000"/>
+            </a:srgbClr>
+          </a:solidFill>
+          <a:ln w="57150" cap="sq">
+            <a:solidFill>
+              <a:srgbClr val="E5EDDD"/>
+            </a:solidFill>
+            <a:miter lim="800000"/>
+          </a:ln>
+          <a:effectLst>
+            <a:outerShdw blurRad="55000" dist="18000" dir="5400000" algn="tl" rotWithShape="0">
+              <a:srgbClr val="000000">
+                <a:alpha val="40000"/>
+              </a:srgbClr>
+            </a:outerShdw>
+          </a:effectLst>
+          <a:scene3d>
+            <a:camera prst="orthographicFront"/>
+            <a:lightRig rig="twoPt" dir="t">
+              <a:rot lat="0" lon="0" rev="7200000"/>
+            </a:lightRig>
+          </a:scene3d>
+          <a:sp3d>
+            <a:bevelT w="25400" h="19050"/>
+            <a:contourClr>
+              <a:srgbClr val="FFFFFF"/>
+            </a:contourClr>
+          </a:sp3d>
+        </p:spPr>
+      </p:pic>
     </p:spTree>
     <p:extLst>
       <p:ext uri="{BB962C8B-B14F-4D97-AF65-F5344CB8AC3E}">
-        <p14:creationId xmlns:p14="http://schemas.microsoft.com/office/powerpoint/2010/main" val="1188192135"/>
+        <p14:creationId xmlns:p14="http://schemas.microsoft.com/office/powerpoint/2010/main" val="14080649"/>
       </p:ext>
     </p:extLst>
   </p:cSld>
   <p:clrMapOvr>
     <a:masterClrMapping/>
   </p:clrMapOvr>
-  <mc:AlternateContent xmlns:mc="http://schemas.openxmlformats.org/markup-compatibility/2006" xmlns:p14="http://schemas.microsoft.com/office/powerpoint/2010/main">
-    <mc:Choice Requires="p14">
+  <mc:AlternateContent xmlns:mc="http://schemas.openxmlformats.org/markup-compatibility/2006">
+    <mc:Choice xmlns:p14="http://schemas.microsoft.com/office/powerpoint/2010/main" Requires="p14">
       <p:transition spd="med" p14:dur="700">
         <p:fade/>
       </p:transition>
     </mc:Choice>
-    <mc:Fallback xmlns="">
+    <mc:Fallback>
       <p:transition spd="med">
         <p:fade/>
       </p:transition>
@@ -15762,7 +15958,7 @@
           <p:cNvPr id="2" name="Title 1">
             <a:extLst>
               <a:ext uri="{FF2B5EF4-FFF2-40B4-BE49-F238E27FC236}">
-                <a16:creationId xmlns:a16="http://schemas.microsoft.com/office/drawing/2014/main" id="{2BD7C78A-703A-694E-8FFC-38843E2ED0D5}"/>
+                <a16:creationId xmlns:a16="http://schemas.microsoft.com/office/drawing/2014/main" id="{AADB5DC0-637B-33EB-9B61-EFB3DE503900}"/>
               </a:ext>
             </a:extLst>
           </p:cNvPr>
@@ -15787,7 +15983,7 @@
           <p:cNvPr id="3" name="Content Placeholder 2">
             <a:extLst>
               <a:ext uri="{FF2B5EF4-FFF2-40B4-BE49-F238E27FC236}">
-                <a16:creationId xmlns:a16="http://schemas.microsoft.com/office/drawing/2014/main" id="{12D21900-DBB9-221C-76E0-EDDD133DAC6B}"/>
+                <a16:creationId xmlns:a16="http://schemas.microsoft.com/office/drawing/2014/main" id="{54DEFFDB-126C-310C-5C89-434FDACA5F31}"/>
               </a:ext>
             </a:extLst>
           </p:cNvPr>
@@ -15812,7 +16008,7 @@
           <p:cNvPr id="4" name="Picture Placeholder 3">
             <a:extLst>
               <a:ext uri="{FF2B5EF4-FFF2-40B4-BE49-F238E27FC236}">
-                <a16:creationId xmlns:a16="http://schemas.microsoft.com/office/drawing/2014/main" id="{32AEFEA6-A660-5D12-A8F7-5BB4222EFB74}"/>
+                <a16:creationId xmlns:a16="http://schemas.microsoft.com/office/drawing/2014/main" id="{84E988D3-CF35-4838-4D7E-194B8206E5F6}"/>
               </a:ext>
             </a:extLst>
           </p:cNvPr>
@@ -15837,7 +16033,7 @@
           <p:cNvPr id="5" name="Slide Number Placeholder 4">
             <a:extLst>
               <a:ext uri="{FF2B5EF4-FFF2-40B4-BE49-F238E27FC236}">
-                <a16:creationId xmlns:a16="http://schemas.microsoft.com/office/drawing/2014/main" id="{4DFB636B-8EED-D8C9-B88E-532B23AEFD21}"/>
+                <a16:creationId xmlns:a16="http://schemas.microsoft.com/office/drawing/2014/main" id="{ECB92C49-500A-83A9-A98E-071CD7B4CF66}"/>
               </a:ext>
             </a:extLst>
           </p:cNvPr>
@@ -15867,7 +16063,7 @@
           <p:cNvPr id="6" name="Slide Number Placeholder 4">
             <a:extLst>
               <a:ext uri="{FF2B5EF4-FFF2-40B4-BE49-F238E27FC236}">
-                <a16:creationId xmlns:a16="http://schemas.microsoft.com/office/drawing/2014/main" id="{36B8F459-6F30-1450-5D41-1997E9CEE977}"/>
+                <a16:creationId xmlns:a16="http://schemas.microsoft.com/office/drawing/2014/main" id="{3F841A1B-DBD5-E8AC-6353-E738060B9317}"/>
               </a:ext>
             </a:extLst>
           </p:cNvPr>
@@ -15996,7 +16192,7 @@
     </p:spTree>
     <p:extLst>
       <p:ext uri="{BB962C8B-B14F-4D97-AF65-F5344CB8AC3E}">
-        <p14:creationId xmlns:p14="http://schemas.microsoft.com/office/powerpoint/2010/main" val="3262945818"/>
+        <p14:creationId xmlns:p14="http://schemas.microsoft.com/office/powerpoint/2010/main" val="1871765083"/>
       </p:ext>
     </p:extLst>
   </p:cSld>
@@ -16040,7 +16236,7 @@
           <p:cNvPr id="2" name="Title 1">
             <a:extLst>
               <a:ext uri="{FF2B5EF4-FFF2-40B4-BE49-F238E27FC236}">
-                <a16:creationId xmlns:a16="http://schemas.microsoft.com/office/drawing/2014/main" id="{0B4D0D16-67A0-9392-36C4-38AEF1EFD705}"/>
+                <a16:creationId xmlns:a16="http://schemas.microsoft.com/office/drawing/2014/main" id="{3691652E-4125-782A-0F3D-C13ED2979900}"/>
               </a:ext>
             </a:extLst>
           </p:cNvPr>
@@ -16065,7 +16261,7 @@
           <p:cNvPr id="3" name="Content Placeholder 2">
             <a:extLst>
               <a:ext uri="{FF2B5EF4-FFF2-40B4-BE49-F238E27FC236}">
-                <a16:creationId xmlns:a16="http://schemas.microsoft.com/office/drawing/2014/main" id="{639F28B0-AE40-DF8E-76CA-380B2FBF75D9}"/>
+                <a16:creationId xmlns:a16="http://schemas.microsoft.com/office/drawing/2014/main" id="{C7EE9B6C-C4DB-433D-ADAB-6B49E2BC80AB}"/>
               </a:ext>
             </a:extLst>
           </p:cNvPr>
@@ -16087,10 +16283,10 @@
       </p:sp>
       <p:sp>
         <p:nvSpPr>
-          <p:cNvPr id="4" name="Content Placeholder 3">
+          <p:cNvPr id="4" name="Picture Placeholder 3">
             <a:extLst>
               <a:ext uri="{FF2B5EF4-FFF2-40B4-BE49-F238E27FC236}">
-                <a16:creationId xmlns:a16="http://schemas.microsoft.com/office/drawing/2014/main" id="{E1B2001F-94BD-7F0A-56F1-F7B277AF3CC6}"/>
+                <a16:creationId xmlns:a16="http://schemas.microsoft.com/office/drawing/2014/main" id="{F26B7286-44C7-3395-7091-9C3CF7134780}"/>
               </a:ext>
             </a:extLst>
           </p:cNvPr>
@@ -16098,7 +16294,7 @@
             <a:spLocks noGrp="1"/>
           </p:cNvSpPr>
           <p:nvPr>
-            <p:ph sz="quarter" idx="14"/>
+            <p:ph type="pic" sz="quarter" idx="14"/>
           </p:nvPr>
         </p:nvSpPr>
         <p:spPr/>
@@ -16106,7 +16302,7 @@
           <a:bodyPr/>
           <a:lstStyle/>
           <a:p>
-            <a:endParaRPr lang="en-IN"/>
+            <a:endParaRPr lang="en-US"/>
           </a:p>
         </p:txBody>
       </p:sp>
@@ -16115,7 +16311,7 @@
           <p:cNvPr id="5" name="Slide Number Placeholder 4">
             <a:extLst>
               <a:ext uri="{FF2B5EF4-FFF2-40B4-BE49-F238E27FC236}">
-                <a16:creationId xmlns:a16="http://schemas.microsoft.com/office/drawing/2014/main" id="{DE249310-06ED-CE6D-9342-95110ABFA82A}"/>
+                <a16:creationId xmlns:a16="http://schemas.microsoft.com/office/drawing/2014/main" id="{771CACD5-DC8F-E562-D34B-63ACEED10192}"/>
               </a:ext>
             </a:extLst>
           </p:cNvPr>
@@ -16145,7 +16341,7 @@
           <p:cNvPr id="6" name="Slide Number Placeholder 4">
             <a:extLst>
               <a:ext uri="{FF2B5EF4-FFF2-40B4-BE49-F238E27FC236}">
-                <a16:creationId xmlns:a16="http://schemas.microsoft.com/office/drawing/2014/main" id="{150241C0-6662-9989-D473-E5D8BFD58F6F}"/>
+                <a16:creationId xmlns:a16="http://schemas.microsoft.com/office/drawing/2014/main" id="{FC397AB4-E7B3-064C-48F7-B4F336380CBA}"/>
               </a:ext>
             </a:extLst>
           </p:cNvPr>
@@ -16274,7 +16470,7 @@
     </p:spTree>
     <p:extLst>
       <p:ext uri="{BB962C8B-B14F-4D97-AF65-F5344CB8AC3E}">
-        <p14:creationId xmlns:p14="http://schemas.microsoft.com/office/powerpoint/2010/main" val="2633488709"/>
+        <p14:creationId xmlns:p14="http://schemas.microsoft.com/office/powerpoint/2010/main" val="2540403346"/>
       </p:ext>
     </p:extLst>
   </p:cSld>
@@ -16693,7 +16889,7 @@
           <p:cNvPr id="2" name="Title 1">
             <a:extLst>
               <a:ext uri="{FF2B5EF4-FFF2-40B4-BE49-F238E27FC236}">
-                <a16:creationId xmlns:a16="http://schemas.microsoft.com/office/drawing/2014/main" id="{3870CE6E-495D-1808-5A8C-EC4D855C5587}"/>
+                <a16:creationId xmlns:a16="http://schemas.microsoft.com/office/drawing/2014/main" id="{E5BB7D67-76BC-2F76-6A7E-93CF1B03CA9B}"/>
               </a:ext>
             </a:extLst>
           </p:cNvPr>
@@ -16709,10 +16905,7 @@
           <a:bodyPr/>
           <a:lstStyle/>
           <a:p>
-            <a:r>
-              <a:rPr lang="en-IN" dirty="0"/>
-              <a:t>Testing Phase</a:t>
-            </a:r>
+            <a:endParaRPr lang="en-IN"/>
           </a:p>
         </p:txBody>
       </p:sp>
@@ -16721,7 +16914,7 @@
           <p:cNvPr id="3" name="Content Placeholder 2">
             <a:extLst>
               <a:ext uri="{FF2B5EF4-FFF2-40B4-BE49-F238E27FC236}">
-                <a16:creationId xmlns:a16="http://schemas.microsoft.com/office/drawing/2014/main" id="{B0EEF2E2-7250-905A-9F8E-5BB773C92FF2}"/>
+                <a16:creationId xmlns:a16="http://schemas.microsoft.com/office/drawing/2014/main" id="{481F0043-5374-9370-B17A-15CAD56ADF84}"/>
               </a:ext>
             </a:extLst>
           </p:cNvPr>
@@ -16743,10 +16936,10 @@
       </p:sp>
       <p:sp>
         <p:nvSpPr>
-          <p:cNvPr id="4" name="Content Placeholder 3">
+          <p:cNvPr id="4" name="Picture Placeholder 3">
             <a:extLst>
               <a:ext uri="{FF2B5EF4-FFF2-40B4-BE49-F238E27FC236}">
-                <a16:creationId xmlns:a16="http://schemas.microsoft.com/office/drawing/2014/main" id="{2A8D0320-4D4B-365D-2F4F-3045D1A7C46C}"/>
+                <a16:creationId xmlns:a16="http://schemas.microsoft.com/office/drawing/2014/main" id="{B57F297D-5244-EB01-2D2D-30DC341E469D}"/>
               </a:ext>
             </a:extLst>
           </p:cNvPr>
@@ -16754,7 +16947,7 @@
             <a:spLocks noGrp="1"/>
           </p:cNvSpPr>
           <p:nvPr>
-            <p:ph sz="quarter" idx="14"/>
+            <p:ph type="pic" sz="quarter" idx="14"/>
           </p:nvPr>
         </p:nvSpPr>
         <p:spPr/>
@@ -16762,7 +16955,7 @@
           <a:bodyPr/>
           <a:lstStyle/>
           <a:p>
-            <a:endParaRPr lang="en-IN"/>
+            <a:endParaRPr lang="en-US"/>
           </a:p>
         </p:txBody>
       </p:sp>
@@ -16771,7 +16964,7 @@
           <p:cNvPr id="5" name="Slide Number Placeholder 4">
             <a:extLst>
               <a:ext uri="{FF2B5EF4-FFF2-40B4-BE49-F238E27FC236}">
-                <a16:creationId xmlns:a16="http://schemas.microsoft.com/office/drawing/2014/main" id="{E7948434-32DA-F1E2-FC11-F2978017F64B}"/>
+                <a16:creationId xmlns:a16="http://schemas.microsoft.com/office/drawing/2014/main" id="{C6881C2A-23D8-2323-B89B-98E5EBD584F6}"/>
               </a:ext>
             </a:extLst>
           </p:cNvPr>
@@ -16801,7 +16994,7 @@
           <p:cNvPr id="6" name="Slide Number Placeholder 4">
             <a:extLst>
               <a:ext uri="{FF2B5EF4-FFF2-40B4-BE49-F238E27FC236}">
-                <a16:creationId xmlns:a16="http://schemas.microsoft.com/office/drawing/2014/main" id="{5ECD9DAA-C767-07CC-5C79-8738D4F306A7}"/>
+                <a16:creationId xmlns:a16="http://schemas.microsoft.com/office/drawing/2014/main" id="{1466C1CC-3C62-38E8-78DE-98C589A6C039}"/>
               </a:ext>
             </a:extLst>
           </p:cNvPr>
@@ -16930,7 +17123,7 @@
     </p:spTree>
     <p:extLst>
       <p:ext uri="{BB962C8B-B14F-4D97-AF65-F5344CB8AC3E}">
-        <p14:creationId xmlns:p14="http://schemas.microsoft.com/office/powerpoint/2010/main" val="825357147"/>
+        <p14:creationId xmlns:p14="http://schemas.microsoft.com/office/powerpoint/2010/main" val="1188192135"/>
       </p:ext>
     </p:extLst>
   </p:cSld>
@@ -16974,7 +17167,7 @@
           <p:cNvPr id="2" name="Title 1">
             <a:extLst>
               <a:ext uri="{FF2B5EF4-FFF2-40B4-BE49-F238E27FC236}">
-                <a16:creationId xmlns:a16="http://schemas.microsoft.com/office/drawing/2014/main" id="{64983D13-B3DC-F5A2-EC3C-9AA3827FF06F}"/>
+                <a16:creationId xmlns:a16="http://schemas.microsoft.com/office/drawing/2014/main" id="{2BD7C78A-703A-694E-8FFC-38843E2ED0D5}"/>
               </a:ext>
             </a:extLst>
           </p:cNvPr>
@@ -16996,10 +17189,10 @@
       </p:sp>
       <p:sp>
         <p:nvSpPr>
-          <p:cNvPr id="3" name="Picture Placeholder 2">
+          <p:cNvPr id="3" name="Content Placeholder 2">
             <a:extLst>
               <a:ext uri="{FF2B5EF4-FFF2-40B4-BE49-F238E27FC236}">
-                <a16:creationId xmlns:a16="http://schemas.microsoft.com/office/drawing/2014/main" id="{57620467-CA16-1C06-152E-31CFC11FAB8D}"/>
+                <a16:creationId xmlns:a16="http://schemas.microsoft.com/office/drawing/2014/main" id="{12D21900-DBB9-221C-76E0-EDDD133DAC6B}"/>
               </a:ext>
             </a:extLst>
           </p:cNvPr>
@@ -17007,7 +17200,7 @@
             <a:spLocks noGrp="1"/>
           </p:cNvSpPr>
           <p:nvPr>
-            <p:ph type="pic" sz="quarter" idx="10"/>
+            <p:ph sz="quarter" idx="13"/>
           </p:nvPr>
         </p:nvSpPr>
         <p:spPr/>
@@ -17015,6 +17208,31 @@
           <a:bodyPr/>
           <a:lstStyle/>
           <a:p>
+            <a:endParaRPr lang="en-IN"/>
+          </a:p>
+        </p:txBody>
+      </p:sp>
+      <p:sp>
+        <p:nvSpPr>
+          <p:cNvPr id="4" name="Picture Placeholder 3">
+            <a:extLst>
+              <a:ext uri="{FF2B5EF4-FFF2-40B4-BE49-F238E27FC236}">
+                <a16:creationId xmlns:a16="http://schemas.microsoft.com/office/drawing/2014/main" id="{32AEFEA6-A660-5D12-A8F7-5BB4222EFB74}"/>
+              </a:ext>
+            </a:extLst>
+          </p:cNvPr>
+          <p:cNvSpPr>
+            <a:spLocks noGrp="1"/>
+          </p:cNvSpPr>
+          <p:nvPr>
+            <p:ph type="pic" sz="quarter" idx="14"/>
+          </p:nvPr>
+        </p:nvSpPr>
+        <p:spPr/>
+        <p:txBody>
+          <a:bodyPr/>
+          <a:lstStyle/>
+          <a:p>
             <a:endParaRPr lang="en-US"/>
           </a:p>
         </p:txBody>
@@ -17024,7 +17242,37 @@
           <p:cNvPr id="5" name="Slide Number Placeholder 4">
             <a:extLst>
               <a:ext uri="{FF2B5EF4-FFF2-40B4-BE49-F238E27FC236}">
-                <a16:creationId xmlns:a16="http://schemas.microsoft.com/office/drawing/2014/main" id="{19257D08-7BDC-2EFF-F790-09A4B6BCCC7B}"/>
+                <a16:creationId xmlns:a16="http://schemas.microsoft.com/office/drawing/2014/main" id="{4DFB636B-8EED-D8C9-B88E-532B23AEFD21}"/>
+              </a:ext>
+            </a:extLst>
+          </p:cNvPr>
+          <p:cNvSpPr>
+            <a:spLocks noGrp="1"/>
+          </p:cNvSpPr>
+          <p:nvPr>
+            <p:ph type="sldNum" sz="quarter" idx="12"/>
+          </p:nvPr>
+        </p:nvSpPr>
+        <p:spPr/>
+        <p:txBody>
+          <a:bodyPr/>
+          <a:lstStyle/>
+          <a:p>
+            <a:fld id="{EB37DED6-D4C7-42EE-AB49-D2E39E64FDE4}" type="slidenum">
+              <a:rPr lang="en-US" smtClean="0"/>
+              <a:pPr/>
+              <a:t>21</a:t>
+            </a:fld>
+            <a:endParaRPr lang="en-US" dirty="0"/>
+          </a:p>
+        </p:txBody>
+      </p:sp>
+      <p:sp>
+        <p:nvSpPr>
+          <p:cNvPr id="6" name="Slide Number Placeholder 4">
+            <a:extLst>
+              <a:ext uri="{FF2B5EF4-FFF2-40B4-BE49-F238E27FC236}">
+                <a16:creationId xmlns:a16="http://schemas.microsoft.com/office/drawing/2014/main" id="{36B8F459-6F30-1450-5D41-1997E9CEE977}"/>
               </a:ext>
             </a:extLst>
           </p:cNvPr>
@@ -17153,7 +17401,7 @@
     </p:spTree>
     <p:extLst>
       <p:ext uri="{BB962C8B-B14F-4D97-AF65-F5344CB8AC3E}">
-        <p14:creationId xmlns:p14="http://schemas.microsoft.com/office/powerpoint/2010/main" val="1723280250"/>
+        <p14:creationId xmlns:p14="http://schemas.microsoft.com/office/powerpoint/2010/main" val="3262945818"/>
       </p:ext>
     </p:extLst>
   </p:cSld>
@@ -17197,7 +17445,7 @@
           <p:cNvPr id="2" name="Title 1">
             <a:extLst>
               <a:ext uri="{FF2B5EF4-FFF2-40B4-BE49-F238E27FC236}">
-                <a16:creationId xmlns:a16="http://schemas.microsoft.com/office/drawing/2014/main" id="{E9DC9FCC-4F0C-53A9-AE36-C60D0609DD96}"/>
+                <a16:creationId xmlns:a16="http://schemas.microsoft.com/office/drawing/2014/main" id="{0B4D0D16-67A0-9392-36C4-38AEF1EFD705}"/>
               </a:ext>
             </a:extLst>
           </p:cNvPr>
@@ -17222,7 +17470,7 @@
           <p:cNvPr id="3" name="Content Placeholder 2">
             <a:extLst>
               <a:ext uri="{FF2B5EF4-FFF2-40B4-BE49-F238E27FC236}">
-                <a16:creationId xmlns:a16="http://schemas.microsoft.com/office/drawing/2014/main" id="{AA5DF3F7-8350-F924-067C-6062DEA38DC6}"/>
+                <a16:creationId xmlns:a16="http://schemas.microsoft.com/office/drawing/2014/main" id="{639F28B0-AE40-DF8E-76CA-380B2FBF75D9}"/>
               </a:ext>
             </a:extLst>
           </p:cNvPr>
@@ -17244,10 +17492,35 @@
       </p:sp>
       <p:sp>
         <p:nvSpPr>
-          <p:cNvPr id="4" name="Slide Number Placeholder 3">
+          <p:cNvPr id="4" name="Content Placeholder 3">
             <a:extLst>
               <a:ext uri="{FF2B5EF4-FFF2-40B4-BE49-F238E27FC236}">
-                <a16:creationId xmlns:a16="http://schemas.microsoft.com/office/drawing/2014/main" id="{023EA18A-7BBC-A7A5-F52F-E930F453BA58}"/>
+                <a16:creationId xmlns:a16="http://schemas.microsoft.com/office/drawing/2014/main" id="{E1B2001F-94BD-7F0A-56F1-F7B277AF3CC6}"/>
+              </a:ext>
+            </a:extLst>
+          </p:cNvPr>
+          <p:cNvSpPr>
+            <a:spLocks noGrp="1"/>
+          </p:cNvSpPr>
+          <p:nvPr>
+            <p:ph sz="quarter" idx="14"/>
+          </p:nvPr>
+        </p:nvSpPr>
+        <p:spPr/>
+        <p:txBody>
+          <a:bodyPr/>
+          <a:lstStyle/>
+          <a:p>
+            <a:endParaRPr lang="en-IN"/>
+          </a:p>
+        </p:txBody>
+      </p:sp>
+      <p:sp>
+        <p:nvSpPr>
+          <p:cNvPr id="5" name="Slide Number Placeholder 4">
+            <a:extLst>
+              <a:ext uri="{FF2B5EF4-FFF2-40B4-BE49-F238E27FC236}">
+                <a16:creationId xmlns:a16="http://schemas.microsoft.com/office/drawing/2014/main" id="{DE249310-06ED-CE6D-9342-95110ABFA82A}"/>
               </a:ext>
             </a:extLst>
           </p:cNvPr>
@@ -17267,6 +17540,763 @@
               <a:rPr lang="en-US" smtClean="0"/>
               <a:pPr/>
               <a:t>22</a:t>
+            </a:fld>
+            <a:endParaRPr lang="en-US" dirty="0"/>
+          </a:p>
+        </p:txBody>
+      </p:sp>
+      <p:sp>
+        <p:nvSpPr>
+          <p:cNvPr id="6" name="Slide Number Placeholder 4">
+            <a:extLst>
+              <a:ext uri="{FF2B5EF4-FFF2-40B4-BE49-F238E27FC236}">
+                <a16:creationId xmlns:a16="http://schemas.microsoft.com/office/drawing/2014/main" id="{150241C0-6662-9989-D473-E5D8BFD58F6F}"/>
+              </a:ext>
+            </a:extLst>
+          </p:cNvPr>
+          <p:cNvSpPr txBox="1">
+            <a:spLocks/>
+          </p:cNvSpPr>
+          <p:nvPr/>
+        </p:nvSpPr>
+        <p:spPr>
+          <a:xfrm>
+            <a:off x="455612" y="6190488"/>
+            <a:ext cx="2677604" cy="210312"/>
+          </a:xfrm>
+          <a:prstGeom prst="rect">
+            <a:avLst/>
+          </a:prstGeom>
+        </p:spPr>
+        <p:txBody>
+          <a:bodyPr vert="horz" lIns="121899" tIns="60949" rIns="121899" bIns="60949" rtlCol="0" anchor="b"/>
+          <a:lstStyle>
+            <a:defPPr>
+              <a:defRPr lang="en-US"/>
+            </a:defPPr>
+            <a:lvl1pPr marL="0" algn="r" defTabSz="1218987" rtl="0" eaLnBrk="1" latinLnBrk="0" hangingPunct="1">
+              <a:defRPr sz="1000" b="1" kern="1200" spc="200" baseline="0">
+                <a:solidFill>
+                  <a:schemeClr val="tx2">
+                    <a:lumMod val="50000"/>
+                  </a:schemeClr>
+                </a:solidFill>
+                <a:latin typeface="+mn-lt"/>
+                <a:ea typeface="+mn-ea"/>
+                <a:cs typeface="+mn-cs"/>
+              </a:defRPr>
+            </a:lvl1pPr>
+            <a:lvl2pPr marL="609493" algn="l" defTabSz="1218987" rtl="0" eaLnBrk="1" latinLnBrk="0" hangingPunct="1">
+              <a:defRPr sz="2400" kern="1200">
+                <a:solidFill>
+                  <a:schemeClr val="tx1"/>
+                </a:solidFill>
+                <a:latin typeface="+mn-lt"/>
+                <a:ea typeface="+mn-ea"/>
+                <a:cs typeface="+mn-cs"/>
+              </a:defRPr>
+            </a:lvl2pPr>
+            <a:lvl3pPr marL="1218987" algn="l" defTabSz="1218987" rtl="0" eaLnBrk="1" latinLnBrk="0" hangingPunct="1">
+              <a:defRPr sz="2400" kern="1200">
+                <a:solidFill>
+                  <a:schemeClr val="tx1"/>
+                </a:solidFill>
+                <a:latin typeface="+mn-lt"/>
+                <a:ea typeface="+mn-ea"/>
+                <a:cs typeface="+mn-cs"/>
+              </a:defRPr>
+            </a:lvl3pPr>
+            <a:lvl4pPr marL="1828480" algn="l" defTabSz="1218987" rtl="0" eaLnBrk="1" latinLnBrk="0" hangingPunct="1">
+              <a:defRPr sz="2400" kern="1200">
+                <a:solidFill>
+                  <a:schemeClr val="tx1"/>
+                </a:solidFill>
+                <a:latin typeface="+mn-lt"/>
+                <a:ea typeface="+mn-ea"/>
+                <a:cs typeface="+mn-cs"/>
+              </a:defRPr>
+            </a:lvl4pPr>
+            <a:lvl5pPr marL="2437973" algn="l" defTabSz="1218987" rtl="0" eaLnBrk="1" latinLnBrk="0" hangingPunct="1">
+              <a:defRPr sz="2400" kern="1200">
+                <a:solidFill>
+                  <a:schemeClr val="tx1"/>
+                </a:solidFill>
+                <a:latin typeface="+mn-lt"/>
+                <a:ea typeface="+mn-ea"/>
+                <a:cs typeface="+mn-cs"/>
+              </a:defRPr>
+            </a:lvl5pPr>
+            <a:lvl6pPr marL="3047467" algn="l" defTabSz="1218987" rtl="0" eaLnBrk="1" latinLnBrk="0" hangingPunct="1">
+              <a:defRPr sz="2400" kern="1200">
+                <a:solidFill>
+                  <a:schemeClr val="tx1"/>
+                </a:solidFill>
+                <a:latin typeface="+mn-lt"/>
+                <a:ea typeface="+mn-ea"/>
+                <a:cs typeface="+mn-cs"/>
+              </a:defRPr>
+            </a:lvl6pPr>
+            <a:lvl7pPr marL="3656960" algn="l" defTabSz="1218987" rtl="0" eaLnBrk="1" latinLnBrk="0" hangingPunct="1">
+              <a:defRPr sz="2400" kern="1200">
+                <a:solidFill>
+                  <a:schemeClr val="tx1"/>
+                </a:solidFill>
+                <a:latin typeface="+mn-lt"/>
+                <a:ea typeface="+mn-ea"/>
+                <a:cs typeface="+mn-cs"/>
+              </a:defRPr>
+            </a:lvl7pPr>
+            <a:lvl8pPr marL="4266453" algn="l" defTabSz="1218987" rtl="0" eaLnBrk="1" latinLnBrk="0" hangingPunct="1">
+              <a:defRPr sz="2400" kern="1200">
+                <a:solidFill>
+                  <a:schemeClr val="tx1"/>
+                </a:solidFill>
+                <a:latin typeface="+mn-lt"/>
+                <a:ea typeface="+mn-ea"/>
+                <a:cs typeface="+mn-cs"/>
+              </a:defRPr>
+            </a:lvl8pPr>
+            <a:lvl9pPr marL="4875947" algn="l" defTabSz="1218987" rtl="0" eaLnBrk="1" latinLnBrk="0" hangingPunct="1">
+              <a:defRPr sz="2400" kern="1200">
+                <a:solidFill>
+                  <a:schemeClr val="tx1"/>
+                </a:solidFill>
+                <a:latin typeface="+mn-lt"/>
+                <a:ea typeface="+mn-ea"/>
+                <a:cs typeface="+mn-cs"/>
+              </a:defRPr>
+            </a:lvl9pPr>
+          </a:lstStyle>
+          <a:p>
+            <a:pPr algn="l"/>
+            <a:r>
+              <a:rPr lang="en-US" dirty="0"/>
+              <a:t>DES211 CAPSTONE PROJECT</a:t>
+            </a:r>
+          </a:p>
+        </p:txBody>
+      </p:sp>
+    </p:spTree>
+    <p:extLst>
+      <p:ext uri="{BB962C8B-B14F-4D97-AF65-F5344CB8AC3E}">
+        <p14:creationId xmlns:p14="http://schemas.microsoft.com/office/powerpoint/2010/main" val="2633488709"/>
+      </p:ext>
+    </p:extLst>
+  </p:cSld>
+  <p:clrMapOvr>
+    <a:masterClrMapping/>
+  </p:clrMapOvr>
+  <mc:AlternateContent xmlns:mc="http://schemas.openxmlformats.org/markup-compatibility/2006" xmlns:p14="http://schemas.microsoft.com/office/powerpoint/2010/main">
+    <mc:Choice Requires="p14">
+      <p:transition spd="med" p14:dur="700">
+        <p:fade/>
+      </p:transition>
+    </mc:Choice>
+    <mc:Fallback xmlns="">
+      <p:transition spd="med">
+        <p:fade/>
+      </p:transition>
+    </mc:Fallback>
+  </mc:AlternateContent>
+</p:sld>
+</file>
+
+<file path=ppt/slides/slide23.xml><?xml version="1.0" encoding="utf-8"?>
+<p:sld xmlns:a="http://schemas.openxmlformats.org/drawingml/2006/main" xmlns:r="http://schemas.openxmlformats.org/officeDocument/2006/relationships" xmlns:p="http://schemas.openxmlformats.org/presentationml/2006/main">
+  <p:cSld>
+    <p:spTree>
+      <p:nvGrpSpPr>
+        <p:cNvPr id="1" name=""/>
+        <p:cNvGrpSpPr/>
+        <p:nvPr/>
+      </p:nvGrpSpPr>
+      <p:grpSpPr>
+        <a:xfrm>
+          <a:off x="0" y="0"/>
+          <a:ext cx="0" cy="0"/>
+          <a:chOff x="0" y="0"/>
+          <a:chExt cx="0" cy="0"/>
+        </a:xfrm>
+      </p:grpSpPr>
+      <p:sp>
+        <p:nvSpPr>
+          <p:cNvPr id="2" name="Title 1">
+            <a:extLst>
+              <a:ext uri="{FF2B5EF4-FFF2-40B4-BE49-F238E27FC236}">
+                <a16:creationId xmlns:a16="http://schemas.microsoft.com/office/drawing/2014/main" id="{3870CE6E-495D-1808-5A8C-EC4D855C5587}"/>
+              </a:ext>
+            </a:extLst>
+          </p:cNvPr>
+          <p:cNvSpPr>
+            <a:spLocks noGrp="1"/>
+          </p:cNvSpPr>
+          <p:nvPr>
+            <p:ph type="title"/>
+          </p:nvPr>
+        </p:nvSpPr>
+        <p:spPr/>
+        <p:txBody>
+          <a:bodyPr/>
+          <a:lstStyle/>
+          <a:p>
+            <a:r>
+              <a:rPr lang="en-IN" dirty="0"/>
+              <a:t>Testing Phase</a:t>
+            </a:r>
+          </a:p>
+        </p:txBody>
+      </p:sp>
+      <p:sp>
+        <p:nvSpPr>
+          <p:cNvPr id="3" name="Content Placeholder 2">
+            <a:extLst>
+              <a:ext uri="{FF2B5EF4-FFF2-40B4-BE49-F238E27FC236}">
+                <a16:creationId xmlns:a16="http://schemas.microsoft.com/office/drawing/2014/main" id="{B0EEF2E2-7250-905A-9F8E-5BB773C92FF2}"/>
+              </a:ext>
+            </a:extLst>
+          </p:cNvPr>
+          <p:cNvSpPr>
+            <a:spLocks noGrp="1"/>
+          </p:cNvSpPr>
+          <p:nvPr>
+            <p:ph sz="quarter" idx="13"/>
+          </p:nvPr>
+        </p:nvSpPr>
+        <p:spPr/>
+        <p:txBody>
+          <a:bodyPr/>
+          <a:lstStyle/>
+          <a:p>
+            <a:endParaRPr lang="en-IN"/>
+          </a:p>
+        </p:txBody>
+      </p:sp>
+      <p:sp>
+        <p:nvSpPr>
+          <p:cNvPr id="4" name="Content Placeholder 3">
+            <a:extLst>
+              <a:ext uri="{FF2B5EF4-FFF2-40B4-BE49-F238E27FC236}">
+                <a16:creationId xmlns:a16="http://schemas.microsoft.com/office/drawing/2014/main" id="{2A8D0320-4D4B-365D-2F4F-3045D1A7C46C}"/>
+              </a:ext>
+            </a:extLst>
+          </p:cNvPr>
+          <p:cNvSpPr>
+            <a:spLocks noGrp="1"/>
+          </p:cNvSpPr>
+          <p:nvPr>
+            <p:ph sz="quarter" idx="14"/>
+          </p:nvPr>
+        </p:nvSpPr>
+        <p:spPr/>
+        <p:txBody>
+          <a:bodyPr/>
+          <a:lstStyle/>
+          <a:p>
+            <a:endParaRPr lang="en-IN"/>
+          </a:p>
+        </p:txBody>
+      </p:sp>
+      <p:sp>
+        <p:nvSpPr>
+          <p:cNvPr id="5" name="Slide Number Placeholder 4">
+            <a:extLst>
+              <a:ext uri="{FF2B5EF4-FFF2-40B4-BE49-F238E27FC236}">
+                <a16:creationId xmlns:a16="http://schemas.microsoft.com/office/drawing/2014/main" id="{E7948434-32DA-F1E2-FC11-F2978017F64B}"/>
+              </a:ext>
+            </a:extLst>
+          </p:cNvPr>
+          <p:cNvSpPr>
+            <a:spLocks noGrp="1"/>
+          </p:cNvSpPr>
+          <p:nvPr>
+            <p:ph type="sldNum" sz="quarter" idx="12"/>
+          </p:nvPr>
+        </p:nvSpPr>
+        <p:spPr/>
+        <p:txBody>
+          <a:bodyPr/>
+          <a:lstStyle/>
+          <a:p>
+            <a:fld id="{EB37DED6-D4C7-42EE-AB49-D2E39E64FDE4}" type="slidenum">
+              <a:rPr lang="en-US" smtClean="0"/>
+              <a:pPr/>
+              <a:t>23</a:t>
+            </a:fld>
+            <a:endParaRPr lang="en-US" dirty="0"/>
+          </a:p>
+        </p:txBody>
+      </p:sp>
+      <p:sp>
+        <p:nvSpPr>
+          <p:cNvPr id="6" name="Slide Number Placeholder 4">
+            <a:extLst>
+              <a:ext uri="{FF2B5EF4-FFF2-40B4-BE49-F238E27FC236}">
+                <a16:creationId xmlns:a16="http://schemas.microsoft.com/office/drawing/2014/main" id="{5ECD9DAA-C767-07CC-5C79-8738D4F306A7}"/>
+              </a:ext>
+            </a:extLst>
+          </p:cNvPr>
+          <p:cNvSpPr txBox="1">
+            <a:spLocks/>
+          </p:cNvSpPr>
+          <p:nvPr/>
+        </p:nvSpPr>
+        <p:spPr>
+          <a:xfrm>
+            <a:off x="455612" y="6190488"/>
+            <a:ext cx="2677604" cy="210312"/>
+          </a:xfrm>
+          <a:prstGeom prst="rect">
+            <a:avLst/>
+          </a:prstGeom>
+        </p:spPr>
+        <p:txBody>
+          <a:bodyPr vert="horz" lIns="121899" tIns="60949" rIns="121899" bIns="60949" rtlCol="0" anchor="b"/>
+          <a:lstStyle>
+            <a:defPPr>
+              <a:defRPr lang="en-US"/>
+            </a:defPPr>
+            <a:lvl1pPr marL="0" algn="r" defTabSz="1218987" rtl="0" eaLnBrk="1" latinLnBrk="0" hangingPunct="1">
+              <a:defRPr sz="1000" b="1" kern="1200" spc="200" baseline="0">
+                <a:solidFill>
+                  <a:schemeClr val="tx2">
+                    <a:lumMod val="50000"/>
+                  </a:schemeClr>
+                </a:solidFill>
+                <a:latin typeface="+mn-lt"/>
+                <a:ea typeface="+mn-ea"/>
+                <a:cs typeface="+mn-cs"/>
+              </a:defRPr>
+            </a:lvl1pPr>
+            <a:lvl2pPr marL="609493" algn="l" defTabSz="1218987" rtl="0" eaLnBrk="1" latinLnBrk="0" hangingPunct="1">
+              <a:defRPr sz="2400" kern="1200">
+                <a:solidFill>
+                  <a:schemeClr val="tx1"/>
+                </a:solidFill>
+                <a:latin typeface="+mn-lt"/>
+                <a:ea typeface="+mn-ea"/>
+                <a:cs typeface="+mn-cs"/>
+              </a:defRPr>
+            </a:lvl2pPr>
+            <a:lvl3pPr marL="1218987" algn="l" defTabSz="1218987" rtl="0" eaLnBrk="1" latinLnBrk="0" hangingPunct="1">
+              <a:defRPr sz="2400" kern="1200">
+                <a:solidFill>
+                  <a:schemeClr val="tx1"/>
+                </a:solidFill>
+                <a:latin typeface="+mn-lt"/>
+                <a:ea typeface="+mn-ea"/>
+                <a:cs typeface="+mn-cs"/>
+              </a:defRPr>
+            </a:lvl3pPr>
+            <a:lvl4pPr marL="1828480" algn="l" defTabSz="1218987" rtl="0" eaLnBrk="1" latinLnBrk="0" hangingPunct="1">
+              <a:defRPr sz="2400" kern="1200">
+                <a:solidFill>
+                  <a:schemeClr val="tx1"/>
+                </a:solidFill>
+                <a:latin typeface="+mn-lt"/>
+                <a:ea typeface="+mn-ea"/>
+                <a:cs typeface="+mn-cs"/>
+              </a:defRPr>
+            </a:lvl4pPr>
+            <a:lvl5pPr marL="2437973" algn="l" defTabSz="1218987" rtl="0" eaLnBrk="1" latinLnBrk="0" hangingPunct="1">
+              <a:defRPr sz="2400" kern="1200">
+                <a:solidFill>
+                  <a:schemeClr val="tx1"/>
+                </a:solidFill>
+                <a:latin typeface="+mn-lt"/>
+                <a:ea typeface="+mn-ea"/>
+                <a:cs typeface="+mn-cs"/>
+              </a:defRPr>
+            </a:lvl5pPr>
+            <a:lvl6pPr marL="3047467" algn="l" defTabSz="1218987" rtl="0" eaLnBrk="1" latinLnBrk="0" hangingPunct="1">
+              <a:defRPr sz="2400" kern="1200">
+                <a:solidFill>
+                  <a:schemeClr val="tx1"/>
+                </a:solidFill>
+                <a:latin typeface="+mn-lt"/>
+                <a:ea typeface="+mn-ea"/>
+                <a:cs typeface="+mn-cs"/>
+              </a:defRPr>
+            </a:lvl6pPr>
+            <a:lvl7pPr marL="3656960" algn="l" defTabSz="1218987" rtl="0" eaLnBrk="1" latinLnBrk="0" hangingPunct="1">
+              <a:defRPr sz="2400" kern="1200">
+                <a:solidFill>
+                  <a:schemeClr val="tx1"/>
+                </a:solidFill>
+                <a:latin typeface="+mn-lt"/>
+                <a:ea typeface="+mn-ea"/>
+                <a:cs typeface="+mn-cs"/>
+              </a:defRPr>
+            </a:lvl7pPr>
+            <a:lvl8pPr marL="4266453" algn="l" defTabSz="1218987" rtl="0" eaLnBrk="1" latinLnBrk="0" hangingPunct="1">
+              <a:defRPr sz="2400" kern="1200">
+                <a:solidFill>
+                  <a:schemeClr val="tx1"/>
+                </a:solidFill>
+                <a:latin typeface="+mn-lt"/>
+                <a:ea typeface="+mn-ea"/>
+                <a:cs typeface="+mn-cs"/>
+              </a:defRPr>
+            </a:lvl8pPr>
+            <a:lvl9pPr marL="4875947" algn="l" defTabSz="1218987" rtl="0" eaLnBrk="1" latinLnBrk="0" hangingPunct="1">
+              <a:defRPr sz="2400" kern="1200">
+                <a:solidFill>
+                  <a:schemeClr val="tx1"/>
+                </a:solidFill>
+                <a:latin typeface="+mn-lt"/>
+                <a:ea typeface="+mn-ea"/>
+                <a:cs typeface="+mn-cs"/>
+              </a:defRPr>
+            </a:lvl9pPr>
+          </a:lstStyle>
+          <a:p>
+            <a:pPr algn="l"/>
+            <a:r>
+              <a:rPr lang="en-US" dirty="0"/>
+              <a:t>DES211 CAPSTONE PROJECT</a:t>
+            </a:r>
+          </a:p>
+        </p:txBody>
+      </p:sp>
+    </p:spTree>
+    <p:extLst>
+      <p:ext uri="{BB962C8B-B14F-4D97-AF65-F5344CB8AC3E}">
+        <p14:creationId xmlns:p14="http://schemas.microsoft.com/office/powerpoint/2010/main" val="825357147"/>
+      </p:ext>
+    </p:extLst>
+  </p:cSld>
+  <p:clrMapOvr>
+    <a:masterClrMapping/>
+  </p:clrMapOvr>
+  <mc:AlternateContent xmlns:mc="http://schemas.openxmlformats.org/markup-compatibility/2006" xmlns:p14="http://schemas.microsoft.com/office/powerpoint/2010/main">
+    <mc:Choice Requires="p14">
+      <p:transition spd="med" p14:dur="700">
+        <p:fade/>
+      </p:transition>
+    </mc:Choice>
+    <mc:Fallback xmlns="">
+      <p:transition spd="med">
+        <p:fade/>
+      </p:transition>
+    </mc:Fallback>
+  </mc:AlternateContent>
+</p:sld>
+</file>
+
+<file path=ppt/slides/slide24.xml><?xml version="1.0" encoding="utf-8"?>
+<p:sld xmlns:a="http://schemas.openxmlformats.org/drawingml/2006/main" xmlns:r="http://schemas.openxmlformats.org/officeDocument/2006/relationships" xmlns:p="http://schemas.openxmlformats.org/presentationml/2006/main">
+  <p:cSld>
+    <p:spTree>
+      <p:nvGrpSpPr>
+        <p:cNvPr id="1" name=""/>
+        <p:cNvGrpSpPr/>
+        <p:nvPr/>
+      </p:nvGrpSpPr>
+      <p:grpSpPr>
+        <a:xfrm>
+          <a:off x="0" y="0"/>
+          <a:ext cx="0" cy="0"/>
+          <a:chOff x="0" y="0"/>
+          <a:chExt cx="0" cy="0"/>
+        </a:xfrm>
+      </p:grpSpPr>
+      <p:sp>
+        <p:nvSpPr>
+          <p:cNvPr id="2" name="Title 1">
+            <a:extLst>
+              <a:ext uri="{FF2B5EF4-FFF2-40B4-BE49-F238E27FC236}">
+                <a16:creationId xmlns:a16="http://schemas.microsoft.com/office/drawing/2014/main" id="{64983D13-B3DC-F5A2-EC3C-9AA3827FF06F}"/>
+              </a:ext>
+            </a:extLst>
+          </p:cNvPr>
+          <p:cNvSpPr>
+            <a:spLocks noGrp="1"/>
+          </p:cNvSpPr>
+          <p:nvPr>
+            <p:ph type="title"/>
+          </p:nvPr>
+        </p:nvSpPr>
+        <p:spPr/>
+        <p:txBody>
+          <a:bodyPr/>
+          <a:lstStyle/>
+          <a:p>
+            <a:endParaRPr lang="en-IN"/>
+          </a:p>
+        </p:txBody>
+      </p:sp>
+      <p:sp>
+        <p:nvSpPr>
+          <p:cNvPr id="3" name="Picture Placeholder 2">
+            <a:extLst>
+              <a:ext uri="{FF2B5EF4-FFF2-40B4-BE49-F238E27FC236}">
+                <a16:creationId xmlns:a16="http://schemas.microsoft.com/office/drawing/2014/main" id="{57620467-CA16-1C06-152E-31CFC11FAB8D}"/>
+              </a:ext>
+            </a:extLst>
+          </p:cNvPr>
+          <p:cNvSpPr>
+            <a:spLocks noGrp="1"/>
+          </p:cNvSpPr>
+          <p:nvPr>
+            <p:ph type="pic" sz="quarter" idx="10"/>
+          </p:nvPr>
+        </p:nvSpPr>
+        <p:spPr/>
+        <p:txBody>
+          <a:bodyPr/>
+          <a:lstStyle/>
+          <a:p>
+            <a:endParaRPr lang="en-US"/>
+          </a:p>
+        </p:txBody>
+      </p:sp>
+      <p:sp>
+        <p:nvSpPr>
+          <p:cNvPr id="5" name="Slide Number Placeholder 4">
+            <a:extLst>
+              <a:ext uri="{FF2B5EF4-FFF2-40B4-BE49-F238E27FC236}">
+                <a16:creationId xmlns:a16="http://schemas.microsoft.com/office/drawing/2014/main" id="{19257D08-7BDC-2EFF-F790-09A4B6BCCC7B}"/>
+              </a:ext>
+            </a:extLst>
+          </p:cNvPr>
+          <p:cNvSpPr txBox="1">
+            <a:spLocks/>
+          </p:cNvSpPr>
+          <p:nvPr/>
+        </p:nvSpPr>
+        <p:spPr>
+          <a:xfrm>
+            <a:off x="455612" y="6190488"/>
+            <a:ext cx="2677604" cy="210312"/>
+          </a:xfrm>
+          <a:prstGeom prst="rect">
+            <a:avLst/>
+          </a:prstGeom>
+        </p:spPr>
+        <p:txBody>
+          <a:bodyPr vert="horz" lIns="121899" tIns="60949" rIns="121899" bIns="60949" rtlCol="0" anchor="b"/>
+          <a:lstStyle>
+            <a:defPPr>
+              <a:defRPr lang="en-US"/>
+            </a:defPPr>
+            <a:lvl1pPr marL="0" algn="r" defTabSz="1218987" rtl="0" eaLnBrk="1" latinLnBrk="0" hangingPunct="1">
+              <a:defRPr sz="1000" b="1" kern="1200" spc="200" baseline="0">
+                <a:solidFill>
+                  <a:schemeClr val="tx2">
+                    <a:lumMod val="50000"/>
+                  </a:schemeClr>
+                </a:solidFill>
+                <a:latin typeface="+mn-lt"/>
+                <a:ea typeface="+mn-ea"/>
+                <a:cs typeface="+mn-cs"/>
+              </a:defRPr>
+            </a:lvl1pPr>
+            <a:lvl2pPr marL="609493" algn="l" defTabSz="1218987" rtl="0" eaLnBrk="1" latinLnBrk="0" hangingPunct="1">
+              <a:defRPr sz="2400" kern="1200">
+                <a:solidFill>
+                  <a:schemeClr val="tx1"/>
+                </a:solidFill>
+                <a:latin typeface="+mn-lt"/>
+                <a:ea typeface="+mn-ea"/>
+                <a:cs typeface="+mn-cs"/>
+              </a:defRPr>
+            </a:lvl2pPr>
+            <a:lvl3pPr marL="1218987" algn="l" defTabSz="1218987" rtl="0" eaLnBrk="1" latinLnBrk="0" hangingPunct="1">
+              <a:defRPr sz="2400" kern="1200">
+                <a:solidFill>
+                  <a:schemeClr val="tx1"/>
+                </a:solidFill>
+                <a:latin typeface="+mn-lt"/>
+                <a:ea typeface="+mn-ea"/>
+                <a:cs typeface="+mn-cs"/>
+              </a:defRPr>
+            </a:lvl3pPr>
+            <a:lvl4pPr marL="1828480" algn="l" defTabSz="1218987" rtl="0" eaLnBrk="1" latinLnBrk="0" hangingPunct="1">
+              <a:defRPr sz="2400" kern="1200">
+                <a:solidFill>
+                  <a:schemeClr val="tx1"/>
+                </a:solidFill>
+                <a:latin typeface="+mn-lt"/>
+                <a:ea typeface="+mn-ea"/>
+                <a:cs typeface="+mn-cs"/>
+              </a:defRPr>
+            </a:lvl4pPr>
+            <a:lvl5pPr marL="2437973" algn="l" defTabSz="1218987" rtl="0" eaLnBrk="1" latinLnBrk="0" hangingPunct="1">
+              <a:defRPr sz="2400" kern="1200">
+                <a:solidFill>
+                  <a:schemeClr val="tx1"/>
+                </a:solidFill>
+                <a:latin typeface="+mn-lt"/>
+                <a:ea typeface="+mn-ea"/>
+                <a:cs typeface="+mn-cs"/>
+              </a:defRPr>
+            </a:lvl5pPr>
+            <a:lvl6pPr marL="3047467" algn="l" defTabSz="1218987" rtl="0" eaLnBrk="1" latinLnBrk="0" hangingPunct="1">
+              <a:defRPr sz="2400" kern="1200">
+                <a:solidFill>
+                  <a:schemeClr val="tx1"/>
+                </a:solidFill>
+                <a:latin typeface="+mn-lt"/>
+                <a:ea typeface="+mn-ea"/>
+                <a:cs typeface="+mn-cs"/>
+              </a:defRPr>
+            </a:lvl6pPr>
+            <a:lvl7pPr marL="3656960" algn="l" defTabSz="1218987" rtl="0" eaLnBrk="1" latinLnBrk="0" hangingPunct="1">
+              <a:defRPr sz="2400" kern="1200">
+                <a:solidFill>
+                  <a:schemeClr val="tx1"/>
+                </a:solidFill>
+                <a:latin typeface="+mn-lt"/>
+                <a:ea typeface="+mn-ea"/>
+                <a:cs typeface="+mn-cs"/>
+              </a:defRPr>
+            </a:lvl7pPr>
+            <a:lvl8pPr marL="4266453" algn="l" defTabSz="1218987" rtl="0" eaLnBrk="1" latinLnBrk="0" hangingPunct="1">
+              <a:defRPr sz="2400" kern="1200">
+                <a:solidFill>
+                  <a:schemeClr val="tx1"/>
+                </a:solidFill>
+                <a:latin typeface="+mn-lt"/>
+                <a:ea typeface="+mn-ea"/>
+                <a:cs typeface="+mn-cs"/>
+              </a:defRPr>
+            </a:lvl8pPr>
+            <a:lvl9pPr marL="4875947" algn="l" defTabSz="1218987" rtl="0" eaLnBrk="1" latinLnBrk="0" hangingPunct="1">
+              <a:defRPr sz="2400" kern="1200">
+                <a:solidFill>
+                  <a:schemeClr val="tx1"/>
+                </a:solidFill>
+                <a:latin typeface="+mn-lt"/>
+                <a:ea typeface="+mn-ea"/>
+                <a:cs typeface="+mn-cs"/>
+              </a:defRPr>
+            </a:lvl9pPr>
+          </a:lstStyle>
+          <a:p>
+            <a:pPr algn="l"/>
+            <a:r>
+              <a:rPr lang="en-US" dirty="0"/>
+              <a:t>DES211 CAPSTONE PROJECT</a:t>
+            </a:r>
+          </a:p>
+        </p:txBody>
+      </p:sp>
+    </p:spTree>
+    <p:extLst>
+      <p:ext uri="{BB962C8B-B14F-4D97-AF65-F5344CB8AC3E}">
+        <p14:creationId xmlns:p14="http://schemas.microsoft.com/office/powerpoint/2010/main" val="1723280250"/>
+      </p:ext>
+    </p:extLst>
+  </p:cSld>
+  <p:clrMapOvr>
+    <a:masterClrMapping/>
+  </p:clrMapOvr>
+  <mc:AlternateContent xmlns:mc="http://schemas.openxmlformats.org/markup-compatibility/2006" xmlns:p14="http://schemas.microsoft.com/office/powerpoint/2010/main">
+    <mc:Choice Requires="p14">
+      <p:transition spd="med" p14:dur="700">
+        <p:fade/>
+      </p:transition>
+    </mc:Choice>
+    <mc:Fallback xmlns="">
+      <p:transition spd="med">
+        <p:fade/>
+      </p:transition>
+    </mc:Fallback>
+  </mc:AlternateContent>
+</p:sld>
+</file>
+
+<file path=ppt/slides/slide25.xml><?xml version="1.0" encoding="utf-8"?>
+<p:sld xmlns:a="http://schemas.openxmlformats.org/drawingml/2006/main" xmlns:r="http://schemas.openxmlformats.org/officeDocument/2006/relationships" xmlns:p="http://schemas.openxmlformats.org/presentationml/2006/main">
+  <p:cSld>
+    <p:spTree>
+      <p:nvGrpSpPr>
+        <p:cNvPr id="1" name=""/>
+        <p:cNvGrpSpPr/>
+        <p:nvPr/>
+      </p:nvGrpSpPr>
+      <p:grpSpPr>
+        <a:xfrm>
+          <a:off x="0" y="0"/>
+          <a:ext cx="0" cy="0"/>
+          <a:chOff x="0" y="0"/>
+          <a:chExt cx="0" cy="0"/>
+        </a:xfrm>
+      </p:grpSpPr>
+      <p:sp>
+        <p:nvSpPr>
+          <p:cNvPr id="2" name="Title 1">
+            <a:extLst>
+              <a:ext uri="{FF2B5EF4-FFF2-40B4-BE49-F238E27FC236}">
+                <a16:creationId xmlns:a16="http://schemas.microsoft.com/office/drawing/2014/main" id="{E9DC9FCC-4F0C-53A9-AE36-C60D0609DD96}"/>
+              </a:ext>
+            </a:extLst>
+          </p:cNvPr>
+          <p:cNvSpPr>
+            <a:spLocks noGrp="1"/>
+          </p:cNvSpPr>
+          <p:nvPr>
+            <p:ph type="title"/>
+          </p:nvPr>
+        </p:nvSpPr>
+        <p:spPr/>
+        <p:txBody>
+          <a:bodyPr/>
+          <a:lstStyle/>
+          <a:p>
+            <a:endParaRPr lang="en-IN"/>
+          </a:p>
+        </p:txBody>
+      </p:sp>
+      <p:sp>
+        <p:nvSpPr>
+          <p:cNvPr id="3" name="Content Placeholder 2">
+            <a:extLst>
+              <a:ext uri="{FF2B5EF4-FFF2-40B4-BE49-F238E27FC236}">
+                <a16:creationId xmlns:a16="http://schemas.microsoft.com/office/drawing/2014/main" id="{AA5DF3F7-8350-F924-067C-6062DEA38DC6}"/>
+              </a:ext>
+            </a:extLst>
+          </p:cNvPr>
+          <p:cNvSpPr>
+            <a:spLocks noGrp="1"/>
+          </p:cNvSpPr>
+          <p:nvPr>
+            <p:ph sz="quarter" idx="13"/>
+          </p:nvPr>
+        </p:nvSpPr>
+        <p:spPr/>
+        <p:txBody>
+          <a:bodyPr/>
+          <a:lstStyle/>
+          <a:p>
+            <a:endParaRPr lang="en-IN"/>
+          </a:p>
+        </p:txBody>
+      </p:sp>
+      <p:sp>
+        <p:nvSpPr>
+          <p:cNvPr id="4" name="Slide Number Placeholder 3">
+            <a:extLst>
+              <a:ext uri="{FF2B5EF4-FFF2-40B4-BE49-F238E27FC236}">
+                <a16:creationId xmlns:a16="http://schemas.microsoft.com/office/drawing/2014/main" id="{023EA18A-7BBC-A7A5-F52F-E930F453BA58}"/>
+              </a:ext>
+            </a:extLst>
+          </p:cNvPr>
+          <p:cNvSpPr>
+            <a:spLocks noGrp="1"/>
+          </p:cNvSpPr>
+          <p:nvPr>
+            <p:ph type="sldNum" sz="quarter" idx="12"/>
+          </p:nvPr>
+        </p:nvSpPr>
+        <p:spPr/>
+        <p:txBody>
+          <a:bodyPr/>
+          <a:lstStyle/>
+          <a:p>
+            <a:fld id="{EB37DED6-D4C7-42EE-AB49-D2E39E64FDE4}" type="slidenum">
+              <a:rPr lang="en-US" smtClean="0"/>
+              <a:pPr/>
+              <a:t>25</a:t>
             </a:fld>
             <a:endParaRPr lang="en-US" dirty="0"/>
           </a:p>
@@ -21568,15 +22598,6 @@
 </file>
 
 <file path=customXml/item1.xml><?xml version="1.0" encoding="utf-8"?>
-<?mso-contentType ?>
-<FormTemplates xmlns="http://schemas.microsoft.com/sharepoint/v3/contenttype/forms">
-  <Display>DocumentLibraryForm</Display>
-  <Edit>DocumentLibraryForm</Edit>
-  <New>DocumentLibraryForm</New>
-</FormTemplates>
-</file>
-
-<file path=customXml/item2.xml><?xml version="1.0" encoding="utf-8"?>
 <p:properties xmlns:p="http://schemas.microsoft.com/office/2006/metadata/properties" xmlns:xsi="http://www.w3.org/2001/XMLSchema-instance" xmlns:pc="http://schemas.microsoft.com/office/infopath/2007/PartnerControls">
   <documentManagement>
     <_ip_UnifiedCompliancePolicyUIAction xmlns="http://schemas.microsoft.com/sharepoint/v3" xsi:nil="true"/>
@@ -21594,6 +22615,15 @@
     <MediaServiceKeyPoints xmlns="71af3243-3dd4-4a8d-8c0d-dd76da1f02a5" xsi:nil="true"/>
   </documentManagement>
 </p:properties>
+</file>
+
+<file path=customXml/item2.xml><?xml version="1.0" encoding="utf-8"?>
+<?mso-contentType ?>
+<FormTemplates xmlns="http://schemas.microsoft.com/sharepoint/v3/contenttype/forms">
+  <Display>DocumentLibraryForm</Display>
+  <Edit>DocumentLibraryForm</Edit>
+  <New>DocumentLibraryForm</New>
+</FormTemplates>
 </file>
 
 <file path=customXml/item3.xml><?xml version="1.0" encoding="utf-8"?>
@@ -21909,14 +22939,6 @@
 </file>
 
 <file path=customXml/itemProps1.xml><?xml version="1.0" encoding="utf-8"?>
-<ds:datastoreItem xmlns:ds="http://schemas.openxmlformats.org/officeDocument/2006/customXml" ds:itemID="{F49F7C99-DB67-4EF2-86B4-C45C603BA94C}">
-  <ds:schemaRefs>
-    <ds:schemaRef ds:uri="http://schemas.microsoft.com/sharepoint/v3/contenttype/forms"/>
-  </ds:schemaRefs>
-</ds:datastoreItem>
-</file>
-
-<file path=customXml/itemProps2.xml><?xml version="1.0" encoding="utf-8"?>
 <ds:datastoreItem xmlns:ds="http://schemas.openxmlformats.org/officeDocument/2006/customXml" ds:itemID="{527F8595-6F9C-444F-81F9-1BB5383C5D01}">
   <ds:schemaRefs>
     <ds:schemaRef ds:uri="http://schemas.microsoft.com/office/2006/metadata/properties"/>
@@ -21924,6 +22946,14 @@
     <ds:schemaRef ds:uri="http://schemas.microsoft.com/sharepoint/v3"/>
     <ds:schemaRef ds:uri="71af3243-3dd4-4a8d-8c0d-dd76da1f02a5"/>
     <ds:schemaRef ds:uri="230e9df3-be65-4c73-a93b-d1236ebd677e"/>
+  </ds:schemaRefs>
+</ds:datastoreItem>
+</file>
+
+<file path=customXml/itemProps2.xml><?xml version="1.0" encoding="utf-8"?>
+<ds:datastoreItem xmlns:ds="http://schemas.openxmlformats.org/officeDocument/2006/customXml" ds:itemID="{F49F7C99-DB67-4EF2-86B4-C45C603BA94C}">
+  <ds:schemaRefs>
+    <ds:schemaRef ds:uri="http://schemas.microsoft.com/sharepoint/v3/contenttype/forms"/>
   </ds:schemaRefs>
 </ds:datastoreItem>
 </file>

</xml_diff>